<commit_message>
added weather trend chart
</commit_message>
<xml_diff>
--- a/Project-1-Presentation.pptx
+++ b/Project-1-Presentation.pptx
@@ -5,7 +5,7 @@
     <p:sldMasterId id="2147483712" r:id="rId1"/>
   </p:sldMasterIdLst>
   <p:notesMasterIdLst>
-    <p:notesMasterId r:id="rId21"/>
+    <p:notesMasterId r:id="rId22"/>
   </p:notesMasterIdLst>
   <p:sldIdLst>
     <p:sldId id="256" r:id="rId2"/>
@@ -18,15 +18,16 @@
     <p:sldId id="273" r:id="rId9"/>
     <p:sldId id="274" r:id="rId10"/>
     <p:sldId id="275" r:id="rId11"/>
-    <p:sldId id="272" r:id="rId12"/>
-    <p:sldId id="271" r:id="rId13"/>
-    <p:sldId id="258" r:id="rId14"/>
-    <p:sldId id="259" r:id="rId15"/>
-    <p:sldId id="264" r:id="rId16"/>
-    <p:sldId id="265" r:id="rId17"/>
-    <p:sldId id="267" r:id="rId18"/>
-    <p:sldId id="268" r:id="rId19"/>
-    <p:sldId id="276" r:id="rId20"/>
+    <p:sldId id="277" r:id="rId12"/>
+    <p:sldId id="272" r:id="rId13"/>
+    <p:sldId id="271" r:id="rId14"/>
+    <p:sldId id="258" r:id="rId15"/>
+    <p:sldId id="259" r:id="rId16"/>
+    <p:sldId id="264" r:id="rId17"/>
+    <p:sldId id="265" r:id="rId18"/>
+    <p:sldId id="267" r:id="rId19"/>
+    <p:sldId id="268" r:id="rId20"/>
+    <p:sldId id="276" r:id="rId21"/>
   </p:sldIdLst>
   <p:sldSz cx="12192000" cy="6858000"/>
   <p:notesSz cx="6858000" cy="9144000"/>
@@ -441,18 +442,18 @@
   <pc:docChgLst>
     <pc:chgData name="Mike Saunders" userId="c0986ea9a2f2a984" providerId="LiveId" clId="{A88E1021-0D6E-4899-A132-129726DC3689}"/>
     <pc:docChg chg="undo custSel addSld delSld modSld sldOrd">
-      <pc:chgData name="Mike Saunders" userId="c0986ea9a2f2a984" providerId="LiveId" clId="{A88E1021-0D6E-4899-A132-129726DC3689}" dt="2024-07-18T00:34:43.888" v="1323"/>
+      <pc:chgData name="Mike Saunders" userId="c0986ea9a2f2a984" providerId="LiveId" clId="{A88E1021-0D6E-4899-A132-129726DC3689}" dt="2024-07-18T23:06:18.854" v="1488" actId="6549"/>
       <pc:docMkLst>
         <pc:docMk/>
       </pc:docMkLst>
       <pc:sldChg chg="delSp modSp mod delDesignElem">
-        <pc:chgData name="Mike Saunders" userId="c0986ea9a2f2a984" providerId="LiveId" clId="{A88E1021-0D6E-4899-A132-129726DC3689}" dt="2024-07-17T23:58:03.217" v="1221" actId="20577"/>
+        <pc:chgData name="Mike Saunders" userId="c0986ea9a2f2a984" providerId="LiveId" clId="{A88E1021-0D6E-4899-A132-129726DC3689}" dt="2024-07-18T22:56:52.562" v="1345" actId="403"/>
         <pc:sldMkLst>
           <pc:docMk/>
           <pc:sldMk cId="4031883172" sldId="256"/>
         </pc:sldMkLst>
         <pc:spChg chg="mod">
-          <ac:chgData name="Mike Saunders" userId="c0986ea9a2f2a984" providerId="LiveId" clId="{A88E1021-0D6E-4899-A132-129726DC3689}" dt="2024-07-17T23:58:03.217" v="1221" actId="20577"/>
+          <ac:chgData name="Mike Saunders" userId="c0986ea9a2f2a984" providerId="LiveId" clId="{A88E1021-0D6E-4899-A132-129726DC3689}" dt="2024-07-18T22:56:52.562" v="1345" actId="403"/>
           <ac:spMkLst>
             <pc:docMk/>
             <pc:sldMk cId="4031883172" sldId="256"/>
@@ -832,7 +833,7 @@
         </pc:picChg>
       </pc:sldChg>
       <pc:sldChg chg="addSp delSp modSp add mod setBg delDesignElem chgLayout">
-        <pc:chgData name="Mike Saunders" userId="c0986ea9a2f2a984" providerId="LiveId" clId="{A88E1021-0D6E-4899-A132-129726DC3689}" dt="2024-07-17T23:05:54.270" v="261" actId="1076"/>
+        <pc:chgData name="Mike Saunders" userId="c0986ea9a2f2a984" providerId="LiveId" clId="{A88E1021-0D6E-4899-A132-129726DC3689}" dt="2024-07-18T23:05:24.419" v="1477" actId="1076"/>
         <pc:sldMkLst>
           <pc:docMk/>
           <pc:sldMk cId="3717669872" sldId="262"/>
@@ -926,7 +927,7 @@
           </ac:picMkLst>
         </pc:picChg>
         <pc:picChg chg="add mod">
-          <ac:chgData name="Mike Saunders" userId="c0986ea9a2f2a984" providerId="LiveId" clId="{A88E1021-0D6E-4899-A132-129726DC3689}" dt="2024-07-17T23:05:54.270" v="261" actId="1076"/>
+          <ac:chgData name="Mike Saunders" userId="c0986ea9a2f2a984" providerId="LiveId" clId="{A88E1021-0D6E-4899-A132-129726DC3689}" dt="2024-07-18T23:05:24.419" v="1477" actId="1076"/>
           <ac:picMkLst>
             <pc:docMk/>
             <pc:sldMk cId="3717669872" sldId="262"/>
@@ -935,7 +936,7 @@
         </pc:picChg>
       </pc:sldChg>
       <pc:sldChg chg="addSp delSp modSp new mod setBg">
-        <pc:chgData name="Mike Saunders" userId="c0986ea9a2f2a984" providerId="LiveId" clId="{A88E1021-0D6E-4899-A132-129726DC3689}" dt="2024-07-17T23:30:03.863" v="670" actId="1076"/>
+        <pc:chgData name="Mike Saunders" userId="c0986ea9a2f2a984" providerId="LiveId" clId="{A88E1021-0D6E-4899-A132-129726DC3689}" dt="2024-07-18T23:05:41.642" v="1480" actId="1076"/>
         <pc:sldMkLst>
           <pc:docMk/>
           <pc:sldMk cId="276345597" sldId="263"/>
@@ -957,7 +958,7 @@
           </ac:spMkLst>
         </pc:spChg>
         <pc:spChg chg="add mod">
-          <ac:chgData name="Mike Saunders" userId="c0986ea9a2f2a984" providerId="LiveId" clId="{A88E1021-0D6E-4899-A132-129726DC3689}" dt="2024-07-17T23:13:26.385" v="529" actId="1035"/>
+          <ac:chgData name="Mike Saunders" userId="c0986ea9a2f2a984" providerId="LiveId" clId="{A88E1021-0D6E-4899-A132-129726DC3689}" dt="2024-07-18T23:05:41.642" v="1480" actId="1076"/>
           <ac:spMkLst>
             <pc:docMk/>
             <pc:sldMk cId="276345597" sldId="263"/>
@@ -1234,7 +1235,7 @@
         </pc:picChg>
       </pc:sldChg>
       <pc:sldChg chg="addSp delSp modSp new mod setBg">
-        <pc:chgData name="Mike Saunders" userId="c0986ea9a2f2a984" providerId="LiveId" clId="{A88E1021-0D6E-4899-A132-129726DC3689}" dt="2024-07-17T23:56:08.563" v="1211" actId="14100"/>
+        <pc:chgData name="Mike Saunders" userId="c0986ea9a2f2a984" providerId="LiveId" clId="{A88E1021-0D6E-4899-A132-129726DC3689}" dt="2024-07-18T23:05:48.081" v="1482" actId="207"/>
         <pc:sldMkLst>
           <pc:docMk/>
           <pc:sldMk cId="1422104089" sldId="266"/>
@@ -1248,7 +1249,7 @@
           </ac:spMkLst>
         </pc:spChg>
         <pc:spChg chg="add mod">
-          <ac:chgData name="Mike Saunders" userId="c0986ea9a2f2a984" providerId="LiveId" clId="{A88E1021-0D6E-4899-A132-129726DC3689}" dt="2024-07-17T23:13:52.453" v="536" actId="20577"/>
+          <ac:chgData name="Mike Saunders" userId="c0986ea9a2f2a984" providerId="LiveId" clId="{A88E1021-0D6E-4899-A132-129726DC3689}" dt="2024-07-18T23:05:48.081" v="1482" actId="207"/>
           <ac:spMkLst>
             <pc:docMk/>
             <pc:sldMk cId="1422104089" sldId="266"/>
@@ -1730,6 +1731,281 @@
             <ac:spMk id="2" creationId="{2ACF58D5-2D97-563C-5A20-A5DF7CB90086}"/>
           </ac:spMkLst>
         </pc:spChg>
+      </pc:sldChg>
+      <pc:sldChg chg="modSp mod">
+        <pc:chgData name="Mike Saunders" userId="c0986ea9a2f2a984" providerId="LiveId" clId="{A88E1021-0D6E-4899-A132-129726DC3689}" dt="2024-07-18T23:06:01.883" v="1484" actId="207"/>
+        <pc:sldMkLst>
+          <pc:docMk/>
+          <pc:sldMk cId="4166704550" sldId="274"/>
+        </pc:sldMkLst>
+        <pc:spChg chg="mod">
+          <ac:chgData name="Mike Saunders" userId="c0986ea9a2f2a984" providerId="LiveId" clId="{A88E1021-0D6E-4899-A132-129726DC3689}" dt="2024-07-18T23:06:01.883" v="1484" actId="207"/>
+          <ac:spMkLst>
+            <pc:docMk/>
+            <pc:sldMk cId="4166704550" sldId="274"/>
+            <ac:spMk id="7" creationId="{7D1C0FCC-A79B-8D82-05D1-E4F87A5A0A11}"/>
+          </ac:spMkLst>
+        </pc:spChg>
+      </pc:sldChg>
+      <pc:sldChg chg="modSp mod">
+        <pc:chgData name="Mike Saunders" userId="c0986ea9a2f2a984" providerId="LiveId" clId="{A88E1021-0D6E-4899-A132-129726DC3689}" dt="2024-07-18T23:06:12.532" v="1486" actId="207"/>
+        <pc:sldMkLst>
+          <pc:docMk/>
+          <pc:sldMk cId="3940634714" sldId="275"/>
+        </pc:sldMkLst>
+        <pc:spChg chg="mod">
+          <ac:chgData name="Mike Saunders" userId="c0986ea9a2f2a984" providerId="LiveId" clId="{A88E1021-0D6E-4899-A132-129726DC3689}" dt="2024-07-18T23:06:12.532" v="1486" actId="207"/>
+          <ac:spMkLst>
+            <pc:docMk/>
+            <pc:sldMk cId="3940634714" sldId="275"/>
+            <ac:spMk id="7" creationId="{7D1C0FCC-A79B-8D82-05D1-E4F87A5A0A11}"/>
+          </ac:spMkLst>
+        </pc:spChg>
+      </pc:sldChg>
+      <pc:sldChg chg="addSp delSp modSp add mod setBg delDesignElem modNotesTx">
+        <pc:chgData name="Mike Saunders" userId="c0986ea9a2f2a984" providerId="LiveId" clId="{A88E1021-0D6E-4899-A132-129726DC3689}" dt="2024-07-18T23:06:18.854" v="1488" actId="6549"/>
+        <pc:sldMkLst>
+          <pc:docMk/>
+          <pc:sldMk cId="1590742534" sldId="277"/>
+        </pc:sldMkLst>
+        <pc:spChg chg="mod">
+          <ac:chgData name="Mike Saunders" userId="c0986ea9a2f2a984" providerId="LiveId" clId="{A88E1021-0D6E-4899-A132-129726DC3689}" dt="2024-07-18T23:04:38.706" v="1476" actId="20577"/>
+          <ac:spMkLst>
+            <pc:docMk/>
+            <pc:sldMk cId="1590742534" sldId="277"/>
+            <ac:spMk id="2" creationId="{56E94A04-04A0-FD3D-83EC-CBA731417051}"/>
+          </ac:spMkLst>
+        </pc:spChg>
+        <pc:spChg chg="del mod">
+          <ac:chgData name="Mike Saunders" userId="c0986ea9a2f2a984" providerId="LiveId" clId="{A88E1021-0D6E-4899-A132-129726DC3689}" dt="2024-07-18T23:03:53.952" v="1416" actId="478"/>
+          <ac:spMkLst>
+            <pc:docMk/>
+            <pc:sldMk cId="1590742534" sldId="277"/>
+            <ac:spMk id="7" creationId="{7D1C0FCC-A79B-8D82-05D1-E4F87A5A0A11}"/>
+          </ac:spMkLst>
+        </pc:spChg>
+        <pc:spChg chg="del">
+          <ac:chgData name="Mike Saunders" userId="c0986ea9a2f2a984" providerId="LiveId" clId="{A88E1021-0D6E-4899-A132-129726DC3689}" dt="2024-07-18T23:00:41.254" v="1351"/>
+          <ac:spMkLst>
+            <pc:docMk/>
+            <pc:sldMk cId="1590742534" sldId="277"/>
+            <ac:spMk id="9" creationId="{A8384FB5-9ADC-4DDC-881B-597D56F5B15D}"/>
+          </ac:spMkLst>
+        </pc:spChg>
+        <pc:spChg chg="add mod">
+          <ac:chgData name="Mike Saunders" userId="c0986ea9a2f2a984" providerId="LiveId" clId="{A88E1021-0D6E-4899-A132-129726DC3689}" dt="2024-07-18T23:04:25.593" v="1461" actId="1076"/>
+          <ac:spMkLst>
+            <pc:docMk/>
+            <pc:sldMk cId="1590742534" sldId="277"/>
+            <ac:spMk id="10" creationId="{09B234A6-59CE-142D-C352-173878D97BF5}"/>
+          </ac:spMkLst>
+        </pc:spChg>
+        <pc:spChg chg="del">
+          <ac:chgData name="Mike Saunders" userId="c0986ea9a2f2a984" providerId="LiveId" clId="{A88E1021-0D6E-4899-A132-129726DC3689}" dt="2024-07-18T23:00:41.254" v="1351"/>
+          <ac:spMkLst>
+            <pc:docMk/>
+            <pc:sldMk cId="1590742534" sldId="277"/>
+            <ac:spMk id="11" creationId="{1199E1B1-A8C0-4FE8-A5A8-1CB41D69F857}"/>
+          </ac:spMkLst>
+        </pc:spChg>
+        <pc:spChg chg="add">
+          <ac:chgData name="Mike Saunders" userId="c0986ea9a2f2a984" providerId="LiveId" clId="{A88E1021-0D6E-4899-A132-129726DC3689}" dt="2024-07-18T23:01:34.491" v="1364" actId="26606"/>
+          <ac:spMkLst>
+            <pc:docMk/>
+            <pc:sldMk cId="1590742534" sldId="277"/>
+            <ac:spMk id="12" creationId="{A8384FB5-9ADC-4DDC-881B-597D56F5B15D}"/>
+          </ac:spMkLst>
+        </pc:spChg>
+        <pc:spChg chg="del">
+          <ac:chgData name="Mike Saunders" userId="c0986ea9a2f2a984" providerId="LiveId" clId="{A88E1021-0D6E-4899-A132-129726DC3689}" dt="2024-07-18T23:00:41.254" v="1351"/>
+          <ac:spMkLst>
+            <pc:docMk/>
+            <pc:sldMk cId="1590742534" sldId="277"/>
+            <ac:spMk id="13" creationId="{84A8DE83-DE75-4B41-9DB4-A7EC0B0DEC0B}"/>
+          </ac:spMkLst>
+        </pc:spChg>
+        <pc:spChg chg="add">
+          <ac:chgData name="Mike Saunders" userId="c0986ea9a2f2a984" providerId="LiveId" clId="{A88E1021-0D6E-4899-A132-129726DC3689}" dt="2024-07-18T23:01:34.491" v="1364" actId="26606"/>
+          <ac:spMkLst>
+            <pc:docMk/>
+            <pc:sldMk cId="1590742534" sldId="277"/>
+            <ac:spMk id="14" creationId="{1199E1B1-A8C0-4FE8-A5A8-1CB41D69F857}"/>
+          </ac:spMkLst>
+        </pc:spChg>
+        <pc:spChg chg="del">
+          <ac:chgData name="Mike Saunders" userId="c0986ea9a2f2a984" providerId="LiveId" clId="{A88E1021-0D6E-4899-A132-129726DC3689}" dt="2024-07-18T23:00:41.254" v="1351"/>
+          <ac:spMkLst>
+            <pc:docMk/>
+            <pc:sldMk cId="1590742534" sldId="277"/>
+            <ac:spMk id="15" creationId="{A7009A0A-BEF5-4EAC-AF15-E4F9F002E239}"/>
+          </ac:spMkLst>
+        </pc:spChg>
+        <pc:spChg chg="add">
+          <ac:chgData name="Mike Saunders" userId="c0986ea9a2f2a984" providerId="LiveId" clId="{A88E1021-0D6E-4899-A132-129726DC3689}" dt="2024-07-18T23:01:34.491" v="1364" actId="26606"/>
+          <ac:spMkLst>
+            <pc:docMk/>
+            <pc:sldMk cId="1590742534" sldId="277"/>
+            <ac:spMk id="16" creationId="{84A8DE83-DE75-4B41-9DB4-A7EC0B0DEC0B}"/>
+          </ac:spMkLst>
+        </pc:spChg>
+        <pc:spChg chg="add">
+          <ac:chgData name="Mike Saunders" userId="c0986ea9a2f2a984" providerId="LiveId" clId="{A88E1021-0D6E-4899-A132-129726DC3689}" dt="2024-07-18T23:01:34.491" v="1364" actId="26606"/>
+          <ac:spMkLst>
+            <pc:docMk/>
+            <pc:sldMk cId="1590742534" sldId="277"/>
+            <ac:spMk id="18" creationId="{A7009A0A-BEF5-4EAC-AF15-E4F9F002E239}"/>
+          </ac:spMkLst>
+        </pc:spChg>
+        <pc:picChg chg="del">
+          <ac:chgData name="Mike Saunders" userId="c0986ea9a2f2a984" providerId="LiveId" clId="{A88E1021-0D6E-4899-A132-129726DC3689}" dt="2024-07-18T23:00:42.925" v="1352" actId="478"/>
+          <ac:picMkLst>
+            <pc:docMk/>
+            <pc:sldMk cId="1590742534" sldId="277"/>
+            <ac:picMk id="4" creationId="{7E1E60B8-0865-9EFB-5382-91AAB97DD036}"/>
+          </ac:picMkLst>
+        </pc:picChg>
+        <pc:picChg chg="add del mod">
+          <ac:chgData name="Mike Saunders" userId="c0986ea9a2f2a984" providerId="LiveId" clId="{A88E1021-0D6E-4899-A132-129726DC3689}" dt="2024-07-18T23:03:04.953" v="1381" actId="478"/>
+          <ac:picMkLst>
+            <pc:docMk/>
+            <pc:sldMk cId="1590742534" sldId="277"/>
+            <ac:picMk id="5" creationId="{C6F43B31-2361-D277-D40D-F0C578809BDD}"/>
+          </ac:picMkLst>
+        </pc:picChg>
+        <pc:picChg chg="add mod">
+          <ac:chgData name="Mike Saunders" userId="c0986ea9a2f2a984" providerId="LiveId" clId="{A88E1021-0D6E-4899-A132-129726DC3689}" dt="2024-07-18T23:04:30.854" v="1468" actId="1076"/>
+          <ac:picMkLst>
+            <pc:docMk/>
+            <pc:sldMk cId="1590742534" sldId="277"/>
+            <ac:picMk id="8" creationId="{7701BF50-4FBE-02BA-8031-2607A00A08F6}"/>
+          </ac:picMkLst>
+        </pc:picChg>
+      </pc:sldChg>
+      <pc:sldChg chg="addSp modSp new del mod setBg">
+        <pc:chgData name="Mike Saunders" userId="c0986ea9a2f2a984" providerId="LiveId" clId="{A88E1021-0D6E-4899-A132-129726DC3689}" dt="2024-07-18T23:00:32.998" v="1349" actId="47"/>
+        <pc:sldMkLst>
+          <pc:docMk/>
+          <pc:sldMk cId="3139819979" sldId="277"/>
+        </pc:sldMkLst>
+        <pc:spChg chg="mod">
+          <ac:chgData name="Mike Saunders" userId="c0986ea9a2f2a984" providerId="LiveId" clId="{A88E1021-0D6E-4899-A132-129726DC3689}" dt="2024-07-18T23:00:23.062" v="1348" actId="26606"/>
+          <ac:spMkLst>
+            <pc:docMk/>
+            <pc:sldMk cId="3139819979" sldId="277"/>
+            <ac:spMk id="2" creationId="{F3A2013F-40C7-CA0C-3772-6AA4A7F235B2}"/>
+          </ac:spMkLst>
+        </pc:spChg>
+        <pc:spChg chg="add">
+          <ac:chgData name="Mike Saunders" userId="c0986ea9a2f2a984" providerId="LiveId" clId="{A88E1021-0D6E-4899-A132-129726DC3689}" dt="2024-07-18T23:00:23.062" v="1348" actId="26606"/>
+          <ac:spMkLst>
+            <pc:docMk/>
+            <pc:sldMk cId="3139819979" sldId="277"/>
+            <ac:spMk id="9" creationId="{A4AC5506-6312-4701-8D3C-40187889A947}"/>
+          </ac:spMkLst>
+        </pc:spChg>
+        <pc:picChg chg="add mod">
+          <ac:chgData name="Mike Saunders" userId="c0986ea9a2f2a984" providerId="LiveId" clId="{A88E1021-0D6E-4899-A132-129726DC3689}" dt="2024-07-18T23:00:23.062" v="1348" actId="26606"/>
+          <ac:picMkLst>
+            <pc:docMk/>
+            <pc:sldMk cId="3139819979" sldId="277"/>
+            <ac:picMk id="4" creationId="{220DC481-1AA2-BFCA-15D8-3875467A67CF}"/>
+          </ac:picMkLst>
+        </pc:picChg>
+      </pc:sldChg>
+      <pc:sldChg chg="addSp delSp modSp add del mod setBg delDesignElem chgLayout">
+        <pc:chgData name="Mike Saunders" userId="c0986ea9a2f2a984" providerId="LiveId" clId="{A88E1021-0D6E-4899-A132-129726DC3689}" dt="2024-07-18T23:01:20.730" v="1362"/>
+        <pc:sldMkLst>
+          <pc:docMk/>
+          <pc:sldMk cId="680769365" sldId="278"/>
+        </pc:sldMkLst>
+        <pc:spChg chg="mod ord">
+          <ac:chgData name="Mike Saunders" userId="c0986ea9a2f2a984" providerId="LiveId" clId="{A88E1021-0D6E-4899-A132-129726DC3689}" dt="2024-07-18T23:01:20.064" v="1361" actId="700"/>
+          <ac:spMkLst>
+            <pc:docMk/>
+            <pc:sldMk cId="680769365" sldId="278"/>
+            <ac:spMk id="2" creationId="{56E94A04-04A0-FD3D-83EC-CBA731417051}"/>
+          </ac:spMkLst>
+        </pc:spChg>
+        <pc:spChg chg="mod">
+          <ac:chgData name="Mike Saunders" userId="c0986ea9a2f2a984" providerId="LiveId" clId="{A88E1021-0D6E-4899-A132-129726DC3689}" dt="2024-07-18T23:01:17.365" v="1360" actId="26606"/>
+          <ac:spMkLst>
+            <pc:docMk/>
+            <pc:sldMk cId="680769365" sldId="278"/>
+            <ac:spMk id="7" creationId="{7D1C0FCC-A79B-8D82-05D1-E4F87A5A0A11}"/>
+          </ac:spMkLst>
+        </pc:spChg>
+        <pc:spChg chg="add del">
+          <ac:chgData name="Mike Saunders" userId="c0986ea9a2f2a984" providerId="LiveId" clId="{A88E1021-0D6E-4899-A132-129726DC3689}" dt="2024-07-18T23:01:20.730" v="1362"/>
+          <ac:spMkLst>
+            <pc:docMk/>
+            <pc:sldMk cId="680769365" sldId="278"/>
+            <ac:spMk id="9" creationId="{A8384FB5-9ADC-4DDC-881B-597D56F5B15D}"/>
+          </ac:spMkLst>
+        </pc:spChg>
+        <pc:spChg chg="add del">
+          <ac:chgData name="Mike Saunders" userId="c0986ea9a2f2a984" providerId="LiveId" clId="{A88E1021-0D6E-4899-A132-129726DC3689}" dt="2024-07-18T23:01:20.730" v="1362"/>
+          <ac:spMkLst>
+            <pc:docMk/>
+            <pc:sldMk cId="680769365" sldId="278"/>
+            <ac:spMk id="11" creationId="{1199E1B1-A8C0-4FE8-A5A8-1CB41D69F857}"/>
+          </ac:spMkLst>
+        </pc:spChg>
+        <pc:spChg chg="add del">
+          <ac:chgData name="Mike Saunders" userId="c0986ea9a2f2a984" providerId="LiveId" clId="{A88E1021-0D6E-4899-A132-129726DC3689}" dt="2024-07-18T23:01:17.365" v="1360" actId="26606"/>
+          <ac:spMkLst>
+            <pc:docMk/>
+            <pc:sldMk cId="680769365" sldId="278"/>
+            <ac:spMk id="12" creationId="{A8384FB5-9ADC-4DDC-881B-597D56F5B15D}"/>
+          </ac:spMkLst>
+        </pc:spChg>
+        <pc:spChg chg="add del">
+          <ac:chgData name="Mike Saunders" userId="c0986ea9a2f2a984" providerId="LiveId" clId="{A88E1021-0D6E-4899-A132-129726DC3689}" dt="2024-07-18T23:01:20.730" v="1362"/>
+          <ac:spMkLst>
+            <pc:docMk/>
+            <pc:sldMk cId="680769365" sldId="278"/>
+            <ac:spMk id="13" creationId="{84A8DE83-DE75-4B41-9DB4-A7EC0B0DEC0B}"/>
+          </ac:spMkLst>
+        </pc:spChg>
+        <pc:spChg chg="add del">
+          <ac:chgData name="Mike Saunders" userId="c0986ea9a2f2a984" providerId="LiveId" clId="{A88E1021-0D6E-4899-A132-129726DC3689}" dt="2024-07-18T23:01:17.365" v="1360" actId="26606"/>
+          <ac:spMkLst>
+            <pc:docMk/>
+            <pc:sldMk cId="680769365" sldId="278"/>
+            <ac:spMk id="14" creationId="{1199E1B1-A8C0-4FE8-A5A8-1CB41D69F857}"/>
+          </ac:spMkLst>
+        </pc:spChg>
+        <pc:spChg chg="add del">
+          <ac:chgData name="Mike Saunders" userId="c0986ea9a2f2a984" providerId="LiveId" clId="{A88E1021-0D6E-4899-A132-129726DC3689}" dt="2024-07-18T23:01:20.730" v="1362"/>
+          <ac:spMkLst>
+            <pc:docMk/>
+            <pc:sldMk cId="680769365" sldId="278"/>
+            <ac:spMk id="15" creationId="{A7009A0A-BEF5-4EAC-AF15-E4F9F002E239}"/>
+          </ac:spMkLst>
+        </pc:spChg>
+        <pc:spChg chg="add del">
+          <ac:chgData name="Mike Saunders" userId="c0986ea9a2f2a984" providerId="LiveId" clId="{A88E1021-0D6E-4899-A132-129726DC3689}" dt="2024-07-18T23:01:17.365" v="1360" actId="26606"/>
+          <ac:spMkLst>
+            <pc:docMk/>
+            <pc:sldMk cId="680769365" sldId="278"/>
+            <ac:spMk id="16" creationId="{84A8DE83-DE75-4B41-9DB4-A7EC0B0DEC0B}"/>
+          </ac:spMkLst>
+        </pc:spChg>
+        <pc:spChg chg="add del">
+          <ac:chgData name="Mike Saunders" userId="c0986ea9a2f2a984" providerId="LiveId" clId="{A88E1021-0D6E-4899-A132-129726DC3689}" dt="2024-07-18T23:01:17.365" v="1360" actId="26606"/>
+          <ac:spMkLst>
+            <pc:docMk/>
+            <pc:sldMk cId="680769365" sldId="278"/>
+            <ac:spMk id="18" creationId="{A7009A0A-BEF5-4EAC-AF15-E4F9F002E239}"/>
+          </ac:spMkLst>
+        </pc:spChg>
+        <pc:picChg chg="mod">
+          <ac:chgData name="Mike Saunders" userId="c0986ea9a2f2a984" providerId="LiveId" clId="{A88E1021-0D6E-4899-A132-129726DC3689}" dt="2024-07-18T23:01:17.365" v="1360" actId="26606"/>
+          <ac:picMkLst>
+            <pc:docMk/>
+            <pc:sldMk cId="680769365" sldId="278"/>
+            <ac:picMk id="4" creationId="{7E1E60B8-0865-9EFB-5382-91AAB97DD036}"/>
+          </ac:picMkLst>
+        </pc:picChg>
       </pc:sldChg>
     </pc:docChg>
   </pc:docChgLst>
@@ -1818,7 +2094,7 @@
           <a:p>
             <a:fld id="{EED1439E-0D64-4804-80F6-7A6E36836B42}" type="datetimeFigureOut">
               <a:rPr lang="en-US" smtClean="0"/>
-              <a:t>7/18/24</a:t>
+              <a:t>7/18/2024</a:t>
             </a:fld>
             <a:endParaRPr lang="en-US"/>
           </a:p>
@@ -2343,6 +2619,90 @@
 </p:notes>
 </file>
 
+<file path=ppt/notesSlides/notesSlide4.xml><?xml version="1.0" encoding="utf-8"?>
+<p:notes xmlns:a="http://schemas.openxmlformats.org/drawingml/2006/main" xmlns:r="http://schemas.openxmlformats.org/officeDocument/2006/relationships" xmlns:p="http://schemas.openxmlformats.org/presentationml/2006/main">
+  <p:cSld>
+    <p:spTree>
+      <p:nvGrpSpPr>
+        <p:cNvPr id="1" name=""/>
+        <p:cNvGrpSpPr/>
+        <p:nvPr/>
+      </p:nvGrpSpPr>
+      <p:grpSpPr>
+        <a:xfrm>
+          <a:off x="0" y="0"/>
+          <a:ext cx="0" cy="0"/>
+          <a:chOff x="0" y="0"/>
+          <a:chExt cx="0" cy="0"/>
+        </a:xfrm>
+      </p:grpSpPr>
+      <p:sp>
+        <p:nvSpPr>
+          <p:cNvPr id="2" name="Slide Image Placeholder 1"/>
+          <p:cNvSpPr>
+            <a:spLocks noGrp="1" noRot="1" noChangeAspect="1"/>
+          </p:cNvSpPr>
+          <p:nvPr>
+            <p:ph type="sldImg"/>
+          </p:nvPr>
+        </p:nvSpPr>
+        <p:spPr/>
+      </p:sp>
+      <p:sp>
+        <p:nvSpPr>
+          <p:cNvPr id="3" name="Notes Placeholder 2"/>
+          <p:cNvSpPr>
+            <a:spLocks noGrp="1"/>
+          </p:cNvSpPr>
+          <p:nvPr>
+            <p:ph type="body" idx="1"/>
+          </p:nvPr>
+        </p:nvSpPr>
+        <p:spPr/>
+        <p:txBody>
+          <a:bodyPr/>
+          <a:lstStyle/>
+          <a:p>
+            <a:endParaRPr lang="en-US" dirty="0"/>
+          </a:p>
+        </p:txBody>
+      </p:sp>
+      <p:sp>
+        <p:nvSpPr>
+          <p:cNvPr id="4" name="Slide Number Placeholder 3"/>
+          <p:cNvSpPr>
+            <a:spLocks noGrp="1"/>
+          </p:cNvSpPr>
+          <p:nvPr>
+            <p:ph type="sldNum" sz="quarter" idx="5"/>
+          </p:nvPr>
+        </p:nvSpPr>
+        <p:spPr/>
+        <p:txBody>
+          <a:bodyPr/>
+          <a:lstStyle/>
+          <a:p>
+            <a:fld id="{5DBAAC1D-FCF9-47BC-9EB5-8EC3A97479DA}" type="slidenum">
+              <a:rPr lang="en-US" smtClean="0"/>
+              <a:t>11</a:t>
+            </a:fld>
+            <a:endParaRPr lang="en-US"/>
+          </a:p>
+        </p:txBody>
+      </p:sp>
+    </p:spTree>
+    <p:extLst>
+      <p:ext uri="{BB962C8B-B14F-4D97-AF65-F5344CB8AC3E}">
+        <p14:creationId xmlns:p14="http://schemas.microsoft.com/office/powerpoint/2010/main" val="3570900895"/>
+      </p:ext>
+    </p:extLst>
+  </p:cSld>
+  <p:clrMapOvr>
+    <a:masterClrMapping/>
+  </p:clrMapOvr>
+</p:notes>
+</file>
+
 <file path=ppt/slideLayouts/slideLayout1.xml><?xml version="1.0" encoding="utf-8"?>
 <p:sldLayout xmlns:a="http://schemas.openxmlformats.org/drawingml/2006/main" xmlns:r="http://schemas.openxmlformats.org/officeDocument/2006/relationships" xmlns:p="http://schemas.openxmlformats.org/presentationml/2006/main" type="title" preserve="1">
   <p:cSld name="Title Slide">
@@ -2490,7 +2850,7 @@
           <a:p>
             <a:fld id="{72345051-2045-45DA-935E-2E3CA1A69ADC}" type="datetimeFigureOut">
               <a:rPr lang="en-US" smtClean="0"/>
-              <a:t>7/18/24</a:t>
+              <a:t>7/18/2024</a:t>
             </a:fld>
             <a:endParaRPr lang="en-US" dirty="0"/>
           </a:p>
@@ -2688,7 +3048,7 @@
           <a:p>
             <a:fld id="{72345051-2045-45DA-935E-2E3CA1A69ADC}" type="datetimeFigureOut">
               <a:rPr lang="en-US" smtClean="0"/>
-              <a:t>7/18/24</a:t>
+              <a:t>7/18/2024</a:t>
             </a:fld>
             <a:endParaRPr lang="en-US"/>
           </a:p>
@@ -2896,7 +3256,7 @@
           <a:p>
             <a:fld id="{72345051-2045-45DA-935E-2E3CA1A69ADC}" type="datetimeFigureOut">
               <a:rPr lang="en-US" smtClean="0"/>
-              <a:t>7/18/24</a:t>
+              <a:t>7/18/2024</a:t>
             </a:fld>
             <a:endParaRPr lang="en-US"/>
           </a:p>
@@ -3094,7 +3454,7 @@
           <a:p>
             <a:fld id="{72345051-2045-45DA-935E-2E3CA1A69ADC}" type="datetimeFigureOut">
               <a:rPr lang="en-US" smtClean="0"/>
-              <a:t>7/18/24</a:t>
+              <a:t>7/18/2024</a:t>
             </a:fld>
             <a:endParaRPr lang="en-US"/>
           </a:p>
@@ -3369,7 +3729,7 @@
           <a:p>
             <a:fld id="{72345051-2045-45DA-935E-2E3CA1A69ADC}" type="datetimeFigureOut">
               <a:rPr lang="en-US" smtClean="0"/>
-              <a:t>7/18/24</a:t>
+              <a:t>7/18/2024</a:t>
             </a:fld>
             <a:endParaRPr lang="en-US"/>
           </a:p>
@@ -3634,7 +3994,7 @@
           <a:p>
             <a:fld id="{72345051-2045-45DA-935E-2E3CA1A69ADC}" type="datetimeFigureOut">
               <a:rPr lang="en-US" smtClean="0"/>
-              <a:t>7/18/24</a:t>
+              <a:t>7/18/2024</a:t>
             </a:fld>
             <a:endParaRPr lang="en-US"/>
           </a:p>
@@ -4046,7 +4406,7 @@
           <a:p>
             <a:fld id="{72345051-2045-45DA-935E-2E3CA1A69ADC}" type="datetimeFigureOut">
               <a:rPr lang="en-US" smtClean="0"/>
-              <a:t>7/18/24</a:t>
+              <a:t>7/18/2024</a:t>
             </a:fld>
             <a:endParaRPr lang="en-US"/>
           </a:p>
@@ -4187,7 +4547,7 @@
           <a:p>
             <a:fld id="{72345051-2045-45DA-935E-2E3CA1A69ADC}" type="datetimeFigureOut">
               <a:rPr lang="en-US" smtClean="0"/>
-              <a:t>7/18/24</a:t>
+              <a:t>7/18/2024</a:t>
             </a:fld>
             <a:endParaRPr lang="en-US"/>
           </a:p>
@@ -4300,7 +4660,7 @@
           <a:p>
             <a:fld id="{72345051-2045-45DA-935E-2E3CA1A69ADC}" type="datetimeFigureOut">
               <a:rPr lang="en-US" smtClean="0"/>
-              <a:t>7/18/24</a:t>
+              <a:t>7/18/2024</a:t>
             </a:fld>
             <a:endParaRPr lang="en-US"/>
           </a:p>
@@ -4611,7 +4971,7 @@
           <a:p>
             <a:fld id="{72345051-2045-45DA-935E-2E3CA1A69ADC}" type="datetimeFigureOut">
               <a:rPr lang="en-US" smtClean="0"/>
-              <a:t>7/18/24</a:t>
+              <a:t>7/18/2024</a:t>
             </a:fld>
             <a:endParaRPr lang="en-US"/>
           </a:p>
@@ -4899,7 +5259,7 @@
           <a:p>
             <a:fld id="{72345051-2045-45DA-935E-2E3CA1A69ADC}" type="datetimeFigureOut">
               <a:rPr lang="en-US" smtClean="0"/>
-              <a:t>7/18/24</a:t>
+              <a:t>7/18/2024</a:t>
             </a:fld>
             <a:endParaRPr lang="en-US"/>
           </a:p>
@@ -5140,7 +5500,7 @@
           <a:p>
             <a:fld id="{72345051-2045-45DA-935E-2E3CA1A69ADC}" type="datetimeFigureOut">
               <a:rPr lang="en-US" smtClean="0"/>
-              <a:t>7/18/24</a:t>
+              <a:t>7/18/2024</a:t>
             </a:fld>
             <a:endParaRPr lang="en-US" dirty="0"/>
           </a:p>
@@ -5594,10 +5954,10 @@
           <a:lstStyle/>
           <a:p>
             <a:r>
-              <a:rPr lang="en-US" sz="2800" dirty="0">
+              <a:rPr lang="en-US" sz="3200" dirty="0">
                 <a:latin typeface="Amasis MT Pro Black" panose="020F0502020204030204" pitchFamily="18" charset="0"/>
               </a:rPr>
-              <a:t>Understanding the Impact of Temperature on Influenza Hospitalizations, With a Look at Population and Historical Temperature Trends</a:t>
+              <a:t>Investigating the Impact of Weather and Influenza as Well as Population Growth</a:t>
             </a:r>
           </a:p>
         </p:txBody>
@@ -6195,7 +6555,7 @@
         </p:nvSpPr>
         <p:spPr>
           <a:xfrm>
-            <a:off x="10024056" y="6498460"/>
+            <a:off x="8828567" y="602488"/>
             <a:ext cx="2146476" cy="369332"/>
           </a:xfrm>
           <a:prstGeom prst="rect">
@@ -6210,7 +6570,11 @@
           <a:lstStyle/>
           <a:p>
             <a:r>
-              <a:rPr lang="en-US" dirty="0"/>
+              <a:rPr lang="en-US" dirty="0">
+                <a:solidFill>
+                  <a:schemeClr val="bg1"/>
+                </a:solidFill>
+              </a:rPr>
               <a:t>Correlation: 0.0667</a:t>
             </a:r>
           </a:p>
@@ -6292,10 +6656,10 @@
       </p:grpSpPr>
       <p:sp useBgFill="1">
         <p:nvSpPr>
-          <p:cNvPr id="8" name="Rectangle 7">
-            <a:extLst>
-              <a:ext uri="{FF2B5EF4-FFF2-40B4-BE49-F238E27FC236}">
-                <a16:creationId xmlns:a16="http://schemas.microsoft.com/office/drawing/2014/main" id="{1B15ED52-F352-441B-82BF-E0EA34836D08}"/>
+          <p:cNvPr id="12" name="Rectangle 11">
+            <a:extLst>
+              <a:ext uri="{FF2B5EF4-FFF2-40B4-BE49-F238E27FC236}">
+                <a16:creationId xmlns:a16="http://schemas.microsoft.com/office/drawing/2014/main" id="{A8384FB5-9ADC-4DDC-881B-597D56F5B15D}"/>
               </a:ext>
               <a:ext uri="{C183D7F6-B498-43B3-948B-1728B52AA6E4}">
                 <adec:decorative xmlns:adec="http://schemas.microsoft.com/office/drawing/2017/decorative" val="1"/>
@@ -6368,10 +6732,10 @@
       </p:sp>
       <p:sp>
         <p:nvSpPr>
-          <p:cNvPr id="10" name="Rectangle 9">
-            <a:extLst>
-              <a:ext uri="{FF2B5EF4-FFF2-40B4-BE49-F238E27FC236}">
-                <a16:creationId xmlns:a16="http://schemas.microsoft.com/office/drawing/2014/main" id="{3B2E3793-BFE6-45A2-9B7B-E18844431C99}"/>
+          <p:cNvPr id="14" name="Rectangle 13">
+            <a:extLst>
+              <a:ext uri="{FF2B5EF4-FFF2-40B4-BE49-F238E27FC236}">
+                <a16:creationId xmlns:a16="http://schemas.microsoft.com/office/drawing/2014/main" id="{1199E1B1-A8C0-4FE8-A5A8-1CB41D69F857}"/>
               </a:ext>
               <a:ext uri="{C183D7F6-B498-43B3-948B-1728B52AA6E4}">
                 <adec:decorative xmlns:adec="http://schemas.microsoft.com/office/drawing/2017/decorative" val="1"/>
@@ -6390,9 +6754,9 @@
           </p:nvPr>
         </p:nvSpPr>
         <p:spPr>
-          <a:xfrm flipH="1">
-            <a:off x="-1" y="-1"/>
-            <a:ext cx="12191998" cy="1590742"/>
+          <a:xfrm rot="10800000" flipH="1">
+            <a:off x="2" y="0"/>
+            <a:ext cx="12191998" cy="1575955"/>
           </a:xfrm>
           <a:prstGeom prst="rect">
             <a:avLst/>
@@ -6400,11 +6764,90 @@
           <a:gradFill>
             <a:gsLst>
               <a:gs pos="0">
-                <a:srgbClr val="000000"/>
+                <a:srgbClr val="000000">
+                  <a:alpha val="96000"/>
+                </a:srgbClr>
               </a:gs>
               <a:gs pos="100000">
                 <a:schemeClr val="accent1">
                   <a:lumMod val="75000"/>
+                </a:schemeClr>
+              </a:gs>
+            </a:gsLst>
+            <a:lin ang="6000000" scaled="0"/>
+          </a:gradFill>
+          <a:ln>
+            <a:noFill/>
+          </a:ln>
+        </p:spPr>
+        <p:style>
+          <a:lnRef idx="2">
+            <a:schemeClr val="accent1">
+              <a:shade val="50000"/>
+            </a:schemeClr>
+          </a:lnRef>
+          <a:fillRef idx="1">
+            <a:schemeClr val="accent1"/>
+          </a:fillRef>
+          <a:effectRef idx="0">
+            <a:schemeClr val="accent1"/>
+          </a:effectRef>
+          <a:fontRef idx="minor">
+            <a:schemeClr val="lt1"/>
+          </a:fontRef>
+        </p:style>
+        <p:txBody>
+          <a:bodyPr rtlCol="0" anchor="ctr"/>
+          <a:lstStyle/>
+          <a:p>
+            <a:pPr algn="ctr"/>
+            <a:endParaRPr lang="en-US"/>
+          </a:p>
+        </p:txBody>
+      </p:sp>
+      <p:sp>
+        <p:nvSpPr>
+          <p:cNvPr id="16" name="Rectangle 15">
+            <a:extLst>
+              <a:ext uri="{FF2B5EF4-FFF2-40B4-BE49-F238E27FC236}">
+                <a16:creationId xmlns:a16="http://schemas.microsoft.com/office/drawing/2014/main" id="{84A8DE83-DE75-4B41-9DB4-A7EC0B0DEC0B}"/>
+              </a:ext>
+              <a:ext uri="{C183D7F6-B498-43B3-948B-1728B52AA6E4}">
+                <adec:decorative xmlns:adec="http://schemas.microsoft.com/office/drawing/2017/decorative" val="1"/>
+              </a:ext>
+            </a:extLst>
+          </p:cNvPr>
+          <p:cNvSpPr>
+            <a:spLocks noGrp="1" noRot="1" noChangeAspect="1" noMove="1" noResize="1" noEditPoints="1" noAdjustHandles="1" noChangeArrowheads="1" noChangeShapeType="1" noTextEdit="1"/>
+          </p:cNvSpPr>
+          <p:nvPr>
+            <p:extLst>
+              <p:ext uri="{386F3935-93C4-4BCD-93E2-E3B085C9AB24}">
+                <p16:designElem xmlns:p16="http://schemas.microsoft.com/office/powerpoint/2015/main" val="1"/>
+              </p:ext>
+            </p:extLst>
+          </p:nvPr>
+        </p:nvSpPr>
+        <p:spPr>
+          <a:xfrm>
+            <a:off x="0" y="0"/>
+            <a:ext cx="8128856" cy="1575461"/>
+          </a:xfrm>
+          <a:prstGeom prst="rect">
+            <a:avLst/>
+          </a:prstGeom>
+          <a:gradFill>
+            <a:gsLst>
+              <a:gs pos="0">
+                <a:schemeClr val="accent1">
+                  <a:alpha val="41000"/>
+                </a:schemeClr>
+              </a:gs>
+              <a:gs pos="74000">
+                <a:schemeClr val="accent1">
+                  <a:lumMod val="60000"/>
+                  <a:lumOff val="40000"/>
+                  <a:alpha val="0"/>
                 </a:schemeClr>
               </a:gs>
             </a:gsLst>
@@ -6441,10 +6884,10 @@
       </p:sp>
       <p:sp>
         <p:nvSpPr>
-          <p:cNvPr id="12" name="Rectangle 11">
-            <a:extLst>
-              <a:ext uri="{FF2B5EF4-FFF2-40B4-BE49-F238E27FC236}">
-                <a16:creationId xmlns:a16="http://schemas.microsoft.com/office/drawing/2014/main" id="{BC4C4868-CB8F-4AF9-9CDB-8108F2C19B67}"/>
+          <p:cNvPr id="18" name="Rectangle 17">
+            <a:extLst>
+              <a:ext uri="{FF2B5EF4-FFF2-40B4-BE49-F238E27FC236}">
+                <a16:creationId xmlns:a16="http://schemas.microsoft.com/office/drawing/2014/main" id="{A7009A0A-BEF5-4EAC-AF15-E4F9F002E239}"/>
               </a:ext>
               <a:ext uri="{C183D7F6-B498-43B3-948B-1728B52AA6E4}">
                 <adec:decorative xmlns:adec="http://schemas.microsoft.com/office/drawing/2017/decorative" val="1"/>
@@ -6463,28 +6906,27 @@
           </p:nvPr>
         </p:nvSpPr>
         <p:spPr>
-          <a:xfrm rot="10800000" flipH="1">
-            <a:off x="-3" y="0"/>
-            <a:ext cx="8115306" cy="1590742"/>
+          <a:xfrm flipH="1">
+            <a:off x="-3" y="-1"/>
+            <a:ext cx="12192002" cy="1574311"/>
           </a:xfrm>
           <a:prstGeom prst="rect">
             <a:avLst/>
           </a:prstGeom>
           <a:gradFill>
             <a:gsLst>
-              <a:gs pos="20000">
+              <a:gs pos="0">
+                <a:srgbClr val="000000">
+                  <a:alpha val="63000"/>
+                </a:srgbClr>
+              </a:gs>
+              <a:gs pos="78000">
                 <a:schemeClr val="accent1">
-                  <a:alpha val="0"/>
-                </a:schemeClr>
-              </a:gs>
-              <a:gs pos="100000">
-                <a:schemeClr val="accent1">
-                  <a:lumMod val="50000"/>
-                  <a:alpha val="55000"/>
+                  <a:alpha val="15000"/>
                 </a:schemeClr>
               </a:gs>
             </a:gsLst>
-            <a:lin ang="13800000" scaled="0"/>
+            <a:lin ang="15600000" scaled="0"/>
           </a:gradFill>
           <a:ln>
             <a:noFill/>
@@ -6517,266 +6959,116 @@
       </p:sp>
       <p:sp>
         <p:nvSpPr>
-          <p:cNvPr id="14" name="Rectangle 13">
-            <a:extLst>
-              <a:ext uri="{FF2B5EF4-FFF2-40B4-BE49-F238E27FC236}">
-                <a16:creationId xmlns:a16="http://schemas.microsoft.com/office/drawing/2014/main" id="{375E0459-6403-40CD-989D-56A4407CA12E}"/>
-              </a:ext>
-              <a:ext uri="{C183D7F6-B498-43B3-948B-1728B52AA6E4}">
-                <adec:decorative xmlns:adec="http://schemas.microsoft.com/office/drawing/2017/decorative" val="1"/>
-              </a:ext>
-            </a:extLst>
-          </p:cNvPr>
-          <p:cNvSpPr>
-            <a:spLocks noGrp="1" noRot="1" noChangeAspect="1" noMove="1" noResize="1" noEditPoints="1" noAdjustHandles="1" noChangeArrowheads="1" noChangeShapeType="1" noTextEdit="1"/>
-          </p:cNvSpPr>
-          <p:nvPr>
-            <p:extLst>
-              <p:ext uri="{386F3935-93C4-4BCD-93E2-E3B085C9AB24}">
-                <p16:designElem xmlns:p16="http://schemas.microsoft.com/office/powerpoint/2015/main" val="1"/>
-              </p:ext>
-            </p:extLst>
-          </p:nvPr>
-        </p:nvSpPr>
-        <p:spPr>
-          <a:xfrm flipH="1">
-            <a:off x="8115299" y="-1"/>
-            <a:ext cx="4076698" cy="1590742"/>
-          </a:xfrm>
-          <a:prstGeom prst="rect">
-            <a:avLst/>
-          </a:prstGeom>
-          <a:gradFill>
-            <a:gsLst>
-              <a:gs pos="0">
-                <a:schemeClr val="accent1">
-                  <a:alpha val="66000"/>
-                </a:schemeClr>
-              </a:gs>
-              <a:gs pos="100000">
-                <a:srgbClr val="000000">
-                  <a:alpha val="30000"/>
-                </a:srgbClr>
-              </a:gs>
-            </a:gsLst>
-            <a:lin ang="13200000" scaled="0"/>
-          </a:gradFill>
-          <a:ln>
-            <a:noFill/>
-          </a:ln>
-        </p:spPr>
-        <p:style>
-          <a:lnRef idx="2">
-            <a:schemeClr val="accent1">
-              <a:shade val="50000"/>
-            </a:schemeClr>
-          </a:lnRef>
-          <a:fillRef idx="1">
-            <a:schemeClr val="accent1"/>
-          </a:fillRef>
-          <a:effectRef idx="0">
-            <a:schemeClr val="accent1"/>
-          </a:effectRef>
-          <a:fontRef idx="minor">
-            <a:schemeClr val="lt1"/>
-          </a:fontRef>
-        </p:style>
-        <p:txBody>
-          <a:bodyPr rtlCol="0" anchor="ctr"/>
-          <a:lstStyle/>
-          <a:p>
-            <a:pPr algn="ctr"/>
-            <a:endParaRPr lang="en-US"/>
-          </a:p>
-        </p:txBody>
-      </p:sp>
-      <p:sp>
-        <p:nvSpPr>
-          <p:cNvPr id="19" name="Rectangle 18">
-            <a:extLst>
-              <a:ext uri="{FF2B5EF4-FFF2-40B4-BE49-F238E27FC236}">
-                <a16:creationId xmlns:a16="http://schemas.microsoft.com/office/drawing/2014/main" id="{53E5B1A8-3AC9-4BD1-9BBC-78CA94F2D1BA}"/>
-              </a:ext>
-              <a:ext uri="{C183D7F6-B498-43B3-948B-1728B52AA6E4}">
-                <adec:decorative xmlns:adec="http://schemas.microsoft.com/office/drawing/2017/decorative" val="1"/>
-              </a:ext>
-            </a:extLst>
-          </p:cNvPr>
-          <p:cNvSpPr>
-            <a:spLocks noGrp="1" noRot="1" noChangeAspect="1" noMove="1" noResize="1" noEditPoints="1" noAdjustHandles="1" noChangeArrowheads="1" noChangeShapeType="1" noTextEdit="1"/>
-          </p:cNvSpPr>
-          <p:nvPr>
-            <p:extLst>
-              <p:ext uri="{386F3935-93C4-4BCD-93E2-E3B085C9AB24}">
-                <p16:designElem xmlns:p16="http://schemas.microsoft.com/office/powerpoint/2015/main" val="1"/>
-              </p:ext>
-            </p:extLst>
+          <p:cNvPr id="2" name="Title 1">
+            <a:extLst>
+              <a:ext uri="{FF2B5EF4-FFF2-40B4-BE49-F238E27FC236}">
+                <a16:creationId xmlns:a16="http://schemas.microsoft.com/office/drawing/2014/main" id="{56E94A04-04A0-FD3D-83EC-CBA731417051}"/>
+              </a:ext>
+            </a:extLst>
+          </p:cNvPr>
+          <p:cNvSpPr>
+            <a:spLocks noGrp="1"/>
+          </p:cNvSpPr>
+          <p:nvPr>
+            <p:ph type="title"/>
           </p:nvPr>
         </p:nvSpPr>
         <p:spPr>
           <a:xfrm>
-            <a:off x="459350" y="-1"/>
-            <a:ext cx="11732646" cy="1597433"/>
-          </a:xfrm>
-          <a:prstGeom prst="rect">
-            <a:avLst/>
-          </a:prstGeom>
-          <a:gradFill>
-            <a:gsLst>
-              <a:gs pos="50000">
-                <a:srgbClr val="000000">
-                  <a:alpha val="0"/>
-                </a:srgbClr>
-              </a:gs>
-              <a:gs pos="99000">
-                <a:schemeClr val="accent1">
-                  <a:lumMod val="50000"/>
-                  <a:alpha val="52000"/>
-                </a:schemeClr>
-              </a:gs>
-            </a:gsLst>
-            <a:lin ang="16800000" scaled="0"/>
-          </a:gradFill>
-          <a:ln>
-            <a:noFill/>
-          </a:ln>
-        </p:spPr>
-        <p:style>
-          <a:lnRef idx="2">
-            <a:schemeClr val="accent1">
-              <a:shade val="50000"/>
-            </a:schemeClr>
-          </a:lnRef>
-          <a:fillRef idx="1">
-            <a:schemeClr val="accent1"/>
-          </a:fillRef>
-          <a:effectRef idx="0">
-            <a:schemeClr val="accent1"/>
-          </a:effectRef>
-          <a:fontRef idx="minor">
-            <a:schemeClr val="lt1"/>
-          </a:fontRef>
-        </p:style>
-        <p:txBody>
-          <a:bodyPr rtlCol="0" anchor="ctr"/>
-          <a:lstStyle/>
-          <a:p>
-            <a:pPr algn="ctr"/>
-            <a:endParaRPr lang="en-US"/>
-          </a:p>
-        </p:txBody>
-      </p:sp>
-      <p:sp>
-        <p:nvSpPr>
-          <p:cNvPr id="3" name="Title 2">
-            <a:extLst>
-              <a:ext uri="{FF2B5EF4-FFF2-40B4-BE49-F238E27FC236}">
-                <a16:creationId xmlns:a16="http://schemas.microsoft.com/office/drawing/2014/main" id="{EA5357D9-D4FB-4AAD-8A2F-1178ADF39DA1}"/>
-              </a:ext>
-            </a:extLst>
-          </p:cNvPr>
-          <p:cNvSpPr>
-            <a:spLocks noGrp="1"/>
-          </p:cNvSpPr>
-          <p:nvPr>
-            <p:ph type="title"/>
-          </p:nvPr>
-        </p:nvSpPr>
-        <p:spPr>
-          <a:xfrm>
-            <a:off x="1371599" y="294538"/>
-            <a:ext cx="9895951" cy="1033669"/>
-          </a:xfrm>
-        </p:spPr>
-        <p:txBody>
-          <a:bodyPr>
+            <a:off x="699713" y="248038"/>
+            <a:ext cx="7063721" cy="1159200"/>
+          </a:xfrm>
+        </p:spPr>
+        <p:txBody>
+          <a:bodyPr vert="horz" lIns="91440" tIns="45720" rIns="91440" bIns="45720" rtlCol="0" anchor="ctr">
             <a:normAutofit/>
           </a:bodyPr>
           <a:lstStyle/>
           <a:p>
             <a:r>
-              <a:rPr lang="en-US" sz="4000" dirty="0">
+              <a:rPr lang="en-US" sz="3700" dirty="0">
                 <a:solidFill>
                   <a:srgbClr val="FFFFFF"/>
                 </a:solidFill>
               </a:rPr>
-              <a:t>Next Steps</a:t>
+              <a:t>Ohio Average Temperature Trend</a:t>
             </a:r>
-          </a:p>
-        </p:txBody>
-      </p:sp>
-      <p:sp>
-        <p:nvSpPr>
-          <p:cNvPr id="4" name="Content Placeholder 3">
-            <a:extLst>
-              <a:ext uri="{FF2B5EF4-FFF2-40B4-BE49-F238E27FC236}">
-                <a16:creationId xmlns:a16="http://schemas.microsoft.com/office/drawing/2014/main" id="{A334D890-1D5F-47EF-1BC9-33EF85062CF7}"/>
-              </a:ext>
-            </a:extLst>
-          </p:cNvPr>
-          <p:cNvSpPr>
-            <a:spLocks noGrp="1"/>
-          </p:cNvSpPr>
-          <p:nvPr>
-            <p:ph idx="1"/>
-          </p:nvPr>
-        </p:nvSpPr>
-        <p:spPr/>
-        <p:txBody>
-          <a:bodyPr/>
-          <a:lstStyle/>
-          <a:p>
-            <a:pPr marL="0" indent="0">
-              <a:buNone/>
-            </a:pPr>
+            <a:endParaRPr lang="en-US" sz="3700" kern="1200" dirty="0">
+              <a:solidFill>
+                <a:srgbClr val="FFFFFF"/>
+              </a:solidFill>
+              <a:latin typeface="+mj-lt"/>
+              <a:ea typeface="+mj-ea"/>
+              <a:cs typeface="+mj-cs"/>
+            </a:endParaRPr>
+          </a:p>
+        </p:txBody>
+      </p:sp>
+      <p:pic>
+        <p:nvPicPr>
+          <p:cNvPr id="8" name="Picture 7">
+            <a:extLst>
+              <a:ext uri="{FF2B5EF4-FFF2-40B4-BE49-F238E27FC236}">
+                <a16:creationId xmlns:a16="http://schemas.microsoft.com/office/drawing/2014/main" id="{7701BF50-4FBE-02BA-8031-2607A00A08F6}"/>
+              </a:ext>
+            </a:extLst>
+          </p:cNvPr>
+          <p:cNvPicPr>
+            <a:picLocks noChangeAspect="1"/>
+          </p:cNvPicPr>
+          <p:nvPr/>
+        </p:nvPicPr>
+        <p:blipFill>
+          <a:blip r:embed="rId3"/>
+          <a:stretch>
+            <a:fillRect/>
+          </a:stretch>
+        </p:blipFill>
+        <p:spPr>
+          <a:xfrm>
+            <a:off x="0" y="2636607"/>
+            <a:ext cx="12192000" cy="2695128"/>
+          </a:xfrm>
+          <a:prstGeom prst="rect">
+            <a:avLst/>
+          </a:prstGeom>
+        </p:spPr>
+      </p:pic>
+      <p:sp>
+        <p:nvSpPr>
+          <p:cNvPr id="10" name="TextBox 9">
+            <a:extLst>
+              <a:ext uri="{FF2B5EF4-FFF2-40B4-BE49-F238E27FC236}">
+                <a16:creationId xmlns:a16="http://schemas.microsoft.com/office/drawing/2014/main" id="{09B234A6-59CE-142D-C352-173878D97BF5}"/>
+              </a:ext>
+            </a:extLst>
+          </p:cNvPr>
+          <p:cNvSpPr txBox="1"/>
+          <p:nvPr/>
+        </p:nvSpPr>
+        <p:spPr>
+          <a:xfrm>
+            <a:off x="8423253" y="602488"/>
+            <a:ext cx="3474349" cy="369332"/>
+          </a:xfrm>
+          <a:prstGeom prst="rect">
+            <a:avLst/>
+          </a:prstGeom>
+          <a:noFill/>
+        </p:spPr>
+        <p:txBody>
+          <a:bodyPr wrap="none" rtlCol="0">
+            <a:spAutoFit/>
+          </a:bodyPr>
+          <a:lstStyle/>
+          <a:p>
             <a:r>
-              <a:rPr lang="en-US" dirty="0"/>
-              <a:t>Influenza</a:t>
-            </a:r>
-          </a:p>
-          <a:p>
-            <a:pPr lvl="1"/>
-            <a:r>
-              <a:rPr lang="en-US" dirty="0"/>
-              <a:t>Try to get influenza data based on diagnosis vs hospitalizations</a:t>
-            </a:r>
-          </a:p>
-          <a:p>
-            <a:endParaRPr lang="en-US" dirty="0"/>
-          </a:p>
-          <a:p>
-            <a:pPr marL="0" indent="0">
-              <a:buNone/>
-            </a:pPr>
-            <a:r>
-              <a:rPr lang="en-US" dirty="0"/>
-              <a:t>Temperature</a:t>
-            </a:r>
-          </a:p>
-          <a:p>
-            <a:pPr lvl="1"/>
-            <a:r>
-              <a:rPr lang="en-US" dirty="0"/>
-              <a:t>XXX</a:t>
-            </a:r>
-          </a:p>
-          <a:p>
-            <a:endParaRPr lang="en-US" dirty="0"/>
-          </a:p>
-          <a:p>
-            <a:pPr marL="0" indent="0">
-              <a:buNone/>
-            </a:pPr>
-            <a:r>
-              <a:rPr lang="en-US" dirty="0"/>
-              <a:t>Census</a:t>
-            </a:r>
-          </a:p>
-          <a:p>
-            <a:pPr lvl="1"/>
-            <a:r>
-              <a:rPr lang="en-US" dirty="0"/>
-              <a:t>Analyze temperatures based on seasons, graph, and look for correlation</a:t>
+              <a:rPr lang="en-US" dirty="0">
+                <a:solidFill>
+                  <a:schemeClr val="bg1"/>
+                </a:solidFill>
+              </a:rPr>
+              <a:t>Cleveland, Columbus, Cincinnati</a:t>
             </a:r>
           </a:p>
         </p:txBody>
@@ -6784,7 +7076,7 @@
     </p:spTree>
     <p:extLst>
       <p:ext uri="{BB962C8B-B14F-4D97-AF65-F5344CB8AC3E}">
-        <p14:creationId xmlns:p14="http://schemas.microsoft.com/office/powerpoint/2010/main" val="3410459470"/>
+        <p14:creationId xmlns:p14="http://schemas.microsoft.com/office/powerpoint/2010/main" val="1590742534"/>
       </p:ext>
     </p:extLst>
   </p:cSld>
@@ -6795,64 +7087,6 @@
 </file>
 
 <file path=ppt/slides/slide12.xml><?xml version="1.0" encoding="utf-8"?>
-<p:sld xmlns:a="http://schemas.openxmlformats.org/drawingml/2006/main" xmlns:r="http://schemas.openxmlformats.org/officeDocument/2006/relationships" xmlns:p="http://schemas.openxmlformats.org/presentationml/2006/main">
-  <p:cSld>
-    <p:spTree>
-      <p:nvGrpSpPr>
-        <p:cNvPr id="1" name=""/>
-        <p:cNvGrpSpPr/>
-        <p:nvPr/>
-      </p:nvGrpSpPr>
-      <p:grpSpPr>
-        <a:xfrm>
-          <a:off x="0" y="0"/>
-          <a:ext cx="0" cy="0"/>
-          <a:chOff x="0" y="0"/>
-          <a:chExt cx="0" cy="0"/>
-        </a:xfrm>
-      </p:grpSpPr>
-      <p:sp>
-        <p:nvSpPr>
-          <p:cNvPr id="2" name="Title 1">
-            <a:extLst>
-              <a:ext uri="{FF2B5EF4-FFF2-40B4-BE49-F238E27FC236}">
-                <a16:creationId xmlns:a16="http://schemas.microsoft.com/office/drawing/2014/main" id="{2ACF58D5-2D97-563C-5A20-A5DF7CB90086}"/>
-              </a:ext>
-            </a:extLst>
-          </p:cNvPr>
-          <p:cNvSpPr>
-            <a:spLocks noGrp="1"/>
-          </p:cNvSpPr>
-          <p:nvPr>
-            <p:ph type="title"/>
-          </p:nvPr>
-        </p:nvSpPr>
-        <p:spPr/>
-        <p:txBody>
-          <a:bodyPr/>
-          <a:lstStyle/>
-          <a:p>
-            <a:r>
-              <a:rPr lang="en-US" dirty="0"/>
-              <a:t>Appendix</a:t>
-            </a:r>
-          </a:p>
-        </p:txBody>
-      </p:sp>
-    </p:spTree>
-    <p:extLst>
-      <p:ext uri="{BB962C8B-B14F-4D97-AF65-F5344CB8AC3E}">
-        <p14:creationId xmlns:p14="http://schemas.microsoft.com/office/powerpoint/2010/main" val="3326597434"/>
-      </p:ext>
-    </p:extLst>
-  </p:cSld>
-  <p:clrMapOvr>
-    <a:masterClrMapping/>
-  </p:clrMapOvr>
-</p:sld>
-</file>
-
-<file path=ppt/slides/slide13.xml><?xml version="1.0" encoding="utf-8"?>
 <p:sld xmlns:a="http://schemas.openxmlformats.org/drawingml/2006/main" xmlns:r="http://schemas.openxmlformats.org/officeDocument/2006/relationships" xmlns:p="http://schemas.openxmlformats.org/presentationml/2006/main">
   <p:cSld>
     <p:bg>
@@ -6879,10 +7113,10 @@
       </p:grpSpPr>
       <p:sp useBgFill="1">
         <p:nvSpPr>
-          <p:cNvPr id="14" name="Rectangle 13">
-            <a:extLst>
-              <a:ext uri="{FF2B5EF4-FFF2-40B4-BE49-F238E27FC236}">
-                <a16:creationId xmlns:a16="http://schemas.microsoft.com/office/drawing/2014/main" id="{9CB95732-565A-4D2C-A3AB-CC460C0D3826}"/>
+          <p:cNvPr id="8" name="Rectangle 7">
+            <a:extLst>
+              <a:ext uri="{FF2B5EF4-FFF2-40B4-BE49-F238E27FC236}">
+                <a16:creationId xmlns:a16="http://schemas.microsoft.com/office/drawing/2014/main" id="{1B15ED52-F352-441B-82BF-E0EA34836D08}"/>
               </a:ext>
               <a:ext uri="{C183D7F6-B498-43B3-948B-1728B52AA6E4}">
                 <adec:decorative xmlns:adec="http://schemas.microsoft.com/office/drawing/2017/decorative" val="1"/>
@@ -6955,10 +7189,10 @@
       </p:sp>
       <p:sp>
         <p:nvSpPr>
-          <p:cNvPr id="16" name="Rectangle 15">
-            <a:extLst>
-              <a:ext uri="{FF2B5EF4-FFF2-40B4-BE49-F238E27FC236}">
-                <a16:creationId xmlns:a16="http://schemas.microsoft.com/office/drawing/2014/main" id="{E19B653C-798C-4333-8452-3DF3AE3C1D11}"/>
+          <p:cNvPr id="10" name="Rectangle 9">
+            <a:extLst>
+              <a:ext uri="{FF2B5EF4-FFF2-40B4-BE49-F238E27FC236}">
+                <a16:creationId xmlns:a16="http://schemas.microsoft.com/office/drawing/2014/main" id="{3B2E3793-BFE6-45A2-9B7B-E18844431C99}"/>
               </a:ext>
               <a:ext uri="{C183D7F6-B498-43B3-948B-1728B52AA6E4}">
                 <adec:decorative xmlns:adec="http://schemas.microsoft.com/office/drawing/2017/decorative" val="1"/>
@@ -6977,9 +7211,9 @@
           </p:nvPr>
         </p:nvSpPr>
         <p:spPr>
-          <a:xfrm rot="10800000" flipH="1">
-            <a:off x="2" y="0"/>
-            <a:ext cx="12191998" cy="1575955"/>
+          <a:xfrm flipH="1">
+            <a:off x="-1" y="-1"/>
+            <a:ext cx="12191998" cy="1590742"/>
           </a:xfrm>
           <a:prstGeom prst="rect">
             <a:avLst/>
@@ -6987,9 +7221,7 @@
           <a:gradFill>
             <a:gsLst>
               <a:gs pos="0">
-                <a:srgbClr val="000000">
-                  <a:alpha val="96000"/>
-                </a:srgbClr>
+                <a:srgbClr val="000000"/>
               </a:gs>
               <a:gs pos="100000">
                 <a:schemeClr val="accent1">
@@ -6997,7 +7229,7 @@
                 </a:schemeClr>
               </a:gs>
             </a:gsLst>
-            <a:lin ang="6000000" scaled="0"/>
+            <a:lin ang="8400000" scaled="0"/>
           </a:gradFill>
           <a:ln>
             <a:noFill/>
@@ -7030,10 +7262,10 @@
       </p:sp>
       <p:sp>
         <p:nvSpPr>
-          <p:cNvPr id="18" name="Rectangle 17">
-            <a:extLst>
-              <a:ext uri="{FF2B5EF4-FFF2-40B4-BE49-F238E27FC236}">
-                <a16:creationId xmlns:a16="http://schemas.microsoft.com/office/drawing/2014/main" id="{0FE50278-E2EC-42B2-A1F1-921DD39901C4}"/>
+          <p:cNvPr id="12" name="Rectangle 11">
+            <a:extLst>
+              <a:ext uri="{FF2B5EF4-FFF2-40B4-BE49-F238E27FC236}">
+                <a16:creationId xmlns:a16="http://schemas.microsoft.com/office/drawing/2014/main" id="{BC4C4868-CB8F-4AF9-9CDB-8108F2C19B67}"/>
               </a:ext>
               <a:ext uri="{C183D7F6-B498-43B3-948B-1728B52AA6E4}">
                 <adec:decorative xmlns:adec="http://schemas.microsoft.com/office/drawing/2017/decorative" val="1"/>
@@ -7052,27 +7284,28 @@
           </p:nvPr>
         </p:nvSpPr>
         <p:spPr>
-          <a:xfrm rot="16200000">
-            <a:off x="5305994" y="-5310547"/>
-            <a:ext cx="1580014" cy="12192002"/>
+          <a:xfrm rot="10800000" flipH="1">
+            <a:off x="-3" y="0"/>
+            <a:ext cx="8115306" cy="1590742"/>
           </a:xfrm>
           <a:prstGeom prst="rect">
             <a:avLst/>
           </a:prstGeom>
           <a:gradFill>
             <a:gsLst>
-              <a:gs pos="19000">
+              <a:gs pos="20000">
                 <a:schemeClr val="accent1">
                   <a:alpha val="0"/>
                 </a:schemeClr>
               </a:gs>
-              <a:gs pos="99000">
-                <a:srgbClr val="000000">
-                  <a:alpha val="74000"/>
-                </a:srgbClr>
+              <a:gs pos="100000">
+                <a:schemeClr val="accent1">
+                  <a:lumMod val="50000"/>
+                  <a:alpha val="55000"/>
+                </a:schemeClr>
               </a:gs>
             </a:gsLst>
-            <a:lin ang="11400000" scaled="0"/>
+            <a:lin ang="13800000" scaled="0"/>
           </a:gradFill>
           <a:ln>
             <a:noFill/>
@@ -7099,16 +7332,16 @@
           <a:lstStyle/>
           <a:p>
             <a:pPr algn="ctr"/>
-            <a:endParaRPr lang="en-US" dirty="0"/>
-          </a:p>
-        </p:txBody>
-      </p:sp>
-      <p:sp>
-        <p:nvSpPr>
-          <p:cNvPr id="20" name="Rectangle 19">
-            <a:extLst>
-              <a:ext uri="{FF2B5EF4-FFF2-40B4-BE49-F238E27FC236}">
-                <a16:creationId xmlns:a16="http://schemas.microsoft.com/office/drawing/2014/main" id="{1236153F-0DB4-40DD-87C6-B40C1B7E282C}"/>
+            <a:endParaRPr lang="en-US"/>
+          </a:p>
+        </p:txBody>
+      </p:sp>
+      <p:sp>
+        <p:nvSpPr>
+          <p:cNvPr id="14" name="Rectangle 13">
+            <a:extLst>
+              <a:ext uri="{FF2B5EF4-FFF2-40B4-BE49-F238E27FC236}">
+                <a16:creationId xmlns:a16="http://schemas.microsoft.com/office/drawing/2014/main" id="{375E0459-6403-40CD-989D-56A4407CA12E}"/>
               </a:ext>
               <a:ext uri="{C183D7F6-B498-43B3-948B-1728B52AA6E4}">
                 <adec:decorative xmlns:adec="http://schemas.microsoft.com/office/drawing/2017/decorative" val="1"/>
@@ -7127,9 +7360,9 @@
           </p:nvPr>
         </p:nvSpPr>
         <p:spPr>
-          <a:xfrm>
-            <a:off x="3825434" y="0"/>
-            <a:ext cx="4303422" cy="1575461"/>
+          <a:xfrm flipH="1">
+            <a:off x="8115299" y="-1"/>
+            <a:ext cx="4076698" cy="1590742"/>
           </a:xfrm>
           <a:prstGeom prst="rect">
             <a:avLst/>
@@ -7138,17 +7371,16 @@
             <a:gsLst>
               <a:gs pos="0">
                 <a:schemeClr val="accent1">
-                  <a:alpha val="72000"/>
+                  <a:alpha val="66000"/>
                 </a:schemeClr>
               </a:gs>
-              <a:gs pos="74000">
-                <a:schemeClr val="accent1">
-                  <a:lumMod val="50000"/>
-                  <a:alpha val="0"/>
-                </a:schemeClr>
+              <a:gs pos="100000">
+                <a:srgbClr val="000000">
+                  <a:alpha val="30000"/>
+                </a:srgbClr>
               </a:gs>
             </a:gsLst>
-            <a:lin ang="14400000" scaled="0"/>
+            <a:lin ang="13200000" scaled="0"/>
           </a:gradFill>
           <a:ln>
             <a:noFill/>
@@ -7181,10 +7413,86 @@
       </p:sp>
       <p:sp>
         <p:nvSpPr>
-          <p:cNvPr id="2" name="Title 1">
-            <a:extLst>
-              <a:ext uri="{FF2B5EF4-FFF2-40B4-BE49-F238E27FC236}">
-                <a16:creationId xmlns:a16="http://schemas.microsoft.com/office/drawing/2014/main" id="{7246B072-2CCD-AA46-3FEE-4CEEE79E61DD}"/>
+          <p:cNvPr id="19" name="Rectangle 18">
+            <a:extLst>
+              <a:ext uri="{FF2B5EF4-FFF2-40B4-BE49-F238E27FC236}">
+                <a16:creationId xmlns:a16="http://schemas.microsoft.com/office/drawing/2014/main" id="{53E5B1A8-3AC9-4BD1-9BBC-78CA94F2D1BA}"/>
+              </a:ext>
+              <a:ext uri="{C183D7F6-B498-43B3-948B-1728B52AA6E4}">
+                <adec:decorative xmlns:adec="http://schemas.microsoft.com/office/drawing/2017/decorative" val="1"/>
+              </a:ext>
+            </a:extLst>
+          </p:cNvPr>
+          <p:cNvSpPr>
+            <a:spLocks noGrp="1" noRot="1" noChangeAspect="1" noMove="1" noResize="1" noEditPoints="1" noAdjustHandles="1" noChangeArrowheads="1" noChangeShapeType="1" noTextEdit="1"/>
+          </p:cNvSpPr>
+          <p:nvPr>
+            <p:extLst>
+              <p:ext uri="{386F3935-93C4-4BCD-93E2-E3B085C9AB24}">
+                <p16:designElem xmlns:p16="http://schemas.microsoft.com/office/powerpoint/2015/main" val="1"/>
+              </p:ext>
+            </p:extLst>
+          </p:nvPr>
+        </p:nvSpPr>
+        <p:spPr>
+          <a:xfrm>
+            <a:off x="459350" y="-1"/>
+            <a:ext cx="11732646" cy="1597433"/>
+          </a:xfrm>
+          <a:prstGeom prst="rect">
+            <a:avLst/>
+          </a:prstGeom>
+          <a:gradFill>
+            <a:gsLst>
+              <a:gs pos="50000">
+                <a:srgbClr val="000000">
+                  <a:alpha val="0"/>
+                </a:srgbClr>
+              </a:gs>
+              <a:gs pos="99000">
+                <a:schemeClr val="accent1">
+                  <a:lumMod val="50000"/>
+                  <a:alpha val="52000"/>
+                </a:schemeClr>
+              </a:gs>
+            </a:gsLst>
+            <a:lin ang="16800000" scaled="0"/>
+          </a:gradFill>
+          <a:ln>
+            <a:noFill/>
+          </a:ln>
+        </p:spPr>
+        <p:style>
+          <a:lnRef idx="2">
+            <a:schemeClr val="accent1">
+              <a:shade val="50000"/>
+            </a:schemeClr>
+          </a:lnRef>
+          <a:fillRef idx="1">
+            <a:schemeClr val="accent1"/>
+          </a:fillRef>
+          <a:effectRef idx="0">
+            <a:schemeClr val="accent1"/>
+          </a:effectRef>
+          <a:fontRef idx="minor">
+            <a:schemeClr val="lt1"/>
+          </a:fontRef>
+        </p:style>
+        <p:txBody>
+          <a:bodyPr rtlCol="0" anchor="ctr"/>
+          <a:lstStyle/>
+          <a:p>
+            <a:pPr algn="ctr"/>
+            <a:endParaRPr lang="en-US"/>
+          </a:p>
+        </p:txBody>
+      </p:sp>
+      <p:sp>
+        <p:nvSpPr>
+          <p:cNvPr id="3" name="Title 2">
+            <a:extLst>
+              <a:ext uri="{FF2B5EF4-FFF2-40B4-BE49-F238E27FC236}">
+                <a16:creationId xmlns:a16="http://schemas.microsoft.com/office/drawing/2014/main" id="{EA5357D9-D4FB-4AAD-8A2F-1178ADF39DA1}"/>
               </a:ext>
             </a:extLst>
           </p:cNvPr>
@@ -7197,123 +7505,165 @@
         </p:nvSpPr>
         <p:spPr>
           <a:xfrm>
-            <a:off x="699715" y="288404"/>
-            <a:ext cx="7170656" cy="977442"/>
-          </a:xfrm>
-        </p:spPr>
-        <p:txBody>
-          <a:bodyPr vert="horz" lIns="91440" tIns="45720" rIns="91440" bIns="45720" rtlCol="0" anchor="ctr">
+            <a:off x="1371599" y="294538"/>
+            <a:ext cx="9895951" cy="1033669"/>
+          </a:xfrm>
+        </p:spPr>
+        <p:txBody>
+          <a:bodyPr>
             <a:normAutofit/>
           </a:bodyPr>
           <a:lstStyle/>
           <a:p>
             <a:r>
-              <a:rPr lang="en-US" sz="4000">
+              <a:rPr lang="en-US" sz="4000" dirty="0">
                 <a:solidFill>
                   <a:srgbClr val="FFFFFF"/>
                 </a:solidFill>
               </a:rPr>
-              <a:t>Temperature Trends</a:t>
+              <a:t>Next Steps</a:t>
             </a:r>
           </a:p>
         </p:txBody>
       </p:sp>
-      <p:pic>
-        <p:nvPicPr>
-          <p:cNvPr id="5" name="Picture 4">
-            <a:extLst>
-              <a:ext uri="{FF2B5EF4-FFF2-40B4-BE49-F238E27FC236}">
-                <a16:creationId xmlns:a16="http://schemas.microsoft.com/office/drawing/2014/main" id="{D1BCF4F6-7804-D210-8B6C-6B972C9059BC}"/>
-              </a:ext>
-            </a:extLst>
-          </p:cNvPr>
-          <p:cNvPicPr>
-            <a:picLocks noChangeAspect="1"/>
-          </p:cNvPicPr>
-          <p:nvPr/>
-        </p:nvPicPr>
-        <p:blipFill>
-          <a:blip r:embed="rId2"/>
-          <a:stretch>
-            <a:fillRect/>
-          </a:stretch>
-        </p:blipFill>
-        <p:spPr>
-          <a:xfrm>
-            <a:off x="216754" y="1659840"/>
-            <a:ext cx="4629874" cy="1828800"/>
-          </a:xfrm>
-          <a:prstGeom prst="rect">
-            <a:avLst/>
-          </a:prstGeom>
-        </p:spPr>
-      </p:pic>
-      <p:pic>
-        <p:nvPicPr>
-          <p:cNvPr id="7" name="Content Placeholder 6">
-            <a:extLst>
-              <a:ext uri="{FF2B5EF4-FFF2-40B4-BE49-F238E27FC236}">
-                <a16:creationId xmlns:a16="http://schemas.microsoft.com/office/drawing/2014/main" id="{5588B13E-BDFF-C93D-43A9-38CE70AC80D5}"/>
-              </a:ext>
-            </a:extLst>
-          </p:cNvPr>
-          <p:cNvPicPr>
-            <a:picLocks noGrp="1" noChangeAspect="1"/>
-          </p:cNvPicPr>
+      <p:sp>
+        <p:nvSpPr>
+          <p:cNvPr id="4" name="Content Placeholder 3">
+            <a:extLst>
+              <a:ext uri="{FF2B5EF4-FFF2-40B4-BE49-F238E27FC236}">
+                <a16:creationId xmlns:a16="http://schemas.microsoft.com/office/drawing/2014/main" id="{A334D890-1D5F-47EF-1BC9-33EF85062CF7}"/>
+              </a:ext>
+            </a:extLst>
+          </p:cNvPr>
+          <p:cNvSpPr>
+            <a:spLocks noGrp="1"/>
+          </p:cNvSpPr>
           <p:nvPr>
             <p:ph idx="1"/>
           </p:nvPr>
-        </p:nvPicPr>
-        <p:blipFill>
-          <a:blip r:embed="rId3"/>
-          <a:stretch>
-            <a:fillRect/>
-          </a:stretch>
-        </p:blipFill>
-        <p:spPr>
-          <a:xfrm>
-            <a:off x="3646730" y="3226526"/>
-            <a:ext cx="4629875" cy="1828800"/>
-          </a:xfrm>
-          <a:prstGeom prst="rect">
-            <a:avLst/>
-          </a:prstGeom>
-        </p:spPr>
-      </p:pic>
-      <p:pic>
-        <p:nvPicPr>
-          <p:cNvPr id="9" name="Picture 8">
-            <a:extLst>
-              <a:ext uri="{FF2B5EF4-FFF2-40B4-BE49-F238E27FC236}">
-                <a16:creationId xmlns:a16="http://schemas.microsoft.com/office/drawing/2014/main" id="{88B5389A-081F-90DB-2CDA-630EC88D3D9E}"/>
-              </a:ext>
-            </a:extLst>
-          </p:cNvPr>
-          <p:cNvPicPr>
-            <a:picLocks noChangeAspect="1"/>
-          </p:cNvPicPr>
-          <p:nvPr/>
-        </p:nvPicPr>
-        <p:blipFill>
-          <a:blip r:embed="rId4"/>
-          <a:stretch>
-            <a:fillRect/>
-          </a:stretch>
-        </p:blipFill>
-        <p:spPr>
-          <a:xfrm>
-            <a:off x="7499075" y="4914904"/>
-            <a:ext cx="4629874" cy="1828800"/>
-          </a:xfrm>
-          <a:prstGeom prst="rect">
-            <a:avLst/>
-          </a:prstGeom>
-        </p:spPr>
-      </p:pic>
+        </p:nvSpPr>
+        <p:spPr/>
+        <p:txBody>
+          <a:bodyPr/>
+          <a:lstStyle/>
+          <a:p>
+            <a:pPr marL="0" indent="0">
+              <a:buNone/>
+            </a:pPr>
+            <a:r>
+              <a:rPr lang="en-US" dirty="0"/>
+              <a:t>Influenza</a:t>
+            </a:r>
+          </a:p>
+          <a:p>
+            <a:pPr lvl="1"/>
+            <a:r>
+              <a:rPr lang="en-US" dirty="0"/>
+              <a:t>Try to get influenza data based on diagnosis vs hospitalizations</a:t>
+            </a:r>
+          </a:p>
+          <a:p>
+            <a:endParaRPr lang="en-US" dirty="0"/>
+          </a:p>
+          <a:p>
+            <a:pPr marL="0" indent="0">
+              <a:buNone/>
+            </a:pPr>
+            <a:r>
+              <a:rPr lang="en-US" dirty="0"/>
+              <a:t>Temperature</a:t>
+            </a:r>
+          </a:p>
+          <a:p>
+            <a:pPr lvl="1"/>
+            <a:r>
+              <a:rPr lang="en-US" dirty="0"/>
+              <a:t>XXX</a:t>
+            </a:r>
+          </a:p>
+          <a:p>
+            <a:endParaRPr lang="en-US" dirty="0"/>
+          </a:p>
+          <a:p>
+            <a:pPr marL="0" indent="0">
+              <a:buNone/>
+            </a:pPr>
+            <a:r>
+              <a:rPr lang="en-US" dirty="0"/>
+              <a:t>Census</a:t>
+            </a:r>
+          </a:p>
+          <a:p>
+            <a:pPr lvl="1"/>
+            <a:r>
+              <a:rPr lang="en-US" dirty="0"/>
+              <a:t>Analyze temperatures based on seasons, graph, and look for correlation</a:t>
+            </a:r>
+          </a:p>
+        </p:txBody>
+      </p:sp>
     </p:spTree>
     <p:extLst>
       <p:ext uri="{BB962C8B-B14F-4D97-AF65-F5344CB8AC3E}">
-        <p14:creationId xmlns:p14="http://schemas.microsoft.com/office/powerpoint/2010/main" val="3642388448"/>
+        <p14:creationId xmlns:p14="http://schemas.microsoft.com/office/powerpoint/2010/main" val="3410459470"/>
+      </p:ext>
+    </p:extLst>
+  </p:cSld>
+  <p:clrMapOvr>
+    <a:masterClrMapping/>
+  </p:clrMapOvr>
+</p:sld>
+</file>
+
+<file path=ppt/slides/slide13.xml><?xml version="1.0" encoding="utf-8"?>
+<p:sld xmlns:a="http://schemas.openxmlformats.org/drawingml/2006/main" xmlns:r="http://schemas.openxmlformats.org/officeDocument/2006/relationships" xmlns:p="http://schemas.openxmlformats.org/presentationml/2006/main">
+  <p:cSld>
+    <p:spTree>
+      <p:nvGrpSpPr>
+        <p:cNvPr id="1" name=""/>
+        <p:cNvGrpSpPr/>
+        <p:nvPr/>
+      </p:nvGrpSpPr>
+      <p:grpSpPr>
+        <a:xfrm>
+          <a:off x="0" y="0"/>
+          <a:ext cx="0" cy="0"/>
+          <a:chOff x="0" y="0"/>
+          <a:chExt cx="0" cy="0"/>
+        </a:xfrm>
+      </p:grpSpPr>
+      <p:sp>
+        <p:nvSpPr>
+          <p:cNvPr id="2" name="Title 1">
+            <a:extLst>
+              <a:ext uri="{FF2B5EF4-FFF2-40B4-BE49-F238E27FC236}">
+                <a16:creationId xmlns:a16="http://schemas.microsoft.com/office/drawing/2014/main" id="{2ACF58D5-2D97-563C-5A20-A5DF7CB90086}"/>
+              </a:ext>
+            </a:extLst>
+          </p:cNvPr>
+          <p:cNvSpPr>
+            <a:spLocks noGrp="1"/>
+          </p:cNvSpPr>
+          <p:nvPr>
+            <p:ph type="title"/>
+          </p:nvPr>
+        </p:nvSpPr>
+        <p:spPr/>
+        <p:txBody>
+          <a:bodyPr/>
+          <a:lstStyle/>
+          <a:p>
+            <a:r>
+              <a:rPr lang="en-US" dirty="0"/>
+              <a:t>Appendix</a:t>
+            </a:r>
+          </a:p>
+        </p:txBody>
+      </p:sp>
+    </p:spTree>
+    <p:extLst>
+      <p:ext uri="{BB962C8B-B14F-4D97-AF65-F5344CB8AC3E}">
+        <p14:creationId xmlns:p14="http://schemas.microsoft.com/office/powerpoint/2010/main" val="3326597434"/>
       </p:ext>
     </p:extLst>
   </p:cSld>
@@ -7350,7 +7700,7 @@
       </p:grpSpPr>
       <p:sp useBgFill="1">
         <p:nvSpPr>
-          <p:cNvPr id="18" name="Rectangle 17">
+          <p:cNvPr id="14" name="Rectangle 13">
             <a:extLst>
               <a:ext uri="{FF2B5EF4-FFF2-40B4-BE49-F238E27FC236}">
                 <a16:creationId xmlns:a16="http://schemas.microsoft.com/office/drawing/2014/main" id="{9CB95732-565A-4D2C-A3AB-CC460C0D3826}"/>
@@ -7426,7 +7776,7 @@
       </p:sp>
       <p:sp>
         <p:nvSpPr>
-          <p:cNvPr id="20" name="Rectangle 19">
+          <p:cNvPr id="16" name="Rectangle 15">
             <a:extLst>
               <a:ext uri="{FF2B5EF4-FFF2-40B4-BE49-F238E27FC236}">
                 <a16:creationId xmlns:a16="http://schemas.microsoft.com/office/drawing/2014/main" id="{E19B653C-798C-4333-8452-3DF3AE3C1D11}"/>
@@ -7501,7 +7851,7 @@
       </p:sp>
       <p:sp>
         <p:nvSpPr>
-          <p:cNvPr id="22" name="Rectangle 21">
+          <p:cNvPr id="18" name="Rectangle 17">
             <a:extLst>
               <a:ext uri="{FF2B5EF4-FFF2-40B4-BE49-F238E27FC236}">
                 <a16:creationId xmlns:a16="http://schemas.microsoft.com/office/drawing/2014/main" id="{0FE50278-E2EC-42B2-A1F1-921DD39901C4}"/>
@@ -7576,7 +7926,7 @@
       </p:sp>
       <p:sp>
         <p:nvSpPr>
-          <p:cNvPr id="24" name="Rectangle 23">
+          <p:cNvPr id="20" name="Rectangle 19">
             <a:extLst>
               <a:ext uri="{FF2B5EF4-FFF2-40B4-BE49-F238E27FC236}">
                 <a16:creationId xmlns:a16="http://schemas.microsoft.com/office/drawing/2014/main" id="{1236153F-0DB4-40DD-87C6-B40C1B7E282C}"/>
@@ -7684,17 +8034,17 @@
                   <a:srgbClr val="FFFFFF"/>
                 </a:solidFill>
               </a:rPr>
-              <a:t>Influenza Hospitalizations</a:t>
+              <a:t>Temperature Trends</a:t>
             </a:r>
           </a:p>
         </p:txBody>
       </p:sp>
       <p:pic>
         <p:nvPicPr>
-          <p:cNvPr id="11" name="Picture 10">
-            <a:extLst>
-              <a:ext uri="{FF2B5EF4-FFF2-40B4-BE49-F238E27FC236}">
-                <a16:creationId xmlns:a16="http://schemas.microsoft.com/office/drawing/2014/main" id="{270AD0E6-6871-8A62-10D1-DEEEC88A3130}"/>
+          <p:cNvPr id="5" name="Picture 4">
+            <a:extLst>
+              <a:ext uri="{FF2B5EF4-FFF2-40B4-BE49-F238E27FC236}">
+                <a16:creationId xmlns:a16="http://schemas.microsoft.com/office/drawing/2014/main" id="{D1BCF4F6-7804-D210-8B6C-6B972C9059BC}"/>
               </a:ext>
             </a:extLst>
           </p:cNvPr>
@@ -7711,8 +8061,8 @@
         </p:blipFill>
         <p:spPr>
           <a:xfrm>
-            <a:off x="201843" y="1620154"/>
-            <a:ext cx="3825942" cy="2286000"/>
+            <a:off x="216754" y="1659840"/>
+            <a:ext cx="4629874" cy="1828800"/>
           </a:xfrm>
           <a:prstGeom prst="rect">
             <a:avLst/>
@@ -7721,17 +8071,19 @@
       </p:pic>
       <p:pic>
         <p:nvPicPr>
-          <p:cNvPr id="13" name="Picture 12">
-            <a:extLst>
-              <a:ext uri="{FF2B5EF4-FFF2-40B4-BE49-F238E27FC236}">
-                <a16:creationId xmlns:a16="http://schemas.microsoft.com/office/drawing/2014/main" id="{4A659193-77B0-4253-75AD-BD4F0E6CF1D4}"/>
+          <p:cNvPr id="7" name="Content Placeholder 6">
+            <a:extLst>
+              <a:ext uri="{FF2B5EF4-FFF2-40B4-BE49-F238E27FC236}">
+                <a16:creationId xmlns:a16="http://schemas.microsoft.com/office/drawing/2014/main" id="{5588B13E-BDFF-C93D-43A9-38CE70AC80D5}"/>
               </a:ext>
             </a:extLst>
           </p:cNvPr>
           <p:cNvPicPr>
-            <a:picLocks noChangeAspect="1"/>
+            <a:picLocks noGrp="1" noChangeAspect="1"/>
           </p:cNvPicPr>
-          <p:nvPr/>
+          <p:nvPr>
+            <p:ph idx="1"/>
+          </p:nvPr>
         </p:nvPicPr>
         <p:blipFill>
           <a:blip r:embed="rId3"/>
@@ -7741,8 +8093,8 @@
         </p:blipFill>
         <p:spPr>
           <a:xfrm>
-            <a:off x="4118581" y="2961937"/>
-            <a:ext cx="3825942" cy="2286000"/>
+            <a:off x="3646730" y="3226526"/>
+            <a:ext cx="4629875" cy="1828800"/>
           </a:xfrm>
           <a:prstGeom prst="rect">
             <a:avLst/>
@@ -7751,10 +8103,10 @@
       </p:pic>
       <p:pic>
         <p:nvPicPr>
-          <p:cNvPr id="8" name="Picture 7">
-            <a:extLst>
-              <a:ext uri="{FF2B5EF4-FFF2-40B4-BE49-F238E27FC236}">
-                <a16:creationId xmlns:a16="http://schemas.microsoft.com/office/drawing/2014/main" id="{D8B84859-15E5-4212-A406-1A0FA29CD419}"/>
+          <p:cNvPr id="9" name="Picture 8">
+            <a:extLst>
+              <a:ext uri="{FF2B5EF4-FFF2-40B4-BE49-F238E27FC236}">
+                <a16:creationId xmlns:a16="http://schemas.microsoft.com/office/drawing/2014/main" id="{88B5389A-081F-90DB-2CDA-630EC88D3D9E}"/>
               </a:ext>
             </a:extLst>
           </p:cNvPr>
@@ -7771,178 +8123,18 @@
         </p:blipFill>
         <p:spPr>
           <a:xfrm>
-            <a:off x="8073420" y="4487594"/>
-            <a:ext cx="3825942" cy="2286000"/>
+            <a:off x="7499075" y="4914904"/>
+            <a:ext cx="4629874" cy="1828800"/>
           </a:xfrm>
           <a:prstGeom prst="rect">
             <a:avLst/>
           </a:prstGeom>
         </p:spPr>
       </p:pic>
-      <p:sp>
-        <p:nvSpPr>
-          <p:cNvPr id="14" name="TextBox 13">
-            <a:extLst>
-              <a:ext uri="{FF2B5EF4-FFF2-40B4-BE49-F238E27FC236}">
-                <a16:creationId xmlns:a16="http://schemas.microsoft.com/office/drawing/2014/main" id="{DF933A6A-A9E1-9BF3-97CB-093399238658}"/>
-              </a:ext>
-            </a:extLst>
-          </p:cNvPr>
-          <p:cNvSpPr txBox="1"/>
-          <p:nvPr/>
-        </p:nvSpPr>
-        <p:spPr>
-          <a:xfrm>
-            <a:off x="9032383" y="2099256"/>
-            <a:ext cx="2528064" cy="369332"/>
-          </a:xfrm>
-          <a:prstGeom prst="rect">
-            <a:avLst/>
-          </a:prstGeom>
-          <a:noFill/>
-        </p:spPr>
-        <p:txBody>
-          <a:bodyPr wrap="none" rtlCol="0">
-            <a:spAutoFit/>
-          </a:bodyPr>
-          <a:lstStyle/>
-          <a:p>
-            <a:r>
-              <a:rPr lang="en-US" dirty="0"/>
-              <a:t>Note 2020-2021 - Covid</a:t>
-            </a:r>
-          </a:p>
-        </p:txBody>
-      </p:sp>
-      <p:cxnSp>
-        <p:nvCxnSpPr>
-          <p:cNvPr id="16" name="Straight Arrow Connector 15">
-            <a:extLst>
-              <a:ext uri="{FF2B5EF4-FFF2-40B4-BE49-F238E27FC236}">
-                <a16:creationId xmlns:a16="http://schemas.microsoft.com/office/drawing/2014/main" id="{7ED0AD73-8D78-6C47-1F66-5DCC413BB75F}"/>
-              </a:ext>
-            </a:extLst>
-          </p:cNvPr>
-          <p:cNvCxnSpPr>
-            <a:cxnSpLocks/>
-          </p:cNvCxnSpPr>
-          <p:nvPr/>
-        </p:nvCxnSpPr>
-        <p:spPr>
-          <a:xfrm>
-            <a:off x="10296415" y="2464295"/>
-            <a:ext cx="1071337" cy="3648877"/>
-          </a:xfrm>
-          <a:prstGeom prst="straightConnector1">
-            <a:avLst/>
-          </a:prstGeom>
-          <a:ln>
-            <a:tailEnd type="triangle"/>
-          </a:ln>
-        </p:spPr>
-        <p:style>
-          <a:lnRef idx="2">
-            <a:schemeClr val="accent1"/>
-          </a:lnRef>
-          <a:fillRef idx="0">
-            <a:schemeClr val="accent1"/>
-          </a:fillRef>
-          <a:effectRef idx="1">
-            <a:schemeClr val="accent1"/>
-          </a:effectRef>
-          <a:fontRef idx="minor">
-            <a:schemeClr val="tx1"/>
-          </a:fontRef>
-        </p:style>
-      </p:cxnSp>
-      <p:cxnSp>
-        <p:nvCxnSpPr>
-          <p:cNvPr id="17" name="Straight Arrow Connector 16">
-            <a:extLst>
-              <a:ext uri="{FF2B5EF4-FFF2-40B4-BE49-F238E27FC236}">
-                <a16:creationId xmlns:a16="http://schemas.microsoft.com/office/drawing/2014/main" id="{9C392C03-1F03-0785-A782-50D38A2B9761}"/>
-              </a:ext>
-            </a:extLst>
-          </p:cNvPr>
-          <p:cNvCxnSpPr>
-            <a:cxnSpLocks/>
-            <a:stCxn id="14" idx="2"/>
-          </p:cNvCxnSpPr>
-          <p:nvPr/>
-        </p:nvCxnSpPr>
-        <p:spPr>
-          <a:xfrm flipH="1">
-            <a:off x="3515932" y="2468588"/>
-            <a:ext cx="6780483" cy="888339"/>
-          </a:xfrm>
-          <a:prstGeom prst="straightConnector1">
-            <a:avLst/>
-          </a:prstGeom>
-          <a:ln>
-            <a:tailEnd type="triangle"/>
-          </a:ln>
-        </p:spPr>
-        <p:style>
-          <a:lnRef idx="2">
-            <a:schemeClr val="accent1"/>
-          </a:lnRef>
-          <a:fillRef idx="0">
-            <a:schemeClr val="accent1"/>
-          </a:fillRef>
-          <a:effectRef idx="1">
-            <a:schemeClr val="accent1"/>
-          </a:effectRef>
-          <a:fontRef idx="minor">
-            <a:schemeClr val="tx1"/>
-          </a:fontRef>
-        </p:style>
-      </p:cxnSp>
-      <p:cxnSp>
-        <p:nvCxnSpPr>
-          <p:cNvPr id="19" name="Straight Arrow Connector 18">
-            <a:extLst>
-              <a:ext uri="{FF2B5EF4-FFF2-40B4-BE49-F238E27FC236}">
-                <a16:creationId xmlns:a16="http://schemas.microsoft.com/office/drawing/2014/main" id="{CF42BC7C-203D-194E-EDA7-3F7B6F3D3472}"/>
-              </a:ext>
-            </a:extLst>
-          </p:cNvPr>
-          <p:cNvCxnSpPr>
-            <a:cxnSpLocks/>
-            <a:stCxn id="14" idx="2"/>
-          </p:cNvCxnSpPr>
-          <p:nvPr/>
-        </p:nvCxnSpPr>
-        <p:spPr>
-          <a:xfrm flipH="1">
-            <a:off x="7323786" y="2468588"/>
-            <a:ext cx="2972629" cy="2257959"/>
-          </a:xfrm>
-          <a:prstGeom prst="straightConnector1">
-            <a:avLst/>
-          </a:prstGeom>
-          <a:ln>
-            <a:tailEnd type="triangle"/>
-          </a:ln>
-        </p:spPr>
-        <p:style>
-          <a:lnRef idx="2">
-            <a:schemeClr val="accent1"/>
-          </a:lnRef>
-          <a:fillRef idx="0">
-            <a:schemeClr val="accent1"/>
-          </a:fillRef>
-          <a:effectRef idx="1">
-            <a:schemeClr val="accent1"/>
-          </a:effectRef>
-          <a:fontRef idx="minor">
-            <a:schemeClr val="tx1"/>
-          </a:fontRef>
-        </p:style>
-      </p:cxnSp>
     </p:spTree>
     <p:extLst>
       <p:ext uri="{BB962C8B-B14F-4D97-AF65-F5344CB8AC3E}">
-        <p14:creationId xmlns:p14="http://schemas.microsoft.com/office/powerpoint/2010/main" val="3963055046"/>
+        <p14:creationId xmlns:p14="http://schemas.microsoft.com/office/powerpoint/2010/main" val="3642388448"/>
       </p:ext>
     </p:extLst>
   </p:cSld>
@@ -7979,10 +8171,10 @@
       </p:grpSpPr>
       <p:sp useBgFill="1">
         <p:nvSpPr>
-          <p:cNvPr id="9" name="Rectangle 8">
-            <a:extLst>
-              <a:ext uri="{FF2B5EF4-FFF2-40B4-BE49-F238E27FC236}">
-                <a16:creationId xmlns:a16="http://schemas.microsoft.com/office/drawing/2014/main" id="{A8384FB5-9ADC-4DDC-881B-597D56F5B15D}"/>
+          <p:cNvPr id="18" name="Rectangle 17">
+            <a:extLst>
+              <a:ext uri="{FF2B5EF4-FFF2-40B4-BE49-F238E27FC236}">
+                <a16:creationId xmlns:a16="http://schemas.microsoft.com/office/drawing/2014/main" id="{9CB95732-565A-4D2C-A3AB-CC460C0D3826}"/>
               </a:ext>
               <a:ext uri="{C183D7F6-B498-43B3-948B-1728B52AA6E4}">
                 <adec:decorative xmlns:adec="http://schemas.microsoft.com/office/drawing/2017/decorative" val="1"/>
@@ -8055,10 +8247,10 @@
       </p:sp>
       <p:sp>
         <p:nvSpPr>
-          <p:cNvPr id="11" name="Rectangle 10">
-            <a:extLst>
-              <a:ext uri="{FF2B5EF4-FFF2-40B4-BE49-F238E27FC236}">
-                <a16:creationId xmlns:a16="http://schemas.microsoft.com/office/drawing/2014/main" id="{1199E1B1-A8C0-4FE8-A5A8-1CB41D69F857}"/>
+          <p:cNvPr id="20" name="Rectangle 19">
+            <a:extLst>
+              <a:ext uri="{FF2B5EF4-FFF2-40B4-BE49-F238E27FC236}">
+                <a16:creationId xmlns:a16="http://schemas.microsoft.com/office/drawing/2014/main" id="{E19B653C-798C-4333-8452-3DF3AE3C1D11}"/>
               </a:ext>
               <a:ext uri="{C183D7F6-B498-43B3-948B-1728B52AA6E4}">
                 <adec:decorative xmlns:adec="http://schemas.microsoft.com/office/drawing/2017/decorative" val="1"/>
@@ -8130,10 +8322,10 @@
       </p:sp>
       <p:sp>
         <p:nvSpPr>
-          <p:cNvPr id="13" name="Rectangle 12">
-            <a:extLst>
-              <a:ext uri="{FF2B5EF4-FFF2-40B4-BE49-F238E27FC236}">
-                <a16:creationId xmlns:a16="http://schemas.microsoft.com/office/drawing/2014/main" id="{84A8DE83-DE75-4B41-9DB4-A7EC0B0DEC0B}"/>
+          <p:cNvPr id="22" name="Rectangle 21">
+            <a:extLst>
+              <a:ext uri="{FF2B5EF4-FFF2-40B4-BE49-F238E27FC236}">
+                <a16:creationId xmlns:a16="http://schemas.microsoft.com/office/drawing/2014/main" id="{0FE50278-E2EC-42B2-A1F1-921DD39901C4}"/>
               </a:ext>
               <a:ext uri="{C183D7F6-B498-43B3-948B-1728B52AA6E4}">
                 <adec:decorative xmlns:adec="http://schemas.microsoft.com/office/drawing/2017/decorative" val="1"/>
@@ -8152,9 +8344,84 @@
           </p:nvPr>
         </p:nvSpPr>
         <p:spPr>
+          <a:xfrm rot="16200000">
+            <a:off x="5305994" y="-5310547"/>
+            <a:ext cx="1580014" cy="12192002"/>
+          </a:xfrm>
+          <a:prstGeom prst="rect">
+            <a:avLst/>
+          </a:prstGeom>
+          <a:gradFill>
+            <a:gsLst>
+              <a:gs pos="19000">
+                <a:schemeClr val="accent1">
+                  <a:alpha val="0"/>
+                </a:schemeClr>
+              </a:gs>
+              <a:gs pos="99000">
+                <a:srgbClr val="000000">
+                  <a:alpha val="74000"/>
+                </a:srgbClr>
+              </a:gs>
+            </a:gsLst>
+            <a:lin ang="11400000" scaled="0"/>
+          </a:gradFill>
+          <a:ln>
+            <a:noFill/>
+          </a:ln>
+        </p:spPr>
+        <p:style>
+          <a:lnRef idx="2">
+            <a:schemeClr val="accent1">
+              <a:shade val="50000"/>
+            </a:schemeClr>
+          </a:lnRef>
+          <a:fillRef idx="1">
+            <a:schemeClr val="accent1"/>
+          </a:fillRef>
+          <a:effectRef idx="0">
+            <a:schemeClr val="accent1"/>
+          </a:effectRef>
+          <a:fontRef idx="minor">
+            <a:schemeClr val="lt1"/>
+          </a:fontRef>
+        </p:style>
+        <p:txBody>
+          <a:bodyPr rtlCol="0" anchor="ctr"/>
+          <a:lstStyle/>
+          <a:p>
+            <a:pPr algn="ctr"/>
+            <a:endParaRPr lang="en-US" dirty="0"/>
+          </a:p>
+        </p:txBody>
+      </p:sp>
+      <p:sp>
+        <p:nvSpPr>
+          <p:cNvPr id="24" name="Rectangle 23">
+            <a:extLst>
+              <a:ext uri="{FF2B5EF4-FFF2-40B4-BE49-F238E27FC236}">
+                <a16:creationId xmlns:a16="http://schemas.microsoft.com/office/drawing/2014/main" id="{1236153F-0DB4-40DD-87C6-B40C1B7E282C}"/>
+              </a:ext>
+              <a:ext uri="{C183D7F6-B498-43B3-948B-1728B52AA6E4}">
+                <adec:decorative xmlns:adec="http://schemas.microsoft.com/office/drawing/2017/decorative" val="1"/>
+              </a:ext>
+            </a:extLst>
+          </p:cNvPr>
+          <p:cNvSpPr>
+            <a:spLocks noGrp="1" noRot="1" noChangeAspect="1" noMove="1" noResize="1" noEditPoints="1" noAdjustHandles="1" noChangeArrowheads="1" noChangeShapeType="1" noTextEdit="1"/>
+          </p:cNvSpPr>
+          <p:nvPr>
+            <p:extLst>
+              <p:ext uri="{386F3935-93C4-4BCD-93E2-E3B085C9AB24}">
+                <p16:designElem xmlns:p16="http://schemas.microsoft.com/office/powerpoint/2015/main" val="1"/>
+              </p:ext>
+            </p:extLst>
+          </p:nvPr>
+        </p:nvSpPr>
+        <p:spPr>
           <a:xfrm>
-            <a:off x="0" y="0"/>
-            <a:ext cx="8128856" cy="1575461"/>
+            <a:off x="3825434" y="0"/>
+            <a:ext cx="4303422" cy="1575461"/>
           </a:xfrm>
           <a:prstGeom prst="rect">
             <a:avLst/>
@@ -8163,18 +8430,17 @@
             <a:gsLst>
               <a:gs pos="0">
                 <a:schemeClr val="accent1">
-                  <a:alpha val="41000"/>
+                  <a:alpha val="72000"/>
                 </a:schemeClr>
               </a:gs>
               <a:gs pos="74000">
                 <a:schemeClr val="accent1">
-                  <a:lumMod val="60000"/>
-                  <a:lumOff val="40000"/>
+                  <a:lumMod val="50000"/>
                   <a:alpha val="0"/>
                 </a:schemeClr>
               </a:gs>
             </a:gsLst>
-            <a:lin ang="8400000" scaled="0"/>
+            <a:lin ang="14400000" scaled="0"/>
           </a:gradFill>
           <a:ln>
             <a:noFill/>
@@ -8207,85 +8473,10 @@
       </p:sp>
       <p:sp>
         <p:nvSpPr>
-          <p:cNvPr id="15" name="Rectangle 14">
-            <a:extLst>
-              <a:ext uri="{FF2B5EF4-FFF2-40B4-BE49-F238E27FC236}">
-                <a16:creationId xmlns:a16="http://schemas.microsoft.com/office/drawing/2014/main" id="{A7009A0A-BEF5-4EAC-AF15-E4F9F002E239}"/>
-              </a:ext>
-              <a:ext uri="{C183D7F6-B498-43B3-948B-1728B52AA6E4}">
-                <adec:decorative xmlns:adec="http://schemas.microsoft.com/office/drawing/2017/decorative" val="1"/>
-              </a:ext>
-            </a:extLst>
-          </p:cNvPr>
-          <p:cNvSpPr>
-            <a:spLocks noGrp="1" noRot="1" noChangeAspect="1" noMove="1" noResize="1" noEditPoints="1" noAdjustHandles="1" noChangeArrowheads="1" noChangeShapeType="1" noTextEdit="1"/>
-          </p:cNvSpPr>
-          <p:nvPr>
-            <p:extLst>
-              <p:ext uri="{386F3935-93C4-4BCD-93E2-E3B085C9AB24}">
-                <p16:designElem xmlns:p16="http://schemas.microsoft.com/office/powerpoint/2015/main" val="1"/>
-              </p:ext>
-            </p:extLst>
-          </p:nvPr>
-        </p:nvSpPr>
-        <p:spPr>
-          <a:xfrm flipH="1">
-            <a:off x="-3" y="-1"/>
-            <a:ext cx="12192002" cy="1574311"/>
-          </a:xfrm>
-          <a:prstGeom prst="rect">
-            <a:avLst/>
-          </a:prstGeom>
-          <a:gradFill>
-            <a:gsLst>
-              <a:gs pos="0">
-                <a:srgbClr val="000000">
-                  <a:alpha val="63000"/>
-                </a:srgbClr>
-              </a:gs>
-              <a:gs pos="78000">
-                <a:schemeClr val="accent1">
-                  <a:alpha val="15000"/>
-                </a:schemeClr>
-              </a:gs>
-            </a:gsLst>
-            <a:lin ang="15600000" scaled="0"/>
-          </a:gradFill>
-          <a:ln>
-            <a:noFill/>
-          </a:ln>
-        </p:spPr>
-        <p:style>
-          <a:lnRef idx="2">
-            <a:schemeClr val="accent1">
-              <a:shade val="50000"/>
-            </a:schemeClr>
-          </a:lnRef>
-          <a:fillRef idx="1">
-            <a:schemeClr val="accent1"/>
-          </a:fillRef>
-          <a:effectRef idx="0">
-            <a:schemeClr val="accent1"/>
-          </a:effectRef>
-          <a:fontRef idx="minor">
-            <a:schemeClr val="lt1"/>
-          </a:fontRef>
-        </p:style>
-        <p:txBody>
-          <a:bodyPr rtlCol="0" anchor="ctr"/>
-          <a:lstStyle/>
-          <a:p>
-            <a:pPr algn="ctr"/>
-            <a:endParaRPr lang="en-US"/>
-          </a:p>
-        </p:txBody>
-      </p:sp>
-      <p:sp>
-        <p:nvSpPr>
           <p:cNvPr id="2" name="Title 1">
             <a:extLst>
               <a:ext uri="{FF2B5EF4-FFF2-40B4-BE49-F238E27FC236}">
-                <a16:creationId xmlns:a16="http://schemas.microsoft.com/office/drawing/2014/main" id="{03B76D06-025D-EB1E-9E89-B631CD9CF719}"/>
+                <a16:creationId xmlns:a16="http://schemas.microsoft.com/office/drawing/2014/main" id="{7246B072-2CCD-AA46-3FEE-4CEEE79E61DD}"/>
               </a:ext>
             </a:extLst>
           </p:cNvPr>
@@ -8298,41 +8489,33 @@
         </p:nvSpPr>
         <p:spPr>
           <a:xfrm>
-            <a:off x="699713" y="248038"/>
-            <a:ext cx="7063721" cy="1159200"/>
+            <a:off x="699715" y="288404"/>
+            <a:ext cx="7170656" cy="977442"/>
           </a:xfrm>
         </p:spPr>
         <p:txBody>
           <a:bodyPr vert="horz" lIns="91440" tIns="45720" rIns="91440" bIns="45720" rtlCol="0" anchor="ctr">
-            <a:normAutofit fontScale="90000"/>
+            <a:normAutofit/>
           </a:bodyPr>
           <a:lstStyle/>
           <a:p>
             <a:r>
-              <a:rPr lang="en-US" sz="4000" dirty="0">
+              <a:rPr lang="en-US" sz="4000">
                 <a:solidFill>
                   <a:srgbClr val="FFFFFF"/>
                 </a:solidFill>
               </a:rPr>
-              <a:t>Weekly Temperatures &amp; Influenza Hospitalizations - Cincinnati</a:t>
+              <a:t>Influenza Hospitalizations</a:t>
             </a:r>
-            <a:endParaRPr lang="en-US" sz="4000" kern="1200" dirty="0">
-              <a:solidFill>
-                <a:srgbClr val="FFFFFF"/>
-              </a:solidFill>
-              <a:latin typeface="+mj-lt"/>
-              <a:ea typeface="+mj-ea"/>
-              <a:cs typeface="+mj-cs"/>
-            </a:endParaRPr>
           </a:p>
         </p:txBody>
       </p:sp>
       <p:pic>
         <p:nvPicPr>
-          <p:cNvPr id="4" name="Picture 3">
-            <a:extLst>
-              <a:ext uri="{FF2B5EF4-FFF2-40B4-BE49-F238E27FC236}">
-                <a16:creationId xmlns:a16="http://schemas.microsoft.com/office/drawing/2014/main" id="{69A72209-1EE0-2F90-380E-8A052706DC1C}"/>
+          <p:cNvPr id="11" name="Picture 10">
+            <a:extLst>
+              <a:ext uri="{FF2B5EF4-FFF2-40B4-BE49-F238E27FC236}">
+                <a16:creationId xmlns:a16="http://schemas.microsoft.com/office/drawing/2014/main" id="{270AD0E6-6871-8A62-10D1-DEEEC88A3130}"/>
               </a:ext>
             </a:extLst>
           </p:cNvPr>
@@ -8349,20 +8532,80 @@
         </p:blipFill>
         <p:spPr>
           <a:xfrm>
-            <a:off x="1176486" y="1966293"/>
-            <a:ext cx="9839026" cy="4452160"/>
+            <a:off x="201843" y="1620154"/>
+            <a:ext cx="3825942" cy="2286000"/>
           </a:xfrm>
           <a:prstGeom prst="rect">
             <a:avLst/>
           </a:prstGeom>
         </p:spPr>
       </p:pic>
-      <p:sp>
-        <p:nvSpPr>
-          <p:cNvPr id="5" name="TextBox 4">
-            <a:extLst>
-              <a:ext uri="{FF2B5EF4-FFF2-40B4-BE49-F238E27FC236}">
-                <a16:creationId xmlns:a16="http://schemas.microsoft.com/office/drawing/2014/main" id="{D2871EBF-C9C9-567C-D518-945B1D0C72BA}"/>
+      <p:pic>
+        <p:nvPicPr>
+          <p:cNvPr id="13" name="Picture 12">
+            <a:extLst>
+              <a:ext uri="{FF2B5EF4-FFF2-40B4-BE49-F238E27FC236}">
+                <a16:creationId xmlns:a16="http://schemas.microsoft.com/office/drawing/2014/main" id="{4A659193-77B0-4253-75AD-BD4F0E6CF1D4}"/>
+              </a:ext>
+            </a:extLst>
+          </p:cNvPr>
+          <p:cNvPicPr>
+            <a:picLocks noChangeAspect="1"/>
+          </p:cNvPicPr>
+          <p:nvPr/>
+        </p:nvPicPr>
+        <p:blipFill>
+          <a:blip r:embed="rId3"/>
+          <a:stretch>
+            <a:fillRect/>
+          </a:stretch>
+        </p:blipFill>
+        <p:spPr>
+          <a:xfrm>
+            <a:off x="4118581" y="2961937"/>
+            <a:ext cx="3825942" cy="2286000"/>
+          </a:xfrm>
+          <a:prstGeom prst="rect">
+            <a:avLst/>
+          </a:prstGeom>
+        </p:spPr>
+      </p:pic>
+      <p:pic>
+        <p:nvPicPr>
+          <p:cNvPr id="8" name="Picture 7">
+            <a:extLst>
+              <a:ext uri="{FF2B5EF4-FFF2-40B4-BE49-F238E27FC236}">
+                <a16:creationId xmlns:a16="http://schemas.microsoft.com/office/drawing/2014/main" id="{D8B84859-15E5-4212-A406-1A0FA29CD419}"/>
+              </a:ext>
+            </a:extLst>
+          </p:cNvPr>
+          <p:cNvPicPr>
+            <a:picLocks noChangeAspect="1"/>
+          </p:cNvPicPr>
+          <p:nvPr/>
+        </p:nvPicPr>
+        <p:blipFill>
+          <a:blip r:embed="rId4"/>
+          <a:stretch>
+            <a:fillRect/>
+          </a:stretch>
+        </p:blipFill>
+        <p:spPr>
+          <a:xfrm>
+            <a:off x="8073420" y="4487594"/>
+            <a:ext cx="3825942" cy="2286000"/>
+          </a:xfrm>
+          <a:prstGeom prst="rect">
+            <a:avLst/>
+          </a:prstGeom>
+        </p:spPr>
+      </p:pic>
+      <p:sp>
+        <p:nvSpPr>
+          <p:cNvPr id="14" name="TextBox 13">
+            <a:extLst>
+              <a:ext uri="{FF2B5EF4-FFF2-40B4-BE49-F238E27FC236}">
+                <a16:creationId xmlns:a16="http://schemas.microsoft.com/office/drawing/2014/main" id="{DF933A6A-A9E1-9BF3-97CB-093399238658}"/>
               </a:ext>
             </a:extLst>
           </p:cNvPr>
@@ -8371,8 +8614,8 @@
         </p:nvSpPr>
         <p:spPr>
           <a:xfrm>
-            <a:off x="10024056" y="6498460"/>
-            <a:ext cx="2146476" cy="369332"/>
+            <a:off x="9032383" y="2099256"/>
+            <a:ext cx="2528064" cy="369332"/>
           </a:xfrm>
           <a:prstGeom prst="rect">
             <a:avLst/>
@@ -8380,41 +8623,6 @@
           <a:noFill/>
         </p:spPr>
         <p:txBody>
-          <a:bodyPr wrap="square" rtlCol="0">
-            <a:spAutoFit/>
-          </a:bodyPr>
-          <a:lstStyle/>
-          <a:p>
-            <a:r>
-              <a:rPr lang="en-US" dirty="0"/>
-              <a:t>Correlation: -0.513</a:t>
-            </a:r>
-          </a:p>
-        </p:txBody>
-      </p:sp>
-      <p:sp>
-        <p:nvSpPr>
-          <p:cNvPr id="6" name="TextBox 5">
-            <a:extLst>
-              <a:ext uri="{FF2B5EF4-FFF2-40B4-BE49-F238E27FC236}">
-                <a16:creationId xmlns:a16="http://schemas.microsoft.com/office/drawing/2014/main" id="{7FF9EF46-0D10-2FBF-4776-9F711BC9802A}"/>
-              </a:ext>
-            </a:extLst>
-          </p:cNvPr>
-          <p:cNvSpPr txBox="1"/>
-          <p:nvPr/>
-        </p:nvSpPr>
-        <p:spPr>
-          <a:xfrm>
-            <a:off x="21464" y="6498460"/>
-            <a:ext cx="5418599" cy="369332"/>
-          </a:xfrm>
-          <a:prstGeom prst="rect">
-            <a:avLst/>
-          </a:prstGeom>
-          <a:noFill/>
-        </p:spPr>
-        <p:txBody>
           <a:bodyPr wrap="none" rtlCol="0">
             <a:spAutoFit/>
           </a:bodyPr>
@@ -8422,15 +8630,140 @@
           <a:p>
             <a:r>
               <a:rPr lang="en-US" dirty="0"/>
-              <a:t>Note: 2020-2021 Season Was Excluded Due To Covid</a:t>
+              <a:t>Note 2020-2021 - Covid</a:t>
             </a:r>
           </a:p>
         </p:txBody>
       </p:sp>
+      <p:cxnSp>
+        <p:nvCxnSpPr>
+          <p:cNvPr id="16" name="Straight Arrow Connector 15">
+            <a:extLst>
+              <a:ext uri="{FF2B5EF4-FFF2-40B4-BE49-F238E27FC236}">
+                <a16:creationId xmlns:a16="http://schemas.microsoft.com/office/drawing/2014/main" id="{7ED0AD73-8D78-6C47-1F66-5DCC413BB75F}"/>
+              </a:ext>
+            </a:extLst>
+          </p:cNvPr>
+          <p:cNvCxnSpPr>
+            <a:cxnSpLocks/>
+          </p:cNvCxnSpPr>
+          <p:nvPr/>
+        </p:nvCxnSpPr>
+        <p:spPr>
+          <a:xfrm>
+            <a:off x="10296415" y="2464295"/>
+            <a:ext cx="1071337" cy="3648877"/>
+          </a:xfrm>
+          <a:prstGeom prst="straightConnector1">
+            <a:avLst/>
+          </a:prstGeom>
+          <a:ln>
+            <a:tailEnd type="triangle"/>
+          </a:ln>
+        </p:spPr>
+        <p:style>
+          <a:lnRef idx="2">
+            <a:schemeClr val="accent1"/>
+          </a:lnRef>
+          <a:fillRef idx="0">
+            <a:schemeClr val="accent1"/>
+          </a:fillRef>
+          <a:effectRef idx="1">
+            <a:schemeClr val="accent1"/>
+          </a:effectRef>
+          <a:fontRef idx="minor">
+            <a:schemeClr val="tx1"/>
+          </a:fontRef>
+        </p:style>
+      </p:cxnSp>
+      <p:cxnSp>
+        <p:nvCxnSpPr>
+          <p:cNvPr id="17" name="Straight Arrow Connector 16">
+            <a:extLst>
+              <a:ext uri="{FF2B5EF4-FFF2-40B4-BE49-F238E27FC236}">
+                <a16:creationId xmlns:a16="http://schemas.microsoft.com/office/drawing/2014/main" id="{9C392C03-1F03-0785-A782-50D38A2B9761}"/>
+              </a:ext>
+            </a:extLst>
+          </p:cNvPr>
+          <p:cNvCxnSpPr>
+            <a:cxnSpLocks/>
+            <a:stCxn id="14" idx="2"/>
+          </p:cNvCxnSpPr>
+          <p:nvPr/>
+        </p:nvCxnSpPr>
+        <p:spPr>
+          <a:xfrm flipH="1">
+            <a:off x="3515932" y="2468588"/>
+            <a:ext cx="6780483" cy="888339"/>
+          </a:xfrm>
+          <a:prstGeom prst="straightConnector1">
+            <a:avLst/>
+          </a:prstGeom>
+          <a:ln>
+            <a:tailEnd type="triangle"/>
+          </a:ln>
+        </p:spPr>
+        <p:style>
+          <a:lnRef idx="2">
+            <a:schemeClr val="accent1"/>
+          </a:lnRef>
+          <a:fillRef idx="0">
+            <a:schemeClr val="accent1"/>
+          </a:fillRef>
+          <a:effectRef idx="1">
+            <a:schemeClr val="accent1"/>
+          </a:effectRef>
+          <a:fontRef idx="minor">
+            <a:schemeClr val="tx1"/>
+          </a:fontRef>
+        </p:style>
+      </p:cxnSp>
+      <p:cxnSp>
+        <p:nvCxnSpPr>
+          <p:cNvPr id="19" name="Straight Arrow Connector 18">
+            <a:extLst>
+              <a:ext uri="{FF2B5EF4-FFF2-40B4-BE49-F238E27FC236}">
+                <a16:creationId xmlns:a16="http://schemas.microsoft.com/office/drawing/2014/main" id="{CF42BC7C-203D-194E-EDA7-3F7B6F3D3472}"/>
+              </a:ext>
+            </a:extLst>
+          </p:cNvPr>
+          <p:cNvCxnSpPr>
+            <a:cxnSpLocks/>
+            <a:stCxn id="14" idx="2"/>
+          </p:cNvCxnSpPr>
+          <p:nvPr/>
+        </p:nvCxnSpPr>
+        <p:spPr>
+          <a:xfrm flipH="1">
+            <a:off x="7323786" y="2468588"/>
+            <a:ext cx="2972629" cy="2257959"/>
+          </a:xfrm>
+          <a:prstGeom prst="straightConnector1">
+            <a:avLst/>
+          </a:prstGeom>
+          <a:ln>
+            <a:tailEnd type="triangle"/>
+          </a:ln>
+        </p:spPr>
+        <p:style>
+          <a:lnRef idx="2">
+            <a:schemeClr val="accent1"/>
+          </a:lnRef>
+          <a:fillRef idx="0">
+            <a:schemeClr val="accent1"/>
+          </a:fillRef>
+          <a:effectRef idx="1">
+            <a:schemeClr val="accent1"/>
+          </a:effectRef>
+          <a:fontRef idx="minor">
+            <a:schemeClr val="tx1"/>
+          </a:fontRef>
+        </p:style>
+      </p:cxnSp>
     </p:spTree>
     <p:extLst>
       <p:ext uri="{BB962C8B-B14F-4D97-AF65-F5344CB8AC3E}">
-        <p14:creationId xmlns:p14="http://schemas.microsoft.com/office/powerpoint/2010/main" val="2038907524"/>
+        <p14:creationId xmlns:p14="http://schemas.microsoft.com/office/powerpoint/2010/main" val="3963055046"/>
       </p:ext>
     </p:extLst>
   </p:cSld>
@@ -8773,7 +9106,7 @@
           <p:cNvPr id="2" name="Title 1">
             <a:extLst>
               <a:ext uri="{FF2B5EF4-FFF2-40B4-BE49-F238E27FC236}">
-                <a16:creationId xmlns:a16="http://schemas.microsoft.com/office/drawing/2014/main" id="{A7BF1CC6-6F79-011F-31C7-ACAC4CD300A9}"/>
+                <a16:creationId xmlns:a16="http://schemas.microsoft.com/office/drawing/2014/main" id="{03B76D06-025D-EB1E-9E89-B631CD9CF719}"/>
               </a:ext>
             </a:extLst>
           </p:cNvPr>
@@ -8802,7 +9135,7 @@
                   <a:srgbClr val="FFFFFF"/>
                 </a:solidFill>
               </a:rPr>
-              <a:t>Weekly Temperatures &amp; Influenza Hospitalizations - Cleveland</a:t>
+              <a:t>Weekly Temperatures &amp; Influenza Hospitalizations - Cincinnati</a:t>
             </a:r>
             <a:endParaRPr lang="en-US" sz="4000" kern="1200" dirty="0">
               <a:solidFill>
@@ -8820,7 +9153,7 @@
           <p:cNvPr id="4" name="Picture 3">
             <a:extLst>
               <a:ext uri="{FF2B5EF4-FFF2-40B4-BE49-F238E27FC236}">
-                <a16:creationId xmlns:a16="http://schemas.microsoft.com/office/drawing/2014/main" id="{D0E244AC-30E3-6266-4D46-ADFA92B04005}"/>
+                <a16:creationId xmlns:a16="http://schemas.microsoft.com/office/drawing/2014/main" id="{69A72209-1EE0-2F90-380E-8A052706DC1C}"/>
               </a:ext>
             </a:extLst>
           </p:cNvPr>
@@ -8850,7 +9183,7 @@
           <p:cNvPr id="5" name="TextBox 4">
             <a:extLst>
               <a:ext uri="{FF2B5EF4-FFF2-40B4-BE49-F238E27FC236}">
-                <a16:creationId xmlns:a16="http://schemas.microsoft.com/office/drawing/2014/main" id="{C38563DC-48A6-78B7-EE16-C7A41F983135}"/>
+                <a16:creationId xmlns:a16="http://schemas.microsoft.com/office/drawing/2014/main" id="{D2871EBF-C9C9-567C-D518-945B1D0C72BA}"/>
               </a:ext>
             </a:extLst>
           </p:cNvPr>
@@ -8875,7 +9208,7 @@
           <a:p>
             <a:r>
               <a:rPr lang="en-US" dirty="0"/>
-              <a:t>Correlation: -0.534</a:t>
+              <a:t>Correlation: -0.513</a:t>
             </a:r>
           </a:p>
         </p:txBody>
@@ -8885,7 +9218,7 @@
           <p:cNvPr id="6" name="TextBox 5">
             <a:extLst>
               <a:ext uri="{FF2B5EF4-FFF2-40B4-BE49-F238E27FC236}">
-                <a16:creationId xmlns:a16="http://schemas.microsoft.com/office/drawing/2014/main" id="{414C7F17-38AC-F954-4FAE-E27ABC1D405F}"/>
+                <a16:creationId xmlns:a16="http://schemas.microsoft.com/office/drawing/2014/main" id="{7FF9EF46-0D10-2FBF-4776-9F711BC9802A}"/>
               </a:ext>
             </a:extLst>
           </p:cNvPr>
@@ -8918,7 +9251,7 @@
     </p:spTree>
     <p:extLst>
       <p:ext uri="{BB962C8B-B14F-4D97-AF65-F5344CB8AC3E}">
-        <p14:creationId xmlns:p14="http://schemas.microsoft.com/office/powerpoint/2010/main" val="3741511294"/>
+        <p14:creationId xmlns:p14="http://schemas.microsoft.com/office/powerpoint/2010/main" val="2038907524"/>
       </p:ext>
     </p:extLst>
   </p:cSld>
@@ -9261,7 +9594,7 @@
           <p:cNvPr id="2" name="Title 1">
             <a:extLst>
               <a:ext uri="{FF2B5EF4-FFF2-40B4-BE49-F238E27FC236}">
-                <a16:creationId xmlns:a16="http://schemas.microsoft.com/office/drawing/2014/main" id="{9143A132-7F4F-094C-E7A9-B77557C2B703}"/>
+                <a16:creationId xmlns:a16="http://schemas.microsoft.com/office/drawing/2014/main" id="{A7BF1CC6-6F79-011F-31C7-ACAC4CD300A9}"/>
               </a:ext>
             </a:extLst>
           </p:cNvPr>
@@ -9285,60 +9618,30 @@
           <a:lstStyle/>
           <a:p>
             <a:r>
-              <a:rPr lang="en-US" sz="4000" kern="1200" dirty="0">
+              <a:rPr lang="en-US" sz="4000" dirty="0">
                 <a:solidFill>
                   <a:srgbClr val="FFFFFF"/>
                 </a:solidFill>
-                <a:latin typeface="+mj-lt"/>
-                <a:ea typeface="+mj-ea"/>
-                <a:cs typeface="+mj-cs"/>
               </a:rPr>
-              <a:t>Seasonal Average Temperature &amp; Seasonal Total Hospitalizations - Cincinnati</a:t>
+              <a:t>Weekly Temperatures &amp; Influenza Hospitalizations - Cleveland</a:t>
             </a:r>
-          </a:p>
-        </p:txBody>
-      </p:sp>
-      <p:sp>
-        <p:nvSpPr>
-          <p:cNvPr id="5" name="TextBox 4">
-            <a:extLst>
-              <a:ext uri="{FF2B5EF4-FFF2-40B4-BE49-F238E27FC236}">
-                <a16:creationId xmlns:a16="http://schemas.microsoft.com/office/drawing/2014/main" id="{FB21D110-6E68-A1A1-516F-344BE6F60F47}"/>
-              </a:ext>
-            </a:extLst>
-          </p:cNvPr>
-          <p:cNvSpPr txBox="1"/>
-          <p:nvPr/>
-        </p:nvSpPr>
-        <p:spPr>
-          <a:xfrm>
-            <a:off x="10024056" y="6498460"/>
-            <a:ext cx="2146476" cy="369332"/>
-          </a:xfrm>
-          <a:prstGeom prst="rect">
-            <a:avLst/>
-          </a:prstGeom>
-          <a:noFill/>
-        </p:spPr>
-        <p:txBody>
-          <a:bodyPr wrap="square" rtlCol="0">
-            <a:spAutoFit/>
-          </a:bodyPr>
-          <a:lstStyle/>
-          <a:p>
-            <a:r>
-              <a:rPr lang="en-US" dirty="0"/>
-              <a:t>Correlation: -0.582</a:t>
-            </a:r>
+            <a:endParaRPr lang="en-US" sz="4000" kern="1200" dirty="0">
+              <a:solidFill>
+                <a:srgbClr val="FFFFFF"/>
+              </a:solidFill>
+              <a:latin typeface="+mj-lt"/>
+              <a:ea typeface="+mj-ea"/>
+              <a:cs typeface="+mj-cs"/>
+            </a:endParaRPr>
           </a:p>
         </p:txBody>
       </p:sp>
       <p:pic>
         <p:nvPicPr>
-          <p:cNvPr id="19" name="Picture 18">
-            <a:extLst>
-              <a:ext uri="{FF2B5EF4-FFF2-40B4-BE49-F238E27FC236}">
-                <a16:creationId xmlns:a16="http://schemas.microsoft.com/office/drawing/2014/main" id="{C0AC1AB0-9313-08BA-D191-FFCEC26F8885}"/>
+          <p:cNvPr id="4" name="Picture 3">
+            <a:extLst>
+              <a:ext uri="{FF2B5EF4-FFF2-40B4-BE49-F238E27FC236}">
+                <a16:creationId xmlns:a16="http://schemas.microsoft.com/office/drawing/2014/main" id="{D0E244AC-30E3-6266-4D46-ADFA92B04005}"/>
               </a:ext>
             </a:extLst>
           </p:cNvPr>
@@ -9355,18 +9658,88 @@
         </p:blipFill>
         <p:spPr>
           <a:xfrm>
-            <a:off x="1038225" y="1896924"/>
-            <a:ext cx="9905720" cy="4389120"/>
+            <a:off x="1176486" y="1966293"/>
+            <a:ext cx="9839026" cy="4452160"/>
           </a:xfrm>
           <a:prstGeom prst="rect">
             <a:avLst/>
           </a:prstGeom>
         </p:spPr>
       </p:pic>
+      <p:sp>
+        <p:nvSpPr>
+          <p:cNvPr id="5" name="TextBox 4">
+            <a:extLst>
+              <a:ext uri="{FF2B5EF4-FFF2-40B4-BE49-F238E27FC236}">
+                <a16:creationId xmlns:a16="http://schemas.microsoft.com/office/drawing/2014/main" id="{C38563DC-48A6-78B7-EE16-C7A41F983135}"/>
+              </a:ext>
+            </a:extLst>
+          </p:cNvPr>
+          <p:cNvSpPr txBox="1"/>
+          <p:nvPr/>
+        </p:nvSpPr>
+        <p:spPr>
+          <a:xfrm>
+            <a:off x="10024056" y="6498460"/>
+            <a:ext cx="2146476" cy="369332"/>
+          </a:xfrm>
+          <a:prstGeom prst="rect">
+            <a:avLst/>
+          </a:prstGeom>
+          <a:noFill/>
+        </p:spPr>
+        <p:txBody>
+          <a:bodyPr wrap="square" rtlCol="0">
+            <a:spAutoFit/>
+          </a:bodyPr>
+          <a:lstStyle/>
+          <a:p>
+            <a:r>
+              <a:rPr lang="en-US" dirty="0"/>
+              <a:t>Correlation: -0.534</a:t>
+            </a:r>
+          </a:p>
+        </p:txBody>
+      </p:sp>
+      <p:sp>
+        <p:nvSpPr>
+          <p:cNvPr id="6" name="TextBox 5">
+            <a:extLst>
+              <a:ext uri="{FF2B5EF4-FFF2-40B4-BE49-F238E27FC236}">
+                <a16:creationId xmlns:a16="http://schemas.microsoft.com/office/drawing/2014/main" id="{414C7F17-38AC-F954-4FAE-E27ABC1D405F}"/>
+              </a:ext>
+            </a:extLst>
+          </p:cNvPr>
+          <p:cNvSpPr txBox="1"/>
+          <p:nvPr/>
+        </p:nvSpPr>
+        <p:spPr>
+          <a:xfrm>
+            <a:off x="21464" y="6498460"/>
+            <a:ext cx="5418599" cy="369332"/>
+          </a:xfrm>
+          <a:prstGeom prst="rect">
+            <a:avLst/>
+          </a:prstGeom>
+          <a:noFill/>
+        </p:spPr>
+        <p:txBody>
+          <a:bodyPr wrap="none" rtlCol="0">
+            <a:spAutoFit/>
+          </a:bodyPr>
+          <a:lstStyle/>
+          <a:p>
+            <a:r>
+              <a:rPr lang="en-US" dirty="0"/>
+              <a:t>Note: 2020-2021 Season Was Excluded Due To Covid</a:t>
+            </a:r>
+          </a:p>
+        </p:txBody>
+      </p:sp>
     </p:spTree>
     <p:extLst>
       <p:ext uri="{BB962C8B-B14F-4D97-AF65-F5344CB8AC3E}">
-        <p14:creationId xmlns:p14="http://schemas.microsoft.com/office/powerpoint/2010/main" val="3423382430"/>
+        <p14:creationId xmlns:p14="http://schemas.microsoft.com/office/powerpoint/2010/main" val="3741511294"/>
       </p:ext>
     </p:extLst>
   </p:cSld>
@@ -9709,7 +10082,7 @@
           <p:cNvPr id="2" name="Title 1">
             <a:extLst>
               <a:ext uri="{FF2B5EF4-FFF2-40B4-BE49-F238E27FC236}">
-                <a16:creationId xmlns:a16="http://schemas.microsoft.com/office/drawing/2014/main" id="{072D2E6C-D7D9-5A19-EBA3-F361325D660C}"/>
+                <a16:creationId xmlns:a16="http://schemas.microsoft.com/office/drawing/2014/main" id="{9143A132-7F4F-094C-E7A9-B77557C2B703}"/>
               </a:ext>
             </a:extLst>
           </p:cNvPr>
@@ -9741,7 +10114,7 @@
                 <a:ea typeface="+mj-ea"/>
                 <a:cs typeface="+mj-cs"/>
               </a:rPr>
-              <a:t>Seasonal Average Temperature &amp; Seasonal Total Hospitalizations - Cleveland</a:t>
+              <a:t>Seasonal Average Temperature &amp; Seasonal Total Hospitalizations - Cincinnati</a:t>
             </a:r>
           </a:p>
         </p:txBody>
@@ -9751,7 +10124,7 @@
           <p:cNvPr id="5" name="TextBox 4">
             <a:extLst>
               <a:ext uri="{FF2B5EF4-FFF2-40B4-BE49-F238E27FC236}">
-                <a16:creationId xmlns:a16="http://schemas.microsoft.com/office/drawing/2014/main" id="{054D79B3-23A9-B672-3B8B-2907857BE9E5}"/>
+                <a16:creationId xmlns:a16="http://schemas.microsoft.com/office/drawing/2014/main" id="{FB21D110-6E68-A1A1-516F-344BE6F60F47}"/>
               </a:ext>
             </a:extLst>
           </p:cNvPr>
@@ -9776,17 +10149,17 @@
           <a:p>
             <a:r>
               <a:rPr lang="en-US" dirty="0"/>
-              <a:t>Correlation: -0.019</a:t>
+              <a:t>Correlation: -0.582</a:t>
             </a:r>
           </a:p>
         </p:txBody>
       </p:sp>
       <p:pic>
         <p:nvPicPr>
-          <p:cNvPr id="17" name="Picture 16">
-            <a:extLst>
-              <a:ext uri="{FF2B5EF4-FFF2-40B4-BE49-F238E27FC236}">
-                <a16:creationId xmlns:a16="http://schemas.microsoft.com/office/drawing/2014/main" id="{D0883807-B68A-F374-F3E6-968D6E769FE9}"/>
+          <p:cNvPr id="19" name="Picture 18">
+            <a:extLst>
+              <a:ext uri="{FF2B5EF4-FFF2-40B4-BE49-F238E27FC236}">
+                <a16:creationId xmlns:a16="http://schemas.microsoft.com/office/drawing/2014/main" id="{C0AC1AB0-9313-08BA-D191-FFCEC26F8885}"/>
               </a:ext>
             </a:extLst>
           </p:cNvPr>
@@ -9803,7 +10176,7 @@
         </p:blipFill>
         <p:spPr>
           <a:xfrm>
-            <a:off x="923925" y="1882015"/>
+            <a:off x="1038225" y="1896924"/>
             <a:ext cx="9905720" cy="4389120"/>
           </a:xfrm>
           <a:prstGeom prst="rect">
@@ -9814,7 +10187,7 @@
     </p:spTree>
     <p:extLst>
       <p:ext uri="{BB962C8B-B14F-4D97-AF65-F5344CB8AC3E}">
-        <p14:creationId xmlns:p14="http://schemas.microsoft.com/office/powerpoint/2010/main" val="547791207"/>
+        <p14:creationId xmlns:p14="http://schemas.microsoft.com/office/powerpoint/2010/main" val="3423382430"/>
       </p:ext>
     </p:extLst>
   </p:cSld>
@@ -10181,21 +10554,16 @@
           <a:lstStyle/>
           <a:p>
             <a:r>
-              <a:rPr lang="en-US" sz="4000" dirty="0">
+              <a:rPr lang="en-US" sz="4000" kern="1200" dirty="0">
                 <a:solidFill>
                   <a:srgbClr val="FFFFFF"/>
                 </a:solidFill>
+                <a:latin typeface="+mj-lt"/>
+                <a:ea typeface="+mj-ea"/>
+                <a:cs typeface="+mj-cs"/>
               </a:rPr>
-              <a:t>Weekly Temperatures &amp; Population- Cleveland</a:t>
+              <a:t>Seasonal Average Temperature &amp; Seasonal Total Hospitalizations - Cleveland</a:t>
             </a:r>
-            <a:endParaRPr lang="en-US" sz="4000" kern="1200" dirty="0">
-              <a:solidFill>
-                <a:srgbClr val="FFFFFF"/>
-              </a:solidFill>
-              <a:latin typeface="+mj-lt"/>
-              <a:ea typeface="+mj-ea"/>
-              <a:cs typeface="+mj-cs"/>
-            </a:endParaRPr>
           </a:p>
         </p:txBody>
       </p:sp>
@@ -10213,8 +10581,8 @@
         </p:nvSpPr>
         <p:spPr>
           <a:xfrm>
-            <a:off x="9916886" y="6498460"/>
-            <a:ext cx="2253646" cy="369332"/>
+            <a:off x="10024056" y="6498460"/>
+            <a:ext cx="2146476" cy="369332"/>
           </a:xfrm>
           <a:prstGeom prst="rect">
             <a:avLst/>
@@ -10229,17 +10597,17 @@
           <a:p>
             <a:r>
               <a:rPr lang="en-US" dirty="0"/>
-              <a:t>Correlation: -0.4140</a:t>
+              <a:t>Correlation: -0.019</a:t>
             </a:r>
           </a:p>
         </p:txBody>
       </p:sp>
       <p:pic>
         <p:nvPicPr>
-          <p:cNvPr id="4" name="Picture 3" descr="A graph with blue lines and red dots&#10;&#10;Description automatically generated">
-            <a:extLst>
-              <a:ext uri="{FF2B5EF4-FFF2-40B4-BE49-F238E27FC236}">
-                <a16:creationId xmlns:a16="http://schemas.microsoft.com/office/drawing/2014/main" id="{CB553646-2DDF-650D-C36C-C32CACC523FE}"/>
+          <p:cNvPr id="17" name="Picture 16">
+            <a:extLst>
+              <a:ext uri="{FF2B5EF4-FFF2-40B4-BE49-F238E27FC236}">
+                <a16:creationId xmlns:a16="http://schemas.microsoft.com/office/drawing/2014/main" id="{D0883807-B68A-F374-F3E6-968D6E769FE9}"/>
               </a:ext>
             </a:extLst>
           </p:cNvPr>
@@ -10249,21 +10617,15 @@
           <p:nvPr/>
         </p:nvPicPr>
         <p:blipFill>
-          <a:blip r:embed="rId2">
-            <a:extLst>
-              <a:ext uri="{28A0092B-C50C-407E-A947-70E740481C1C}">
-                <a14:useLocalDpi xmlns:a14="http://schemas.microsoft.com/office/drawing/2010/main" val="0"/>
-              </a:ext>
-            </a:extLst>
-          </a:blip>
+          <a:blip r:embed="rId2"/>
           <a:stretch>
             <a:fillRect/>
           </a:stretch>
         </p:blipFill>
         <p:spPr>
           <a:xfrm>
-            <a:off x="986555" y="1655276"/>
-            <a:ext cx="10218885" cy="4710533"/>
+            <a:off x="923925" y="1882015"/>
+            <a:ext cx="9905720" cy="4389120"/>
           </a:xfrm>
           <a:prstGeom prst="rect">
             <a:avLst/>
@@ -10273,7 +10635,7 @@
     </p:spTree>
     <p:extLst>
       <p:ext uri="{BB962C8B-B14F-4D97-AF65-F5344CB8AC3E}">
-        <p14:creationId xmlns:p14="http://schemas.microsoft.com/office/powerpoint/2010/main" val="3223283231"/>
+        <p14:creationId xmlns:p14="http://schemas.microsoft.com/office/powerpoint/2010/main" val="547791207"/>
       </p:ext>
     </p:extLst>
   </p:cSld>
@@ -10841,6 +11203,465 @@
     <p:extLst>
       <p:ext uri="{BB962C8B-B14F-4D97-AF65-F5344CB8AC3E}">
         <p14:creationId xmlns:p14="http://schemas.microsoft.com/office/powerpoint/2010/main" val="382987857"/>
+      </p:ext>
+    </p:extLst>
+  </p:cSld>
+  <p:clrMapOvr>
+    <a:masterClrMapping/>
+  </p:clrMapOvr>
+</p:sld>
+</file>
+
+<file path=ppt/slides/slide20.xml><?xml version="1.0" encoding="utf-8"?>
+<p:sld xmlns:a="http://schemas.openxmlformats.org/drawingml/2006/main" xmlns:r="http://schemas.openxmlformats.org/officeDocument/2006/relationships" xmlns:p="http://schemas.openxmlformats.org/presentationml/2006/main">
+  <p:cSld>
+    <p:bg>
+      <p:bgPr>
+        <a:solidFill>
+          <a:schemeClr val="bg1"/>
+        </a:solidFill>
+        <a:effectLst/>
+      </p:bgPr>
+    </p:bg>
+    <p:spTree>
+      <p:nvGrpSpPr>
+        <p:cNvPr id="1" name=""/>
+        <p:cNvGrpSpPr/>
+        <p:nvPr/>
+      </p:nvGrpSpPr>
+      <p:grpSpPr>
+        <a:xfrm>
+          <a:off x="0" y="0"/>
+          <a:ext cx="0" cy="0"/>
+          <a:chOff x="0" y="0"/>
+          <a:chExt cx="0" cy="0"/>
+        </a:xfrm>
+      </p:grpSpPr>
+      <p:sp useBgFill="1">
+        <p:nvSpPr>
+          <p:cNvPr id="9" name="Rectangle 8">
+            <a:extLst>
+              <a:ext uri="{FF2B5EF4-FFF2-40B4-BE49-F238E27FC236}">
+                <a16:creationId xmlns:a16="http://schemas.microsoft.com/office/drawing/2014/main" id="{A8384FB5-9ADC-4DDC-881B-597D56F5B15D}"/>
+              </a:ext>
+              <a:ext uri="{C183D7F6-B498-43B3-948B-1728B52AA6E4}">
+                <adec:decorative xmlns:adec="http://schemas.microsoft.com/office/drawing/2017/decorative" val="1"/>
+              </a:ext>
+            </a:extLst>
+          </p:cNvPr>
+          <p:cNvSpPr>
+            <a:spLocks noGrp="1" noRot="1" noChangeAspect="1" noMove="1" noResize="1" noEditPoints="1" noAdjustHandles="1" noChangeArrowheads="1" noChangeShapeType="1" noTextEdit="1"/>
+          </p:cNvSpPr>
+          <p:nvPr>
+            <p:extLst>
+              <p:ext uri="{386F3935-93C4-4BCD-93E2-E3B085C9AB24}">
+                <p16:designElem xmlns:p16="http://schemas.microsoft.com/office/powerpoint/2015/main" val="1"/>
+              </p:ext>
+            </p:extLst>
+          </p:nvPr>
+        </p:nvSpPr>
+        <p:spPr>
+          <a:xfrm>
+            <a:off x="0" y="0"/>
+            <a:ext cx="12192000" cy="6858000"/>
+          </a:xfrm>
+          <a:prstGeom prst="rect">
+            <a:avLst/>
+          </a:prstGeom>
+          <a:ln w="12700" cap="flat" cmpd="sng" algn="ctr">
+            <a:noFill/>
+            <a:prstDash val="solid"/>
+            <a:miter lim="800000"/>
+          </a:ln>
+          <a:effectLst/>
+          <a:extLst>
+            <a:ext uri="{91240B29-F687-4F45-9708-019B960494DF}">
+              <a14:hiddenLine xmlns:a14="http://schemas.microsoft.com/office/drawing/2010/main" w="12700" cap="flat" cmpd="sng" algn="ctr">
+                <a:solidFill>
+                  <a:schemeClr val="accent1">
+                    <a:shade val="50000"/>
+                  </a:schemeClr>
+                </a:solidFill>
+                <a:prstDash val="solid"/>
+                <a:miter lim="800000"/>
+              </a14:hiddenLine>
+            </a:ext>
+          </a:extLst>
+        </p:spPr>
+        <p:style>
+          <a:lnRef idx="2">
+            <a:schemeClr val="accent1">
+              <a:shade val="50000"/>
+            </a:schemeClr>
+          </a:lnRef>
+          <a:fillRef idx="1">
+            <a:schemeClr val="accent1"/>
+          </a:fillRef>
+          <a:effectRef idx="0">
+            <a:schemeClr val="accent1"/>
+          </a:effectRef>
+          <a:fontRef idx="minor">
+            <a:schemeClr val="lt1"/>
+          </a:fontRef>
+        </p:style>
+        <p:txBody>
+          <a:bodyPr rtlCol="0" anchor="ctr"/>
+          <a:lstStyle/>
+          <a:p>
+            <a:pPr algn="ctr"/>
+            <a:endParaRPr lang="en-US"/>
+          </a:p>
+        </p:txBody>
+      </p:sp>
+      <p:sp>
+        <p:nvSpPr>
+          <p:cNvPr id="11" name="Rectangle 10">
+            <a:extLst>
+              <a:ext uri="{FF2B5EF4-FFF2-40B4-BE49-F238E27FC236}">
+                <a16:creationId xmlns:a16="http://schemas.microsoft.com/office/drawing/2014/main" id="{1199E1B1-A8C0-4FE8-A5A8-1CB41D69F857}"/>
+              </a:ext>
+              <a:ext uri="{C183D7F6-B498-43B3-948B-1728B52AA6E4}">
+                <adec:decorative xmlns:adec="http://schemas.microsoft.com/office/drawing/2017/decorative" val="1"/>
+              </a:ext>
+            </a:extLst>
+          </p:cNvPr>
+          <p:cNvSpPr>
+            <a:spLocks noGrp="1" noRot="1" noChangeAspect="1" noMove="1" noResize="1" noEditPoints="1" noAdjustHandles="1" noChangeArrowheads="1" noChangeShapeType="1" noTextEdit="1"/>
+          </p:cNvSpPr>
+          <p:nvPr>
+            <p:extLst>
+              <p:ext uri="{386F3935-93C4-4BCD-93E2-E3B085C9AB24}">
+                <p16:designElem xmlns:p16="http://schemas.microsoft.com/office/powerpoint/2015/main" val="1"/>
+              </p:ext>
+            </p:extLst>
+          </p:nvPr>
+        </p:nvSpPr>
+        <p:spPr>
+          <a:xfrm rot="10800000" flipH="1">
+            <a:off x="2" y="0"/>
+            <a:ext cx="12191998" cy="1575955"/>
+          </a:xfrm>
+          <a:prstGeom prst="rect">
+            <a:avLst/>
+          </a:prstGeom>
+          <a:gradFill>
+            <a:gsLst>
+              <a:gs pos="0">
+                <a:srgbClr val="000000">
+                  <a:alpha val="96000"/>
+                </a:srgbClr>
+              </a:gs>
+              <a:gs pos="100000">
+                <a:schemeClr val="accent1">
+                  <a:lumMod val="75000"/>
+                </a:schemeClr>
+              </a:gs>
+            </a:gsLst>
+            <a:lin ang="6000000" scaled="0"/>
+          </a:gradFill>
+          <a:ln>
+            <a:noFill/>
+          </a:ln>
+        </p:spPr>
+        <p:style>
+          <a:lnRef idx="2">
+            <a:schemeClr val="accent1">
+              <a:shade val="50000"/>
+            </a:schemeClr>
+          </a:lnRef>
+          <a:fillRef idx="1">
+            <a:schemeClr val="accent1"/>
+          </a:fillRef>
+          <a:effectRef idx="0">
+            <a:schemeClr val="accent1"/>
+          </a:effectRef>
+          <a:fontRef idx="minor">
+            <a:schemeClr val="lt1"/>
+          </a:fontRef>
+        </p:style>
+        <p:txBody>
+          <a:bodyPr rtlCol="0" anchor="ctr"/>
+          <a:lstStyle/>
+          <a:p>
+            <a:pPr algn="ctr"/>
+            <a:endParaRPr lang="en-US"/>
+          </a:p>
+        </p:txBody>
+      </p:sp>
+      <p:sp>
+        <p:nvSpPr>
+          <p:cNvPr id="13" name="Rectangle 12">
+            <a:extLst>
+              <a:ext uri="{FF2B5EF4-FFF2-40B4-BE49-F238E27FC236}">
+                <a16:creationId xmlns:a16="http://schemas.microsoft.com/office/drawing/2014/main" id="{84A8DE83-DE75-4B41-9DB4-A7EC0B0DEC0B}"/>
+              </a:ext>
+              <a:ext uri="{C183D7F6-B498-43B3-948B-1728B52AA6E4}">
+                <adec:decorative xmlns:adec="http://schemas.microsoft.com/office/drawing/2017/decorative" val="1"/>
+              </a:ext>
+            </a:extLst>
+          </p:cNvPr>
+          <p:cNvSpPr>
+            <a:spLocks noGrp="1" noRot="1" noChangeAspect="1" noMove="1" noResize="1" noEditPoints="1" noAdjustHandles="1" noChangeArrowheads="1" noChangeShapeType="1" noTextEdit="1"/>
+          </p:cNvSpPr>
+          <p:nvPr>
+            <p:extLst>
+              <p:ext uri="{386F3935-93C4-4BCD-93E2-E3B085C9AB24}">
+                <p16:designElem xmlns:p16="http://schemas.microsoft.com/office/powerpoint/2015/main" val="1"/>
+              </p:ext>
+            </p:extLst>
+          </p:nvPr>
+        </p:nvSpPr>
+        <p:spPr>
+          <a:xfrm>
+            <a:off x="0" y="0"/>
+            <a:ext cx="8128856" cy="1575461"/>
+          </a:xfrm>
+          <a:prstGeom prst="rect">
+            <a:avLst/>
+          </a:prstGeom>
+          <a:gradFill>
+            <a:gsLst>
+              <a:gs pos="0">
+                <a:schemeClr val="accent1">
+                  <a:alpha val="41000"/>
+                </a:schemeClr>
+              </a:gs>
+              <a:gs pos="74000">
+                <a:schemeClr val="accent1">
+                  <a:lumMod val="60000"/>
+                  <a:lumOff val="40000"/>
+                  <a:alpha val="0"/>
+                </a:schemeClr>
+              </a:gs>
+            </a:gsLst>
+            <a:lin ang="8400000" scaled="0"/>
+          </a:gradFill>
+          <a:ln>
+            <a:noFill/>
+          </a:ln>
+        </p:spPr>
+        <p:style>
+          <a:lnRef idx="2">
+            <a:schemeClr val="accent1">
+              <a:shade val="50000"/>
+            </a:schemeClr>
+          </a:lnRef>
+          <a:fillRef idx="1">
+            <a:schemeClr val="accent1"/>
+          </a:fillRef>
+          <a:effectRef idx="0">
+            <a:schemeClr val="accent1"/>
+          </a:effectRef>
+          <a:fontRef idx="minor">
+            <a:schemeClr val="lt1"/>
+          </a:fontRef>
+        </p:style>
+        <p:txBody>
+          <a:bodyPr rtlCol="0" anchor="ctr"/>
+          <a:lstStyle/>
+          <a:p>
+            <a:pPr algn="ctr"/>
+            <a:endParaRPr lang="en-US"/>
+          </a:p>
+        </p:txBody>
+      </p:sp>
+      <p:sp>
+        <p:nvSpPr>
+          <p:cNvPr id="15" name="Rectangle 14">
+            <a:extLst>
+              <a:ext uri="{FF2B5EF4-FFF2-40B4-BE49-F238E27FC236}">
+                <a16:creationId xmlns:a16="http://schemas.microsoft.com/office/drawing/2014/main" id="{A7009A0A-BEF5-4EAC-AF15-E4F9F002E239}"/>
+              </a:ext>
+              <a:ext uri="{C183D7F6-B498-43B3-948B-1728B52AA6E4}">
+                <adec:decorative xmlns:adec="http://schemas.microsoft.com/office/drawing/2017/decorative" val="1"/>
+              </a:ext>
+            </a:extLst>
+          </p:cNvPr>
+          <p:cNvSpPr>
+            <a:spLocks noGrp="1" noRot="1" noChangeAspect="1" noMove="1" noResize="1" noEditPoints="1" noAdjustHandles="1" noChangeArrowheads="1" noChangeShapeType="1" noTextEdit="1"/>
+          </p:cNvSpPr>
+          <p:nvPr>
+            <p:extLst>
+              <p:ext uri="{386F3935-93C4-4BCD-93E2-E3B085C9AB24}">
+                <p16:designElem xmlns:p16="http://schemas.microsoft.com/office/powerpoint/2015/main" val="1"/>
+              </p:ext>
+            </p:extLst>
+          </p:nvPr>
+        </p:nvSpPr>
+        <p:spPr>
+          <a:xfrm flipH="1">
+            <a:off x="-3" y="-1"/>
+            <a:ext cx="12192002" cy="1574311"/>
+          </a:xfrm>
+          <a:prstGeom prst="rect">
+            <a:avLst/>
+          </a:prstGeom>
+          <a:gradFill>
+            <a:gsLst>
+              <a:gs pos="0">
+                <a:srgbClr val="000000">
+                  <a:alpha val="63000"/>
+                </a:srgbClr>
+              </a:gs>
+              <a:gs pos="78000">
+                <a:schemeClr val="accent1">
+                  <a:alpha val="15000"/>
+                </a:schemeClr>
+              </a:gs>
+            </a:gsLst>
+            <a:lin ang="15600000" scaled="0"/>
+          </a:gradFill>
+          <a:ln>
+            <a:noFill/>
+          </a:ln>
+        </p:spPr>
+        <p:style>
+          <a:lnRef idx="2">
+            <a:schemeClr val="accent1">
+              <a:shade val="50000"/>
+            </a:schemeClr>
+          </a:lnRef>
+          <a:fillRef idx="1">
+            <a:schemeClr val="accent1"/>
+          </a:fillRef>
+          <a:effectRef idx="0">
+            <a:schemeClr val="accent1"/>
+          </a:effectRef>
+          <a:fontRef idx="minor">
+            <a:schemeClr val="lt1"/>
+          </a:fontRef>
+        </p:style>
+        <p:txBody>
+          <a:bodyPr rtlCol="0" anchor="ctr"/>
+          <a:lstStyle/>
+          <a:p>
+            <a:pPr algn="ctr"/>
+            <a:endParaRPr lang="en-US"/>
+          </a:p>
+        </p:txBody>
+      </p:sp>
+      <p:sp>
+        <p:nvSpPr>
+          <p:cNvPr id="2" name="Title 1">
+            <a:extLst>
+              <a:ext uri="{FF2B5EF4-FFF2-40B4-BE49-F238E27FC236}">
+                <a16:creationId xmlns:a16="http://schemas.microsoft.com/office/drawing/2014/main" id="{072D2E6C-D7D9-5A19-EBA3-F361325D660C}"/>
+              </a:ext>
+            </a:extLst>
+          </p:cNvPr>
+          <p:cNvSpPr>
+            <a:spLocks noGrp="1"/>
+          </p:cNvSpPr>
+          <p:nvPr>
+            <p:ph type="title"/>
+          </p:nvPr>
+        </p:nvSpPr>
+        <p:spPr>
+          <a:xfrm>
+            <a:off x="699713" y="248038"/>
+            <a:ext cx="7063721" cy="1159200"/>
+          </a:xfrm>
+        </p:spPr>
+        <p:txBody>
+          <a:bodyPr vert="horz" lIns="91440" tIns="45720" rIns="91440" bIns="45720" rtlCol="0" anchor="ctr">
+            <a:normAutofit fontScale="90000"/>
+          </a:bodyPr>
+          <a:lstStyle/>
+          <a:p>
+            <a:r>
+              <a:rPr lang="en-US" sz="4000" dirty="0">
+                <a:solidFill>
+                  <a:srgbClr val="FFFFFF"/>
+                </a:solidFill>
+              </a:rPr>
+              <a:t>Weekly Temperatures &amp; Population- Cleveland</a:t>
+            </a:r>
+            <a:endParaRPr lang="en-US" sz="4000" kern="1200" dirty="0">
+              <a:solidFill>
+                <a:srgbClr val="FFFFFF"/>
+              </a:solidFill>
+              <a:latin typeface="+mj-lt"/>
+              <a:ea typeface="+mj-ea"/>
+              <a:cs typeface="+mj-cs"/>
+            </a:endParaRPr>
+          </a:p>
+        </p:txBody>
+      </p:sp>
+      <p:sp>
+        <p:nvSpPr>
+          <p:cNvPr id="5" name="TextBox 4">
+            <a:extLst>
+              <a:ext uri="{FF2B5EF4-FFF2-40B4-BE49-F238E27FC236}">
+                <a16:creationId xmlns:a16="http://schemas.microsoft.com/office/drawing/2014/main" id="{054D79B3-23A9-B672-3B8B-2907857BE9E5}"/>
+              </a:ext>
+            </a:extLst>
+          </p:cNvPr>
+          <p:cNvSpPr txBox="1"/>
+          <p:nvPr/>
+        </p:nvSpPr>
+        <p:spPr>
+          <a:xfrm>
+            <a:off x="9916886" y="6498460"/>
+            <a:ext cx="2253646" cy="369332"/>
+          </a:xfrm>
+          <a:prstGeom prst="rect">
+            <a:avLst/>
+          </a:prstGeom>
+          <a:noFill/>
+        </p:spPr>
+        <p:txBody>
+          <a:bodyPr wrap="square" rtlCol="0">
+            <a:spAutoFit/>
+          </a:bodyPr>
+          <a:lstStyle/>
+          <a:p>
+            <a:r>
+              <a:rPr lang="en-US" dirty="0"/>
+              <a:t>Correlation: -0.4140</a:t>
+            </a:r>
+          </a:p>
+        </p:txBody>
+      </p:sp>
+      <p:pic>
+        <p:nvPicPr>
+          <p:cNvPr id="4" name="Picture 3" descr="A graph with blue lines and red dots&#10;&#10;Description automatically generated">
+            <a:extLst>
+              <a:ext uri="{FF2B5EF4-FFF2-40B4-BE49-F238E27FC236}">
+                <a16:creationId xmlns:a16="http://schemas.microsoft.com/office/drawing/2014/main" id="{CB553646-2DDF-650D-C36C-C32CACC523FE}"/>
+              </a:ext>
+            </a:extLst>
+          </p:cNvPr>
+          <p:cNvPicPr>
+            <a:picLocks noChangeAspect="1"/>
+          </p:cNvPicPr>
+          <p:nvPr/>
+        </p:nvPicPr>
+        <p:blipFill>
+          <a:blip r:embed="rId2">
+            <a:extLst>
+              <a:ext uri="{28A0092B-C50C-407E-A947-70E740481C1C}">
+                <a14:useLocalDpi xmlns:a14="http://schemas.microsoft.com/office/drawing/2010/main" val="0"/>
+              </a:ext>
+            </a:extLst>
+          </a:blip>
+          <a:stretch>
+            <a:fillRect/>
+          </a:stretch>
+        </p:blipFill>
+        <p:spPr>
+          <a:xfrm>
+            <a:off x="986555" y="1655276"/>
+            <a:ext cx="10218885" cy="4710533"/>
+          </a:xfrm>
+          <a:prstGeom prst="rect">
+            <a:avLst/>
+          </a:prstGeom>
+        </p:spPr>
+      </p:pic>
+    </p:spTree>
+    <p:extLst>
+      <p:ext uri="{BB962C8B-B14F-4D97-AF65-F5344CB8AC3E}">
+        <p14:creationId xmlns:p14="http://schemas.microsoft.com/office/powerpoint/2010/main" val="3223283231"/>
       </p:ext>
     </p:extLst>
   </p:cSld>
@@ -12231,7 +13052,7 @@
         </p:blipFill>
         <p:spPr>
           <a:xfrm>
-            <a:off x="2743201" y="1655276"/>
+            <a:off x="2412308" y="1822348"/>
             <a:ext cx="7367380" cy="4399549"/>
           </a:xfrm>
           <a:prstGeom prst="rect">
@@ -12671,7 +13492,7 @@
         </p:nvSpPr>
         <p:spPr>
           <a:xfrm>
-            <a:off x="10024056" y="6498460"/>
+            <a:off x="8837070" y="642972"/>
             <a:ext cx="2146476" cy="369332"/>
           </a:xfrm>
           <a:prstGeom prst="rect">
@@ -12686,7 +13507,11 @@
           <a:lstStyle/>
           <a:p>
             <a:r>
-              <a:rPr lang="en-US" dirty="0"/>
+              <a:rPr lang="en-US" dirty="0">
+                <a:solidFill>
+                  <a:schemeClr val="bg1"/>
+                </a:solidFill>
+              </a:rPr>
               <a:t>Correlation: -0.520</a:t>
             </a:r>
           </a:p>
@@ -13124,7 +13949,7 @@
         </p:nvSpPr>
         <p:spPr>
           <a:xfrm>
-            <a:off x="10024056" y="6498460"/>
+            <a:off x="8828567" y="602488"/>
             <a:ext cx="2146476" cy="369332"/>
           </a:xfrm>
           <a:prstGeom prst="rect">
@@ -13139,7 +13964,11 @@
           <a:lstStyle/>
           <a:p>
             <a:r>
-              <a:rPr lang="en-US" dirty="0"/>
+              <a:rPr lang="en-US" dirty="0">
+                <a:solidFill>
+                  <a:schemeClr val="bg1"/>
+                </a:solidFill>
+              </a:rPr>
               <a:t>Correlation: -0.598</a:t>
             </a:r>
           </a:p>
@@ -13996,7 +14825,7 @@
         </p:nvSpPr>
         <p:spPr>
           <a:xfrm>
-            <a:off x="10024056" y="6498460"/>
+            <a:off x="8828567" y="602488"/>
             <a:ext cx="2146476" cy="369332"/>
           </a:xfrm>
           <a:prstGeom prst="rect">
@@ -14011,7 +14840,11 @@
           <a:lstStyle/>
           <a:p>
             <a:r>
-              <a:rPr lang="en-US" dirty="0"/>
+              <a:rPr lang="en-US" dirty="0">
+                <a:solidFill>
+                  <a:schemeClr val="bg1"/>
+                </a:solidFill>
+              </a:rPr>
               <a:t>Correlation: 0.3725</a:t>
             </a:r>
           </a:p>

</xml_diff>

<commit_message>
fixed error on influenza charts
</commit_message>
<xml_diff>
--- a/Project-1-Presentation.pptx
+++ b/Project-1-Presentation.pptx
@@ -147,1576 +147,6 @@
 <file path=ppt/changesInfos/changesInfo1.xml><?xml version="1.0" encoding="utf-8"?>
 <pc:chgInfo xmlns:a="http://schemas.openxmlformats.org/drawingml/2006/main" xmlns:r="http://schemas.openxmlformats.org/officeDocument/2006/relationships" xmlns:ac="http://schemas.microsoft.com/office/drawing/2013/main/command" xmlns:pc="http://schemas.microsoft.com/office/powerpoint/2013/main/command">
   <pc:docChgLst>
-    <pc:chgData name="Mike Saunders" userId="c0986ea9a2f2a984" providerId="LiveId" clId="{A88E1021-0D6E-4899-A132-129726DC3689}"/>
-    <pc:docChg chg="undo custSel addSld delSld modSld sldOrd">
-      <pc:chgData name="Mike Saunders" userId="c0986ea9a2f2a984" providerId="LiveId" clId="{A88E1021-0D6E-4899-A132-129726DC3689}" dt="2024-07-18T23:06:18.854" v="1488" actId="6549"/>
-      <pc:docMkLst>
-        <pc:docMk/>
-      </pc:docMkLst>
-      <pc:sldChg chg="delSp modSp mod delDesignElem">
-        <pc:chgData name="Mike Saunders" userId="c0986ea9a2f2a984" providerId="LiveId" clId="{A88E1021-0D6E-4899-A132-129726DC3689}" dt="2024-07-18T22:56:52.562" v="1345" actId="403"/>
-        <pc:sldMkLst>
-          <pc:docMk/>
-          <pc:sldMk cId="4031883172" sldId="256"/>
-        </pc:sldMkLst>
-        <pc:spChg chg="mod">
-          <ac:chgData name="Mike Saunders" userId="c0986ea9a2f2a984" providerId="LiveId" clId="{A88E1021-0D6E-4899-A132-129726DC3689}" dt="2024-07-18T22:56:52.562" v="1345" actId="403"/>
-          <ac:spMkLst>
-            <pc:docMk/>
-            <pc:sldMk cId="4031883172" sldId="256"/>
-            <ac:spMk id="2" creationId="{4EB9F1EE-B7C1-B5A7-D3DE-5486DF557772}"/>
-          </ac:spMkLst>
-        </pc:spChg>
-        <pc:spChg chg="mod">
-          <ac:chgData name="Mike Saunders" userId="c0986ea9a2f2a984" providerId="LiveId" clId="{A88E1021-0D6E-4899-A132-129726DC3689}" dt="2024-07-17T23:15:46.324" v="548" actId="120"/>
-          <ac:spMkLst>
-            <pc:docMk/>
-            <pc:sldMk cId="4031883172" sldId="256"/>
-            <ac:spMk id="3" creationId="{79CBFAF9-313F-CFE8-A551-D1D9961AA6DB}"/>
-          </ac:spMkLst>
-        </pc:spChg>
-        <pc:spChg chg="del">
-          <ac:chgData name="Mike Saunders" userId="c0986ea9a2f2a984" providerId="LiveId" clId="{A88E1021-0D6E-4899-A132-129726DC3689}" dt="2024-07-17T22:52:10.071" v="4"/>
-          <ac:spMkLst>
-            <pc:docMk/>
-            <pc:sldMk cId="4031883172" sldId="256"/>
-            <ac:spMk id="9" creationId="{9B7AD9F6-8CE7-4299-8FC6-328F4DCD3FF9}"/>
-          </ac:spMkLst>
-        </pc:spChg>
-        <pc:spChg chg="del">
-          <ac:chgData name="Mike Saunders" userId="c0986ea9a2f2a984" providerId="LiveId" clId="{A88E1021-0D6E-4899-A132-129726DC3689}" dt="2024-07-17T22:52:10.071" v="4"/>
-          <ac:spMkLst>
-            <pc:docMk/>
-            <pc:sldMk cId="4031883172" sldId="256"/>
-            <ac:spMk id="11" creationId="{F49775AF-8896-43EE-92C6-83497D6DC56F}"/>
-          </ac:spMkLst>
-        </pc:spChg>
-      </pc:sldChg>
-      <pc:sldChg chg="new del">
-        <pc:chgData name="Mike Saunders" userId="c0986ea9a2f2a984" providerId="LiveId" clId="{A88E1021-0D6E-4899-A132-129726DC3689}" dt="2024-07-17T22:51:38.835" v="2" actId="47"/>
-        <pc:sldMkLst>
-          <pc:docMk/>
-          <pc:sldMk cId="1999600122" sldId="257"/>
-        </pc:sldMkLst>
-      </pc:sldChg>
-      <pc:sldChg chg="addSp delSp modSp new mod ord setBg modClrScheme delDesignElem chgLayout">
-        <pc:chgData name="Mike Saunders" userId="c0986ea9a2f2a984" providerId="LiveId" clId="{A88E1021-0D6E-4899-A132-129726DC3689}" dt="2024-07-18T00:34:43.888" v="1323"/>
-        <pc:sldMkLst>
-          <pc:docMk/>
-          <pc:sldMk cId="3642388448" sldId="258"/>
-        </pc:sldMkLst>
-        <pc:spChg chg="add mod ord">
-          <ac:chgData name="Mike Saunders" userId="c0986ea9a2f2a984" providerId="LiveId" clId="{A88E1021-0D6E-4899-A132-129726DC3689}" dt="2024-07-17T23:02:12.166" v="189" actId="26606"/>
-          <ac:spMkLst>
-            <pc:docMk/>
-            <pc:sldMk cId="3642388448" sldId="258"/>
-            <ac:spMk id="2" creationId="{7246B072-2CCD-AA46-3FEE-4CEEE79E61DD}"/>
-          </ac:spMkLst>
-        </pc:spChg>
-        <pc:spChg chg="add del mod">
-          <ac:chgData name="Mike Saunders" userId="c0986ea9a2f2a984" providerId="LiveId" clId="{A88E1021-0D6E-4899-A132-129726DC3689}" dt="2024-07-17T22:53:37.533" v="37" actId="22"/>
-          <ac:spMkLst>
-            <pc:docMk/>
-            <pc:sldMk cId="3642388448" sldId="258"/>
-            <ac:spMk id="3" creationId="{F2F4B3BA-39D7-AD7E-98E9-30F9E5F21D59}"/>
-          </ac:spMkLst>
-        </pc:spChg>
-        <pc:spChg chg="add del mod">
-          <ac:chgData name="Mike Saunders" userId="c0986ea9a2f2a984" providerId="LiveId" clId="{A88E1021-0D6E-4899-A132-129726DC3689}" dt="2024-07-17T22:59:48.427" v="149" actId="22"/>
-          <ac:spMkLst>
-            <pc:docMk/>
-            <pc:sldMk cId="3642388448" sldId="258"/>
-            <ac:spMk id="11" creationId="{BFAE83A6-84C7-4527-C281-F25253888976}"/>
-          </ac:spMkLst>
-        </pc:spChg>
-        <pc:spChg chg="add del">
-          <ac:chgData name="Mike Saunders" userId="c0986ea9a2f2a984" providerId="LiveId" clId="{A88E1021-0D6E-4899-A132-129726DC3689}" dt="2024-07-17T23:04:35.333" v="218"/>
-          <ac:spMkLst>
-            <pc:docMk/>
-            <pc:sldMk cId="3642388448" sldId="258"/>
-            <ac:spMk id="14" creationId="{9CB95732-565A-4D2C-A3AB-CC460C0D3826}"/>
-          </ac:spMkLst>
-        </pc:spChg>
-        <pc:spChg chg="add del">
-          <ac:chgData name="Mike Saunders" userId="c0986ea9a2f2a984" providerId="LiveId" clId="{A88E1021-0D6E-4899-A132-129726DC3689}" dt="2024-07-17T23:04:35.333" v="218"/>
-          <ac:spMkLst>
-            <pc:docMk/>
-            <pc:sldMk cId="3642388448" sldId="258"/>
-            <ac:spMk id="16" creationId="{E19B653C-798C-4333-8452-3DF3AE3C1D11}"/>
-          </ac:spMkLst>
-        </pc:spChg>
-        <pc:spChg chg="add del">
-          <ac:chgData name="Mike Saunders" userId="c0986ea9a2f2a984" providerId="LiveId" clId="{A88E1021-0D6E-4899-A132-129726DC3689}" dt="2024-07-17T23:04:35.333" v="218"/>
-          <ac:spMkLst>
-            <pc:docMk/>
-            <pc:sldMk cId="3642388448" sldId="258"/>
-            <ac:spMk id="18" creationId="{0FE50278-E2EC-42B2-A1F1-921DD39901C4}"/>
-          </ac:spMkLst>
-        </pc:spChg>
-        <pc:spChg chg="add del">
-          <ac:chgData name="Mike Saunders" userId="c0986ea9a2f2a984" providerId="LiveId" clId="{A88E1021-0D6E-4899-A132-129726DC3689}" dt="2024-07-17T23:04:35.333" v="218"/>
-          <ac:spMkLst>
-            <pc:docMk/>
-            <pc:sldMk cId="3642388448" sldId="258"/>
-            <ac:spMk id="20" creationId="{1236153F-0DB4-40DD-87C6-B40C1B7E282C}"/>
-          </ac:spMkLst>
-        </pc:spChg>
-        <pc:picChg chg="add mod">
-          <ac:chgData name="Mike Saunders" userId="c0986ea9a2f2a984" providerId="LiveId" clId="{A88E1021-0D6E-4899-A132-129726DC3689}" dt="2024-07-17T23:02:52.978" v="199" actId="14100"/>
-          <ac:picMkLst>
-            <pc:docMk/>
-            <pc:sldMk cId="3642388448" sldId="258"/>
-            <ac:picMk id="5" creationId="{D1BCF4F6-7804-D210-8B6C-6B972C9059BC}"/>
-          </ac:picMkLst>
-        </pc:picChg>
-        <pc:picChg chg="add mod ord">
-          <ac:chgData name="Mike Saunders" userId="c0986ea9a2f2a984" providerId="LiveId" clId="{A88E1021-0D6E-4899-A132-129726DC3689}" dt="2024-07-17T23:02:52.978" v="199" actId="14100"/>
-          <ac:picMkLst>
-            <pc:docMk/>
-            <pc:sldMk cId="3642388448" sldId="258"/>
-            <ac:picMk id="7" creationId="{5588B13E-BDFF-C93D-43A9-38CE70AC80D5}"/>
-          </ac:picMkLst>
-        </pc:picChg>
-        <pc:picChg chg="add mod">
-          <ac:chgData name="Mike Saunders" userId="c0986ea9a2f2a984" providerId="LiveId" clId="{A88E1021-0D6E-4899-A132-129726DC3689}" dt="2024-07-17T23:02:58.869" v="200" actId="1076"/>
-          <ac:picMkLst>
-            <pc:docMk/>
-            <pc:sldMk cId="3642388448" sldId="258"/>
-            <ac:picMk id="9" creationId="{88B5389A-081F-90DB-2CDA-630EC88D3D9E}"/>
-          </ac:picMkLst>
-        </pc:picChg>
-      </pc:sldChg>
-      <pc:sldChg chg="addSp delSp modSp add mod ord setBg delDesignElem">
-        <pc:chgData name="Mike Saunders" userId="c0986ea9a2f2a984" providerId="LiveId" clId="{A88E1021-0D6E-4899-A132-129726DC3689}" dt="2024-07-18T00:34:43.888" v="1323"/>
-        <pc:sldMkLst>
-          <pc:docMk/>
-          <pc:sldMk cId="3963055046" sldId="259"/>
-        </pc:sldMkLst>
-        <pc:spChg chg="mod">
-          <ac:chgData name="Mike Saunders" userId="c0986ea9a2f2a984" providerId="LiveId" clId="{A88E1021-0D6E-4899-A132-129726DC3689}" dt="2024-07-17T23:02:04.593" v="188" actId="26606"/>
-          <ac:spMkLst>
-            <pc:docMk/>
-            <pc:sldMk cId="3963055046" sldId="259"/>
-            <ac:spMk id="2" creationId="{7246B072-2CCD-AA46-3FEE-4CEEE79E61DD}"/>
-          </ac:spMkLst>
-        </pc:spChg>
-        <pc:spChg chg="add del mod">
-          <ac:chgData name="Mike Saunders" userId="c0986ea9a2f2a984" providerId="LiveId" clId="{A88E1021-0D6E-4899-A132-129726DC3689}" dt="2024-07-17T22:55:15.482" v="67" actId="478"/>
-          <ac:spMkLst>
-            <pc:docMk/>
-            <pc:sldMk cId="3963055046" sldId="259"/>
-            <ac:spMk id="4" creationId="{7B9AC07A-AD8F-3D20-1763-F7AD64328A5F}"/>
-          </ac:spMkLst>
-        </pc:spChg>
-        <pc:spChg chg="add mod">
-          <ac:chgData name="Mike Saunders" userId="c0986ea9a2f2a984" providerId="LiveId" clId="{A88E1021-0D6E-4899-A132-129726DC3689}" dt="2024-07-17T23:27:46.062" v="590" actId="1036"/>
-          <ac:spMkLst>
-            <pc:docMk/>
-            <pc:sldMk cId="3963055046" sldId="259"/>
-            <ac:spMk id="14" creationId="{DF933A6A-A9E1-9BF3-97CB-093399238658}"/>
-          </ac:spMkLst>
-        </pc:spChg>
-        <pc:spChg chg="add del">
-          <ac:chgData name="Mike Saunders" userId="c0986ea9a2f2a984" providerId="LiveId" clId="{A88E1021-0D6E-4899-A132-129726DC3689}" dt="2024-07-17T23:04:35.333" v="218"/>
-          <ac:spMkLst>
-            <pc:docMk/>
-            <pc:sldMk cId="3963055046" sldId="259"/>
-            <ac:spMk id="18" creationId="{9CB95732-565A-4D2C-A3AB-CC460C0D3826}"/>
-          </ac:spMkLst>
-        </pc:spChg>
-        <pc:spChg chg="add del">
-          <ac:chgData name="Mike Saunders" userId="c0986ea9a2f2a984" providerId="LiveId" clId="{A88E1021-0D6E-4899-A132-129726DC3689}" dt="2024-07-17T23:04:35.333" v="218"/>
-          <ac:spMkLst>
-            <pc:docMk/>
-            <pc:sldMk cId="3963055046" sldId="259"/>
-            <ac:spMk id="20" creationId="{E19B653C-798C-4333-8452-3DF3AE3C1D11}"/>
-          </ac:spMkLst>
-        </pc:spChg>
-        <pc:spChg chg="add del">
-          <ac:chgData name="Mike Saunders" userId="c0986ea9a2f2a984" providerId="LiveId" clId="{A88E1021-0D6E-4899-A132-129726DC3689}" dt="2024-07-17T23:04:35.333" v="218"/>
-          <ac:spMkLst>
-            <pc:docMk/>
-            <pc:sldMk cId="3963055046" sldId="259"/>
-            <ac:spMk id="22" creationId="{0FE50278-E2EC-42B2-A1F1-921DD39901C4}"/>
-          </ac:spMkLst>
-        </pc:spChg>
-        <pc:spChg chg="add del">
-          <ac:chgData name="Mike Saunders" userId="c0986ea9a2f2a984" providerId="LiveId" clId="{A88E1021-0D6E-4899-A132-129726DC3689}" dt="2024-07-17T23:04:35.333" v="218"/>
-          <ac:spMkLst>
-            <pc:docMk/>
-            <pc:sldMk cId="3963055046" sldId="259"/>
-            <ac:spMk id="24" creationId="{1236153F-0DB4-40DD-87C6-B40C1B7E282C}"/>
-          </ac:spMkLst>
-        </pc:spChg>
-        <pc:picChg chg="del">
-          <ac:chgData name="Mike Saunders" userId="c0986ea9a2f2a984" providerId="LiveId" clId="{A88E1021-0D6E-4899-A132-129726DC3689}" dt="2024-07-17T22:55:08.740" v="64" actId="478"/>
-          <ac:picMkLst>
-            <pc:docMk/>
-            <pc:sldMk cId="3963055046" sldId="259"/>
-            <ac:picMk id="5" creationId="{D1BCF4F6-7804-D210-8B6C-6B972C9059BC}"/>
-          </ac:picMkLst>
-        </pc:picChg>
-        <pc:picChg chg="del mod">
-          <ac:chgData name="Mike Saunders" userId="c0986ea9a2f2a984" providerId="LiveId" clId="{A88E1021-0D6E-4899-A132-129726DC3689}" dt="2024-07-17T22:55:09.414" v="66" actId="478"/>
-          <ac:picMkLst>
-            <pc:docMk/>
-            <pc:sldMk cId="3963055046" sldId="259"/>
-            <ac:picMk id="7" creationId="{5588B13E-BDFF-C93D-43A9-38CE70AC80D5}"/>
-          </ac:picMkLst>
-        </pc:picChg>
-        <pc:picChg chg="add mod ord">
-          <ac:chgData name="Mike Saunders" userId="c0986ea9a2f2a984" providerId="LiveId" clId="{A88E1021-0D6E-4899-A132-129726DC3689}" dt="2024-07-17T23:03:26.635" v="207" actId="1076"/>
-          <ac:picMkLst>
-            <pc:docMk/>
-            <pc:sldMk cId="3963055046" sldId="259"/>
-            <ac:picMk id="8" creationId="{D8B84859-15E5-4212-A406-1A0FA29CD419}"/>
-          </ac:picMkLst>
-        </pc:picChg>
-        <pc:picChg chg="del">
-          <ac:chgData name="Mike Saunders" userId="c0986ea9a2f2a984" providerId="LiveId" clId="{A88E1021-0D6E-4899-A132-129726DC3689}" dt="2024-07-17T22:55:16.153" v="68" actId="478"/>
-          <ac:picMkLst>
-            <pc:docMk/>
-            <pc:sldMk cId="3963055046" sldId="259"/>
-            <ac:picMk id="9" creationId="{88B5389A-081F-90DB-2CDA-630EC88D3D9E}"/>
-          </ac:picMkLst>
-        </pc:picChg>
-        <pc:picChg chg="add mod">
-          <ac:chgData name="Mike Saunders" userId="c0986ea9a2f2a984" providerId="LiveId" clId="{A88E1021-0D6E-4899-A132-129726DC3689}" dt="2024-07-17T23:03:22.311" v="205" actId="14100"/>
-          <ac:picMkLst>
-            <pc:docMk/>
-            <pc:sldMk cId="3963055046" sldId="259"/>
-            <ac:picMk id="11" creationId="{270AD0E6-6871-8A62-10D1-DEEEC88A3130}"/>
-          </ac:picMkLst>
-        </pc:picChg>
-        <pc:picChg chg="add mod">
-          <ac:chgData name="Mike Saunders" userId="c0986ea9a2f2a984" providerId="LiveId" clId="{A88E1021-0D6E-4899-A132-129726DC3689}" dt="2024-07-17T23:03:28.640" v="208" actId="1076"/>
-          <ac:picMkLst>
-            <pc:docMk/>
-            <pc:sldMk cId="3963055046" sldId="259"/>
-            <ac:picMk id="13" creationId="{4A659193-77B0-4253-75AD-BD4F0E6CF1D4}"/>
-          </ac:picMkLst>
-        </pc:picChg>
-        <pc:cxnChg chg="add mod">
-          <ac:chgData name="Mike Saunders" userId="c0986ea9a2f2a984" providerId="LiveId" clId="{A88E1021-0D6E-4899-A132-129726DC3689}" dt="2024-07-17T23:28:23.765" v="595" actId="1035"/>
-          <ac:cxnSpMkLst>
-            <pc:docMk/>
-            <pc:sldMk cId="3963055046" sldId="259"/>
-            <ac:cxnSpMk id="16" creationId="{7ED0AD73-8D78-6C47-1F66-5DCC413BB75F}"/>
-          </ac:cxnSpMkLst>
-        </pc:cxnChg>
-        <pc:cxnChg chg="add mod">
-          <ac:chgData name="Mike Saunders" userId="c0986ea9a2f2a984" providerId="LiveId" clId="{A88E1021-0D6E-4899-A132-129726DC3689}" dt="2024-07-17T23:27:46.062" v="590" actId="1036"/>
-          <ac:cxnSpMkLst>
-            <pc:docMk/>
-            <pc:sldMk cId="3963055046" sldId="259"/>
-            <ac:cxnSpMk id="17" creationId="{9C392C03-1F03-0785-A782-50D38A2B9761}"/>
-          </ac:cxnSpMkLst>
-        </pc:cxnChg>
-        <pc:cxnChg chg="add mod">
-          <ac:chgData name="Mike Saunders" userId="c0986ea9a2f2a984" providerId="LiveId" clId="{A88E1021-0D6E-4899-A132-129726DC3689}" dt="2024-07-17T23:27:46.062" v="590" actId="1036"/>
-          <ac:cxnSpMkLst>
-            <pc:docMk/>
-            <pc:sldMk cId="3963055046" sldId="259"/>
-            <ac:cxnSpMk id="19" creationId="{CF42BC7C-203D-194E-EDA7-3F7B6F3D3472}"/>
-          </ac:cxnSpMkLst>
-        </pc:cxnChg>
-      </pc:sldChg>
-      <pc:sldChg chg="addSp delSp modSp new mod setBg delDesignElem chgLayout">
-        <pc:chgData name="Mike Saunders" userId="c0986ea9a2f2a984" providerId="LiveId" clId="{A88E1021-0D6E-4899-A132-129726DC3689}" dt="2024-07-17T23:28:32.408" v="598" actId="14100"/>
-        <pc:sldMkLst>
-          <pc:docMk/>
-          <pc:sldMk cId="2120321798" sldId="260"/>
-        </pc:sldMkLst>
-        <pc:spChg chg="mod ord">
-          <ac:chgData name="Mike Saunders" userId="c0986ea9a2f2a984" providerId="LiveId" clId="{A88E1021-0D6E-4899-A132-129726DC3689}" dt="2024-07-17T23:01:58.515" v="187" actId="26606"/>
-          <ac:spMkLst>
-            <pc:docMk/>
-            <pc:sldMk cId="2120321798" sldId="260"/>
-            <ac:spMk id="2" creationId="{50815309-FC43-BB74-ACF0-40E80AE85C97}"/>
-          </ac:spMkLst>
-        </pc:spChg>
-        <pc:spChg chg="add mod">
-          <ac:chgData name="Mike Saunders" userId="c0986ea9a2f2a984" providerId="LiveId" clId="{A88E1021-0D6E-4899-A132-129726DC3689}" dt="2024-07-17T23:28:18.266" v="592" actId="1076"/>
-          <ac:spMkLst>
-            <pc:docMk/>
-            <pc:sldMk cId="2120321798" sldId="260"/>
-            <ac:spMk id="5" creationId="{8A6618D2-9721-A1AC-FC1C-C834F25262C4}"/>
-          </ac:spMkLst>
-        </pc:spChg>
-        <pc:spChg chg="add del">
-          <ac:chgData name="Mike Saunders" userId="c0986ea9a2f2a984" providerId="LiveId" clId="{A88E1021-0D6E-4899-A132-129726DC3689}" dt="2024-07-17T23:04:35.333" v="218"/>
-          <ac:spMkLst>
-            <pc:docMk/>
-            <pc:sldMk cId="2120321798" sldId="260"/>
-            <ac:spMk id="9" creationId="{A8384FB5-9ADC-4DDC-881B-597D56F5B15D}"/>
-          </ac:spMkLst>
-        </pc:spChg>
-        <pc:spChg chg="add del">
-          <ac:chgData name="Mike Saunders" userId="c0986ea9a2f2a984" providerId="LiveId" clId="{A88E1021-0D6E-4899-A132-129726DC3689}" dt="2024-07-17T23:04:35.333" v="218"/>
-          <ac:spMkLst>
-            <pc:docMk/>
-            <pc:sldMk cId="2120321798" sldId="260"/>
-            <ac:spMk id="11" creationId="{1199E1B1-A8C0-4FE8-A5A8-1CB41D69F857}"/>
-          </ac:spMkLst>
-        </pc:spChg>
-        <pc:spChg chg="add del">
-          <ac:chgData name="Mike Saunders" userId="c0986ea9a2f2a984" providerId="LiveId" clId="{A88E1021-0D6E-4899-A132-129726DC3689}" dt="2024-07-17T23:04:35.333" v="218"/>
-          <ac:spMkLst>
-            <pc:docMk/>
-            <pc:sldMk cId="2120321798" sldId="260"/>
-            <ac:spMk id="13" creationId="{84A8DE83-DE75-4B41-9DB4-A7EC0B0DEC0B}"/>
-          </ac:spMkLst>
-        </pc:spChg>
-        <pc:spChg chg="add del">
-          <ac:chgData name="Mike Saunders" userId="c0986ea9a2f2a984" providerId="LiveId" clId="{A88E1021-0D6E-4899-A132-129726DC3689}" dt="2024-07-17T23:04:35.333" v="218"/>
-          <ac:spMkLst>
-            <pc:docMk/>
-            <pc:sldMk cId="2120321798" sldId="260"/>
-            <ac:spMk id="15" creationId="{A7009A0A-BEF5-4EAC-AF15-E4F9F002E239}"/>
-          </ac:spMkLst>
-        </pc:spChg>
-        <pc:picChg chg="add mod">
-          <ac:chgData name="Mike Saunders" userId="c0986ea9a2f2a984" providerId="LiveId" clId="{A88E1021-0D6E-4899-A132-129726DC3689}" dt="2024-07-17T23:03:38.044" v="210" actId="14100"/>
-          <ac:picMkLst>
-            <pc:docMk/>
-            <pc:sldMk cId="2120321798" sldId="260"/>
-            <ac:picMk id="4" creationId="{AFB11A5D-B6D9-B1C9-FBE4-61CB4323AFEE}"/>
-          </ac:picMkLst>
-        </pc:picChg>
-        <pc:cxnChg chg="add mod">
-          <ac:chgData name="Mike Saunders" userId="c0986ea9a2f2a984" providerId="LiveId" clId="{A88E1021-0D6E-4899-A132-129726DC3689}" dt="2024-07-17T23:28:32.408" v="598" actId="14100"/>
-          <ac:cxnSpMkLst>
-            <pc:docMk/>
-            <pc:sldMk cId="2120321798" sldId="260"/>
-            <ac:cxnSpMk id="6" creationId="{C74810E2-0BBB-B9DE-309E-09B9D23FF9F3}"/>
-          </ac:cxnSpMkLst>
-        </pc:cxnChg>
-      </pc:sldChg>
-      <pc:sldChg chg="delSp add del mod setBg delDesignElem">
-        <pc:chgData name="Mike Saunders" userId="c0986ea9a2f2a984" providerId="LiveId" clId="{A88E1021-0D6E-4899-A132-129726DC3689}" dt="2024-07-17T23:04:47.047" v="221" actId="47"/>
-        <pc:sldMkLst>
-          <pc:docMk/>
-          <pc:sldMk cId="4066361515" sldId="261"/>
-        </pc:sldMkLst>
-        <pc:spChg chg="del">
-          <ac:chgData name="Mike Saunders" userId="c0986ea9a2f2a984" providerId="LiveId" clId="{A88E1021-0D6E-4899-A132-129726DC3689}" dt="2024-07-17T23:04:12.112" v="212"/>
-          <ac:spMkLst>
-            <pc:docMk/>
-            <pc:sldMk cId="4066361515" sldId="261"/>
-            <ac:spMk id="9" creationId="{A8384FB5-9ADC-4DDC-881B-597D56F5B15D}"/>
-          </ac:spMkLst>
-        </pc:spChg>
-        <pc:spChg chg="del">
-          <ac:chgData name="Mike Saunders" userId="c0986ea9a2f2a984" providerId="LiveId" clId="{A88E1021-0D6E-4899-A132-129726DC3689}" dt="2024-07-17T23:04:12.112" v="212"/>
-          <ac:spMkLst>
-            <pc:docMk/>
-            <pc:sldMk cId="4066361515" sldId="261"/>
-            <ac:spMk id="11" creationId="{1199E1B1-A8C0-4FE8-A5A8-1CB41D69F857}"/>
-          </ac:spMkLst>
-        </pc:spChg>
-        <pc:spChg chg="del">
-          <ac:chgData name="Mike Saunders" userId="c0986ea9a2f2a984" providerId="LiveId" clId="{A88E1021-0D6E-4899-A132-129726DC3689}" dt="2024-07-17T23:04:12.112" v="212"/>
-          <ac:spMkLst>
-            <pc:docMk/>
-            <pc:sldMk cId="4066361515" sldId="261"/>
-            <ac:spMk id="13" creationId="{84A8DE83-DE75-4B41-9DB4-A7EC0B0DEC0B}"/>
-          </ac:spMkLst>
-        </pc:spChg>
-        <pc:spChg chg="del">
-          <ac:chgData name="Mike Saunders" userId="c0986ea9a2f2a984" providerId="LiveId" clId="{A88E1021-0D6E-4899-A132-129726DC3689}" dt="2024-07-17T23:04:12.112" v="212"/>
-          <ac:spMkLst>
-            <pc:docMk/>
-            <pc:sldMk cId="4066361515" sldId="261"/>
-            <ac:spMk id="15" creationId="{A7009A0A-BEF5-4EAC-AF15-E4F9F002E239}"/>
-          </ac:spMkLst>
-        </pc:spChg>
-        <pc:picChg chg="del">
-          <ac:chgData name="Mike Saunders" userId="c0986ea9a2f2a984" providerId="LiveId" clId="{A88E1021-0D6E-4899-A132-129726DC3689}" dt="2024-07-17T23:04:16.709" v="213" actId="478"/>
-          <ac:picMkLst>
-            <pc:docMk/>
-            <pc:sldMk cId="4066361515" sldId="261"/>
-            <ac:picMk id="4" creationId="{AFB11A5D-B6D9-B1C9-FBE4-61CB4323AFEE}"/>
-          </ac:picMkLst>
-        </pc:picChg>
-      </pc:sldChg>
-      <pc:sldChg chg="addSp delSp modSp add mod setBg delDesignElem chgLayout">
-        <pc:chgData name="Mike Saunders" userId="c0986ea9a2f2a984" providerId="LiveId" clId="{A88E1021-0D6E-4899-A132-129726DC3689}" dt="2024-07-18T23:05:24.419" v="1477" actId="1076"/>
-        <pc:sldMkLst>
-          <pc:docMk/>
-          <pc:sldMk cId="3717669872" sldId="262"/>
-        </pc:sldMkLst>
-        <pc:spChg chg="mod ord">
-          <ac:chgData name="Mike Saunders" userId="c0986ea9a2f2a984" providerId="LiveId" clId="{A88E1021-0D6E-4899-A132-129726DC3689}" dt="2024-07-17T23:05:06.376" v="252" actId="20577"/>
-          <ac:spMkLst>
-            <pc:docMk/>
-            <pc:sldMk cId="3717669872" sldId="262"/>
-            <ac:spMk id="2" creationId="{50815309-FC43-BB74-ACF0-40E80AE85C97}"/>
-          </ac:spMkLst>
-        </pc:spChg>
-        <pc:spChg chg="add">
-          <ac:chgData name="Mike Saunders" userId="c0986ea9a2f2a984" providerId="LiveId" clId="{A88E1021-0D6E-4899-A132-129726DC3689}" dt="2024-07-17T23:04:57.335" v="223" actId="26606"/>
-          <ac:spMkLst>
-            <pc:docMk/>
-            <pc:sldMk cId="3717669872" sldId="262"/>
-            <ac:spMk id="6" creationId="{A8384FB5-9ADC-4DDC-881B-597D56F5B15D}"/>
-          </ac:spMkLst>
-        </pc:spChg>
-        <pc:spChg chg="add">
-          <ac:chgData name="Mike Saunders" userId="c0986ea9a2f2a984" providerId="LiveId" clId="{A88E1021-0D6E-4899-A132-129726DC3689}" dt="2024-07-17T23:04:57.335" v="223" actId="26606"/>
-          <ac:spMkLst>
-            <pc:docMk/>
-            <pc:sldMk cId="3717669872" sldId="262"/>
-            <ac:spMk id="7" creationId="{1199E1B1-A8C0-4FE8-A5A8-1CB41D69F857}"/>
-          </ac:spMkLst>
-        </pc:spChg>
-        <pc:spChg chg="add">
-          <ac:chgData name="Mike Saunders" userId="c0986ea9a2f2a984" providerId="LiveId" clId="{A88E1021-0D6E-4899-A132-129726DC3689}" dt="2024-07-17T23:04:57.335" v="223" actId="26606"/>
-          <ac:spMkLst>
-            <pc:docMk/>
-            <pc:sldMk cId="3717669872" sldId="262"/>
-            <ac:spMk id="8" creationId="{84A8DE83-DE75-4B41-9DB4-A7EC0B0DEC0B}"/>
-          </ac:spMkLst>
-        </pc:spChg>
-        <pc:spChg chg="del">
-          <ac:chgData name="Mike Saunders" userId="c0986ea9a2f2a984" providerId="LiveId" clId="{A88E1021-0D6E-4899-A132-129726DC3689}" dt="2024-07-17T23:04:45.058" v="220"/>
-          <ac:spMkLst>
-            <pc:docMk/>
-            <pc:sldMk cId="3717669872" sldId="262"/>
-            <ac:spMk id="9" creationId="{A8384FB5-9ADC-4DDC-881B-597D56F5B15D}"/>
-          </ac:spMkLst>
-        </pc:spChg>
-        <pc:spChg chg="add">
-          <ac:chgData name="Mike Saunders" userId="c0986ea9a2f2a984" providerId="LiveId" clId="{A88E1021-0D6E-4899-A132-129726DC3689}" dt="2024-07-17T23:04:57.335" v="223" actId="26606"/>
-          <ac:spMkLst>
-            <pc:docMk/>
-            <pc:sldMk cId="3717669872" sldId="262"/>
-            <ac:spMk id="10" creationId="{A7009A0A-BEF5-4EAC-AF15-E4F9F002E239}"/>
-          </ac:spMkLst>
-        </pc:spChg>
-        <pc:spChg chg="del">
-          <ac:chgData name="Mike Saunders" userId="c0986ea9a2f2a984" providerId="LiveId" clId="{A88E1021-0D6E-4899-A132-129726DC3689}" dt="2024-07-17T23:04:45.058" v="220"/>
-          <ac:spMkLst>
-            <pc:docMk/>
-            <pc:sldMk cId="3717669872" sldId="262"/>
-            <ac:spMk id="11" creationId="{1199E1B1-A8C0-4FE8-A5A8-1CB41D69F857}"/>
-          </ac:spMkLst>
-        </pc:spChg>
-        <pc:spChg chg="del">
-          <ac:chgData name="Mike Saunders" userId="c0986ea9a2f2a984" providerId="LiveId" clId="{A88E1021-0D6E-4899-A132-129726DC3689}" dt="2024-07-17T23:04:45.058" v="220"/>
-          <ac:spMkLst>
-            <pc:docMk/>
-            <pc:sldMk cId="3717669872" sldId="262"/>
-            <ac:spMk id="13" creationId="{84A8DE83-DE75-4B41-9DB4-A7EC0B0DEC0B}"/>
-          </ac:spMkLst>
-        </pc:spChg>
-        <pc:spChg chg="del">
-          <ac:chgData name="Mike Saunders" userId="c0986ea9a2f2a984" providerId="LiveId" clId="{A88E1021-0D6E-4899-A132-129726DC3689}" dt="2024-07-17T23:04:45.058" v="220"/>
-          <ac:spMkLst>
-            <pc:docMk/>
-            <pc:sldMk cId="3717669872" sldId="262"/>
-            <ac:spMk id="15" creationId="{A7009A0A-BEF5-4EAC-AF15-E4F9F002E239}"/>
-          </ac:spMkLst>
-        </pc:spChg>
-        <pc:picChg chg="del mod">
-          <ac:chgData name="Mike Saunders" userId="c0986ea9a2f2a984" providerId="LiveId" clId="{A88E1021-0D6E-4899-A132-129726DC3689}" dt="2024-07-17T23:05:31.953" v="253" actId="478"/>
-          <ac:picMkLst>
-            <pc:docMk/>
-            <pc:sldMk cId="3717669872" sldId="262"/>
-            <ac:picMk id="4" creationId="{AFB11A5D-B6D9-B1C9-FBE4-61CB4323AFEE}"/>
-          </ac:picMkLst>
-        </pc:picChg>
-        <pc:picChg chg="add del mod">
-          <ac:chgData name="Mike Saunders" userId="c0986ea9a2f2a984" providerId="LiveId" clId="{A88E1021-0D6E-4899-A132-129726DC3689}" dt="2024-07-17T23:05:49.842" v="258" actId="478"/>
-          <ac:picMkLst>
-            <pc:docMk/>
-            <pc:sldMk cId="3717669872" sldId="262"/>
-            <ac:picMk id="5" creationId="{B50C7A48-167F-EF8F-BB6D-360BDECE68FA}"/>
-          </ac:picMkLst>
-        </pc:picChg>
-        <pc:picChg chg="add mod">
-          <ac:chgData name="Mike Saunders" userId="c0986ea9a2f2a984" providerId="LiveId" clId="{A88E1021-0D6E-4899-A132-129726DC3689}" dt="2024-07-18T23:05:24.419" v="1477" actId="1076"/>
-          <ac:picMkLst>
-            <pc:docMk/>
-            <pc:sldMk cId="3717669872" sldId="262"/>
-            <ac:picMk id="14" creationId="{E6F4DC44-B925-36D1-2B98-0405F7380B72}"/>
-          </ac:picMkLst>
-        </pc:picChg>
-      </pc:sldChg>
-      <pc:sldChg chg="addSp delSp modSp new mod setBg">
-        <pc:chgData name="Mike Saunders" userId="c0986ea9a2f2a984" providerId="LiveId" clId="{A88E1021-0D6E-4899-A132-129726DC3689}" dt="2024-07-18T23:05:41.642" v="1480" actId="1076"/>
-        <pc:sldMkLst>
-          <pc:docMk/>
-          <pc:sldMk cId="276345597" sldId="263"/>
-        </pc:sldMkLst>
-        <pc:spChg chg="mod">
-          <ac:chgData name="Mike Saunders" userId="c0986ea9a2f2a984" providerId="LiveId" clId="{A88E1021-0D6E-4899-A132-129726DC3689}" dt="2024-07-17T23:08:34.331" v="352" actId="20577"/>
-          <ac:spMkLst>
-            <pc:docMk/>
-            <pc:sldMk cId="276345597" sldId="263"/>
-            <ac:spMk id="2" creationId="{56E94A04-04A0-FD3D-83EC-CBA731417051}"/>
-          </ac:spMkLst>
-        </pc:spChg>
-        <pc:spChg chg="add del">
-          <ac:chgData name="Mike Saunders" userId="c0986ea9a2f2a984" providerId="LiveId" clId="{A88E1021-0D6E-4899-A132-129726DC3689}" dt="2024-07-17T23:09:49.765" v="370" actId="22"/>
-          <ac:spMkLst>
-            <pc:docMk/>
-            <pc:sldMk cId="276345597" sldId="263"/>
-            <ac:spMk id="6" creationId="{4DA4E3A8-4FF8-32E7-5006-DCDE99E4428A}"/>
-          </ac:spMkLst>
-        </pc:spChg>
-        <pc:spChg chg="add mod">
-          <ac:chgData name="Mike Saunders" userId="c0986ea9a2f2a984" providerId="LiveId" clId="{A88E1021-0D6E-4899-A132-129726DC3689}" dt="2024-07-18T23:05:41.642" v="1480" actId="1076"/>
-          <ac:spMkLst>
-            <pc:docMk/>
-            <pc:sldMk cId="276345597" sldId="263"/>
-            <ac:spMk id="7" creationId="{7D1C0FCC-A79B-8D82-05D1-E4F87A5A0A11}"/>
-          </ac:spMkLst>
-        </pc:spChg>
-        <pc:spChg chg="add mod">
-          <ac:chgData name="Mike Saunders" userId="c0986ea9a2f2a984" providerId="LiveId" clId="{A88E1021-0D6E-4899-A132-129726DC3689}" dt="2024-07-17T23:30:03.863" v="670" actId="1076"/>
-          <ac:spMkLst>
-            <pc:docMk/>
-            <pc:sldMk cId="276345597" sldId="263"/>
-            <ac:spMk id="8" creationId="{FE3475D2-F4C3-8A97-18B2-E4A8557A37F1}"/>
-          </ac:spMkLst>
-        </pc:spChg>
-        <pc:spChg chg="add">
-          <ac:chgData name="Mike Saunders" userId="c0986ea9a2f2a984" providerId="LiveId" clId="{A88E1021-0D6E-4899-A132-129726DC3689}" dt="2024-07-17T23:06:36.788" v="264" actId="26606"/>
-          <ac:spMkLst>
-            <pc:docMk/>
-            <pc:sldMk cId="276345597" sldId="263"/>
-            <ac:spMk id="9" creationId="{A8384FB5-9ADC-4DDC-881B-597D56F5B15D}"/>
-          </ac:spMkLst>
-        </pc:spChg>
-        <pc:spChg chg="add">
-          <ac:chgData name="Mike Saunders" userId="c0986ea9a2f2a984" providerId="LiveId" clId="{A88E1021-0D6E-4899-A132-129726DC3689}" dt="2024-07-17T23:06:36.788" v="264" actId="26606"/>
-          <ac:spMkLst>
-            <pc:docMk/>
-            <pc:sldMk cId="276345597" sldId="263"/>
-            <ac:spMk id="11" creationId="{1199E1B1-A8C0-4FE8-A5A8-1CB41D69F857}"/>
-          </ac:spMkLst>
-        </pc:spChg>
-        <pc:spChg chg="add">
-          <ac:chgData name="Mike Saunders" userId="c0986ea9a2f2a984" providerId="LiveId" clId="{A88E1021-0D6E-4899-A132-129726DC3689}" dt="2024-07-17T23:06:36.788" v="264" actId="26606"/>
-          <ac:spMkLst>
-            <pc:docMk/>
-            <pc:sldMk cId="276345597" sldId="263"/>
-            <ac:spMk id="13" creationId="{84A8DE83-DE75-4B41-9DB4-A7EC0B0DEC0B}"/>
-          </ac:spMkLst>
-        </pc:spChg>
-        <pc:spChg chg="add">
-          <ac:chgData name="Mike Saunders" userId="c0986ea9a2f2a984" providerId="LiveId" clId="{A88E1021-0D6E-4899-A132-129726DC3689}" dt="2024-07-17T23:06:36.788" v="264" actId="26606"/>
-          <ac:spMkLst>
-            <pc:docMk/>
-            <pc:sldMk cId="276345597" sldId="263"/>
-            <ac:spMk id="15" creationId="{A7009A0A-BEF5-4EAC-AF15-E4F9F002E239}"/>
-          </ac:spMkLst>
-        </pc:spChg>
-        <pc:picChg chg="add mod">
-          <ac:chgData name="Mike Saunders" userId="c0986ea9a2f2a984" providerId="LiveId" clId="{A88E1021-0D6E-4899-A132-129726DC3689}" dt="2024-07-17T23:10:29.681" v="407" actId="1076"/>
-          <ac:picMkLst>
-            <pc:docMk/>
-            <pc:sldMk cId="276345597" sldId="263"/>
-            <ac:picMk id="4" creationId="{C4DBCB93-80C3-93E1-3170-3098373C6715}"/>
-          </ac:picMkLst>
-        </pc:picChg>
-      </pc:sldChg>
-      <pc:sldChg chg="addSp delSp add del setBg delDesignElem">
-        <pc:chgData name="Mike Saunders" userId="c0986ea9a2f2a984" providerId="LiveId" clId="{A88E1021-0D6E-4899-A132-129726DC3689}" dt="2024-07-18T00:33:58.662" v="1316"/>
-        <pc:sldMkLst>
-          <pc:docMk/>
-          <pc:sldMk cId="1340483109" sldId="264"/>
-        </pc:sldMkLst>
-        <pc:spChg chg="add del">
-          <ac:chgData name="Mike Saunders" userId="c0986ea9a2f2a984" providerId="LiveId" clId="{A88E1021-0D6E-4899-A132-129726DC3689}" dt="2024-07-18T00:33:58.662" v="1316"/>
-          <ac:spMkLst>
-            <pc:docMk/>
-            <pc:sldMk cId="1340483109" sldId="264"/>
-            <ac:spMk id="9" creationId="{A8384FB5-9ADC-4DDC-881B-597D56F5B15D}"/>
-          </ac:spMkLst>
-        </pc:spChg>
-        <pc:spChg chg="add del">
-          <ac:chgData name="Mike Saunders" userId="c0986ea9a2f2a984" providerId="LiveId" clId="{A88E1021-0D6E-4899-A132-129726DC3689}" dt="2024-07-18T00:33:58.662" v="1316"/>
-          <ac:spMkLst>
-            <pc:docMk/>
-            <pc:sldMk cId="1340483109" sldId="264"/>
-            <ac:spMk id="11" creationId="{1199E1B1-A8C0-4FE8-A5A8-1CB41D69F857}"/>
-          </ac:spMkLst>
-        </pc:spChg>
-        <pc:spChg chg="add del">
-          <ac:chgData name="Mike Saunders" userId="c0986ea9a2f2a984" providerId="LiveId" clId="{A88E1021-0D6E-4899-A132-129726DC3689}" dt="2024-07-18T00:33:58.662" v="1316"/>
-          <ac:spMkLst>
-            <pc:docMk/>
-            <pc:sldMk cId="1340483109" sldId="264"/>
-            <ac:spMk id="13" creationId="{84A8DE83-DE75-4B41-9DB4-A7EC0B0DEC0B}"/>
-          </ac:spMkLst>
-        </pc:spChg>
-        <pc:spChg chg="add del">
-          <ac:chgData name="Mike Saunders" userId="c0986ea9a2f2a984" providerId="LiveId" clId="{A88E1021-0D6E-4899-A132-129726DC3689}" dt="2024-07-18T00:33:58.662" v="1316"/>
-          <ac:spMkLst>
-            <pc:docMk/>
-            <pc:sldMk cId="1340483109" sldId="264"/>
-            <ac:spMk id="15" creationId="{A7009A0A-BEF5-4EAC-AF15-E4F9F002E239}"/>
-          </ac:spMkLst>
-        </pc:spChg>
-      </pc:sldChg>
-      <pc:sldChg chg="addSp modSp new add del mod ord setBg">
-        <pc:chgData name="Mike Saunders" userId="c0986ea9a2f2a984" providerId="LiveId" clId="{A88E1021-0D6E-4899-A132-129726DC3689}" dt="2024-07-18T00:34:05.458" v="1319"/>
-        <pc:sldMkLst>
-          <pc:docMk/>
-          <pc:sldMk cId="2038907524" sldId="264"/>
-        </pc:sldMkLst>
-        <pc:spChg chg="mod">
-          <ac:chgData name="Mike Saunders" userId="c0986ea9a2f2a984" providerId="LiveId" clId="{A88E1021-0D6E-4899-A132-129726DC3689}" dt="2024-07-17T23:08:29.506" v="341" actId="20577"/>
-          <ac:spMkLst>
-            <pc:docMk/>
-            <pc:sldMk cId="2038907524" sldId="264"/>
-            <ac:spMk id="2" creationId="{03B76D06-025D-EB1E-9E89-B631CD9CF719}"/>
-          </ac:spMkLst>
-        </pc:spChg>
-        <pc:spChg chg="add mod">
-          <ac:chgData name="Mike Saunders" userId="c0986ea9a2f2a984" providerId="LiveId" clId="{A88E1021-0D6E-4899-A132-129726DC3689}" dt="2024-07-17T23:10:51.337" v="428" actId="20577"/>
-          <ac:spMkLst>
-            <pc:docMk/>
-            <pc:sldMk cId="2038907524" sldId="264"/>
-            <ac:spMk id="5" creationId="{D2871EBF-C9C9-567C-D518-945B1D0C72BA}"/>
-          </ac:spMkLst>
-        </pc:spChg>
-        <pc:spChg chg="add mod">
-          <ac:chgData name="Mike Saunders" userId="c0986ea9a2f2a984" providerId="LiveId" clId="{A88E1021-0D6E-4899-A132-129726DC3689}" dt="2024-07-17T23:30:08.881" v="671"/>
-          <ac:spMkLst>
-            <pc:docMk/>
-            <pc:sldMk cId="2038907524" sldId="264"/>
-            <ac:spMk id="6" creationId="{7FF9EF46-0D10-2FBF-4776-9F711BC9802A}"/>
-          </ac:spMkLst>
-        </pc:spChg>
-        <pc:spChg chg="add">
-          <ac:chgData name="Mike Saunders" userId="c0986ea9a2f2a984" providerId="LiveId" clId="{A88E1021-0D6E-4899-A132-129726DC3689}" dt="2024-07-17T23:08:18.661" v="326" actId="26606"/>
-          <ac:spMkLst>
-            <pc:docMk/>
-            <pc:sldMk cId="2038907524" sldId="264"/>
-            <ac:spMk id="9" creationId="{A8384FB5-9ADC-4DDC-881B-597D56F5B15D}"/>
-          </ac:spMkLst>
-        </pc:spChg>
-        <pc:spChg chg="add">
-          <ac:chgData name="Mike Saunders" userId="c0986ea9a2f2a984" providerId="LiveId" clId="{A88E1021-0D6E-4899-A132-129726DC3689}" dt="2024-07-17T23:08:18.661" v="326" actId="26606"/>
-          <ac:spMkLst>
-            <pc:docMk/>
-            <pc:sldMk cId="2038907524" sldId="264"/>
-            <ac:spMk id="11" creationId="{1199E1B1-A8C0-4FE8-A5A8-1CB41D69F857}"/>
-          </ac:spMkLst>
-        </pc:spChg>
-        <pc:spChg chg="add">
-          <ac:chgData name="Mike Saunders" userId="c0986ea9a2f2a984" providerId="LiveId" clId="{A88E1021-0D6E-4899-A132-129726DC3689}" dt="2024-07-17T23:08:18.661" v="326" actId="26606"/>
-          <ac:spMkLst>
-            <pc:docMk/>
-            <pc:sldMk cId="2038907524" sldId="264"/>
-            <ac:spMk id="13" creationId="{84A8DE83-DE75-4B41-9DB4-A7EC0B0DEC0B}"/>
-          </ac:spMkLst>
-        </pc:spChg>
-        <pc:spChg chg="add">
-          <ac:chgData name="Mike Saunders" userId="c0986ea9a2f2a984" providerId="LiveId" clId="{A88E1021-0D6E-4899-A132-129726DC3689}" dt="2024-07-17T23:08:18.661" v="326" actId="26606"/>
-          <ac:spMkLst>
-            <pc:docMk/>
-            <pc:sldMk cId="2038907524" sldId="264"/>
-            <ac:spMk id="15" creationId="{A7009A0A-BEF5-4EAC-AF15-E4F9F002E239}"/>
-          </ac:spMkLst>
-        </pc:spChg>
-        <pc:picChg chg="add mod">
-          <ac:chgData name="Mike Saunders" userId="c0986ea9a2f2a984" providerId="LiveId" clId="{A88E1021-0D6E-4899-A132-129726DC3689}" dt="2024-07-17T23:08:18.661" v="326" actId="26606"/>
-          <ac:picMkLst>
-            <pc:docMk/>
-            <pc:sldMk cId="2038907524" sldId="264"/>
-            <ac:picMk id="4" creationId="{69A72209-1EE0-2F90-380E-8A052706DC1C}"/>
-          </ac:picMkLst>
-        </pc:picChg>
-      </pc:sldChg>
-      <pc:sldChg chg="addSp delSp add del setBg delDesignElem">
-        <pc:chgData name="Mike Saunders" userId="c0986ea9a2f2a984" providerId="LiveId" clId="{A88E1021-0D6E-4899-A132-129726DC3689}" dt="2024-07-18T00:33:58.662" v="1316"/>
-        <pc:sldMkLst>
-          <pc:docMk/>
-          <pc:sldMk cId="1022878573" sldId="265"/>
-        </pc:sldMkLst>
-        <pc:spChg chg="add del">
-          <ac:chgData name="Mike Saunders" userId="c0986ea9a2f2a984" providerId="LiveId" clId="{A88E1021-0D6E-4899-A132-129726DC3689}" dt="2024-07-18T00:33:58.662" v="1316"/>
-          <ac:spMkLst>
-            <pc:docMk/>
-            <pc:sldMk cId="1022878573" sldId="265"/>
-            <ac:spMk id="9" creationId="{A8384FB5-9ADC-4DDC-881B-597D56F5B15D}"/>
-          </ac:spMkLst>
-        </pc:spChg>
-        <pc:spChg chg="add del">
-          <ac:chgData name="Mike Saunders" userId="c0986ea9a2f2a984" providerId="LiveId" clId="{A88E1021-0D6E-4899-A132-129726DC3689}" dt="2024-07-18T00:33:58.662" v="1316"/>
-          <ac:spMkLst>
-            <pc:docMk/>
-            <pc:sldMk cId="1022878573" sldId="265"/>
-            <ac:spMk id="11" creationId="{1199E1B1-A8C0-4FE8-A5A8-1CB41D69F857}"/>
-          </ac:spMkLst>
-        </pc:spChg>
-        <pc:spChg chg="add del">
-          <ac:chgData name="Mike Saunders" userId="c0986ea9a2f2a984" providerId="LiveId" clId="{A88E1021-0D6E-4899-A132-129726DC3689}" dt="2024-07-18T00:33:58.662" v="1316"/>
-          <ac:spMkLst>
-            <pc:docMk/>
-            <pc:sldMk cId="1022878573" sldId="265"/>
-            <ac:spMk id="13" creationId="{84A8DE83-DE75-4B41-9DB4-A7EC0B0DEC0B}"/>
-          </ac:spMkLst>
-        </pc:spChg>
-        <pc:spChg chg="add del">
-          <ac:chgData name="Mike Saunders" userId="c0986ea9a2f2a984" providerId="LiveId" clId="{A88E1021-0D6E-4899-A132-129726DC3689}" dt="2024-07-18T00:33:58.662" v="1316"/>
-          <ac:spMkLst>
-            <pc:docMk/>
-            <pc:sldMk cId="1022878573" sldId="265"/>
-            <ac:spMk id="15" creationId="{A7009A0A-BEF5-4EAC-AF15-E4F9F002E239}"/>
-          </ac:spMkLst>
-        </pc:spChg>
-      </pc:sldChg>
-      <pc:sldChg chg="addSp modSp new add del mod ord setBg">
-        <pc:chgData name="Mike Saunders" userId="c0986ea9a2f2a984" providerId="LiveId" clId="{A88E1021-0D6E-4899-A132-129726DC3689}" dt="2024-07-18T00:34:05.458" v="1319"/>
-        <pc:sldMkLst>
-          <pc:docMk/>
-          <pc:sldMk cId="3741511294" sldId="265"/>
-        </pc:sldMkLst>
-        <pc:spChg chg="mod">
-          <ac:chgData name="Mike Saunders" userId="c0986ea9a2f2a984" providerId="LiveId" clId="{A88E1021-0D6E-4899-A132-129726DC3689}" dt="2024-07-17T23:09:08.850" v="368" actId="20577"/>
-          <ac:spMkLst>
-            <pc:docMk/>
-            <pc:sldMk cId="3741511294" sldId="265"/>
-            <ac:spMk id="2" creationId="{A7BF1CC6-6F79-011F-31C7-ACAC4CD300A9}"/>
-          </ac:spMkLst>
-        </pc:spChg>
-        <pc:spChg chg="add mod">
-          <ac:chgData name="Mike Saunders" userId="c0986ea9a2f2a984" providerId="LiveId" clId="{A88E1021-0D6E-4899-A132-129726DC3689}" dt="2024-07-17T23:11:03.460" v="433" actId="20577"/>
-          <ac:spMkLst>
-            <pc:docMk/>
-            <pc:sldMk cId="3741511294" sldId="265"/>
-            <ac:spMk id="5" creationId="{C38563DC-48A6-78B7-EE16-C7A41F983135}"/>
-          </ac:spMkLst>
-        </pc:spChg>
-        <pc:spChg chg="add mod">
-          <ac:chgData name="Mike Saunders" userId="c0986ea9a2f2a984" providerId="LiveId" clId="{A88E1021-0D6E-4899-A132-129726DC3689}" dt="2024-07-17T23:30:11.171" v="672"/>
-          <ac:spMkLst>
-            <pc:docMk/>
-            <pc:sldMk cId="3741511294" sldId="265"/>
-            <ac:spMk id="6" creationId="{414C7F17-38AC-F954-4FAE-E27ABC1D405F}"/>
-          </ac:spMkLst>
-        </pc:spChg>
-        <pc:spChg chg="add">
-          <ac:chgData name="Mike Saunders" userId="c0986ea9a2f2a984" providerId="LiveId" clId="{A88E1021-0D6E-4899-A132-129726DC3689}" dt="2024-07-17T23:08:57.846" v="355" actId="26606"/>
-          <ac:spMkLst>
-            <pc:docMk/>
-            <pc:sldMk cId="3741511294" sldId="265"/>
-            <ac:spMk id="9" creationId="{A8384FB5-9ADC-4DDC-881B-597D56F5B15D}"/>
-          </ac:spMkLst>
-        </pc:spChg>
-        <pc:spChg chg="add">
-          <ac:chgData name="Mike Saunders" userId="c0986ea9a2f2a984" providerId="LiveId" clId="{A88E1021-0D6E-4899-A132-129726DC3689}" dt="2024-07-17T23:08:57.846" v="355" actId="26606"/>
-          <ac:spMkLst>
-            <pc:docMk/>
-            <pc:sldMk cId="3741511294" sldId="265"/>
-            <ac:spMk id="11" creationId="{1199E1B1-A8C0-4FE8-A5A8-1CB41D69F857}"/>
-          </ac:spMkLst>
-        </pc:spChg>
-        <pc:spChg chg="add">
-          <ac:chgData name="Mike Saunders" userId="c0986ea9a2f2a984" providerId="LiveId" clId="{A88E1021-0D6E-4899-A132-129726DC3689}" dt="2024-07-17T23:08:57.846" v="355" actId="26606"/>
-          <ac:spMkLst>
-            <pc:docMk/>
-            <pc:sldMk cId="3741511294" sldId="265"/>
-            <ac:spMk id="13" creationId="{84A8DE83-DE75-4B41-9DB4-A7EC0B0DEC0B}"/>
-          </ac:spMkLst>
-        </pc:spChg>
-        <pc:spChg chg="add">
-          <ac:chgData name="Mike Saunders" userId="c0986ea9a2f2a984" providerId="LiveId" clId="{A88E1021-0D6E-4899-A132-129726DC3689}" dt="2024-07-17T23:08:57.846" v="355" actId="26606"/>
-          <ac:spMkLst>
-            <pc:docMk/>
-            <pc:sldMk cId="3741511294" sldId="265"/>
-            <ac:spMk id="15" creationId="{A7009A0A-BEF5-4EAC-AF15-E4F9F002E239}"/>
-          </ac:spMkLst>
-        </pc:spChg>
-        <pc:picChg chg="add mod">
-          <ac:chgData name="Mike Saunders" userId="c0986ea9a2f2a984" providerId="LiveId" clId="{A88E1021-0D6E-4899-A132-129726DC3689}" dt="2024-07-17T23:08:57.846" v="355" actId="26606"/>
-          <ac:picMkLst>
-            <pc:docMk/>
-            <pc:sldMk cId="3741511294" sldId="265"/>
-            <ac:picMk id="4" creationId="{D0E244AC-30E3-6266-4D46-ADFA92B04005}"/>
-          </ac:picMkLst>
-        </pc:picChg>
-      </pc:sldChg>
-      <pc:sldChg chg="addSp delSp modSp new mod setBg">
-        <pc:chgData name="Mike Saunders" userId="c0986ea9a2f2a984" providerId="LiveId" clId="{A88E1021-0D6E-4899-A132-129726DC3689}" dt="2024-07-18T23:05:48.081" v="1482" actId="207"/>
-        <pc:sldMkLst>
-          <pc:docMk/>
-          <pc:sldMk cId="1422104089" sldId="266"/>
-        </pc:sldMkLst>
-        <pc:spChg chg="mod">
-          <ac:chgData name="Mike Saunders" userId="c0986ea9a2f2a984" providerId="LiveId" clId="{A88E1021-0D6E-4899-A132-129726DC3689}" dt="2024-07-17T23:12:05.093" v="513" actId="313"/>
-          <ac:spMkLst>
-            <pc:docMk/>
-            <pc:sldMk cId="1422104089" sldId="266"/>
-            <ac:spMk id="2" creationId="{D1333616-2EEA-6564-B310-AAF69F6E51BD}"/>
-          </ac:spMkLst>
-        </pc:spChg>
-        <pc:spChg chg="add mod">
-          <ac:chgData name="Mike Saunders" userId="c0986ea9a2f2a984" providerId="LiveId" clId="{A88E1021-0D6E-4899-A132-129726DC3689}" dt="2024-07-18T23:05:48.081" v="1482" actId="207"/>
-          <ac:spMkLst>
-            <pc:docMk/>
-            <pc:sldMk cId="1422104089" sldId="266"/>
-            <ac:spMk id="5" creationId="{EAF90190-4388-A7D3-DA3D-D76795FE8B18}"/>
-          </ac:spMkLst>
-        </pc:spChg>
-        <pc:spChg chg="add">
-          <ac:chgData name="Mike Saunders" userId="c0986ea9a2f2a984" providerId="LiveId" clId="{A88E1021-0D6E-4899-A132-129726DC3689}" dt="2024-07-17T23:11:28.119" v="436" actId="26606"/>
-          <ac:spMkLst>
-            <pc:docMk/>
-            <pc:sldMk cId="1422104089" sldId="266"/>
-            <ac:spMk id="9" creationId="{A8384FB5-9ADC-4DDC-881B-597D56F5B15D}"/>
-          </ac:spMkLst>
-        </pc:spChg>
-        <pc:spChg chg="add">
-          <ac:chgData name="Mike Saunders" userId="c0986ea9a2f2a984" providerId="LiveId" clId="{A88E1021-0D6E-4899-A132-129726DC3689}" dt="2024-07-17T23:11:28.119" v="436" actId="26606"/>
-          <ac:spMkLst>
-            <pc:docMk/>
-            <pc:sldMk cId="1422104089" sldId="266"/>
-            <ac:spMk id="11" creationId="{1199E1B1-A8C0-4FE8-A5A8-1CB41D69F857}"/>
-          </ac:spMkLst>
-        </pc:spChg>
-        <pc:spChg chg="add">
-          <ac:chgData name="Mike Saunders" userId="c0986ea9a2f2a984" providerId="LiveId" clId="{A88E1021-0D6E-4899-A132-129726DC3689}" dt="2024-07-17T23:11:28.119" v="436" actId="26606"/>
-          <ac:spMkLst>
-            <pc:docMk/>
-            <pc:sldMk cId="1422104089" sldId="266"/>
-            <ac:spMk id="13" creationId="{84A8DE83-DE75-4B41-9DB4-A7EC0B0DEC0B}"/>
-          </ac:spMkLst>
-        </pc:spChg>
-        <pc:spChg chg="add">
-          <ac:chgData name="Mike Saunders" userId="c0986ea9a2f2a984" providerId="LiveId" clId="{A88E1021-0D6E-4899-A132-129726DC3689}" dt="2024-07-17T23:11:28.119" v="436" actId="26606"/>
-          <ac:spMkLst>
-            <pc:docMk/>
-            <pc:sldMk cId="1422104089" sldId="266"/>
-            <ac:spMk id="15" creationId="{A7009A0A-BEF5-4EAC-AF15-E4F9F002E239}"/>
-          </ac:spMkLst>
-        </pc:spChg>
-        <pc:picChg chg="add del mod">
-          <ac:chgData name="Mike Saunders" userId="c0986ea9a2f2a984" providerId="LiveId" clId="{A88E1021-0D6E-4899-A132-129726DC3689}" dt="2024-07-17T23:36:03.240" v="681" actId="478"/>
-          <ac:picMkLst>
-            <pc:docMk/>
-            <pc:sldMk cId="1422104089" sldId="266"/>
-            <ac:picMk id="4" creationId="{43AE4657-AE23-238F-44E4-166477C7D39E}"/>
-          </ac:picMkLst>
-        </pc:picChg>
-        <pc:picChg chg="add del mod">
-          <ac:chgData name="Mike Saunders" userId="c0986ea9a2f2a984" providerId="LiveId" clId="{A88E1021-0D6E-4899-A132-129726DC3689}" dt="2024-07-17T23:39:31.977" v="695" actId="478"/>
-          <ac:picMkLst>
-            <pc:docMk/>
-            <pc:sldMk cId="1422104089" sldId="266"/>
-            <ac:picMk id="7" creationId="{A2033911-B16F-3CE2-EF44-00ED23A00158}"/>
-          </ac:picMkLst>
-        </pc:picChg>
-        <pc:picChg chg="add del mod">
-          <ac:chgData name="Mike Saunders" userId="c0986ea9a2f2a984" providerId="LiveId" clId="{A88E1021-0D6E-4899-A132-129726DC3689}" dt="2024-07-17T23:46:09.996" v="706" actId="478"/>
-          <ac:picMkLst>
-            <pc:docMk/>
-            <pc:sldMk cId="1422104089" sldId="266"/>
-            <ac:picMk id="10" creationId="{56630511-6AAE-4A57-3882-1526A862A13B}"/>
-          </ac:picMkLst>
-        </pc:picChg>
-        <pc:picChg chg="add del mod">
-          <ac:chgData name="Mike Saunders" userId="c0986ea9a2f2a984" providerId="LiveId" clId="{A88E1021-0D6E-4899-A132-129726DC3689}" dt="2024-07-17T23:55:59.104" v="1207" actId="478"/>
-          <ac:picMkLst>
-            <pc:docMk/>
-            <pc:sldMk cId="1422104089" sldId="266"/>
-            <ac:picMk id="14" creationId="{AF10516F-D696-3BE3-B828-661B07B2C0BF}"/>
-          </ac:picMkLst>
-        </pc:picChg>
-        <pc:picChg chg="add mod">
-          <ac:chgData name="Mike Saunders" userId="c0986ea9a2f2a984" providerId="LiveId" clId="{A88E1021-0D6E-4899-A132-129726DC3689}" dt="2024-07-17T23:56:08.563" v="1211" actId="14100"/>
-          <ac:picMkLst>
-            <pc:docMk/>
-            <pc:sldMk cId="1422104089" sldId="266"/>
-            <ac:picMk id="17" creationId="{B71906B2-FED4-2ACF-0004-B126DC26D308}"/>
-          </ac:picMkLst>
-        </pc:picChg>
-      </pc:sldChg>
-      <pc:sldChg chg="addSp delSp modSp new mod ord setBg">
-        <pc:chgData name="Mike Saunders" userId="c0986ea9a2f2a984" providerId="LiveId" clId="{A88E1021-0D6E-4899-A132-129726DC3689}" dt="2024-07-18T00:34:12.342" v="1321"/>
-        <pc:sldMkLst>
-          <pc:docMk/>
-          <pc:sldMk cId="3423382430" sldId="267"/>
-        </pc:sldMkLst>
-        <pc:spChg chg="mod">
-          <ac:chgData name="Mike Saunders" userId="c0986ea9a2f2a984" providerId="LiveId" clId="{A88E1021-0D6E-4899-A132-129726DC3689}" dt="2024-07-17T23:47:19.887" v="729" actId="20577"/>
-          <ac:spMkLst>
-            <pc:docMk/>
-            <pc:sldMk cId="3423382430" sldId="267"/>
-            <ac:spMk id="2" creationId="{9143A132-7F4F-094C-E7A9-B77557C2B703}"/>
-          </ac:spMkLst>
-        </pc:spChg>
-        <pc:spChg chg="add mod">
-          <ac:chgData name="Mike Saunders" userId="c0986ea9a2f2a984" providerId="LiveId" clId="{A88E1021-0D6E-4899-A132-129726DC3689}" dt="2024-07-17T23:14:03.716" v="540" actId="20577"/>
-          <ac:spMkLst>
-            <pc:docMk/>
-            <pc:sldMk cId="3423382430" sldId="267"/>
-            <ac:spMk id="5" creationId="{FB21D110-6E68-A1A1-516F-344BE6F60F47}"/>
-          </ac:spMkLst>
-        </pc:spChg>
-        <pc:spChg chg="add">
-          <ac:chgData name="Mike Saunders" userId="c0986ea9a2f2a984" providerId="LiveId" clId="{A88E1021-0D6E-4899-A132-129726DC3689}" dt="2024-07-17T23:12:29.688" v="516" actId="26606"/>
-          <ac:spMkLst>
-            <pc:docMk/>
-            <pc:sldMk cId="3423382430" sldId="267"/>
-            <ac:spMk id="9" creationId="{A8384FB5-9ADC-4DDC-881B-597D56F5B15D}"/>
-          </ac:spMkLst>
-        </pc:spChg>
-        <pc:spChg chg="add">
-          <ac:chgData name="Mike Saunders" userId="c0986ea9a2f2a984" providerId="LiveId" clId="{A88E1021-0D6E-4899-A132-129726DC3689}" dt="2024-07-17T23:12:29.688" v="516" actId="26606"/>
-          <ac:spMkLst>
-            <pc:docMk/>
-            <pc:sldMk cId="3423382430" sldId="267"/>
-            <ac:spMk id="11" creationId="{1199E1B1-A8C0-4FE8-A5A8-1CB41D69F857}"/>
-          </ac:spMkLst>
-        </pc:spChg>
-        <pc:spChg chg="add">
-          <ac:chgData name="Mike Saunders" userId="c0986ea9a2f2a984" providerId="LiveId" clId="{A88E1021-0D6E-4899-A132-129726DC3689}" dt="2024-07-17T23:12:29.688" v="516" actId="26606"/>
-          <ac:spMkLst>
-            <pc:docMk/>
-            <pc:sldMk cId="3423382430" sldId="267"/>
-            <ac:spMk id="13" creationId="{84A8DE83-DE75-4B41-9DB4-A7EC0B0DEC0B}"/>
-          </ac:spMkLst>
-        </pc:spChg>
-        <pc:spChg chg="add">
-          <ac:chgData name="Mike Saunders" userId="c0986ea9a2f2a984" providerId="LiveId" clId="{A88E1021-0D6E-4899-A132-129726DC3689}" dt="2024-07-17T23:12:29.688" v="516" actId="26606"/>
-          <ac:spMkLst>
-            <pc:docMk/>
-            <pc:sldMk cId="3423382430" sldId="267"/>
-            <ac:spMk id="15" creationId="{A7009A0A-BEF5-4EAC-AF15-E4F9F002E239}"/>
-          </ac:spMkLst>
-        </pc:spChg>
-        <pc:picChg chg="add del mod">
-          <ac:chgData name="Mike Saunders" userId="c0986ea9a2f2a984" providerId="LiveId" clId="{A88E1021-0D6E-4899-A132-129726DC3689}" dt="2024-07-17T23:35:55.386" v="677" actId="478"/>
-          <ac:picMkLst>
-            <pc:docMk/>
-            <pc:sldMk cId="3423382430" sldId="267"/>
-            <ac:picMk id="4" creationId="{2C285E4D-CD2B-0BD1-D81F-CD44B8DC62FE}"/>
-          </ac:picMkLst>
-        </pc:picChg>
-        <pc:picChg chg="add del mod">
-          <ac:chgData name="Mike Saunders" userId="c0986ea9a2f2a984" providerId="LiveId" clId="{A88E1021-0D6E-4899-A132-129726DC3689}" dt="2024-07-17T23:38:40.027" v="691" actId="478"/>
-          <ac:picMkLst>
-            <pc:docMk/>
-            <pc:sldMk cId="3423382430" sldId="267"/>
-            <ac:picMk id="7" creationId="{765FA99A-086C-E824-1EA1-4EA1A0BEB97A}"/>
-          </ac:picMkLst>
-        </pc:picChg>
-        <pc:picChg chg="add del mod">
-          <ac:chgData name="Mike Saunders" userId="c0986ea9a2f2a984" providerId="LiveId" clId="{A88E1021-0D6E-4899-A132-129726DC3689}" dt="2024-07-17T23:43:26.173" v="700" actId="478"/>
-          <ac:picMkLst>
-            <pc:docMk/>
-            <pc:sldMk cId="3423382430" sldId="267"/>
-            <ac:picMk id="10" creationId="{AC72BE52-E796-5686-5DB6-26A9EF53722F}"/>
-          </ac:picMkLst>
-        </pc:picChg>
-        <pc:picChg chg="add del mod">
-          <ac:chgData name="Mike Saunders" userId="c0986ea9a2f2a984" providerId="LiveId" clId="{A88E1021-0D6E-4899-A132-129726DC3689}" dt="2024-07-17T23:46:22.532" v="710" actId="478"/>
-          <ac:picMkLst>
-            <pc:docMk/>
-            <pc:sldMk cId="3423382430" sldId="267"/>
-            <ac:picMk id="14" creationId="{A1143319-DED5-8B74-21AB-6E3C0BBDA17C}"/>
-          </ac:picMkLst>
-        </pc:picChg>
-        <pc:picChg chg="add del mod">
-          <ac:chgData name="Mike Saunders" userId="c0986ea9a2f2a984" providerId="LiveId" clId="{A88E1021-0D6E-4899-A132-129726DC3689}" dt="2024-07-17T23:56:35.229" v="1212" actId="478"/>
-          <ac:picMkLst>
-            <pc:docMk/>
-            <pc:sldMk cId="3423382430" sldId="267"/>
-            <ac:picMk id="17" creationId="{3AA6172E-41F0-100E-0E68-4A54287F4D81}"/>
-          </ac:picMkLst>
-        </pc:picChg>
-        <pc:picChg chg="add mod">
-          <ac:chgData name="Mike Saunders" userId="c0986ea9a2f2a984" providerId="LiveId" clId="{A88E1021-0D6E-4899-A132-129726DC3689}" dt="2024-07-17T23:56:42.334" v="1215" actId="1076"/>
-          <ac:picMkLst>
-            <pc:docMk/>
-            <pc:sldMk cId="3423382430" sldId="267"/>
-            <ac:picMk id="19" creationId="{C0AC1AB0-9313-08BA-D191-FFCEC26F8885}"/>
-          </ac:picMkLst>
-        </pc:picChg>
-      </pc:sldChg>
-      <pc:sldChg chg="addSp delSp modSp new mod ord setBg">
-        <pc:chgData name="Mike Saunders" userId="c0986ea9a2f2a984" providerId="LiveId" clId="{A88E1021-0D6E-4899-A132-129726DC3689}" dt="2024-07-18T00:34:12.342" v="1321"/>
-        <pc:sldMkLst>
-          <pc:docMk/>
-          <pc:sldMk cId="547791207" sldId="268"/>
-        </pc:sldMkLst>
-        <pc:spChg chg="mod">
-          <ac:chgData name="Mike Saunders" userId="c0986ea9a2f2a984" providerId="LiveId" clId="{A88E1021-0D6E-4899-A132-129726DC3689}" dt="2024-07-17T23:47:24.522" v="738" actId="20577"/>
-          <ac:spMkLst>
-            <pc:docMk/>
-            <pc:sldMk cId="547791207" sldId="268"/>
-            <ac:spMk id="2" creationId="{072D2E6C-D7D9-5A19-EBA3-F361325D660C}"/>
-          </ac:spMkLst>
-        </pc:spChg>
-        <pc:spChg chg="add mod">
-          <ac:chgData name="Mike Saunders" userId="c0986ea9a2f2a984" providerId="LiveId" clId="{A88E1021-0D6E-4899-A132-129726DC3689}" dt="2024-07-17T23:14:16.315" v="545" actId="20577"/>
-          <ac:spMkLst>
-            <pc:docMk/>
-            <pc:sldMk cId="547791207" sldId="268"/>
-            <ac:spMk id="5" creationId="{054D79B3-23A9-B672-3B8B-2907857BE9E5}"/>
-          </ac:spMkLst>
-        </pc:spChg>
-        <pc:spChg chg="add">
-          <ac:chgData name="Mike Saunders" userId="c0986ea9a2f2a984" providerId="LiveId" clId="{A88E1021-0D6E-4899-A132-129726DC3689}" dt="2024-07-17T23:12:59.858" v="521" actId="26606"/>
-          <ac:spMkLst>
-            <pc:docMk/>
-            <pc:sldMk cId="547791207" sldId="268"/>
-            <ac:spMk id="9" creationId="{A8384FB5-9ADC-4DDC-881B-597D56F5B15D}"/>
-          </ac:spMkLst>
-        </pc:spChg>
-        <pc:spChg chg="add">
-          <ac:chgData name="Mike Saunders" userId="c0986ea9a2f2a984" providerId="LiveId" clId="{A88E1021-0D6E-4899-A132-129726DC3689}" dt="2024-07-17T23:12:59.858" v="521" actId="26606"/>
-          <ac:spMkLst>
-            <pc:docMk/>
-            <pc:sldMk cId="547791207" sldId="268"/>
-            <ac:spMk id="11" creationId="{1199E1B1-A8C0-4FE8-A5A8-1CB41D69F857}"/>
-          </ac:spMkLst>
-        </pc:spChg>
-        <pc:spChg chg="add">
-          <ac:chgData name="Mike Saunders" userId="c0986ea9a2f2a984" providerId="LiveId" clId="{A88E1021-0D6E-4899-A132-129726DC3689}" dt="2024-07-17T23:12:59.858" v="521" actId="26606"/>
-          <ac:spMkLst>
-            <pc:docMk/>
-            <pc:sldMk cId="547791207" sldId="268"/>
-            <ac:spMk id="13" creationId="{84A8DE83-DE75-4B41-9DB4-A7EC0B0DEC0B}"/>
-          </ac:spMkLst>
-        </pc:spChg>
-        <pc:spChg chg="add">
-          <ac:chgData name="Mike Saunders" userId="c0986ea9a2f2a984" providerId="LiveId" clId="{A88E1021-0D6E-4899-A132-129726DC3689}" dt="2024-07-17T23:12:59.858" v="521" actId="26606"/>
-          <ac:spMkLst>
-            <pc:docMk/>
-            <pc:sldMk cId="547791207" sldId="268"/>
-            <ac:spMk id="15" creationId="{A7009A0A-BEF5-4EAC-AF15-E4F9F002E239}"/>
-          </ac:spMkLst>
-        </pc:spChg>
-        <pc:picChg chg="add del mod">
-          <ac:chgData name="Mike Saunders" userId="c0986ea9a2f2a984" providerId="LiveId" clId="{A88E1021-0D6E-4899-A132-129726DC3689}" dt="2024-07-17T23:35:40.412" v="673" actId="478"/>
-          <ac:picMkLst>
-            <pc:docMk/>
-            <pc:sldMk cId="547791207" sldId="268"/>
-            <ac:picMk id="4" creationId="{9192C771-08A0-43B9-D366-F438B1722D24}"/>
-          </ac:picMkLst>
-        </pc:picChg>
-        <pc:picChg chg="add del mod">
-          <ac:chgData name="Mike Saunders" userId="c0986ea9a2f2a984" providerId="LiveId" clId="{A88E1021-0D6E-4899-A132-129726DC3689}" dt="2024-07-17T23:38:31.187" v="687" actId="478"/>
-          <ac:picMkLst>
-            <pc:docMk/>
-            <pc:sldMk cId="547791207" sldId="268"/>
-            <ac:picMk id="7" creationId="{03080B2D-4BAA-87E8-CA68-06553CEE037D}"/>
-          </ac:picMkLst>
-        </pc:picChg>
-        <pc:picChg chg="add del mod">
-          <ac:chgData name="Mike Saunders" userId="c0986ea9a2f2a984" providerId="LiveId" clId="{A88E1021-0D6E-4899-A132-129726DC3689}" dt="2024-07-17T23:46:29.542" v="714" actId="478"/>
-          <ac:picMkLst>
-            <pc:docMk/>
-            <pc:sldMk cId="547791207" sldId="268"/>
-            <ac:picMk id="10" creationId="{F5AE47C5-6A2D-EE1E-1728-61C772653FC1}"/>
-          </ac:picMkLst>
-        </pc:picChg>
-        <pc:picChg chg="add del mod">
-          <ac:chgData name="Mike Saunders" userId="c0986ea9a2f2a984" providerId="LiveId" clId="{A88E1021-0D6E-4899-A132-129726DC3689}" dt="2024-07-17T23:56:46.447" v="1216" actId="478"/>
-          <ac:picMkLst>
-            <pc:docMk/>
-            <pc:sldMk cId="547791207" sldId="268"/>
-            <ac:picMk id="14" creationId="{2F818FE3-8DC1-BF6A-E144-F0C64854EB16}"/>
-          </ac:picMkLst>
-        </pc:picChg>
-        <pc:picChg chg="add mod">
-          <ac:chgData name="Mike Saunders" userId="c0986ea9a2f2a984" providerId="LiveId" clId="{A88E1021-0D6E-4899-A132-129726DC3689}" dt="2024-07-17T23:57:12.046" v="1219" actId="1076"/>
-          <ac:picMkLst>
-            <pc:docMk/>
-            <pc:sldMk cId="547791207" sldId="268"/>
-            <ac:picMk id="17" creationId="{D0883807-B68A-F374-F3E6-968D6E769FE9}"/>
-          </ac:picMkLst>
-        </pc:picChg>
-      </pc:sldChg>
-      <pc:sldChg chg="addSp delSp modSp new mod setBg modClrScheme chgLayout">
-        <pc:chgData name="Mike Saunders" userId="c0986ea9a2f2a984" providerId="LiveId" clId="{A88E1021-0D6E-4899-A132-129726DC3689}" dt="2024-07-17T23:59:55.749" v="1300" actId="20577"/>
-        <pc:sldMkLst>
-          <pc:docMk/>
-          <pc:sldMk cId="382987857" sldId="269"/>
-        </pc:sldMkLst>
-        <pc:spChg chg="del mod ord">
-          <ac:chgData name="Mike Saunders" userId="c0986ea9a2f2a984" providerId="LiveId" clId="{A88E1021-0D6E-4899-A132-129726DC3689}" dt="2024-07-17T23:47:46.965" v="740" actId="700"/>
-          <ac:spMkLst>
-            <pc:docMk/>
-            <pc:sldMk cId="382987857" sldId="269"/>
-            <ac:spMk id="2" creationId="{F9D08CD3-FBDB-20C4-AAD7-ADAD4AB8622A}"/>
-          </ac:spMkLst>
-        </pc:spChg>
-        <pc:spChg chg="add mod ord">
-          <ac:chgData name="Mike Saunders" userId="c0986ea9a2f2a984" providerId="LiveId" clId="{A88E1021-0D6E-4899-A132-129726DC3689}" dt="2024-07-17T23:48:03.221" v="753" actId="20577"/>
-          <ac:spMkLst>
-            <pc:docMk/>
-            <pc:sldMk cId="382987857" sldId="269"/>
-            <ac:spMk id="3" creationId="{EA5357D9-D4FB-4AAD-8A2F-1178ADF39DA1}"/>
-          </ac:spMkLst>
-        </pc:spChg>
-        <pc:spChg chg="add del mod ord">
-          <ac:chgData name="Mike Saunders" userId="c0986ea9a2f2a984" providerId="LiveId" clId="{A88E1021-0D6E-4899-A132-129726DC3689}" dt="2024-07-17T23:48:30.526" v="763" actId="478"/>
-          <ac:spMkLst>
-            <pc:docMk/>
-            <pc:sldMk cId="382987857" sldId="269"/>
-            <ac:spMk id="4" creationId="{77F2938F-7CCC-D64D-DC2D-3F444EDF5C57}"/>
-          </ac:spMkLst>
-        </pc:spChg>
-        <pc:spChg chg="add mod">
-          <ac:chgData name="Mike Saunders" userId="c0986ea9a2f2a984" providerId="LiveId" clId="{A88E1021-0D6E-4899-A132-129726DC3689}" dt="2024-07-17T23:59:55.749" v="1300" actId="20577"/>
-          <ac:spMkLst>
-            <pc:docMk/>
-            <pc:sldMk cId="382987857" sldId="269"/>
-            <ac:spMk id="6" creationId="{62504B73-9099-3DFF-605F-FEAEB7268706}"/>
-          </ac:spMkLst>
-        </pc:spChg>
-        <pc:spChg chg="add">
-          <ac:chgData name="Mike Saunders" userId="c0986ea9a2f2a984" providerId="LiveId" clId="{A88E1021-0D6E-4899-A132-129726DC3689}" dt="2024-07-17T23:48:00.272" v="744" actId="26606"/>
-          <ac:spMkLst>
-            <pc:docMk/>
-            <pc:sldMk cId="382987857" sldId="269"/>
-            <ac:spMk id="9" creationId="{1B15ED52-F352-441B-82BF-E0EA34836D08}"/>
-          </ac:spMkLst>
-        </pc:spChg>
-        <pc:spChg chg="add">
-          <ac:chgData name="Mike Saunders" userId="c0986ea9a2f2a984" providerId="LiveId" clId="{A88E1021-0D6E-4899-A132-129726DC3689}" dt="2024-07-17T23:48:00.272" v="744" actId="26606"/>
-          <ac:spMkLst>
-            <pc:docMk/>
-            <pc:sldMk cId="382987857" sldId="269"/>
-            <ac:spMk id="11" creationId="{3B2E3793-BFE6-45A2-9B7B-E18844431C99}"/>
-          </ac:spMkLst>
-        </pc:spChg>
-        <pc:spChg chg="add">
-          <ac:chgData name="Mike Saunders" userId="c0986ea9a2f2a984" providerId="LiveId" clId="{A88E1021-0D6E-4899-A132-129726DC3689}" dt="2024-07-17T23:48:00.272" v="744" actId="26606"/>
-          <ac:spMkLst>
-            <pc:docMk/>
-            <pc:sldMk cId="382987857" sldId="269"/>
-            <ac:spMk id="13" creationId="{BC4C4868-CB8F-4AF9-9CDB-8108F2C19B67}"/>
-          </ac:spMkLst>
-        </pc:spChg>
-        <pc:spChg chg="add">
-          <ac:chgData name="Mike Saunders" userId="c0986ea9a2f2a984" providerId="LiveId" clId="{A88E1021-0D6E-4899-A132-129726DC3689}" dt="2024-07-17T23:48:00.272" v="744" actId="26606"/>
-          <ac:spMkLst>
-            <pc:docMk/>
-            <pc:sldMk cId="382987857" sldId="269"/>
-            <ac:spMk id="15" creationId="{375E0459-6403-40CD-989D-56A4407CA12E}"/>
-          </ac:spMkLst>
-        </pc:spChg>
-        <pc:spChg chg="add">
-          <ac:chgData name="Mike Saunders" userId="c0986ea9a2f2a984" providerId="LiveId" clId="{A88E1021-0D6E-4899-A132-129726DC3689}" dt="2024-07-17T23:48:00.272" v="744" actId="26606"/>
-          <ac:spMkLst>
-            <pc:docMk/>
-            <pc:sldMk cId="382987857" sldId="269"/>
-            <ac:spMk id="17" creationId="{53E5B1A8-3AC9-4BD1-9BBC-78CA94F2D1BA}"/>
-          </ac:spMkLst>
-        </pc:spChg>
-      </pc:sldChg>
-      <pc:sldChg chg="addSp delSp modSp add mod ord setBg delDesignElem chgLayout">
-        <pc:chgData name="Mike Saunders" userId="c0986ea9a2f2a984" providerId="LiveId" clId="{A88E1021-0D6E-4899-A132-129726DC3689}" dt="2024-07-17T23:53:25.054" v="1206" actId="20577"/>
-        <pc:sldMkLst>
-          <pc:docMk/>
-          <pc:sldMk cId="124183885" sldId="270"/>
-        </pc:sldMkLst>
-        <pc:spChg chg="mod ord">
-          <ac:chgData name="Mike Saunders" userId="c0986ea9a2f2a984" providerId="LiveId" clId="{A88E1021-0D6E-4899-A132-129726DC3689}" dt="2024-07-17T23:52:51.674" v="1199" actId="20577"/>
-          <ac:spMkLst>
-            <pc:docMk/>
-            <pc:sldMk cId="124183885" sldId="270"/>
-            <ac:spMk id="3" creationId="{EA5357D9-D4FB-4AAD-8A2F-1178ADF39DA1}"/>
-          </ac:spMkLst>
-        </pc:spChg>
-        <pc:spChg chg="add mod">
-          <ac:chgData name="Mike Saunders" userId="c0986ea9a2f2a984" providerId="LiveId" clId="{A88E1021-0D6E-4899-A132-129726DC3689}" dt="2024-07-17T23:53:25.054" v="1206" actId="20577"/>
-          <ac:spMkLst>
-            <pc:docMk/>
-            <pc:sldMk cId="124183885" sldId="270"/>
-            <ac:spMk id="4" creationId="{A334D890-1D5F-47EF-1BC9-33EF85062CF7}"/>
-          </ac:spMkLst>
-        </pc:spChg>
-        <pc:spChg chg="del mod ord">
-          <ac:chgData name="Mike Saunders" userId="c0986ea9a2f2a984" providerId="LiveId" clId="{A88E1021-0D6E-4899-A132-129726DC3689}" dt="2024-07-17T23:53:03.324" v="1202" actId="478"/>
-          <ac:spMkLst>
-            <pc:docMk/>
-            <pc:sldMk cId="124183885" sldId="270"/>
-            <ac:spMk id="6" creationId="{62504B73-9099-3DFF-605F-FEAEB7268706}"/>
-          </ac:spMkLst>
-        </pc:spChg>
-        <pc:spChg chg="add">
-          <ac:chgData name="Mike Saunders" userId="c0986ea9a2f2a984" providerId="LiveId" clId="{A88E1021-0D6E-4899-A132-129726DC3689}" dt="2024-07-17T23:52:45.528" v="1178" actId="26606"/>
-          <ac:spMkLst>
-            <pc:docMk/>
-            <pc:sldMk cId="124183885" sldId="270"/>
-            <ac:spMk id="8" creationId="{1B15ED52-F352-441B-82BF-E0EA34836D08}"/>
-          </ac:spMkLst>
-        </pc:spChg>
-        <pc:spChg chg="del">
-          <ac:chgData name="Mike Saunders" userId="c0986ea9a2f2a984" providerId="LiveId" clId="{A88E1021-0D6E-4899-A132-129726DC3689}" dt="2024-07-17T23:52:12.631" v="1128"/>
-          <ac:spMkLst>
-            <pc:docMk/>
-            <pc:sldMk cId="124183885" sldId="270"/>
-            <ac:spMk id="9" creationId="{1B15ED52-F352-441B-82BF-E0EA34836D08}"/>
-          </ac:spMkLst>
-        </pc:spChg>
-        <pc:spChg chg="add">
-          <ac:chgData name="Mike Saunders" userId="c0986ea9a2f2a984" providerId="LiveId" clId="{A88E1021-0D6E-4899-A132-129726DC3689}" dt="2024-07-17T23:52:45.528" v="1178" actId="26606"/>
-          <ac:spMkLst>
-            <pc:docMk/>
-            <pc:sldMk cId="124183885" sldId="270"/>
-            <ac:spMk id="10" creationId="{3B2E3793-BFE6-45A2-9B7B-E18844431C99}"/>
-          </ac:spMkLst>
-        </pc:spChg>
-        <pc:spChg chg="del">
-          <ac:chgData name="Mike Saunders" userId="c0986ea9a2f2a984" providerId="LiveId" clId="{A88E1021-0D6E-4899-A132-129726DC3689}" dt="2024-07-17T23:52:12.631" v="1128"/>
-          <ac:spMkLst>
-            <pc:docMk/>
-            <pc:sldMk cId="124183885" sldId="270"/>
-            <ac:spMk id="11" creationId="{3B2E3793-BFE6-45A2-9B7B-E18844431C99}"/>
-          </ac:spMkLst>
-        </pc:spChg>
-        <pc:spChg chg="add">
-          <ac:chgData name="Mike Saunders" userId="c0986ea9a2f2a984" providerId="LiveId" clId="{A88E1021-0D6E-4899-A132-129726DC3689}" dt="2024-07-17T23:52:45.528" v="1178" actId="26606"/>
-          <ac:spMkLst>
-            <pc:docMk/>
-            <pc:sldMk cId="124183885" sldId="270"/>
-            <ac:spMk id="12" creationId="{BC4C4868-CB8F-4AF9-9CDB-8108F2C19B67}"/>
-          </ac:spMkLst>
-        </pc:spChg>
-        <pc:spChg chg="del">
-          <ac:chgData name="Mike Saunders" userId="c0986ea9a2f2a984" providerId="LiveId" clId="{A88E1021-0D6E-4899-A132-129726DC3689}" dt="2024-07-17T23:52:12.631" v="1128"/>
-          <ac:spMkLst>
-            <pc:docMk/>
-            <pc:sldMk cId="124183885" sldId="270"/>
-            <ac:spMk id="13" creationId="{BC4C4868-CB8F-4AF9-9CDB-8108F2C19B67}"/>
-          </ac:spMkLst>
-        </pc:spChg>
-        <pc:spChg chg="add">
-          <ac:chgData name="Mike Saunders" userId="c0986ea9a2f2a984" providerId="LiveId" clId="{A88E1021-0D6E-4899-A132-129726DC3689}" dt="2024-07-17T23:52:45.528" v="1178" actId="26606"/>
-          <ac:spMkLst>
-            <pc:docMk/>
-            <pc:sldMk cId="124183885" sldId="270"/>
-            <ac:spMk id="14" creationId="{375E0459-6403-40CD-989D-56A4407CA12E}"/>
-          </ac:spMkLst>
-        </pc:spChg>
-        <pc:spChg chg="del">
-          <ac:chgData name="Mike Saunders" userId="c0986ea9a2f2a984" providerId="LiveId" clId="{A88E1021-0D6E-4899-A132-129726DC3689}" dt="2024-07-17T23:52:12.631" v="1128"/>
-          <ac:spMkLst>
-            <pc:docMk/>
-            <pc:sldMk cId="124183885" sldId="270"/>
-            <ac:spMk id="15" creationId="{375E0459-6403-40CD-989D-56A4407CA12E}"/>
-          </ac:spMkLst>
-        </pc:spChg>
-        <pc:spChg chg="del">
-          <ac:chgData name="Mike Saunders" userId="c0986ea9a2f2a984" providerId="LiveId" clId="{A88E1021-0D6E-4899-A132-129726DC3689}" dt="2024-07-17T23:52:12.631" v="1128"/>
-          <ac:spMkLst>
-            <pc:docMk/>
-            <pc:sldMk cId="124183885" sldId="270"/>
-            <ac:spMk id="17" creationId="{53E5B1A8-3AC9-4BD1-9BBC-78CA94F2D1BA}"/>
-          </ac:spMkLst>
-        </pc:spChg>
-        <pc:spChg chg="add">
-          <ac:chgData name="Mike Saunders" userId="c0986ea9a2f2a984" providerId="LiveId" clId="{A88E1021-0D6E-4899-A132-129726DC3689}" dt="2024-07-17T23:52:45.528" v="1178" actId="26606"/>
-          <ac:spMkLst>
-            <pc:docMk/>
-            <pc:sldMk cId="124183885" sldId="270"/>
-            <ac:spMk id="19" creationId="{53E5B1A8-3AC9-4BD1-9BBC-78CA94F2D1BA}"/>
-          </ac:spMkLst>
-        </pc:spChg>
-      </pc:sldChg>
-      <pc:sldChg chg="modSp new mod">
-        <pc:chgData name="Mike Saunders" userId="c0986ea9a2f2a984" providerId="LiveId" clId="{A88E1021-0D6E-4899-A132-129726DC3689}" dt="2024-07-18T00:33:38.126" v="1311" actId="20577"/>
-        <pc:sldMkLst>
-          <pc:docMk/>
-          <pc:sldMk cId="3326597434" sldId="271"/>
-        </pc:sldMkLst>
-        <pc:spChg chg="mod">
-          <ac:chgData name="Mike Saunders" userId="c0986ea9a2f2a984" providerId="LiveId" clId="{A88E1021-0D6E-4899-A132-129726DC3689}" dt="2024-07-18T00:33:38.126" v="1311" actId="20577"/>
-          <ac:spMkLst>
-            <pc:docMk/>
-            <pc:sldMk cId="3326597434" sldId="271"/>
-            <ac:spMk id="2" creationId="{2ACF58D5-2D97-563C-5A20-A5DF7CB90086}"/>
-          </ac:spMkLst>
-        </pc:spChg>
-      </pc:sldChg>
-      <pc:sldChg chg="modSp mod">
-        <pc:chgData name="Mike Saunders" userId="c0986ea9a2f2a984" providerId="LiveId" clId="{A88E1021-0D6E-4899-A132-129726DC3689}" dt="2024-07-18T23:06:01.883" v="1484" actId="207"/>
-        <pc:sldMkLst>
-          <pc:docMk/>
-          <pc:sldMk cId="4166704550" sldId="274"/>
-        </pc:sldMkLst>
-        <pc:spChg chg="mod">
-          <ac:chgData name="Mike Saunders" userId="c0986ea9a2f2a984" providerId="LiveId" clId="{A88E1021-0D6E-4899-A132-129726DC3689}" dt="2024-07-18T23:06:01.883" v="1484" actId="207"/>
-          <ac:spMkLst>
-            <pc:docMk/>
-            <pc:sldMk cId="4166704550" sldId="274"/>
-            <ac:spMk id="7" creationId="{7D1C0FCC-A79B-8D82-05D1-E4F87A5A0A11}"/>
-          </ac:spMkLst>
-        </pc:spChg>
-      </pc:sldChg>
-      <pc:sldChg chg="modSp mod">
-        <pc:chgData name="Mike Saunders" userId="c0986ea9a2f2a984" providerId="LiveId" clId="{A88E1021-0D6E-4899-A132-129726DC3689}" dt="2024-07-18T23:06:12.532" v="1486" actId="207"/>
-        <pc:sldMkLst>
-          <pc:docMk/>
-          <pc:sldMk cId="3940634714" sldId="275"/>
-        </pc:sldMkLst>
-        <pc:spChg chg="mod">
-          <ac:chgData name="Mike Saunders" userId="c0986ea9a2f2a984" providerId="LiveId" clId="{A88E1021-0D6E-4899-A132-129726DC3689}" dt="2024-07-18T23:06:12.532" v="1486" actId="207"/>
-          <ac:spMkLst>
-            <pc:docMk/>
-            <pc:sldMk cId="3940634714" sldId="275"/>
-            <ac:spMk id="7" creationId="{7D1C0FCC-A79B-8D82-05D1-E4F87A5A0A11}"/>
-          </ac:spMkLst>
-        </pc:spChg>
-      </pc:sldChg>
-      <pc:sldChg chg="addSp delSp modSp add mod setBg delDesignElem modNotesTx">
-        <pc:chgData name="Mike Saunders" userId="c0986ea9a2f2a984" providerId="LiveId" clId="{A88E1021-0D6E-4899-A132-129726DC3689}" dt="2024-07-18T23:06:18.854" v="1488" actId="6549"/>
-        <pc:sldMkLst>
-          <pc:docMk/>
-          <pc:sldMk cId="1590742534" sldId="277"/>
-        </pc:sldMkLst>
-        <pc:spChg chg="mod">
-          <ac:chgData name="Mike Saunders" userId="c0986ea9a2f2a984" providerId="LiveId" clId="{A88E1021-0D6E-4899-A132-129726DC3689}" dt="2024-07-18T23:04:38.706" v="1476" actId="20577"/>
-          <ac:spMkLst>
-            <pc:docMk/>
-            <pc:sldMk cId="1590742534" sldId="277"/>
-            <ac:spMk id="2" creationId="{56E94A04-04A0-FD3D-83EC-CBA731417051}"/>
-          </ac:spMkLst>
-        </pc:spChg>
-        <pc:spChg chg="del mod">
-          <ac:chgData name="Mike Saunders" userId="c0986ea9a2f2a984" providerId="LiveId" clId="{A88E1021-0D6E-4899-A132-129726DC3689}" dt="2024-07-18T23:03:53.952" v="1416" actId="478"/>
-          <ac:spMkLst>
-            <pc:docMk/>
-            <pc:sldMk cId="1590742534" sldId="277"/>
-            <ac:spMk id="7" creationId="{7D1C0FCC-A79B-8D82-05D1-E4F87A5A0A11}"/>
-          </ac:spMkLst>
-        </pc:spChg>
-        <pc:spChg chg="del">
-          <ac:chgData name="Mike Saunders" userId="c0986ea9a2f2a984" providerId="LiveId" clId="{A88E1021-0D6E-4899-A132-129726DC3689}" dt="2024-07-18T23:00:41.254" v="1351"/>
-          <ac:spMkLst>
-            <pc:docMk/>
-            <pc:sldMk cId="1590742534" sldId="277"/>
-            <ac:spMk id="9" creationId="{A8384FB5-9ADC-4DDC-881B-597D56F5B15D}"/>
-          </ac:spMkLst>
-        </pc:spChg>
-        <pc:spChg chg="add mod">
-          <ac:chgData name="Mike Saunders" userId="c0986ea9a2f2a984" providerId="LiveId" clId="{A88E1021-0D6E-4899-A132-129726DC3689}" dt="2024-07-18T23:04:25.593" v="1461" actId="1076"/>
-          <ac:spMkLst>
-            <pc:docMk/>
-            <pc:sldMk cId="1590742534" sldId="277"/>
-            <ac:spMk id="10" creationId="{09B234A6-59CE-142D-C352-173878D97BF5}"/>
-          </ac:spMkLst>
-        </pc:spChg>
-        <pc:spChg chg="del">
-          <ac:chgData name="Mike Saunders" userId="c0986ea9a2f2a984" providerId="LiveId" clId="{A88E1021-0D6E-4899-A132-129726DC3689}" dt="2024-07-18T23:00:41.254" v="1351"/>
-          <ac:spMkLst>
-            <pc:docMk/>
-            <pc:sldMk cId="1590742534" sldId="277"/>
-            <ac:spMk id="11" creationId="{1199E1B1-A8C0-4FE8-A5A8-1CB41D69F857}"/>
-          </ac:spMkLst>
-        </pc:spChg>
-        <pc:spChg chg="add">
-          <ac:chgData name="Mike Saunders" userId="c0986ea9a2f2a984" providerId="LiveId" clId="{A88E1021-0D6E-4899-A132-129726DC3689}" dt="2024-07-18T23:01:34.491" v="1364" actId="26606"/>
-          <ac:spMkLst>
-            <pc:docMk/>
-            <pc:sldMk cId="1590742534" sldId="277"/>
-            <ac:spMk id="12" creationId="{A8384FB5-9ADC-4DDC-881B-597D56F5B15D}"/>
-          </ac:spMkLst>
-        </pc:spChg>
-        <pc:spChg chg="del">
-          <ac:chgData name="Mike Saunders" userId="c0986ea9a2f2a984" providerId="LiveId" clId="{A88E1021-0D6E-4899-A132-129726DC3689}" dt="2024-07-18T23:00:41.254" v="1351"/>
-          <ac:spMkLst>
-            <pc:docMk/>
-            <pc:sldMk cId="1590742534" sldId="277"/>
-            <ac:spMk id="13" creationId="{84A8DE83-DE75-4B41-9DB4-A7EC0B0DEC0B}"/>
-          </ac:spMkLst>
-        </pc:spChg>
-        <pc:spChg chg="add">
-          <ac:chgData name="Mike Saunders" userId="c0986ea9a2f2a984" providerId="LiveId" clId="{A88E1021-0D6E-4899-A132-129726DC3689}" dt="2024-07-18T23:01:34.491" v="1364" actId="26606"/>
-          <ac:spMkLst>
-            <pc:docMk/>
-            <pc:sldMk cId="1590742534" sldId="277"/>
-            <ac:spMk id="14" creationId="{1199E1B1-A8C0-4FE8-A5A8-1CB41D69F857}"/>
-          </ac:spMkLst>
-        </pc:spChg>
-        <pc:spChg chg="del">
-          <ac:chgData name="Mike Saunders" userId="c0986ea9a2f2a984" providerId="LiveId" clId="{A88E1021-0D6E-4899-A132-129726DC3689}" dt="2024-07-18T23:00:41.254" v="1351"/>
-          <ac:spMkLst>
-            <pc:docMk/>
-            <pc:sldMk cId="1590742534" sldId="277"/>
-            <ac:spMk id="15" creationId="{A7009A0A-BEF5-4EAC-AF15-E4F9F002E239}"/>
-          </ac:spMkLst>
-        </pc:spChg>
-        <pc:spChg chg="add">
-          <ac:chgData name="Mike Saunders" userId="c0986ea9a2f2a984" providerId="LiveId" clId="{A88E1021-0D6E-4899-A132-129726DC3689}" dt="2024-07-18T23:01:34.491" v="1364" actId="26606"/>
-          <ac:spMkLst>
-            <pc:docMk/>
-            <pc:sldMk cId="1590742534" sldId="277"/>
-            <ac:spMk id="16" creationId="{84A8DE83-DE75-4B41-9DB4-A7EC0B0DEC0B}"/>
-          </ac:spMkLst>
-        </pc:spChg>
-        <pc:spChg chg="add">
-          <ac:chgData name="Mike Saunders" userId="c0986ea9a2f2a984" providerId="LiveId" clId="{A88E1021-0D6E-4899-A132-129726DC3689}" dt="2024-07-18T23:01:34.491" v="1364" actId="26606"/>
-          <ac:spMkLst>
-            <pc:docMk/>
-            <pc:sldMk cId="1590742534" sldId="277"/>
-            <ac:spMk id="18" creationId="{A7009A0A-BEF5-4EAC-AF15-E4F9F002E239}"/>
-          </ac:spMkLst>
-        </pc:spChg>
-        <pc:picChg chg="del">
-          <ac:chgData name="Mike Saunders" userId="c0986ea9a2f2a984" providerId="LiveId" clId="{A88E1021-0D6E-4899-A132-129726DC3689}" dt="2024-07-18T23:00:42.925" v="1352" actId="478"/>
-          <ac:picMkLst>
-            <pc:docMk/>
-            <pc:sldMk cId="1590742534" sldId="277"/>
-            <ac:picMk id="4" creationId="{7E1E60B8-0865-9EFB-5382-91AAB97DD036}"/>
-          </ac:picMkLst>
-        </pc:picChg>
-        <pc:picChg chg="add del mod">
-          <ac:chgData name="Mike Saunders" userId="c0986ea9a2f2a984" providerId="LiveId" clId="{A88E1021-0D6E-4899-A132-129726DC3689}" dt="2024-07-18T23:03:04.953" v="1381" actId="478"/>
-          <ac:picMkLst>
-            <pc:docMk/>
-            <pc:sldMk cId="1590742534" sldId="277"/>
-            <ac:picMk id="5" creationId="{C6F43B31-2361-D277-D40D-F0C578809BDD}"/>
-          </ac:picMkLst>
-        </pc:picChg>
-        <pc:picChg chg="add mod">
-          <ac:chgData name="Mike Saunders" userId="c0986ea9a2f2a984" providerId="LiveId" clId="{A88E1021-0D6E-4899-A132-129726DC3689}" dt="2024-07-18T23:04:30.854" v="1468" actId="1076"/>
-          <ac:picMkLst>
-            <pc:docMk/>
-            <pc:sldMk cId="1590742534" sldId="277"/>
-            <ac:picMk id="8" creationId="{7701BF50-4FBE-02BA-8031-2607A00A08F6}"/>
-          </ac:picMkLst>
-        </pc:picChg>
-      </pc:sldChg>
-      <pc:sldChg chg="addSp modSp new del mod setBg">
-        <pc:chgData name="Mike Saunders" userId="c0986ea9a2f2a984" providerId="LiveId" clId="{A88E1021-0D6E-4899-A132-129726DC3689}" dt="2024-07-18T23:00:32.998" v="1349" actId="47"/>
-        <pc:sldMkLst>
-          <pc:docMk/>
-          <pc:sldMk cId="3139819979" sldId="277"/>
-        </pc:sldMkLst>
-        <pc:spChg chg="mod">
-          <ac:chgData name="Mike Saunders" userId="c0986ea9a2f2a984" providerId="LiveId" clId="{A88E1021-0D6E-4899-A132-129726DC3689}" dt="2024-07-18T23:00:23.062" v="1348" actId="26606"/>
-          <ac:spMkLst>
-            <pc:docMk/>
-            <pc:sldMk cId="3139819979" sldId="277"/>
-            <ac:spMk id="2" creationId="{F3A2013F-40C7-CA0C-3772-6AA4A7F235B2}"/>
-          </ac:spMkLst>
-        </pc:spChg>
-        <pc:spChg chg="add">
-          <ac:chgData name="Mike Saunders" userId="c0986ea9a2f2a984" providerId="LiveId" clId="{A88E1021-0D6E-4899-A132-129726DC3689}" dt="2024-07-18T23:00:23.062" v="1348" actId="26606"/>
-          <ac:spMkLst>
-            <pc:docMk/>
-            <pc:sldMk cId="3139819979" sldId="277"/>
-            <ac:spMk id="9" creationId="{A4AC5506-6312-4701-8D3C-40187889A947}"/>
-          </ac:spMkLst>
-        </pc:spChg>
-        <pc:picChg chg="add mod">
-          <ac:chgData name="Mike Saunders" userId="c0986ea9a2f2a984" providerId="LiveId" clId="{A88E1021-0D6E-4899-A132-129726DC3689}" dt="2024-07-18T23:00:23.062" v="1348" actId="26606"/>
-          <ac:picMkLst>
-            <pc:docMk/>
-            <pc:sldMk cId="3139819979" sldId="277"/>
-            <ac:picMk id="4" creationId="{220DC481-1AA2-BFCA-15D8-3875467A67CF}"/>
-          </ac:picMkLst>
-        </pc:picChg>
-      </pc:sldChg>
-      <pc:sldChg chg="addSp delSp modSp add del mod setBg delDesignElem chgLayout">
-        <pc:chgData name="Mike Saunders" userId="c0986ea9a2f2a984" providerId="LiveId" clId="{A88E1021-0D6E-4899-A132-129726DC3689}" dt="2024-07-18T23:01:20.730" v="1362"/>
-        <pc:sldMkLst>
-          <pc:docMk/>
-          <pc:sldMk cId="680769365" sldId="278"/>
-        </pc:sldMkLst>
-        <pc:spChg chg="mod ord">
-          <ac:chgData name="Mike Saunders" userId="c0986ea9a2f2a984" providerId="LiveId" clId="{A88E1021-0D6E-4899-A132-129726DC3689}" dt="2024-07-18T23:01:20.064" v="1361" actId="700"/>
-          <ac:spMkLst>
-            <pc:docMk/>
-            <pc:sldMk cId="680769365" sldId="278"/>
-            <ac:spMk id="2" creationId="{56E94A04-04A0-FD3D-83EC-CBA731417051}"/>
-          </ac:spMkLst>
-        </pc:spChg>
-        <pc:spChg chg="mod">
-          <ac:chgData name="Mike Saunders" userId="c0986ea9a2f2a984" providerId="LiveId" clId="{A88E1021-0D6E-4899-A132-129726DC3689}" dt="2024-07-18T23:01:17.365" v="1360" actId="26606"/>
-          <ac:spMkLst>
-            <pc:docMk/>
-            <pc:sldMk cId="680769365" sldId="278"/>
-            <ac:spMk id="7" creationId="{7D1C0FCC-A79B-8D82-05D1-E4F87A5A0A11}"/>
-          </ac:spMkLst>
-        </pc:spChg>
-        <pc:spChg chg="add del">
-          <ac:chgData name="Mike Saunders" userId="c0986ea9a2f2a984" providerId="LiveId" clId="{A88E1021-0D6E-4899-A132-129726DC3689}" dt="2024-07-18T23:01:20.730" v="1362"/>
-          <ac:spMkLst>
-            <pc:docMk/>
-            <pc:sldMk cId="680769365" sldId="278"/>
-            <ac:spMk id="9" creationId="{A8384FB5-9ADC-4DDC-881B-597D56F5B15D}"/>
-          </ac:spMkLst>
-        </pc:spChg>
-        <pc:spChg chg="add del">
-          <ac:chgData name="Mike Saunders" userId="c0986ea9a2f2a984" providerId="LiveId" clId="{A88E1021-0D6E-4899-A132-129726DC3689}" dt="2024-07-18T23:01:20.730" v="1362"/>
-          <ac:spMkLst>
-            <pc:docMk/>
-            <pc:sldMk cId="680769365" sldId="278"/>
-            <ac:spMk id="11" creationId="{1199E1B1-A8C0-4FE8-A5A8-1CB41D69F857}"/>
-          </ac:spMkLst>
-        </pc:spChg>
-        <pc:spChg chg="add del">
-          <ac:chgData name="Mike Saunders" userId="c0986ea9a2f2a984" providerId="LiveId" clId="{A88E1021-0D6E-4899-A132-129726DC3689}" dt="2024-07-18T23:01:17.365" v="1360" actId="26606"/>
-          <ac:spMkLst>
-            <pc:docMk/>
-            <pc:sldMk cId="680769365" sldId="278"/>
-            <ac:spMk id="12" creationId="{A8384FB5-9ADC-4DDC-881B-597D56F5B15D}"/>
-          </ac:spMkLst>
-        </pc:spChg>
-        <pc:spChg chg="add del">
-          <ac:chgData name="Mike Saunders" userId="c0986ea9a2f2a984" providerId="LiveId" clId="{A88E1021-0D6E-4899-A132-129726DC3689}" dt="2024-07-18T23:01:20.730" v="1362"/>
-          <ac:spMkLst>
-            <pc:docMk/>
-            <pc:sldMk cId="680769365" sldId="278"/>
-            <ac:spMk id="13" creationId="{84A8DE83-DE75-4B41-9DB4-A7EC0B0DEC0B}"/>
-          </ac:spMkLst>
-        </pc:spChg>
-        <pc:spChg chg="add del">
-          <ac:chgData name="Mike Saunders" userId="c0986ea9a2f2a984" providerId="LiveId" clId="{A88E1021-0D6E-4899-A132-129726DC3689}" dt="2024-07-18T23:01:17.365" v="1360" actId="26606"/>
-          <ac:spMkLst>
-            <pc:docMk/>
-            <pc:sldMk cId="680769365" sldId="278"/>
-            <ac:spMk id="14" creationId="{1199E1B1-A8C0-4FE8-A5A8-1CB41D69F857}"/>
-          </ac:spMkLst>
-        </pc:spChg>
-        <pc:spChg chg="add del">
-          <ac:chgData name="Mike Saunders" userId="c0986ea9a2f2a984" providerId="LiveId" clId="{A88E1021-0D6E-4899-A132-129726DC3689}" dt="2024-07-18T23:01:20.730" v="1362"/>
-          <ac:spMkLst>
-            <pc:docMk/>
-            <pc:sldMk cId="680769365" sldId="278"/>
-            <ac:spMk id="15" creationId="{A7009A0A-BEF5-4EAC-AF15-E4F9F002E239}"/>
-          </ac:spMkLst>
-        </pc:spChg>
-        <pc:spChg chg="add del">
-          <ac:chgData name="Mike Saunders" userId="c0986ea9a2f2a984" providerId="LiveId" clId="{A88E1021-0D6E-4899-A132-129726DC3689}" dt="2024-07-18T23:01:17.365" v="1360" actId="26606"/>
-          <ac:spMkLst>
-            <pc:docMk/>
-            <pc:sldMk cId="680769365" sldId="278"/>
-            <ac:spMk id="16" creationId="{84A8DE83-DE75-4B41-9DB4-A7EC0B0DEC0B}"/>
-          </ac:spMkLst>
-        </pc:spChg>
-        <pc:spChg chg="add del">
-          <ac:chgData name="Mike Saunders" userId="c0986ea9a2f2a984" providerId="LiveId" clId="{A88E1021-0D6E-4899-A132-129726DC3689}" dt="2024-07-18T23:01:17.365" v="1360" actId="26606"/>
-          <ac:spMkLst>
-            <pc:docMk/>
-            <pc:sldMk cId="680769365" sldId="278"/>
-            <ac:spMk id="18" creationId="{A7009A0A-BEF5-4EAC-AF15-E4F9F002E239}"/>
-          </ac:spMkLst>
-        </pc:spChg>
-        <pc:picChg chg="mod">
-          <ac:chgData name="Mike Saunders" userId="c0986ea9a2f2a984" providerId="LiveId" clId="{A88E1021-0D6E-4899-A132-129726DC3689}" dt="2024-07-18T23:01:17.365" v="1360" actId="26606"/>
-          <ac:picMkLst>
-            <pc:docMk/>
-            <pc:sldMk cId="680769365" sldId="278"/>
-            <ac:picMk id="4" creationId="{7E1E60B8-0865-9EFB-5382-91AAB97DD036}"/>
-          </ac:picMkLst>
-        </pc:picChg>
-      </pc:sldChg>
-    </pc:docChg>
-  </pc:docChgLst>
-  <pc:docChgLst>
     <pc:chgData name="Brian Campbell" userId="a27f3cf3f583021c" providerId="LiveId" clId="{3961579C-DF2F-9540-8A26-84ECA1134E6E}"/>
     <pc:docChg chg="undo custSel addSld delSld modSld sldOrd">
       <pc:chgData name="Brian Campbell" userId="a27f3cf3f583021c" providerId="LiveId" clId="{3961579C-DF2F-9540-8A26-84ECA1134E6E}" dt="2024-07-18T21:41:15.181" v="653" actId="14100"/>
@@ -2006,6 +436,1694 @@
             <pc:docMk/>
             <pc:sldMk cId="3223283231" sldId="276"/>
             <ac:picMk id="17" creationId="{D0883807-B68A-F374-F3E6-968D6E769FE9}"/>
+          </ac:picMkLst>
+        </pc:picChg>
+      </pc:sldChg>
+    </pc:docChg>
+  </pc:docChgLst>
+  <pc:docChgLst>
+    <pc:chgData name="Mike Saunders" userId="c0986ea9a2f2a984" providerId="LiveId" clId="{A88E1021-0D6E-4899-A132-129726DC3689}"/>
+    <pc:docChg chg="undo custSel addSld delSld modSld sldOrd">
+      <pc:chgData name="Mike Saunders" userId="c0986ea9a2f2a984" providerId="LiveId" clId="{A88E1021-0D6E-4899-A132-129726DC3689}" dt="2024-07-19T00:01:38.059" v="1539" actId="1076"/>
+      <pc:docMkLst>
+        <pc:docMk/>
+      </pc:docMkLst>
+      <pc:sldChg chg="delSp modSp mod delDesignElem">
+        <pc:chgData name="Mike Saunders" userId="c0986ea9a2f2a984" providerId="LiveId" clId="{A88E1021-0D6E-4899-A132-129726DC3689}" dt="2024-07-18T22:56:52.562" v="1345" actId="403"/>
+        <pc:sldMkLst>
+          <pc:docMk/>
+          <pc:sldMk cId="4031883172" sldId="256"/>
+        </pc:sldMkLst>
+        <pc:spChg chg="mod">
+          <ac:chgData name="Mike Saunders" userId="c0986ea9a2f2a984" providerId="LiveId" clId="{A88E1021-0D6E-4899-A132-129726DC3689}" dt="2024-07-18T22:56:52.562" v="1345" actId="403"/>
+          <ac:spMkLst>
+            <pc:docMk/>
+            <pc:sldMk cId="4031883172" sldId="256"/>
+            <ac:spMk id="2" creationId="{4EB9F1EE-B7C1-B5A7-D3DE-5486DF557772}"/>
+          </ac:spMkLst>
+        </pc:spChg>
+        <pc:spChg chg="mod">
+          <ac:chgData name="Mike Saunders" userId="c0986ea9a2f2a984" providerId="LiveId" clId="{A88E1021-0D6E-4899-A132-129726DC3689}" dt="2024-07-17T23:15:46.324" v="548" actId="120"/>
+          <ac:spMkLst>
+            <pc:docMk/>
+            <pc:sldMk cId="4031883172" sldId="256"/>
+            <ac:spMk id="3" creationId="{79CBFAF9-313F-CFE8-A551-D1D9961AA6DB}"/>
+          </ac:spMkLst>
+        </pc:spChg>
+        <pc:spChg chg="del">
+          <ac:chgData name="Mike Saunders" userId="c0986ea9a2f2a984" providerId="LiveId" clId="{A88E1021-0D6E-4899-A132-129726DC3689}" dt="2024-07-17T22:52:10.071" v="4"/>
+          <ac:spMkLst>
+            <pc:docMk/>
+            <pc:sldMk cId="4031883172" sldId="256"/>
+            <ac:spMk id="9" creationId="{9B7AD9F6-8CE7-4299-8FC6-328F4DCD3FF9}"/>
+          </ac:spMkLst>
+        </pc:spChg>
+        <pc:spChg chg="del">
+          <ac:chgData name="Mike Saunders" userId="c0986ea9a2f2a984" providerId="LiveId" clId="{A88E1021-0D6E-4899-A132-129726DC3689}" dt="2024-07-17T22:52:10.071" v="4"/>
+          <ac:spMkLst>
+            <pc:docMk/>
+            <pc:sldMk cId="4031883172" sldId="256"/>
+            <ac:spMk id="11" creationId="{F49775AF-8896-43EE-92C6-83497D6DC56F}"/>
+          </ac:spMkLst>
+        </pc:spChg>
+      </pc:sldChg>
+      <pc:sldChg chg="new del">
+        <pc:chgData name="Mike Saunders" userId="c0986ea9a2f2a984" providerId="LiveId" clId="{A88E1021-0D6E-4899-A132-129726DC3689}" dt="2024-07-17T22:51:38.835" v="2" actId="47"/>
+        <pc:sldMkLst>
+          <pc:docMk/>
+          <pc:sldMk cId="1999600122" sldId="257"/>
+        </pc:sldMkLst>
+      </pc:sldChg>
+      <pc:sldChg chg="addSp delSp modSp new mod ord setBg modClrScheme delDesignElem chgLayout">
+        <pc:chgData name="Mike Saunders" userId="c0986ea9a2f2a984" providerId="LiveId" clId="{A88E1021-0D6E-4899-A132-129726DC3689}" dt="2024-07-18T00:34:43.888" v="1323"/>
+        <pc:sldMkLst>
+          <pc:docMk/>
+          <pc:sldMk cId="3642388448" sldId="258"/>
+        </pc:sldMkLst>
+        <pc:spChg chg="add mod ord">
+          <ac:chgData name="Mike Saunders" userId="c0986ea9a2f2a984" providerId="LiveId" clId="{A88E1021-0D6E-4899-A132-129726DC3689}" dt="2024-07-17T23:02:12.166" v="189" actId="26606"/>
+          <ac:spMkLst>
+            <pc:docMk/>
+            <pc:sldMk cId="3642388448" sldId="258"/>
+            <ac:spMk id="2" creationId="{7246B072-2CCD-AA46-3FEE-4CEEE79E61DD}"/>
+          </ac:spMkLst>
+        </pc:spChg>
+        <pc:spChg chg="add del mod">
+          <ac:chgData name="Mike Saunders" userId="c0986ea9a2f2a984" providerId="LiveId" clId="{A88E1021-0D6E-4899-A132-129726DC3689}" dt="2024-07-17T22:53:37.533" v="37" actId="22"/>
+          <ac:spMkLst>
+            <pc:docMk/>
+            <pc:sldMk cId="3642388448" sldId="258"/>
+            <ac:spMk id="3" creationId="{F2F4B3BA-39D7-AD7E-98E9-30F9E5F21D59}"/>
+          </ac:spMkLst>
+        </pc:spChg>
+        <pc:spChg chg="add del mod">
+          <ac:chgData name="Mike Saunders" userId="c0986ea9a2f2a984" providerId="LiveId" clId="{A88E1021-0D6E-4899-A132-129726DC3689}" dt="2024-07-17T22:59:48.427" v="149" actId="22"/>
+          <ac:spMkLst>
+            <pc:docMk/>
+            <pc:sldMk cId="3642388448" sldId="258"/>
+            <ac:spMk id="11" creationId="{BFAE83A6-84C7-4527-C281-F25253888976}"/>
+          </ac:spMkLst>
+        </pc:spChg>
+        <pc:spChg chg="add del">
+          <ac:chgData name="Mike Saunders" userId="c0986ea9a2f2a984" providerId="LiveId" clId="{A88E1021-0D6E-4899-A132-129726DC3689}" dt="2024-07-17T23:04:35.333" v="218"/>
+          <ac:spMkLst>
+            <pc:docMk/>
+            <pc:sldMk cId="3642388448" sldId="258"/>
+            <ac:spMk id="14" creationId="{9CB95732-565A-4D2C-A3AB-CC460C0D3826}"/>
+          </ac:spMkLst>
+        </pc:spChg>
+        <pc:spChg chg="add del">
+          <ac:chgData name="Mike Saunders" userId="c0986ea9a2f2a984" providerId="LiveId" clId="{A88E1021-0D6E-4899-A132-129726DC3689}" dt="2024-07-17T23:04:35.333" v="218"/>
+          <ac:spMkLst>
+            <pc:docMk/>
+            <pc:sldMk cId="3642388448" sldId="258"/>
+            <ac:spMk id="16" creationId="{E19B653C-798C-4333-8452-3DF3AE3C1D11}"/>
+          </ac:spMkLst>
+        </pc:spChg>
+        <pc:spChg chg="add del">
+          <ac:chgData name="Mike Saunders" userId="c0986ea9a2f2a984" providerId="LiveId" clId="{A88E1021-0D6E-4899-A132-129726DC3689}" dt="2024-07-17T23:04:35.333" v="218"/>
+          <ac:spMkLst>
+            <pc:docMk/>
+            <pc:sldMk cId="3642388448" sldId="258"/>
+            <ac:spMk id="18" creationId="{0FE50278-E2EC-42B2-A1F1-921DD39901C4}"/>
+          </ac:spMkLst>
+        </pc:spChg>
+        <pc:spChg chg="add del">
+          <ac:chgData name="Mike Saunders" userId="c0986ea9a2f2a984" providerId="LiveId" clId="{A88E1021-0D6E-4899-A132-129726DC3689}" dt="2024-07-17T23:04:35.333" v="218"/>
+          <ac:spMkLst>
+            <pc:docMk/>
+            <pc:sldMk cId="3642388448" sldId="258"/>
+            <ac:spMk id="20" creationId="{1236153F-0DB4-40DD-87C6-B40C1B7E282C}"/>
+          </ac:spMkLst>
+        </pc:spChg>
+        <pc:picChg chg="add mod">
+          <ac:chgData name="Mike Saunders" userId="c0986ea9a2f2a984" providerId="LiveId" clId="{A88E1021-0D6E-4899-A132-129726DC3689}" dt="2024-07-17T23:02:52.978" v="199" actId="14100"/>
+          <ac:picMkLst>
+            <pc:docMk/>
+            <pc:sldMk cId="3642388448" sldId="258"/>
+            <ac:picMk id="5" creationId="{D1BCF4F6-7804-D210-8B6C-6B972C9059BC}"/>
+          </ac:picMkLst>
+        </pc:picChg>
+        <pc:picChg chg="add mod ord">
+          <ac:chgData name="Mike Saunders" userId="c0986ea9a2f2a984" providerId="LiveId" clId="{A88E1021-0D6E-4899-A132-129726DC3689}" dt="2024-07-17T23:02:52.978" v="199" actId="14100"/>
+          <ac:picMkLst>
+            <pc:docMk/>
+            <pc:sldMk cId="3642388448" sldId="258"/>
+            <ac:picMk id="7" creationId="{5588B13E-BDFF-C93D-43A9-38CE70AC80D5}"/>
+          </ac:picMkLst>
+        </pc:picChg>
+        <pc:picChg chg="add mod">
+          <ac:chgData name="Mike Saunders" userId="c0986ea9a2f2a984" providerId="LiveId" clId="{A88E1021-0D6E-4899-A132-129726DC3689}" dt="2024-07-17T23:02:58.869" v="200" actId="1076"/>
+          <ac:picMkLst>
+            <pc:docMk/>
+            <pc:sldMk cId="3642388448" sldId="258"/>
+            <ac:picMk id="9" creationId="{88B5389A-081F-90DB-2CDA-630EC88D3D9E}"/>
+          </ac:picMkLst>
+        </pc:picChg>
+      </pc:sldChg>
+      <pc:sldChg chg="addSp delSp modSp add mod ord setBg delDesignElem">
+        <pc:chgData name="Mike Saunders" userId="c0986ea9a2f2a984" providerId="LiveId" clId="{A88E1021-0D6E-4899-A132-129726DC3689}" dt="2024-07-18T00:34:43.888" v="1323"/>
+        <pc:sldMkLst>
+          <pc:docMk/>
+          <pc:sldMk cId="3963055046" sldId="259"/>
+        </pc:sldMkLst>
+        <pc:spChg chg="mod">
+          <ac:chgData name="Mike Saunders" userId="c0986ea9a2f2a984" providerId="LiveId" clId="{A88E1021-0D6E-4899-A132-129726DC3689}" dt="2024-07-17T23:02:04.593" v="188" actId="26606"/>
+          <ac:spMkLst>
+            <pc:docMk/>
+            <pc:sldMk cId="3963055046" sldId="259"/>
+            <ac:spMk id="2" creationId="{7246B072-2CCD-AA46-3FEE-4CEEE79E61DD}"/>
+          </ac:spMkLst>
+        </pc:spChg>
+        <pc:spChg chg="add del mod">
+          <ac:chgData name="Mike Saunders" userId="c0986ea9a2f2a984" providerId="LiveId" clId="{A88E1021-0D6E-4899-A132-129726DC3689}" dt="2024-07-17T22:55:15.482" v="67" actId="478"/>
+          <ac:spMkLst>
+            <pc:docMk/>
+            <pc:sldMk cId="3963055046" sldId="259"/>
+            <ac:spMk id="4" creationId="{7B9AC07A-AD8F-3D20-1763-F7AD64328A5F}"/>
+          </ac:spMkLst>
+        </pc:spChg>
+        <pc:spChg chg="add mod">
+          <ac:chgData name="Mike Saunders" userId="c0986ea9a2f2a984" providerId="LiveId" clId="{A88E1021-0D6E-4899-A132-129726DC3689}" dt="2024-07-17T23:27:46.062" v="590" actId="1036"/>
+          <ac:spMkLst>
+            <pc:docMk/>
+            <pc:sldMk cId="3963055046" sldId="259"/>
+            <ac:spMk id="14" creationId="{DF933A6A-A9E1-9BF3-97CB-093399238658}"/>
+          </ac:spMkLst>
+        </pc:spChg>
+        <pc:spChg chg="add del">
+          <ac:chgData name="Mike Saunders" userId="c0986ea9a2f2a984" providerId="LiveId" clId="{A88E1021-0D6E-4899-A132-129726DC3689}" dt="2024-07-17T23:04:35.333" v="218"/>
+          <ac:spMkLst>
+            <pc:docMk/>
+            <pc:sldMk cId="3963055046" sldId="259"/>
+            <ac:spMk id="18" creationId="{9CB95732-565A-4D2C-A3AB-CC460C0D3826}"/>
+          </ac:spMkLst>
+        </pc:spChg>
+        <pc:spChg chg="add del">
+          <ac:chgData name="Mike Saunders" userId="c0986ea9a2f2a984" providerId="LiveId" clId="{A88E1021-0D6E-4899-A132-129726DC3689}" dt="2024-07-17T23:04:35.333" v="218"/>
+          <ac:spMkLst>
+            <pc:docMk/>
+            <pc:sldMk cId="3963055046" sldId="259"/>
+            <ac:spMk id="20" creationId="{E19B653C-798C-4333-8452-3DF3AE3C1D11}"/>
+          </ac:spMkLst>
+        </pc:spChg>
+        <pc:spChg chg="add del">
+          <ac:chgData name="Mike Saunders" userId="c0986ea9a2f2a984" providerId="LiveId" clId="{A88E1021-0D6E-4899-A132-129726DC3689}" dt="2024-07-17T23:04:35.333" v="218"/>
+          <ac:spMkLst>
+            <pc:docMk/>
+            <pc:sldMk cId="3963055046" sldId="259"/>
+            <ac:spMk id="22" creationId="{0FE50278-E2EC-42B2-A1F1-921DD39901C4}"/>
+          </ac:spMkLst>
+        </pc:spChg>
+        <pc:spChg chg="add del">
+          <ac:chgData name="Mike Saunders" userId="c0986ea9a2f2a984" providerId="LiveId" clId="{A88E1021-0D6E-4899-A132-129726DC3689}" dt="2024-07-17T23:04:35.333" v="218"/>
+          <ac:spMkLst>
+            <pc:docMk/>
+            <pc:sldMk cId="3963055046" sldId="259"/>
+            <ac:spMk id="24" creationId="{1236153F-0DB4-40DD-87C6-B40C1B7E282C}"/>
+          </ac:spMkLst>
+        </pc:spChg>
+        <pc:picChg chg="del">
+          <ac:chgData name="Mike Saunders" userId="c0986ea9a2f2a984" providerId="LiveId" clId="{A88E1021-0D6E-4899-A132-129726DC3689}" dt="2024-07-17T22:55:08.740" v="64" actId="478"/>
+          <ac:picMkLst>
+            <pc:docMk/>
+            <pc:sldMk cId="3963055046" sldId="259"/>
+            <ac:picMk id="5" creationId="{D1BCF4F6-7804-D210-8B6C-6B972C9059BC}"/>
+          </ac:picMkLst>
+        </pc:picChg>
+        <pc:picChg chg="del mod">
+          <ac:chgData name="Mike Saunders" userId="c0986ea9a2f2a984" providerId="LiveId" clId="{A88E1021-0D6E-4899-A132-129726DC3689}" dt="2024-07-17T22:55:09.414" v="66" actId="478"/>
+          <ac:picMkLst>
+            <pc:docMk/>
+            <pc:sldMk cId="3963055046" sldId="259"/>
+            <ac:picMk id="7" creationId="{5588B13E-BDFF-C93D-43A9-38CE70AC80D5}"/>
+          </ac:picMkLst>
+        </pc:picChg>
+        <pc:picChg chg="add mod ord">
+          <ac:chgData name="Mike Saunders" userId="c0986ea9a2f2a984" providerId="LiveId" clId="{A88E1021-0D6E-4899-A132-129726DC3689}" dt="2024-07-17T23:03:26.635" v="207" actId="1076"/>
+          <ac:picMkLst>
+            <pc:docMk/>
+            <pc:sldMk cId="3963055046" sldId="259"/>
+            <ac:picMk id="8" creationId="{D8B84859-15E5-4212-A406-1A0FA29CD419}"/>
+          </ac:picMkLst>
+        </pc:picChg>
+        <pc:picChg chg="del">
+          <ac:chgData name="Mike Saunders" userId="c0986ea9a2f2a984" providerId="LiveId" clId="{A88E1021-0D6E-4899-A132-129726DC3689}" dt="2024-07-17T22:55:16.153" v="68" actId="478"/>
+          <ac:picMkLst>
+            <pc:docMk/>
+            <pc:sldMk cId="3963055046" sldId="259"/>
+            <ac:picMk id="9" creationId="{88B5389A-081F-90DB-2CDA-630EC88D3D9E}"/>
+          </ac:picMkLst>
+        </pc:picChg>
+        <pc:picChg chg="add mod">
+          <ac:chgData name="Mike Saunders" userId="c0986ea9a2f2a984" providerId="LiveId" clId="{A88E1021-0D6E-4899-A132-129726DC3689}" dt="2024-07-17T23:03:22.311" v="205" actId="14100"/>
+          <ac:picMkLst>
+            <pc:docMk/>
+            <pc:sldMk cId="3963055046" sldId="259"/>
+            <ac:picMk id="11" creationId="{270AD0E6-6871-8A62-10D1-DEEEC88A3130}"/>
+          </ac:picMkLst>
+        </pc:picChg>
+        <pc:picChg chg="add mod">
+          <ac:chgData name="Mike Saunders" userId="c0986ea9a2f2a984" providerId="LiveId" clId="{A88E1021-0D6E-4899-A132-129726DC3689}" dt="2024-07-17T23:03:28.640" v="208" actId="1076"/>
+          <ac:picMkLst>
+            <pc:docMk/>
+            <pc:sldMk cId="3963055046" sldId="259"/>
+            <ac:picMk id="13" creationId="{4A659193-77B0-4253-75AD-BD4F0E6CF1D4}"/>
+          </ac:picMkLst>
+        </pc:picChg>
+        <pc:cxnChg chg="add mod">
+          <ac:chgData name="Mike Saunders" userId="c0986ea9a2f2a984" providerId="LiveId" clId="{A88E1021-0D6E-4899-A132-129726DC3689}" dt="2024-07-17T23:28:23.765" v="595" actId="1035"/>
+          <ac:cxnSpMkLst>
+            <pc:docMk/>
+            <pc:sldMk cId="3963055046" sldId="259"/>
+            <ac:cxnSpMk id="16" creationId="{7ED0AD73-8D78-6C47-1F66-5DCC413BB75F}"/>
+          </ac:cxnSpMkLst>
+        </pc:cxnChg>
+        <pc:cxnChg chg="add mod">
+          <ac:chgData name="Mike Saunders" userId="c0986ea9a2f2a984" providerId="LiveId" clId="{A88E1021-0D6E-4899-A132-129726DC3689}" dt="2024-07-17T23:27:46.062" v="590" actId="1036"/>
+          <ac:cxnSpMkLst>
+            <pc:docMk/>
+            <pc:sldMk cId="3963055046" sldId="259"/>
+            <ac:cxnSpMk id="17" creationId="{9C392C03-1F03-0785-A782-50D38A2B9761}"/>
+          </ac:cxnSpMkLst>
+        </pc:cxnChg>
+        <pc:cxnChg chg="add mod">
+          <ac:chgData name="Mike Saunders" userId="c0986ea9a2f2a984" providerId="LiveId" clId="{A88E1021-0D6E-4899-A132-129726DC3689}" dt="2024-07-17T23:27:46.062" v="590" actId="1036"/>
+          <ac:cxnSpMkLst>
+            <pc:docMk/>
+            <pc:sldMk cId="3963055046" sldId="259"/>
+            <ac:cxnSpMk id="19" creationId="{CF42BC7C-203D-194E-EDA7-3F7B6F3D3472}"/>
+          </ac:cxnSpMkLst>
+        </pc:cxnChg>
+      </pc:sldChg>
+      <pc:sldChg chg="addSp delSp modSp new mod setBg delDesignElem chgLayout">
+        <pc:chgData name="Mike Saunders" userId="c0986ea9a2f2a984" providerId="LiveId" clId="{A88E1021-0D6E-4899-A132-129726DC3689}" dt="2024-07-17T23:28:32.408" v="598" actId="14100"/>
+        <pc:sldMkLst>
+          <pc:docMk/>
+          <pc:sldMk cId="2120321798" sldId="260"/>
+        </pc:sldMkLst>
+        <pc:spChg chg="mod ord">
+          <ac:chgData name="Mike Saunders" userId="c0986ea9a2f2a984" providerId="LiveId" clId="{A88E1021-0D6E-4899-A132-129726DC3689}" dt="2024-07-17T23:01:58.515" v="187" actId="26606"/>
+          <ac:spMkLst>
+            <pc:docMk/>
+            <pc:sldMk cId="2120321798" sldId="260"/>
+            <ac:spMk id="2" creationId="{50815309-FC43-BB74-ACF0-40E80AE85C97}"/>
+          </ac:spMkLst>
+        </pc:spChg>
+        <pc:spChg chg="add mod">
+          <ac:chgData name="Mike Saunders" userId="c0986ea9a2f2a984" providerId="LiveId" clId="{A88E1021-0D6E-4899-A132-129726DC3689}" dt="2024-07-17T23:28:18.266" v="592" actId="1076"/>
+          <ac:spMkLst>
+            <pc:docMk/>
+            <pc:sldMk cId="2120321798" sldId="260"/>
+            <ac:spMk id="5" creationId="{8A6618D2-9721-A1AC-FC1C-C834F25262C4}"/>
+          </ac:spMkLst>
+        </pc:spChg>
+        <pc:spChg chg="add del">
+          <ac:chgData name="Mike Saunders" userId="c0986ea9a2f2a984" providerId="LiveId" clId="{A88E1021-0D6E-4899-A132-129726DC3689}" dt="2024-07-17T23:04:35.333" v="218"/>
+          <ac:spMkLst>
+            <pc:docMk/>
+            <pc:sldMk cId="2120321798" sldId="260"/>
+            <ac:spMk id="9" creationId="{A8384FB5-9ADC-4DDC-881B-597D56F5B15D}"/>
+          </ac:spMkLst>
+        </pc:spChg>
+        <pc:spChg chg="add del">
+          <ac:chgData name="Mike Saunders" userId="c0986ea9a2f2a984" providerId="LiveId" clId="{A88E1021-0D6E-4899-A132-129726DC3689}" dt="2024-07-17T23:04:35.333" v="218"/>
+          <ac:spMkLst>
+            <pc:docMk/>
+            <pc:sldMk cId="2120321798" sldId="260"/>
+            <ac:spMk id="11" creationId="{1199E1B1-A8C0-4FE8-A5A8-1CB41D69F857}"/>
+          </ac:spMkLst>
+        </pc:spChg>
+        <pc:spChg chg="add del">
+          <ac:chgData name="Mike Saunders" userId="c0986ea9a2f2a984" providerId="LiveId" clId="{A88E1021-0D6E-4899-A132-129726DC3689}" dt="2024-07-17T23:04:35.333" v="218"/>
+          <ac:spMkLst>
+            <pc:docMk/>
+            <pc:sldMk cId="2120321798" sldId="260"/>
+            <ac:spMk id="13" creationId="{84A8DE83-DE75-4B41-9DB4-A7EC0B0DEC0B}"/>
+          </ac:spMkLst>
+        </pc:spChg>
+        <pc:spChg chg="add del">
+          <ac:chgData name="Mike Saunders" userId="c0986ea9a2f2a984" providerId="LiveId" clId="{A88E1021-0D6E-4899-A132-129726DC3689}" dt="2024-07-17T23:04:35.333" v="218"/>
+          <ac:spMkLst>
+            <pc:docMk/>
+            <pc:sldMk cId="2120321798" sldId="260"/>
+            <ac:spMk id="15" creationId="{A7009A0A-BEF5-4EAC-AF15-E4F9F002E239}"/>
+          </ac:spMkLst>
+        </pc:spChg>
+        <pc:picChg chg="add mod">
+          <ac:chgData name="Mike Saunders" userId="c0986ea9a2f2a984" providerId="LiveId" clId="{A88E1021-0D6E-4899-A132-129726DC3689}" dt="2024-07-17T23:03:38.044" v="210" actId="14100"/>
+          <ac:picMkLst>
+            <pc:docMk/>
+            <pc:sldMk cId="2120321798" sldId="260"/>
+            <ac:picMk id="4" creationId="{AFB11A5D-B6D9-B1C9-FBE4-61CB4323AFEE}"/>
+          </ac:picMkLst>
+        </pc:picChg>
+        <pc:cxnChg chg="add mod">
+          <ac:chgData name="Mike Saunders" userId="c0986ea9a2f2a984" providerId="LiveId" clId="{A88E1021-0D6E-4899-A132-129726DC3689}" dt="2024-07-17T23:28:32.408" v="598" actId="14100"/>
+          <ac:cxnSpMkLst>
+            <pc:docMk/>
+            <pc:sldMk cId="2120321798" sldId="260"/>
+            <ac:cxnSpMk id="6" creationId="{C74810E2-0BBB-B9DE-309E-09B9D23FF9F3}"/>
+          </ac:cxnSpMkLst>
+        </pc:cxnChg>
+      </pc:sldChg>
+      <pc:sldChg chg="delSp add del mod setBg delDesignElem">
+        <pc:chgData name="Mike Saunders" userId="c0986ea9a2f2a984" providerId="LiveId" clId="{A88E1021-0D6E-4899-A132-129726DC3689}" dt="2024-07-17T23:04:47.047" v="221" actId="47"/>
+        <pc:sldMkLst>
+          <pc:docMk/>
+          <pc:sldMk cId="4066361515" sldId="261"/>
+        </pc:sldMkLst>
+        <pc:spChg chg="del">
+          <ac:chgData name="Mike Saunders" userId="c0986ea9a2f2a984" providerId="LiveId" clId="{A88E1021-0D6E-4899-A132-129726DC3689}" dt="2024-07-17T23:04:12.112" v="212"/>
+          <ac:spMkLst>
+            <pc:docMk/>
+            <pc:sldMk cId="4066361515" sldId="261"/>
+            <ac:spMk id="9" creationId="{A8384FB5-9ADC-4DDC-881B-597D56F5B15D}"/>
+          </ac:spMkLst>
+        </pc:spChg>
+        <pc:spChg chg="del">
+          <ac:chgData name="Mike Saunders" userId="c0986ea9a2f2a984" providerId="LiveId" clId="{A88E1021-0D6E-4899-A132-129726DC3689}" dt="2024-07-17T23:04:12.112" v="212"/>
+          <ac:spMkLst>
+            <pc:docMk/>
+            <pc:sldMk cId="4066361515" sldId="261"/>
+            <ac:spMk id="11" creationId="{1199E1B1-A8C0-4FE8-A5A8-1CB41D69F857}"/>
+          </ac:spMkLst>
+        </pc:spChg>
+        <pc:spChg chg="del">
+          <ac:chgData name="Mike Saunders" userId="c0986ea9a2f2a984" providerId="LiveId" clId="{A88E1021-0D6E-4899-A132-129726DC3689}" dt="2024-07-17T23:04:12.112" v="212"/>
+          <ac:spMkLst>
+            <pc:docMk/>
+            <pc:sldMk cId="4066361515" sldId="261"/>
+            <ac:spMk id="13" creationId="{84A8DE83-DE75-4B41-9DB4-A7EC0B0DEC0B}"/>
+          </ac:spMkLst>
+        </pc:spChg>
+        <pc:spChg chg="del">
+          <ac:chgData name="Mike Saunders" userId="c0986ea9a2f2a984" providerId="LiveId" clId="{A88E1021-0D6E-4899-A132-129726DC3689}" dt="2024-07-17T23:04:12.112" v="212"/>
+          <ac:spMkLst>
+            <pc:docMk/>
+            <pc:sldMk cId="4066361515" sldId="261"/>
+            <ac:spMk id="15" creationId="{A7009A0A-BEF5-4EAC-AF15-E4F9F002E239}"/>
+          </ac:spMkLst>
+        </pc:spChg>
+        <pc:picChg chg="del">
+          <ac:chgData name="Mike Saunders" userId="c0986ea9a2f2a984" providerId="LiveId" clId="{A88E1021-0D6E-4899-A132-129726DC3689}" dt="2024-07-17T23:04:16.709" v="213" actId="478"/>
+          <ac:picMkLst>
+            <pc:docMk/>
+            <pc:sldMk cId="4066361515" sldId="261"/>
+            <ac:picMk id="4" creationId="{AFB11A5D-B6D9-B1C9-FBE4-61CB4323AFEE}"/>
+          </ac:picMkLst>
+        </pc:picChg>
+      </pc:sldChg>
+      <pc:sldChg chg="addSp delSp modSp add mod setBg delDesignElem chgLayout">
+        <pc:chgData name="Mike Saunders" userId="c0986ea9a2f2a984" providerId="LiveId" clId="{A88E1021-0D6E-4899-A132-129726DC3689}" dt="2024-07-18T23:05:24.419" v="1477" actId="1076"/>
+        <pc:sldMkLst>
+          <pc:docMk/>
+          <pc:sldMk cId="3717669872" sldId="262"/>
+        </pc:sldMkLst>
+        <pc:spChg chg="mod ord">
+          <ac:chgData name="Mike Saunders" userId="c0986ea9a2f2a984" providerId="LiveId" clId="{A88E1021-0D6E-4899-A132-129726DC3689}" dt="2024-07-17T23:05:06.376" v="252" actId="20577"/>
+          <ac:spMkLst>
+            <pc:docMk/>
+            <pc:sldMk cId="3717669872" sldId="262"/>
+            <ac:spMk id="2" creationId="{50815309-FC43-BB74-ACF0-40E80AE85C97}"/>
+          </ac:spMkLst>
+        </pc:spChg>
+        <pc:spChg chg="add">
+          <ac:chgData name="Mike Saunders" userId="c0986ea9a2f2a984" providerId="LiveId" clId="{A88E1021-0D6E-4899-A132-129726DC3689}" dt="2024-07-17T23:04:57.335" v="223" actId="26606"/>
+          <ac:spMkLst>
+            <pc:docMk/>
+            <pc:sldMk cId="3717669872" sldId="262"/>
+            <ac:spMk id="6" creationId="{A8384FB5-9ADC-4DDC-881B-597D56F5B15D}"/>
+          </ac:spMkLst>
+        </pc:spChg>
+        <pc:spChg chg="add">
+          <ac:chgData name="Mike Saunders" userId="c0986ea9a2f2a984" providerId="LiveId" clId="{A88E1021-0D6E-4899-A132-129726DC3689}" dt="2024-07-17T23:04:57.335" v="223" actId="26606"/>
+          <ac:spMkLst>
+            <pc:docMk/>
+            <pc:sldMk cId="3717669872" sldId="262"/>
+            <ac:spMk id="7" creationId="{1199E1B1-A8C0-4FE8-A5A8-1CB41D69F857}"/>
+          </ac:spMkLst>
+        </pc:spChg>
+        <pc:spChg chg="add">
+          <ac:chgData name="Mike Saunders" userId="c0986ea9a2f2a984" providerId="LiveId" clId="{A88E1021-0D6E-4899-A132-129726DC3689}" dt="2024-07-17T23:04:57.335" v="223" actId="26606"/>
+          <ac:spMkLst>
+            <pc:docMk/>
+            <pc:sldMk cId="3717669872" sldId="262"/>
+            <ac:spMk id="8" creationId="{84A8DE83-DE75-4B41-9DB4-A7EC0B0DEC0B}"/>
+          </ac:spMkLst>
+        </pc:spChg>
+        <pc:spChg chg="del">
+          <ac:chgData name="Mike Saunders" userId="c0986ea9a2f2a984" providerId="LiveId" clId="{A88E1021-0D6E-4899-A132-129726DC3689}" dt="2024-07-17T23:04:45.058" v="220"/>
+          <ac:spMkLst>
+            <pc:docMk/>
+            <pc:sldMk cId="3717669872" sldId="262"/>
+            <ac:spMk id="9" creationId="{A8384FB5-9ADC-4DDC-881B-597D56F5B15D}"/>
+          </ac:spMkLst>
+        </pc:spChg>
+        <pc:spChg chg="add">
+          <ac:chgData name="Mike Saunders" userId="c0986ea9a2f2a984" providerId="LiveId" clId="{A88E1021-0D6E-4899-A132-129726DC3689}" dt="2024-07-17T23:04:57.335" v="223" actId="26606"/>
+          <ac:spMkLst>
+            <pc:docMk/>
+            <pc:sldMk cId="3717669872" sldId="262"/>
+            <ac:spMk id="10" creationId="{A7009A0A-BEF5-4EAC-AF15-E4F9F002E239}"/>
+          </ac:spMkLst>
+        </pc:spChg>
+        <pc:spChg chg="del">
+          <ac:chgData name="Mike Saunders" userId="c0986ea9a2f2a984" providerId="LiveId" clId="{A88E1021-0D6E-4899-A132-129726DC3689}" dt="2024-07-17T23:04:45.058" v="220"/>
+          <ac:spMkLst>
+            <pc:docMk/>
+            <pc:sldMk cId="3717669872" sldId="262"/>
+            <ac:spMk id="11" creationId="{1199E1B1-A8C0-4FE8-A5A8-1CB41D69F857}"/>
+          </ac:spMkLst>
+        </pc:spChg>
+        <pc:spChg chg="del">
+          <ac:chgData name="Mike Saunders" userId="c0986ea9a2f2a984" providerId="LiveId" clId="{A88E1021-0D6E-4899-A132-129726DC3689}" dt="2024-07-17T23:04:45.058" v="220"/>
+          <ac:spMkLst>
+            <pc:docMk/>
+            <pc:sldMk cId="3717669872" sldId="262"/>
+            <ac:spMk id="13" creationId="{84A8DE83-DE75-4B41-9DB4-A7EC0B0DEC0B}"/>
+          </ac:spMkLst>
+        </pc:spChg>
+        <pc:spChg chg="del">
+          <ac:chgData name="Mike Saunders" userId="c0986ea9a2f2a984" providerId="LiveId" clId="{A88E1021-0D6E-4899-A132-129726DC3689}" dt="2024-07-17T23:04:45.058" v="220"/>
+          <ac:spMkLst>
+            <pc:docMk/>
+            <pc:sldMk cId="3717669872" sldId="262"/>
+            <ac:spMk id="15" creationId="{A7009A0A-BEF5-4EAC-AF15-E4F9F002E239}"/>
+          </ac:spMkLst>
+        </pc:spChg>
+        <pc:picChg chg="del mod">
+          <ac:chgData name="Mike Saunders" userId="c0986ea9a2f2a984" providerId="LiveId" clId="{A88E1021-0D6E-4899-A132-129726DC3689}" dt="2024-07-17T23:05:31.953" v="253" actId="478"/>
+          <ac:picMkLst>
+            <pc:docMk/>
+            <pc:sldMk cId="3717669872" sldId="262"/>
+            <ac:picMk id="4" creationId="{AFB11A5D-B6D9-B1C9-FBE4-61CB4323AFEE}"/>
+          </ac:picMkLst>
+        </pc:picChg>
+        <pc:picChg chg="add del mod">
+          <ac:chgData name="Mike Saunders" userId="c0986ea9a2f2a984" providerId="LiveId" clId="{A88E1021-0D6E-4899-A132-129726DC3689}" dt="2024-07-17T23:05:49.842" v="258" actId="478"/>
+          <ac:picMkLst>
+            <pc:docMk/>
+            <pc:sldMk cId="3717669872" sldId="262"/>
+            <ac:picMk id="5" creationId="{B50C7A48-167F-EF8F-BB6D-360BDECE68FA}"/>
+          </ac:picMkLst>
+        </pc:picChg>
+        <pc:picChg chg="add mod">
+          <ac:chgData name="Mike Saunders" userId="c0986ea9a2f2a984" providerId="LiveId" clId="{A88E1021-0D6E-4899-A132-129726DC3689}" dt="2024-07-18T23:05:24.419" v="1477" actId="1076"/>
+          <ac:picMkLst>
+            <pc:docMk/>
+            <pc:sldMk cId="3717669872" sldId="262"/>
+            <ac:picMk id="14" creationId="{E6F4DC44-B925-36D1-2B98-0405F7380B72}"/>
+          </ac:picMkLst>
+        </pc:picChg>
+      </pc:sldChg>
+      <pc:sldChg chg="addSp delSp modSp new mod setBg">
+        <pc:chgData name="Mike Saunders" userId="c0986ea9a2f2a984" providerId="LiveId" clId="{A88E1021-0D6E-4899-A132-129726DC3689}" dt="2024-07-18T23:05:41.642" v="1480" actId="1076"/>
+        <pc:sldMkLst>
+          <pc:docMk/>
+          <pc:sldMk cId="276345597" sldId="263"/>
+        </pc:sldMkLst>
+        <pc:spChg chg="mod">
+          <ac:chgData name="Mike Saunders" userId="c0986ea9a2f2a984" providerId="LiveId" clId="{A88E1021-0D6E-4899-A132-129726DC3689}" dt="2024-07-17T23:08:34.331" v="352" actId="20577"/>
+          <ac:spMkLst>
+            <pc:docMk/>
+            <pc:sldMk cId="276345597" sldId="263"/>
+            <ac:spMk id="2" creationId="{56E94A04-04A0-FD3D-83EC-CBA731417051}"/>
+          </ac:spMkLst>
+        </pc:spChg>
+        <pc:spChg chg="add del">
+          <ac:chgData name="Mike Saunders" userId="c0986ea9a2f2a984" providerId="LiveId" clId="{A88E1021-0D6E-4899-A132-129726DC3689}" dt="2024-07-17T23:09:49.765" v="370" actId="22"/>
+          <ac:spMkLst>
+            <pc:docMk/>
+            <pc:sldMk cId="276345597" sldId="263"/>
+            <ac:spMk id="6" creationId="{4DA4E3A8-4FF8-32E7-5006-DCDE99E4428A}"/>
+          </ac:spMkLst>
+        </pc:spChg>
+        <pc:spChg chg="add mod">
+          <ac:chgData name="Mike Saunders" userId="c0986ea9a2f2a984" providerId="LiveId" clId="{A88E1021-0D6E-4899-A132-129726DC3689}" dt="2024-07-18T23:05:41.642" v="1480" actId="1076"/>
+          <ac:spMkLst>
+            <pc:docMk/>
+            <pc:sldMk cId="276345597" sldId="263"/>
+            <ac:spMk id="7" creationId="{7D1C0FCC-A79B-8D82-05D1-E4F87A5A0A11}"/>
+          </ac:spMkLst>
+        </pc:spChg>
+        <pc:spChg chg="add mod">
+          <ac:chgData name="Mike Saunders" userId="c0986ea9a2f2a984" providerId="LiveId" clId="{A88E1021-0D6E-4899-A132-129726DC3689}" dt="2024-07-17T23:30:03.863" v="670" actId="1076"/>
+          <ac:spMkLst>
+            <pc:docMk/>
+            <pc:sldMk cId="276345597" sldId="263"/>
+            <ac:spMk id="8" creationId="{FE3475D2-F4C3-8A97-18B2-E4A8557A37F1}"/>
+          </ac:spMkLst>
+        </pc:spChg>
+        <pc:spChg chg="add">
+          <ac:chgData name="Mike Saunders" userId="c0986ea9a2f2a984" providerId="LiveId" clId="{A88E1021-0D6E-4899-A132-129726DC3689}" dt="2024-07-17T23:06:36.788" v="264" actId="26606"/>
+          <ac:spMkLst>
+            <pc:docMk/>
+            <pc:sldMk cId="276345597" sldId="263"/>
+            <ac:spMk id="9" creationId="{A8384FB5-9ADC-4DDC-881B-597D56F5B15D}"/>
+          </ac:spMkLst>
+        </pc:spChg>
+        <pc:spChg chg="add">
+          <ac:chgData name="Mike Saunders" userId="c0986ea9a2f2a984" providerId="LiveId" clId="{A88E1021-0D6E-4899-A132-129726DC3689}" dt="2024-07-17T23:06:36.788" v="264" actId="26606"/>
+          <ac:spMkLst>
+            <pc:docMk/>
+            <pc:sldMk cId="276345597" sldId="263"/>
+            <ac:spMk id="11" creationId="{1199E1B1-A8C0-4FE8-A5A8-1CB41D69F857}"/>
+          </ac:spMkLst>
+        </pc:spChg>
+        <pc:spChg chg="add">
+          <ac:chgData name="Mike Saunders" userId="c0986ea9a2f2a984" providerId="LiveId" clId="{A88E1021-0D6E-4899-A132-129726DC3689}" dt="2024-07-17T23:06:36.788" v="264" actId="26606"/>
+          <ac:spMkLst>
+            <pc:docMk/>
+            <pc:sldMk cId="276345597" sldId="263"/>
+            <ac:spMk id="13" creationId="{84A8DE83-DE75-4B41-9DB4-A7EC0B0DEC0B}"/>
+          </ac:spMkLst>
+        </pc:spChg>
+        <pc:spChg chg="add">
+          <ac:chgData name="Mike Saunders" userId="c0986ea9a2f2a984" providerId="LiveId" clId="{A88E1021-0D6E-4899-A132-129726DC3689}" dt="2024-07-17T23:06:36.788" v="264" actId="26606"/>
+          <ac:spMkLst>
+            <pc:docMk/>
+            <pc:sldMk cId="276345597" sldId="263"/>
+            <ac:spMk id="15" creationId="{A7009A0A-BEF5-4EAC-AF15-E4F9F002E239}"/>
+          </ac:spMkLst>
+        </pc:spChg>
+        <pc:picChg chg="add mod">
+          <ac:chgData name="Mike Saunders" userId="c0986ea9a2f2a984" providerId="LiveId" clId="{A88E1021-0D6E-4899-A132-129726DC3689}" dt="2024-07-17T23:10:29.681" v="407" actId="1076"/>
+          <ac:picMkLst>
+            <pc:docMk/>
+            <pc:sldMk cId="276345597" sldId="263"/>
+            <ac:picMk id="4" creationId="{C4DBCB93-80C3-93E1-3170-3098373C6715}"/>
+          </ac:picMkLst>
+        </pc:picChg>
+      </pc:sldChg>
+      <pc:sldChg chg="addSp delSp add del setBg delDesignElem">
+        <pc:chgData name="Mike Saunders" userId="c0986ea9a2f2a984" providerId="LiveId" clId="{A88E1021-0D6E-4899-A132-129726DC3689}" dt="2024-07-18T00:33:58.662" v="1316"/>
+        <pc:sldMkLst>
+          <pc:docMk/>
+          <pc:sldMk cId="1340483109" sldId="264"/>
+        </pc:sldMkLst>
+        <pc:spChg chg="add del">
+          <ac:chgData name="Mike Saunders" userId="c0986ea9a2f2a984" providerId="LiveId" clId="{A88E1021-0D6E-4899-A132-129726DC3689}" dt="2024-07-18T00:33:58.662" v="1316"/>
+          <ac:spMkLst>
+            <pc:docMk/>
+            <pc:sldMk cId="1340483109" sldId="264"/>
+            <ac:spMk id="9" creationId="{A8384FB5-9ADC-4DDC-881B-597D56F5B15D}"/>
+          </ac:spMkLst>
+        </pc:spChg>
+        <pc:spChg chg="add del">
+          <ac:chgData name="Mike Saunders" userId="c0986ea9a2f2a984" providerId="LiveId" clId="{A88E1021-0D6E-4899-A132-129726DC3689}" dt="2024-07-18T00:33:58.662" v="1316"/>
+          <ac:spMkLst>
+            <pc:docMk/>
+            <pc:sldMk cId="1340483109" sldId="264"/>
+            <ac:spMk id="11" creationId="{1199E1B1-A8C0-4FE8-A5A8-1CB41D69F857}"/>
+          </ac:spMkLst>
+        </pc:spChg>
+        <pc:spChg chg="add del">
+          <ac:chgData name="Mike Saunders" userId="c0986ea9a2f2a984" providerId="LiveId" clId="{A88E1021-0D6E-4899-A132-129726DC3689}" dt="2024-07-18T00:33:58.662" v="1316"/>
+          <ac:spMkLst>
+            <pc:docMk/>
+            <pc:sldMk cId="1340483109" sldId="264"/>
+            <ac:spMk id="13" creationId="{84A8DE83-DE75-4B41-9DB4-A7EC0B0DEC0B}"/>
+          </ac:spMkLst>
+        </pc:spChg>
+        <pc:spChg chg="add del">
+          <ac:chgData name="Mike Saunders" userId="c0986ea9a2f2a984" providerId="LiveId" clId="{A88E1021-0D6E-4899-A132-129726DC3689}" dt="2024-07-18T00:33:58.662" v="1316"/>
+          <ac:spMkLst>
+            <pc:docMk/>
+            <pc:sldMk cId="1340483109" sldId="264"/>
+            <ac:spMk id="15" creationId="{A7009A0A-BEF5-4EAC-AF15-E4F9F002E239}"/>
+          </ac:spMkLst>
+        </pc:spChg>
+      </pc:sldChg>
+      <pc:sldChg chg="addSp modSp new add del mod ord setBg">
+        <pc:chgData name="Mike Saunders" userId="c0986ea9a2f2a984" providerId="LiveId" clId="{A88E1021-0D6E-4899-A132-129726DC3689}" dt="2024-07-18T23:58:18.963" v="1508" actId="207"/>
+        <pc:sldMkLst>
+          <pc:docMk/>
+          <pc:sldMk cId="2038907524" sldId="264"/>
+        </pc:sldMkLst>
+        <pc:spChg chg="mod">
+          <ac:chgData name="Mike Saunders" userId="c0986ea9a2f2a984" providerId="LiveId" clId="{A88E1021-0D6E-4899-A132-129726DC3689}" dt="2024-07-17T23:08:29.506" v="341" actId="20577"/>
+          <ac:spMkLst>
+            <pc:docMk/>
+            <pc:sldMk cId="2038907524" sldId="264"/>
+            <ac:spMk id="2" creationId="{03B76D06-025D-EB1E-9E89-B631CD9CF719}"/>
+          </ac:spMkLst>
+        </pc:spChg>
+        <pc:spChg chg="add mod">
+          <ac:chgData name="Mike Saunders" userId="c0986ea9a2f2a984" providerId="LiveId" clId="{A88E1021-0D6E-4899-A132-129726DC3689}" dt="2024-07-18T23:58:18.963" v="1508" actId="207"/>
+          <ac:spMkLst>
+            <pc:docMk/>
+            <pc:sldMk cId="2038907524" sldId="264"/>
+            <ac:spMk id="5" creationId="{D2871EBF-C9C9-567C-D518-945B1D0C72BA}"/>
+          </ac:spMkLst>
+        </pc:spChg>
+        <pc:spChg chg="add mod">
+          <ac:chgData name="Mike Saunders" userId="c0986ea9a2f2a984" providerId="LiveId" clId="{A88E1021-0D6E-4899-A132-129726DC3689}" dt="2024-07-17T23:30:08.881" v="671"/>
+          <ac:spMkLst>
+            <pc:docMk/>
+            <pc:sldMk cId="2038907524" sldId="264"/>
+            <ac:spMk id="6" creationId="{7FF9EF46-0D10-2FBF-4776-9F711BC9802A}"/>
+          </ac:spMkLst>
+        </pc:spChg>
+        <pc:spChg chg="add">
+          <ac:chgData name="Mike Saunders" userId="c0986ea9a2f2a984" providerId="LiveId" clId="{A88E1021-0D6E-4899-A132-129726DC3689}" dt="2024-07-17T23:08:18.661" v="326" actId="26606"/>
+          <ac:spMkLst>
+            <pc:docMk/>
+            <pc:sldMk cId="2038907524" sldId="264"/>
+            <ac:spMk id="9" creationId="{A8384FB5-9ADC-4DDC-881B-597D56F5B15D}"/>
+          </ac:spMkLst>
+        </pc:spChg>
+        <pc:spChg chg="add">
+          <ac:chgData name="Mike Saunders" userId="c0986ea9a2f2a984" providerId="LiveId" clId="{A88E1021-0D6E-4899-A132-129726DC3689}" dt="2024-07-17T23:08:18.661" v="326" actId="26606"/>
+          <ac:spMkLst>
+            <pc:docMk/>
+            <pc:sldMk cId="2038907524" sldId="264"/>
+            <ac:spMk id="11" creationId="{1199E1B1-A8C0-4FE8-A5A8-1CB41D69F857}"/>
+          </ac:spMkLst>
+        </pc:spChg>
+        <pc:spChg chg="add">
+          <ac:chgData name="Mike Saunders" userId="c0986ea9a2f2a984" providerId="LiveId" clId="{A88E1021-0D6E-4899-A132-129726DC3689}" dt="2024-07-17T23:08:18.661" v="326" actId="26606"/>
+          <ac:spMkLst>
+            <pc:docMk/>
+            <pc:sldMk cId="2038907524" sldId="264"/>
+            <ac:spMk id="13" creationId="{84A8DE83-DE75-4B41-9DB4-A7EC0B0DEC0B}"/>
+          </ac:spMkLst>
+        </pc:spChg>
+        <pc:spChg chg="add">
+          <ac:chgData name="Mike Saunders" userId="c0986ea9a2f2a984" providerId="LiveId" clId="{A88E1021-0D6E-4899-A132-129726DC3689}" dt="2024-07-17T23:08:18.661" v="326" actId="26606"/>
+          <ac:spMkLst>
+            <pc:docMk/>
+            <pc:sldMk cId="2038907524" sldId="264"/>
+            <ac:spMk id="15" creationId="{A7009A0A-BEF5-4EAC-AF15-E4F9F002E239}"/>
+          </ac:spMkLst>
+        </pc:spChg>
+        <pc:picChg chg="add mod">
+          <ac:chgData name="Mike Saunders" userId="c0986ea9a2f2a984" providerId="LiveId" clId="{A88E1021-0D6E-4899-A132-129726DC3689}" dt="2024-07-17T23:08:18.661" v="326" actId="26606"/>
+          <ac:picMkLst>
+            <pc:docMk/>
+            <pc:sldMk cId="2038907524" sldId="264"/>
+            <ac:picMk id="4" creationId="{69A72209-1EE0-2F90-380E-8A052706DC1C}"/>
+          </ac:picMkLst>
+        </pc:picChg>
+      </pc:sldChg>
+      <pc:sldChg chg="addSp delSp add del setBg delDesignElem">
+        <pc:chgData name="Mike Saunders" userId="c0986ea9a2f2a984" providerId="LiveId" clId="{A88E1021-0D6E-4899-A132-129726DC3689}" dt="2024-07-18T00:33:58.662" v="1316"/>
+        <pc:sldMkLst>
+          <pc:docMk/>
+          <pc:sldMk cId="1022878573" sldId="265"/>
+        </pc:sldMkLst>
+        <pc:spChg chg="add del">
+          <ac:chgData name="Mike Saunders" userId="c0986ea9a2f2a984" providerId="LiveId" clId="{A88E1021-0D6E-4899-A132-129726DC3689}" dt="2024-07-18T00:33:58.662" v="1316"/>
+          <ac:spMkLst>
+            <pc:docMk/>
+            <pc:sldMk cId="1022878573" sldId="265"/>
+            <ac:spMk id="9" creationId="{A8384FB5-9ADC-4DDC-881B-597D56F5B15D}"/>
+          </ac:spMkLst>
+        </pc:spChg>
+        <pc:spChg chg="add del">
+          <ac:chgData name="Mike Saunders" userId="c0986ea9a2f2a984" providerId="LiveId" clId="{A88E1021-0D6E-4899-A132-129726DC3689}" dt="2024-07-18T00:33:58.662" v="1316"/>
+          <ac:spMkLst>
+            <pc:docMk/>
+            <pc:sldMk cId="1022878573" sldId="265"/>
+            <ac:spMk id="11" creationId="{1199E1B1-A8C0-4FE8-A5A8-1CB41D69F857}"/>
+          </ac:spMkLst>
+        </pc:spChg>
+        <pc:spChg chg="add del">
+          <ac:chgData name="Mike Saunders" userId="c0986ea9a2f2a984" providerId="LiveId" clId="{A88E1021-0D6E-4899-A132-129726DC3689}" dt="2024-07-18T00:33:58.662" v="1316"/>
+          <ac:spMkLst>
+            <pc:docMk/>
+            <pc:sldMk cId="1022878573" sldId="265"/>
+            <ac:spMk id="13" creationId="{84A8DE83-DE75-4B41-9DB4-A7EC0B0DEC0B}"/>
+          </ac:spMkLst>
+        </pc:spChg>
+        <pc:spChg chg="add del">
+          <ac:chgData name="Mike Saunders" userId="c0986ea9a2f2a984" providerId="LiveId" clId="{A88E1021-0D6E-4899-A132-129726DC3689}" dt="2024-07-18T00:33:58.662" v="1316"/>
+          <ac:spMkLst>
+            <pc:docMk/>
+            <pc:sldMk cId="1022878573" sldId="265"/>
+            <ac:spMk id="15" creationId="{A7009A0A-BEF5-4EAC-AF15-E4F9F002E239}"/>
+          </ac:spMkLst>
+        </pc:spChg>
+      </pc:sldChg>
+      <pc:sldChg chg="addSp modSp new add del mod ord setBg">
+        <pc:chgData name="Mike Saunders" userId="c0986ea9a2f2a984" providerId="LiveId" clId="{A88E1021-0D6E-4899-A132-129726DC3689}" dt="2024-07-18T23:58:13.187" v="1506" actId="207"/>
+        <pc:sldMkLst>
+          <pc:docMk/>
+          <pc:sldMk cId="3741511294" sldId="265"/>
+        </pc:sldMkLst>
+        <pc:spChg chg="mod">
+          <ac:chgData name="Mike Saunders" userId="c0986ea9a2f2a984" providerId="LiveId" clId="{A88E1021-0D6E-4899-A132-129726DC3689}" dt="2024-07-17T23:09:08.850" v="368" actId="20577"/>
+          <ac:spMkLst>
+            <pc:docMk/>
+            <pc:sldMk cId="3741511294" sldId="265"/>
+            <ac:spMk id="2" creationId="{A7BF1CC6-6F79-011F-31C7-ACAC4CD300A9}"/>
+          </ac:spMkLst>
+        </pc:spChg>
+        <pc:spChg chg="add mod">
+          <ac:chgData name="Mike Saunders" userId="c0986ea9a2f2a984" providerId="LiveId" clId="{A88E1021-0D6E-4899-A132-129726DC3689}" dt="2024-07-18T23:58:13.187" v="1506" actId="207"/>
+          <ac:spMkLst>
+            <pc:docMk/>
+            <pc:sldMk cId="3741511294" sldId="265"/>
+            <ac:spMk id="5" creationId="{C38563DC-48A6-78B7-EE16-C7A41F983135}"/>
+          </ac:spMkLst>
+        </pc:spChg>
+        <pc:spChg chg="add mod">
+          <ac:chgData name="Mike Saunders" userId="c0986ea9a2f2a984" providerId="LiveId" clId="{A88E1021-0D6E-4899-A132-129726DC3689}" dt="2024-07-17T23:30:11.171" v="672"/>
+          <ac:spMkLst>
+            <pc:docMk/>
+            <pc:sldMk cId="3741511294" sldId="265"/>
+            <ac:spMk id="6" creationId="{414C7F17-38AC-F954-4FAE-E27ABC1D405F}"/>
+          </ac:spMkLst>
+        </pc:spChg>
+        <pc:spChg chg="add">
+          <ac:chgData name="Mike Saunders" userId="c0986ea9a2f2a984" providerId="LiveId" clId="{A88E1021-0D6E-4899-A132-129726DC3689}" dt="2024-07-17T23:08:57.846" v="355" actId="26606"/>
+          <ac:spMkLst>
+            <pc:docMk/>
+            <pc:sldMk cId="3741511294" sldId="265"/>
+            <ac:spMk id="9" creationId="{A8384FB5-9ADC-4DDC-881B-597D56F5B15D}"/>
+          </ac:spMkLst>
+        </pc:spChg>
+        <pc:spChg chg="add">
+          <ac:chgData name="Mike Saunders" userId="c0986ea9a2f2a984" providerId="LiveId" clId="{A88E1021-0D6E-4899-A132-129726DC3689}" dt="2024-07-17T23:08:57.846" v="355" actId="26606"/>
+          <ac:spMkLst>
+            <pc:docMk/>
+            <pc:sldMk cId="3741511294" sldId="265"/>
+            <ac:spMk id="11" creationId="{1199E1B1-A8C0-4FE8-A5A8-1CB41D69F857}"/>
+          </ac:spMkLst>
+        </pc:spChg>
+        <pc:spChg chg="add">
+          <ac:chgData name="Mike Saunders" userId="c0986ea9a2f2a984" providerId="LiveId" clId="{A88E1021-0D6E-4899-A132-129726DC3689}" dt="2024-07-17T23:08:57.846" v="355" actId="26606"/>
+          <ac:spMkLst>
+            <pc:docMk/>
+            <pc:sldMk cId="3741511294" sldId="265"/>
+            <ac:spMk id="13" creationId="{84A8DE83-DE75-4B41-9DB4-A7EC0B0DEC0B}"/>
+          </ac:spMkLst>
+        </pc:spChg>
+        <pc:spChg chg="add">
+          <ac:chgData name="Mike Saunders" userId="c0986ea9a2f2a984" providerId="LiveId" clId="{A88E1021-0D6E-4899-A132-129726DC3689}" dt="2024-07-17T23:08:57.846" v="355" actId="26606"/>
+          <ac:spMkLst>
+            <pc:docMk/>
+            <pc:sldMk cId="3741511294" sldId="265"/>
+            <ac:spMk id="15" creationId="{A7009A0A-BEF5-4EAC-AF15-E4F9F002E239}"/>
+          </ac:spMkLst>
+        </pc:spChg>
+        <pc:picChg chg="add mod">
+          <ac:chgData name="Mike Saunders" userId="c0986ea9a2f2a984" providerId="LiveId" clId="{A88E1021-0D6E-4899-A132-129726DC3689}" dt="2024-07-17T23:08:57.846" v="355" actId="26606"/>
+          <ac:picMkLst>
+            <pc:docMk/>
+            <pc:sldMk cId="3741511294" sldId="265"/>
+            <ac:picMk id="4" creationId="{D0E244AC-30E3-6266-4D46-ADFA92B04005}"/>
+          </ac:picMkLst>
+        </pc:picChg>
+      </pc:sldChg>
+      <pc:sldChg chg="addSp delSp modSp new mod setBg">
+        <pc:chgData name="Mike Saunders" userId="c0986ea9a2f2a984" providerId="LiveId" clId="{A88E1021-0D6E-4899-A132-129726DC3689}" dt="2024-07-18T23:57:15.332" v="1492" actId="1076"/>
+        <pc:sldMkLst>
+          <pc:docMk/>
+          <pc:sldMk cId="1422104089" sldId="266"/>
+        </pc:sldMkLst>
+        <pc:spChg chg="mod">
+          <ac:chgData name="Mike Saunders" userId="c0986ea9a2f2a984" providerId="LiveId" clId="{A88E1021-0D6E-4899-A132-129726DC3689}" dt="2024-07-17T23:12:05.093" v="513" actId="313"/>
+          <ac:spMkLst>
+            <pc:docMk/>
+            <pc:sldMk cId="1422104089" sldId="266"/>
+            <ac:spMk id="2" creationId="{D1333616-2EEA-6564-B310-AAF69F6E51BD}"/>
+          </ac:spMkLst>
+        </pc:spChg>
+        <pc:spChg chg="add mod">
+          <ac:chgData name="Mike Saunders" userId="c0986ea9a2f2a984" providerId="LiveId" clId="{A88E1021-0D6E-4899-A132-129726DC3689}" dt="2024-07-18T23:05:48.081" v="1482" actId="207"/>
+          <ac:spMkLst>
+            <pc:docMk/>
+            <pc:sldMk cId="1422104089" sldId="266"/>
+            <ac:spMk id="5" creationId="{EAF90190-4388-A7D3-DA3D-D76795FE8B18}"/>
+          </ac:spMkLst>
+        </pc:spChg>
+        <pc:spChg chg="add">
+          <ac:chgData name="Mike Saunders" userId="c0986ea9a2f2a984" providerId="LiveId" clId="{A88E1021-0D6E-4899-A132-129726DC3689}" dt="2024-07-17T23:11:28.119" v="436" actId="26606"/>
+          <ac:spMkLst>
+            <pc:docMk/>
+            <pc:sldMk cId="1422104089" sldId="266"/>
+            <ac:spMk id="9" creationId="{A8384FB5-9ADC-4DDC-881B-597D56F5B15D}"/>
+          </ac:spMkLst>
+        </pc:spChg>
+        <pc:spChg chg="add">
+          <ac:chgData name="Mike Saunders" userId="c0986ea9a2f2a984" providerId="LiveId" clId="{A88E1021-0D6E-4899-A132-129726DC3689}" dt="2024-07-17T23:11:28.119" v="436" actId="26606"/>
+          <ac:spMkLst>
+            <pc:docMk/>
+            <pc:sldMk cId="1422104089" sldId="266"/>
+            <ac:spMk id="11" creationId="{1199E1B1-A8C0-4FE8-A5A8-1CB41D69F857}"/>
+          </ac:spMkLst>
+        </pc:spChg>
+        <pc:spChg chg="add">
+          <ac:chgData name="Mike Saunders" userId="c0986ea9a2f2a984" providerId="LiveId" clId="{A88E1021-0D6E-4899-A132-129726DC3689}" dt="2024-07-17T23:11:28.119" v="436" actId="26606"/>
+          <ac:spMkLst>
+            <pc:docMk/>
+            <pc:sldMk cId="1422104089" sldId="266"/>
+            <ac:spMk id="13" creationId="{84A8DE83-DE75-4B41-9DB4-A7EC0B0DEC0B}"/>
+          </ac:spMkLst>
+        </pc:spChg>
+        <pc:spChg chg="add">
+          <ac:chgData name="Mike Saunders" userId="c0986ea9a2f2a984" providerId="LiveId" clId="{A88E1021-0D6E-4899-A132-129726DC3689}" dt="2024-07-17T23:11:28.119" v="436" actId="26606"/>
+          <ac:spMkLst>
+            <pc:docMk/>
+            <pc:sldMk cId="1422104089" sldId="266"/>
+            <ac:spMk id="15" creationId="{A7009A0A-BEF5-4EAC-AF15-E4F9F002E239}"/>
+          </ac:spMkLst>
+        </pc:spChg>
+        <pc:picChg chg="add del mod">
+          <ac:chgData name="Mike Saunders" userId="c0986ea9a2f2a984" providerId="LiveId" clId="{A88E1021-0D6E-4899-A132-129726DC3689}" dt="2024-07-17T23:36:03.240" v="681" actId="478"/>
+          <ac:picMkLst>
+            <pc:docMk/>
+            <pc:sldMk cId="1422104089" sldId="266"/>
+            <ac:picMk id="4" creationId="{43AE4657-AE23-238F-44E4-166477C7D39E}"/>
+          </ac:picMkLst>
+        </pc:picChg>
+        <pc:picChg chg="add mod">
+          <ac:chgData name="Mike Saunders" userId="c0986ea9a2f2a984" providerId="LiveId" clId="{A88E1021-0D6E-4899-A132-129726DC3689}" dt="2024-07-18T23:57:15.332" v="1492" actId="1076"/>
+          <ac:picMkLst>
+            <pc:docMk/>
+            <pc:sldMk cId="1422104089" sldId="266"/>
+            <ac:picMk id="4" creationId="{9F38D1A3-3912-C330-57FD-9F39901AE33E}"/>
+          </ac:picMkLst>
+        </pc:picChg>
+        <pc:picChg chg="add del mod">
+          <ac:chgData name="Mike Saunders" userId="c0986ea9a2f2a984" providerId="LiveId" clId="{A88E1021-0D6E-4899-A132-129726DC3689}" dt="2024-07-17T23:39:31.977" v="695" actId="478"/>
+          <ac:picMkLst>
+            <pc:docMk/>
+            <pc:sldMk cId="1422104089" sldId="266"/>
+            <ac:picMk id="7" creationId="{A2033911-B16F-3CE2-EF44-00ED23A00158}"/>
+          </ac:picMkLst>
+        </pc:picChg>
+        <pc:picChg chg="add del mod">
+          <ac:chgData name="Mike Saunders" userId="c0986ea9a2f2a984" providerId="LiveId" clId="{A88E1021-0D6E-4899-A132-129726DC3689}" dt="2024-07-17T23:46:09.996" v="706" actId="478"/>
+          <ac:picMkLst>
+            <pc:docMk/>
+            <pc:sldMk cId="1422104089" sldId="266"/>
+            <ac:picMk id="10" creationId="{56630511-6AAE-4A57-3882-1526A862A13B}"/>
+          </ac:picMkLst>
+        </pc:picChg>
+        <pc:picChg chg="add del mod">
+          <ac:chgData name="Mike Saunders" userId="c0986ea9a2f2a984" providerId="LiveId" clId="{A88E1021-0D6E-4899-A132-129726DC3689}" dt="2024-07-17T23:55:59.104" v="1207" actId="478"/>
+          <ac:picMkLst>
+            <pc:docMk/>
+            <pc:sldMk cId="1422104089" sldId="266"/>
+            <ac:picMk id="14" creationId="{AF10516F-D696-3BE3-B828-661B07B2C0BF}"/>
+          </ac:picMkLst>
+        </pc:picChg>
+        <pc:picChg chg="add del mod">
+          <ac:chgData name="Mike Saunders" userId="c0986ea9a2f2a984" providerId="LiveId" clId="{A88E1021-0D6E-4899-A132-129726DC3689}" dt="2024-07-18T23:57:07.603" v="1489" actId="478"/>
+          <ac:picMkLst>
+            <pc:docMk/>
+            <pc:sldMk cId="1422104089" sldId="266"/>
+            <ac:picMk id="17" creationId="{B71906B2-FED4-2ACF-0004-B126DC26D308}"/>
+          </ac:picMkLst>
+        </pc:picChg>
+      </pc:sldChg>
+      <pc:sldChg chg="addSp delSp modSp new mod ord setBg">
+        <pc:chgData name="Mike Saunders" userId="c0986ea9a2f2a984" providerId="LiveId" clId="{A88E1021-0D6E-4899-A132-129726DC3689}" dt="2024-07-18T23:57:57.014" v="1502" actId="207"/>
+        <pc:sldMkLst>
+          <pc:docMk/>
+          <pc:sldMk cId="3423382430" sldId="267"/>
+        </pc:sldMkLst>
+        <pc:spChg chg="mod">
+          <ac:chgData name="Mike Saunders" userId="c0986ea9a2f2a984" providerId="LiveId" clId="{A88E1021-0D6E-4899-A132-129726DC3689}" dt="2024-07-17T23:47:19.887" v="729" actId="20577"/>
+          <ac:spMkLst>
+            <pc:docMk/>
+            <pc:sldMk cId="3423382430" sldId="267"/>
+            <ac:spMk id="2" creationId="{9143A132-7F4F-094C-E7A9-B77557C2B703}"/>
+          </ac:spMkLst>
+        </pc:spChg>
+        <pc:spChg chg="add mod">
+          <ac:chgData name="Mike Saunders" userId="c0986ea9a2f2a984" providerId="LiveId" clId="{A88E1021-0D6E-4899-A132-129726DC3689}" dt="2024-07-18T23:57:57.014" v="1502" actId="207"/>
+          <ac:spMkLst>
+            <pc:docMk/>
+            <pc:sldMk cId="3423382430" sldId="267"/>
+            <ac:spMk id="5" creationId="{FB21D110-6E68-A1A1-516F-344BE6F60F47}"/>
+          </ac:spMkLst>
+        </pc:spChg>
+        <pc:spChg chg="add">
+          <ac:chgData name="Mike Saunders" userId="c0986ea9a2f2a984" providerId="LiveId" clId="{A88E1021-0D6E-4899-A132-129726DC3689}" dt="2024-07-17T23:12:29.688" v="516" actId="26606"/>
+          <ac:spMkLst>
+            <pc:docMk/>
+            <pc:sldMk cId="3423382430" sldId="267"/>
+            <ac:spMk id="9" creationId="{A8384FB5-9ADC-4DDC-881B-597D56F5B15D}"/>
+          </ac:spMkLst>
+        </pc:spChg>
+        <pc:spChg chg="add">
+          <ac:chgData name="Mike Saunders" userId="c0986ea9a2f2a984" providerId="LiveId" clId="{A88E1021-0D6E-4899-A132-129726DC3689}" dt="2024-07-17T23:12:29.688" v="516" actId="26606"/>
+          <ac:spMkLst>
+            <pc:docMk/>
+            <pc:sldMk cId="3423382430" sldId="267"/>
+            <ac:spMk id="11" creationId="{1199E1B1-A8C0-4FE8-A5A8-1CB41D69F857}"/>
+          </ac:spMkLst>
+        </pc:spChg>
+        <pc:spChg chg="add">
+          <ac:chgData name="Mike Saunders" userId="c0986ea9a2f2a984" providerId="LiveId" clId="{A88E1021-0D6E-4899-A132-129726DC3689}" dt="2024-07-17T23:12:29.688" v="516" actId="26606"/>
+          <ac:spMkLst>
+            <pc:docMk/>
+            <pc:sldMk cId="3423382430" sldId="267"/>
+            <ac:spMk id="13" creationId="{84A8DE83-DE75-4B41-9DB4-A7EC0B0DEC0B}"/>
+          </ac:spMkLst>
+        </pc:spChg>
+        <pc:spChg chg="add">
+          <ac:chgData name="Mike Saunders" userId="c0986ea9a2f2a984" providerId="LiveId" clId="{A88E1021-0D6E-4899-A132-129726DC3689}" dt="2024-07-17T23:12:29.688" v="516" actId="26606"/>
+          <ac:spMkLst>
+            <pc:docMk/>
+            <pc:sldMk cId="3423382430" sldId="267"/>
+            <ac:spMk id="15" creationId="{A7009A0A-BEF5-4EAC-AF15-E4F9F002E239}"/>
+          </ac:spMkLst>
+        </pc:spChg>
+        <pc:picChg chg="add mod">
+          <ac:chgData name="Mike Saunders" userId="c0986ea9a2f2a984" providerId="LiveId" clId="{A88E1021-0D6E-4899-A132-129726DC3689}" dt="2024-07-18T23:57:49.869" v="1500" actId="1076"/>
+          <ac:picMkLst>
+            <pc:docMk/>
+            <pc:sldMk cId="3423382430" sldId="267"/>
+            <ac:picMk id="4" creationId="{038C7811-DC8A-79E5-FBA3-378944F1E9C9}"/>
+          </ac:picMkLst>
+        </pc:picChg>
+        <pc:picChg chg="add del mod">
+          <ac:chgData name="Mike Saunders" userId="c0986ea9a2f2a984" providerId="LiveId" clId="{A88E1021-0D6E-4899-A132-129726DC3689}" dt="2024-07-17T23:35:55.386" v="677" actId="478"/>
+          <ac:picMkLst>
+            <pc:docMk/>
+            <pc:sldMk cId="3423382430" sldId="267"/>
+            <ac:picMk id="4" creationId="{2C285E4D-CD2B-0BD1-D81F-CD44B8DC62FE}"/>
+          </ac:picMkLst>
+        </pc:picChg>
+        <pc:picChg chg="add del mod">
+          <ac:chgData name="Mike Saunders" userId="c0986ea9a2f2a984" providerId="LiveId" clId="{A88E1021-0D6E-4899-A132-129726DC3689}" dt="2024-07-17T23:38:40.027" v="691" actId="478"/>
+          <ac:picMkLst>
+            <pc:docMk/>
+            <pc:sldMk cId="3423382430" sldId="267"/>
+            <ac:picMk id="7" creationId="{765FA99A-086C-E824-1EA1-4EA1A0BEB97A}"/>
+          </ac:picMkLst>
+        </pc:picChg>
+        <pc:picChg chg="add del mod">
+          <ac:chgData name="Mike Saunders" userId="c0986ea9a2f2a984" providerId="LiveId" clId="{A88E1021-0D6E-4899-A132-129726DC3689}" dt="2024-07-17T23:43:26.173" v="700" actId="478"/>
+          <ac:picMkLst>
+            <pc:docMk/>
+            <pc:sldMk cId="3423382430" sldId="267"/>
+            <ac:picMk id="10" creationId="{AC72BE52-E796-5686-5DB6-26A9EF53722F}"/>
+          </ac:picMkLst>
+        </pc:picChg>
+        <pc:picChg chg="add del mod">
+          <ac:chgData name="Mike Saunders" userId="c0986ea9a2f2a984" providerId="LiveId" clId="{A88E1021-0D6E-4899-A132-129726DC3689}" dt="2024-07-17T23:46:22.532" v="710" actId="478"/>
+          <ac:picMkLst>
+            <pc:docMk/>
+            <pc:sldMk cId="3423382430" sldId="267"/>
+            <ac:picMk id="14" creationId="{A1143319-DED5-8B74-21AB-6E3C0BBDA17C}"/>
+          </ac:picMkLst>
+        </pc:picChg>
+        <pc:picChg chg="add del mod">
+          <ac:chgData name="Mike Saunders" userId="c0986ea9a2f2a984" providerId="LiveId" clId="{A88E1021-0D6E-4899-A132-129726DC3689}" dt="2024-07-17T23:56:35.229" v="1212" actId="478"/>
+          <ac:picMkLst>
+            <pc:docMk/>
+            <pc:sldMk cId="3423382430" sldId="267"/>
+            <ac:picMk id="17" creationId="{3AA6172E-41F0-100E-0E68-4A54287F4D81}"/>
+          </ac:picMkLst>
+        </pc:picChg>
+        <pc:picChg chg="add del mod">
+          <ac:chgData name="Mike Saunders" userId="c0986ea9a2f2a984" providerId="LiveId" clId="{A88E1021-0D6E-4899-A132-129726DC3689}" dt="2024-07-18T23:57:36.938" v="1497" actId="478"/>
+          <ac:picMkLst>
+            <pc:docMk/>
+            <pc:sldMk cId="3423382430" sldId="267"/>
+            <ac:picMk id="19" creationId="{C0AC1AB0-9313-08BA-D191-FFCEC26F8885}"/>
+          </ac:picMkLst>
+        </pc:picChg>
+      </pc:sldChg>
+      <pc:sldChg chg="addSp delSp modSp new mod ord setBg">
+        <pc:chgData name="Mike Saunders" userId="c0986ea9a2f2a984" providerId="LiveId" clId="{A88E1021-0D6E-4899-A132-129726DC3689}" dt="2024-07-18T23:57:31.170" v="1496" actId="1076"/>
+        <pc:sldMkLst>
+          <pc:docMk/>
+          <pc:sldMk cId="547791207" sldId="268"/>
+        </pc:sldMkLst>
+        <pc:spChg chg="mod">
+          <ac:chgData name="Mike Saunders" userId="c0986ea9a2f2a984" providerId="LiveId" clId="{A88E1021-0D6E-4899-A132-129726DC3689}" dt="2024-07-17T23:47:24.522" v="738" actId="20577"/>
+          <ac:spMkLst>
+            <pc:docMk/>
+            <pc:sldMk cId="547791207" sldId="268"/>
+            <ac:spMk id="2" creationId="{072D2E6C-D7D9-5A19-EBA3-F361325D660C}"/>
+          </ac:spMkLst>
+        </pc:spChg>
+        <pc:spChg chg="add mod">
+          <ac:chgData name="Mike Saunders" userId="c0986ea9a2f2a984" providerId="LiveId" clId="{A88E1021-0D6E-4899-A132-129726DC3689}" dt="2024-07-17T23:14:16.315" v="545" actId="20577"/>
+          <ac:spMkLst>
+            <pc:docMk/>
+            <pc:sldMk cId="547791207" sldId="268"/>
+            <ac:spMk id="5" creationId="{054D79B3-23A9-B672-3B8B-2907857BE9E5}"/>
+          </ac:spMkLst>
+        </pc:spChg>
+        <pc:spChg chg="add">
+          <ac:chgData name="Mike Saunders" userId="c0986ea9a2f2a984" providerId="LiveId" clId="{A88E1021-0D6E-4899-A132-129726DC3689}" dt="2024-07-17T23:12:59.858" v="521" actId="26606"/>
+          <ac:spMkLst>
+            <pc:docMk/>
+            <pc:sldMk cId="547791207" sldId="268"/>
+            <ac:spMk id="9" creationId="{A8384FB5-9ADC-4DDC-881B-597D56F5B15D}"/>
+          </ac:spMkLst>
+        </pc:spChg>
+        <pc:spChg chg="add">
+          <ac:chgData name="Mike Saunders" userId="c0986ea9a2f2a984" providerId="LiveId" clId="{A88E1021-0D6E-4899-A132-129726DC3689}" dt="2024-07-17T23:12:59.858" v="521" actId="26606"/>
+          <ac:spMkLst>
+            <pc:docMk/>
+            <pc:sldMk cId="547791207" sldId="268"/>
+            <ac:spMk id="11" creationId="{1199E1B1-A8C0-4FE8-A5A8-1CB41D69F857}"/>
+          </ac:spMkLst>
+        </pc:spChg>
+        <pc:spChg chg="add">
+          <ac:chgData name="Mike Saunders" userId="c0986ea9a2f2a984" providerId="LiveId" clId="{A88E1021-0D6E-4899-A132-129726DC3689}" dt="2024-07-17T23:12:59.858" v="521" actId="26606"/>
+          <ac:spMkLst>
+            <pc:docMk/>
+            <pc:sldMk cId="547791207" sldId="268"/>
+            <ac:spMk id="13" creationId="{84A8DE83-DE75-4B41-9DB4-A7EC0B0DEC0B}"/>
+          </ac:spMkLst>
+        </pc:spChg>
+        <pc:spChg chg="add">
+          <ac:chgData name="Mike Saunders" userId="c0986ea9a2f2a984" providerId="LiveId" clId="{A88E1021-0D6E-4899-A132-129726DC3689}" dt="2024-07-17T23:12:59.858" v="521" actId="26606"/>
+          <ac:spMkLst>
+            <pc:docMk/>
+            <pc:sldMk cId="547791207" sldId="268"/>
+            <ac:spMk id="15" creationId="{A7009A0A-BEF5-4EAC-AF15-E4F9F002E239}"/>
+          </ac:spMkLst>
+        </pc:spChg>
+        <pc:picChg chg="add del mod">
+          <ac:chgData name="Mike Saunders" userId="c0986ea9a2f2a984" providerId="LiveId" clId="{A88E1021-0D6E-4899-A132-129726DC3689}" dt="2024-07-17T23:35:40.412" v="673" actId="478"/>
+          <ac:picMkLst>
+            <pc:docMk/>
+            <pc:sldMk cId="547791207" sldId="268"/>
+            <ac:picMk id="4" creationId="{9192C771-08A0-43B9-D366-F438B1722D24}"/>
+          </ac:picMkLst>
+        </pc:picChg>
+        <pc:picChg chg="add mod">
+          <ac:chgData name="Mike Saunders" userId="c0986ea9a2f2a984" providerId="LiveId" clId="{A88E1021-0D6E-4899-A132-129726DC3689}" dt="2024-07-18T23:57:31.170" v="1496" actId="1076"/>
+          <ac:picMkLst>
+            <pc:docMk/>
+            <pc:sldMk cId="547791207" sldId="268"/>
+            <ac:picMk id="4" creationId="{B22C3A64-0993-7DA8-3F22-4CCFB09EC86B}"/>
+          </ac:picMkLst>
+        </pc:picChg>
+        <pc:picChg chg="add del mod">
+          <ac:chgData name="Mike Saunders" userId="c0986ea9a2f2a984" providerId="LiveId" clId="{A88E1021-0D6E-4899-A132-129726DC3689}" dt="2024-07-17T23:38:31.187" v="687" actId="478"/>
+          <ac:picMkLst>
+            <pc:docMk/>
+            <pc:sldMk cId="547791207" sldId="268"/>
+            <ac:picMk id="7" creationId="{03080B2D-4BAA-87E8-CA68-06553CEE037D}"/>
+          </ac:picMkLst>
+        </pc:picChg>
+        <pc:picChg chg="add del mod">
+          <ac:chgData name="Mike Saunders" userId="c0986ea9a2f2a984" providerId="LiveId" clId="{A88E1021-0D6E-4899-A132-129726DC3689}" dt="2024-07-17T23:46:29.542" v="714" actId="478"/>
+          <ac:picMkLst>
+            <pc:docMk/>
+            <pc:sldMk cId="547791207" sldId="268"/>
+            <ac:picMk id="10" creationId="{F5AE47C5-6A2D-EE1E-1728-61C772653FC1}"/>
+          </ac:picMkLst>
+        </pc:picChg>
+        <pc:picChg chg="add del mod">
+          <ac:chgData name="Mike Saunders" userId="c0986ea9a2f2a984" providerId="LiveId" clId="{A88E1021-0D6E-4899-A132-129726DC3689}" dt="2024-07-17T23:56:46.447" v="1216" actId="478"/>
+          <ac:picMkLst>
+            <pc:docMk/>
+            <pc:sldMk cId="547791207" sldId="268"/>
+            <ac:picMk id="14" creationId="{2F818FE3-8DC1-BF6A-E144-F0C64854EB16}"/>
+          </ac:picMkLst>
+        </pc:picChg>
+        <pc:picChg chg="add del mod">
+          <ac:chgData name="Mike Saunders" userId="c0986ea9a2f2a984" providerId="LiveId" clId="{A88E1021-0D6E-4899-A132-129726DC3689}" dt="2024-07-18T23:57:19.706" v="1493" actId="478"/>
+          <ac:picMkLst>
+            <pc:docMk/>
+            <pc:sldMk cId="547791207" sldId="268"/>
+            <ac:picMk id="17" creationId="{D0883807-B68A-F374-F3E6-968D6E769FE9}"/>
+          </ac:picMkLst>
+        </pc:picChg>
+      </pc:sldChg>
+      <pc:sldChg chg="addSp delSp modSp new mod setBg modClrScheme chgLayout">
+        <pc:chgData name="Mike Saunders" userId="c0986ea9a2f2a984" providerId="LiveId" clId="{A88E1021-0D6E-4899-A132-129726DC3689}" dt="2024-07-17T23:59:55.749" v="1300" actId="20577"/>
+        <pc:sldMkLst>
+          <pc:docMk/>
+          <pc:sldMk cId="382987857" sldId="269"/>
+        </pc:sldMkLst>
+        <pc:spChg chg="del mod ord">
+          <ac:chgData name="Mike Saunders" userId="c0986ea9a2f2a984" providerId="LiveId" clId="{A88E1021-0D6E-4899-A132-129726DC3689}" dt="2024-07-17T23:47:46.965" v="740" actId="700"/>
+          <ac:spMkLst>
+            <pc:docMk/>
+            <pc:sldMk cId="382987857" sldId="269"/>
+            <ac:spMk id="2" creationId="{F9D08CD3-FBDB-20C4-AAD7-ADAD4AB8622A}"/>
+          </ac:spMkLst>
+        </pc:spChg>
+        <pc:spChg chg="add mod ord">
+          <ac:chgData name="Mike Saunders" userId="c0986ea9a2f2a984" providerId="LiveId" clId="{A88E1021-0D6E-4899-A132-129726DC3689}" dt="2024-07-17T23:48:03.221" v="753" actId="20577"/>
+          <ac:spMkLst>
+            <pc:docMk/>
+            <pc:sldMk cId="382987857" sldId="269"/>
+            <ac:spMk id="3" creationId="{EA5357D9-D4FB-4AAD-8A2F-1178ADF39DA1}"/>
+          </ac:spMkLst>
+        </pc:spChg>
+        <pc:spChg chg="add del mod ord">
+          <ac:chgData name="Mike Saunders" userId="c0986ea9a2f2a984" providerId="LiveId" clId="{A88E1021-0D6E-4899-A132-129726DC3689}" dt="2024-07-17T23:48:30.526" v="763" actId="478"/>
+          <ac:spMkLst>
+            <pc:docMk/>
+            <pc:sldMk cId="382987857" sldId="269"/>
+            <ac:spMk id="4" creationId="{77F2938F-7CCC-D64D-DC2D-3F444EDF5C57}"/>
+          </ac:spMkLst>
+        </pc:spChg>
+        <pc:spChg chg="add mod">
+          <ac:chgData name="Mike Saunders" userId="c0986ea9a2f2a984" providerId="LiveId" clId="{A88E1021-0D6E-4899-A132-129726DC3689}" dt="2024-07-17T23:59:55.749" v="1300" actId="20577"/>
+          <ac:spMkLst>
+            <pc:docMk/>
+            <pc:sldMk cId="382987857" sldId="269"/>
+            <ac:spMk id="6" creationId="{62504B73-9099-3DFF-605F-FEAEB7268706}"/>
+          </ac:spMkLst>
+        </pc:spChg>
+        <pc:spChg chg="add">
+          <ac:chgData name="Mike Saunders" userId="c0986ea9a2f2a984" providerId="LiveId" clId="{A88E1021-0D6E-4899-A132-129726DC3689}" dt="2024-07-17T23:48:00.272" v="744" actId="26606"/>
+          <ac:spMkLst>
+            <pc:docMk/>
+            <pc:sldMk cId="382987857" sldId="269"/>
+            <ac:spMk id="9" creationId="{1B15ED52-F352-441B-82BF-E0EA34836D08}"/>
+          </ac:spMkLst>
+        </pc:spChg>
+        <pc:spChg chg="add">
+          <ac:chgData name="Mike Saunders" userId="c0986ea9a2f2a984" providerId="LiveId" clId="{A88E1021-0D6E-4899-A132-129726DC3689}" dt="2024-07-17T23:48:00.272" v="744" actId="26606"/>
+          <ac:spMkLst>
+            <pc:docMk/>
+            <pc:sldMk cId="382987857" sldId="269"/>
+            <ac:spMk id="11" creationId="{3B2E3793-BFE6-45A2-9B7B-E18844431C99}"/>
+          </ac:spMkLst>
+        </pc:spChg>
+        <pc:spChg chg="add">
+          <ac:chgData name="Mike Saunders" userId="c0986ea9a2f2a984" providerId="LiveId" clId="{A88E1021-0D6E-4899-A132-129726DC3689}" dt="2024-07-17T23:48:00.272" v="744" actId="26606"/>
+          <ac:spMkLst>
+            <pc:docMk/>
+            <pc:sldMk cId="382987857" sldId="269"/>
+            <ac:spMk id="13" creationId="{BC4C4868-CB8F-4AF9-9CDB-8108F2C19B67}"/>
+          </ac:spMkLst>
+        </pc:spChg>
+        <pc:spChg chg="add">
+          <ac:chgData name="Mike Saunders" userId="c0986ea9a2f2a984" providerId="LiveId" clId="{A88E1021-0D6E-4899-A132-129726DC3689}" dt="2024-07-17T23:48:00.272" v="744" actId="26606"/>
+          <ac:spMkLst>
+            <pc:docMk/>
+            <pc:sldMk cId="382987857" sldId="269"/>
+            <ac:spMk id="15" creationId="{375E0459-6403-40CD-989D-56A4407CA12E}"/>
+          </ac:spMkLst>
+        </pc:spChg>
+        <pc:spChg chg="add">
+          <ac:chgData name="Mike Saunders" userId="c0986ea9a2f2a984" providerId="LiveId" clId="{A88E1021-0D6E-4899-A132-129726DC3689}" dt="2024-07-17T23:48:00.272" v="744" actId="26606"/>
+          <ac:spMkLst>
+            <pc:docMk/>
+            <pc:sldMk cId="382987857" sldId="269"/>
+            <ac:spMk id="17" creationId="{53E5B1A8-3AC9-4BD1-9BBC-78CA94F2D1BA}"/>
+          </ac:spMkLst>
+        </pc:spChg>
+      </pc:sldChg>
+      <pc:sldChg chg="addSp delSp modSp add mod ord setBg delDesignElem chgLayout">
+        <pc:chgData name="Mike Saunders" userId="c0986ea9a2f2a984" providerId="LiveId" clId="{A88E1021-0D6E-4899-A132-129726DC3689}" dt="2024-07-17T23:53:25.054" v="1206" actId="20577"/>
+        <pc:sldMkLst>
+          <pc:docMk/>
+          <pc:sldMk cId="124183885" sldId="270"/>
+        </pc:sldMkLst>
+        <pc:spChg chg="mod ord">
+          <ac:chgData name="Mike Saunders" userId="c0986ea9a2f2a984" providerId="LiveId" clId="{A88E1021-0D6E-4899-A132-129726DC3689}" dt="2024-07-17T23:52:51.674" v="1199" actId="20577"/>
+          <ac:spMkLst>
+            <pc:docMk/>
+            <pc:sldMk cId="124183885" sldId="270"/>
+            <ac:spMk id="3" creationId="{EA5357D9-D4FB-4AAD-8A2F-1178ADF39DA1}"/>
+          </ac:spMkLst>
+        </pc:spChg>
+        <pc:spChg chg="add mod">
+          <ac:chgData name="Mike Saunders" userId="c0986ea9a2f2a984" providerId="LiveId" clId="{A88E1021-0D6E-4899-A132-129726DC3689}" dt="2024-07-17T23:53:25.054" v="1206" actId="20577"/>
+          <ac:spMkLst>
+            <pc:docMk/>
+            <pc:sldMk cId="124183885" sldId="270"/>
+            <ac:spMk id="4" creationId="{A334D890-1D5F-47EF-1BC9-33EF85062CF7}"/>
+          </ac:spMkLst>
+        </pc:spChg>
+        <pc:spChg chg="del mod ord">
+          <ac:chgData name="Mike Saunders" userId="c0986ea9a2f2a984" providerId="LiveId" clId="{A88E1021-0D6E-4899-A132-129726DC3689}" dt="2024-07-17T23:53:03.324" v="1202" actId="478"/>
+          <ac:spMkLst>
+            <pc:docMk/>
+            <pc:sldMk cId="124183885" sldId="270"/>
+            <ac:spMk id="6" creationId="{62504B73-9099-3DFF-605F-FEAEB7268706}"/>
+          </ac:spMkLst>
+        </pc:spChg>
+        <pc:spChg chg="add">
+          <ac:chgData name="Mike Saunders" userId="c0986ea9a2f2a984" providerId="LiveId" clId="{A88E1021-0D6E-4899-A132-129726DC3689}" dt="2024-07-17T23:52:45.528" v="1178" actId="26606"/>
+          <ac:spMkLst>
+            <pc:docMk/>
+            <pc:sldMk cId="124183885" sldId="270"/>
+            <ac:spMk id="8" creationId="{1B15ED52-F352-441B-82BF-E0EA34836D08}"/>
+          </ac:spMkLst>
+        </pc:spChg>
+        <pc:spChg chg="del">
+          <ac:chgData name="Mike Saunders" userId="c0986ea9a2f2a984" providerId="LiveId" clId="{A88E1021-0D6E-4899-A132-129726DC3689}" dt="2024-07-17T23:52:12.631" v="1128"/>
+          <ac:spMkLst>
+            <pc:docMk/>
+            <pc:sldMk cId="124183885" sldId="270"/>
+            <ac:spMk id="9" creationId="{1B15ED52-F352-441B-82BF-E0EA34836D08}"/>
+          </ac:spMkLst>
+        </pc:spChg>
+        <pc:spChg chg="add">
+          <ac:chgData name="Mike Saunders" userId="c0986ea9a2f2a984" providerId="LiveId" clId="{A88E1021-0D6E-4899-A132-129726DC3689}" dt="2024-07-17T23:52:45.528" v="1178" actId="26606"/>
+          <ac:spMkLst>
+            <pc:docMk/>
+            <pc:sldMk cId="124183885" sldId="270"/>
+            <ac:spMk id="10" creationId="{3B2E3793-BFE6-45A2-9B7B-E18844431C99}"/>
+          </ac:spMkLst>
+        </pc:spChg>
+        <pc:spChg chg="del">
+          <ac:chgData name="Mike Saunders" userId="c0986ea9a2f2a984" providerId="LiveId" clId="{A88E1021-0D6E-4899-A132-129726DC3689}" dt="2024-07-17T23:52:12.631" v="1128"/>
+          <ac:spMkLst>
+            <pc:docMk/>
+            <pc:sldMk cId="124183885" sldId="270"/>
+            <ac:spMk id="11" creationId="{3B2E3793-BFE6-45A2-9B7B-E18844431C99}"/>
+          </ac:spMkLst>
+        </pc:spChg>
+        <pc:spChg chg="add">
+          <ac:chgData name="Mike Saunders" userId="c0986ea9a2f2a984" providerId="LiveId" clId="{A88E1021-0D6E-4899-A132-129726DC3689}" dt="2024-07-17T23:52:45.528" v="1178" actId="26606"/>
+          <ac:spMkLst>
+            <pc:docMk/>
+            <pc:sldMk cId="124183885" sldId="270"/>
+            <ac:spMk id="12" creationId="{BC4C4868-CB8F-4AF9-9CDB-8108F2C19B67}"/>
+          </ac:spMkLst>
+        </pc:spChg>
+        <pc:spChg chg="del">
+          <ac:chgData name="Mike Saunders" userId="c0986ea9a2f2a984" providerId="LiveId" clId="{A88E1021-0D6E-4899-A132-129726DC3689}" dt="2024-07-17T23:52:12.631" v="1128"/>
+          <ac:spMkLst>
+            <pc:docMk/>
+            <pc:sldMk cId="124183885" sldId="270"/>
+            <ac:spMk id="13" creationId="{BC4C4868-CB8F-4AF9-9CDB-8108F2C19B67}"/>
+          </ac:spMkLst>
+        </pc:spChg>
+        <pc:spChg chg="add">
+          <ac:chgData name="Mike Saunders" userId="c0986ea9a2f2a984" providerId="LiveId" clId="{A88E1021-0D6E-4899-A132-129726DC3689}" dt="2024-07-17T23:52:45.528" v="1178" actId="26606"/>
+          <ac:spMkLst>
+            <pc:docMk/>
+            <pc:sldMk cId="124183885" sldId="270"/>
+            <ac:spMk id="14" creationId="{375E0459-6403-40CD-989D-56A4407CA12E}"/>
+          </ac:spMkLst>
+        </pc:spChg>
+        <pc:spChg chg="del">
+          <ac:chgData name="Mike Saunders" userId="c0986ea9a2f2a984" providerId="LiveId" clId="{A88E1021-0D6E-4899-A132-129726DC3689}" dt="2024-07-17T23:52:12.631" v="1128"/>
+          <ac:spMkLst>
+            <pc:docMk/>
+            <pc:sldMk cId="124183885" sldId="270"/>
+            <ac:spMk id="15" creationId="{375E0459-6403-40CD-989D-56A4407CA12E}"/>
+          </ac:spMkLst>
+        </pc:spChg>
+        <pc:spChg chg="del">
+          <ac:chgData name="Mike Saunders" userId="c0986ea9a2f2a984" providerId="LiveId" clId="{A88E1021-0D6E-4899-A132-129726DC3689}" dt="2024-07-17T23:52:12.631" v="1128"/>
+          <ac:spMkLst>
+            <pc:docMk/>
+            <pc:sldMk cId="124183885" sldId="270"/>
+            <ac:spMk id="17" creationId="{53E5B1A8-3AC9-4BD1-9BBC-78CA94F2D1BA}"/>
+          </ac:spMkLst>
+        </pc:spChg>
+        <pc:spChg chg="add">
+          <ac:chgData name="Mike Saunders" userId="c0986ea9a2f2a984" providerId="LiveId" clId="{A88E1021-0D6E-4899-A132-129726DC3689}" dt="2024-07-17T23:52:45.528" v="1178" actId="26606"/>
+          <ac:spMkLst>
+            <pc:docMk/>
+            <pc:sldMk cId="124183885" sldId="270"/>
+            <ac:spMk id="19" creationId="{53E5B1A8-3AC9-4BD1-9BBC-78CA94F2D1BA}"/>
+          </ac:spMkLst>
+        </pc:spChg>
+      </pc:sldChg>
+      <pc:sldChg chg="modSp new mod">
+        <pc:chgData name="Mike Saunders" userId="c0986ea9a2f2a984" providerId="LiveId" clId="{A88E1021-0D6E-4899-A132-129726DC3689}" dt="2024-07-18T00:33:38.126" v="1311" actId="20577"/>
+        <pc:sldMkLst>
+          <pc:docMk/>
+          <pc:sldMk cId="3326597434" sldId="271"/>
+        </pc:sldMkLst>
+        <pc:spChg chg="mod">
+          <ac:chgData name="Mike Saunders" userId="c0986ea9a2f2a984" providerId="LiveId" clId="{A88E1021-0D6E-4899-A132-129726DC3689}" dt="2024-07-18T00:33:38.126" v="1311" actId="20577"/>
+          <ac:spMkLst>
+            <pc:docMk/>
+            <pc:sldMk cId="3326597434" sldId="271"/>
+            <ac:spMk id="2" creationId="{2ACF58D5-2D97-563C-5A20-A5DF7CB90086}"/>
+          </ac:spMkLst>
+        </pc:spChg>
+      </pc:sldChg>
+      <pc:sldChg chg="modSp mod">
+        <pc:chgData name="Mike Saunders" userId="c0986ea9a2f2a984" providerId="LiveId" clId="{A88E1021-0D6E-4899-A132-129726DC3689}" dt="2024-07-18T23:06:01.883" v="1484" actId="207"/>
+        <pc:sldMkLst>
+          <pc:docMk/>
+          <pc:sldMk cId="4166704550" sldId="274"/>
+        </pc:sldMkLst>
+        <pc:spChg chg="mod">
+          <ac:chgData name="Mike Saunders" userId="c0986ea9a2f2a984" providerId="LiveId" clId="{A88E1021-0D6E-4899-A132-129726DC3689}" dt="2024-07-18T23:06:01.883" v="1484" actId="207"/>
+          <ac:spMkLst>
+            <pc:docMk/>
+            <pc:sldMk cId="4166704550" sldId="274"/>
+            <ac:spMk id="7" creationId="{7D1C0FCC-A79B-8D82-05D1-E4F87A5A0A11}"/>
+          </ac:spMkLst>
+        </pc:spChg>
+      </pc:sldChg>
+      <pc:sldChg chg="modSp mod">
+        <pc:chgData name="Mike Saunders" userId="c0986ea9a2f2a984" providerId="LiveId" clId="{A88E1021-0D6E-4899-A132-129726DC3689}" dt="2024-07-18T23:06:12.532" v="1486" actId="207"/>
+        <pc:sldMkLst>
+          <pc:docMk/>
+          <pc:sldMk cId="3940634714" sldId="275"/>
+        </pc:sldMkLst>
+        <pc:spChg chg="mod">
+          <ac:chgData name="Mike Saunders" userId="c0986ea9a2f2a984" providerId="LiveId" clId="{A88E1021-0D6E-4899-A132-129726DC3689}" dt="2024-07-18T23:06:12.532" v="1486" actId="207"/>
+          <ac:spMkLst>
+            <pc:docMk/>
+            <pc:sldMk cId="3940634714" sldId="275"/>
+            <ac:spMk id="7" creationId="{7D1C0FCC-A79B-8D82-05D1-E4F87A5A0A11}"/>
+          </ac:spMkLst>
+        </pc:spChg>
+      </pc:sldChg>
+      <pc:sldChg chg="modSp mod">
+        <pc:chgData name="Mike Saunders" userId="c0986ea9a2f2a984" providerId="LiveId" clId="{A88E1021-0D6E-4899-A132-129726DC3689}" dt="2024-07-18T23:58:05.812" v="1504" actId="207"/>
+        <pc:sldMkLst>
+          <pc:docMk/>
+          <pc:sldMk cId="3223283231" sldId="276"/>
+        </pc:sldMkLst>
+        <pc:spChg chg="mod">
+          <ac:chgData name="Mike Saunders" userId="c0986ea9a2f2a984" providerId="LiveId" clId="{A88E1021-0D6E-4899-A132-129726DC3689}" dt="2024-07-18T23:58:05.812" v="1504" actId="207"/>
+          <ac:spMkLst>
+            <pc:docMk/>
+            <pc:sldMk cId="3223283231" sldId="276"/>
+            <ac:spMk id="5" creationId="{054D79B3-23A9-B672-3B8B-2907857BE9E5}"/>
+          </ac:spMkLst>
+        </pc:spChg>
+      </pc:sldChg>
+      <pc:sldChg chg="addSp delSp modSp add mod setBg delDesignElem modNotesTx">
+        <pc:chgData name="Mike Saunders" userId="c0986ea9a2f2a984" providerId="LiveId" clId="{A88E1021-0D6E-4899-A132-129726DC3689}" dt="2024-07-19T00:01:38.059" v="1539" actId="1076"/>
+        <pc:sldMkLst>
+          <pc:docMk/>
+          <pc:sldMk cId="1590742534" sldId="277"/>
+        </pc:sldMkLst>
+        <pc:spChg chg="mod">
+          <ac:chgData name="Mike Saunders" userId="c0986ea9a2f2a984" providerId="LiveId" clId="{A88E1021-0D6E-4899-A132-129726DC3689}" dt="2024-07-18T23:04:38.706" v="1476" actId="20577"/>
+          <ac:spMkLst>
+            <pc:docMk/>
+            <pc:sldMk cId="1590742534" sldId="277"/>
+            <ac:spMk id="2" creationId="{56E94A04-04A0-FD3D-83EC-CBA731417051}"/>
+          </ac:spMkLst>
+        </pc:spChg>
+        <pc:spChg chg="del mod">
+          <ac:chgData name="Mike Saunders" userId="c0986ea9a2f2a984" providerId="LiveId" clId="{A88E1021-0D6E-4899-A132-129726DC3689}" dt="2024-07-18T23:03:53.952" v="1416" actId="478"/>
+          <ac:spMkLst>
+            <pc:docMk/>
+            <pc:sldMk cId="1590742534" sldId="277"/>
+            <ac:spMk id="7" creationId="{7D1C0FCC-A79B-8D82-05D1-E4F87A5A0A11}"/>
+          </ac:spMkLst>
+        </pc:spChg>
+        <pc:spChg chg="del">
+          <ac:chgData name="Mike Saunders" userId="c0986ea9a2f2a984" providerId="LiveId" clId="{A88E1021-0D6E-4899-A132-129726DC3689}" dt="2024-07-18T23:00:41.254" v="1351"/>
+          <ac:spMkLst>
+            <pc:docMk/>
+            <pc:sldMk cId="1590742534" sldId="277"/>
+            <ac:spMk id="9" creationId="{A8384FB5-9ADC-4DDC-881B-597D56F5B15D}"/>
+          </ac:spMkLst>
+        </pc:spChg>
+        <pc:spChg chg="add mod">
+          <ac:chgData name="Mike Saunders" userId="c0986ea9a2f2a984" providerId="LiveId" clId="{A88E1021-0D6E-4899-A132-129726DC3689}" dt="2024-07-18T23:04:25.593" v="1461" actId="1076"/>
+          <ac:spMkLst>
+            <pc:docMk/>
+            <pc:sldMk cId="1590742534" sldId="277"/>
+            <ac:spMk id="10" creationId="{09B234A6-59CE-142D-C352-173878D97BF5}"/>
+          </ac:spMkLst>
+        </pc:spChg>
+        <pc:spChg chg="del">
+          <ac:chgData name="Mike Saunders" userId="c0986ea9a2f2a984" providerId="LiveId" clId="{A88E1021-0D6E-4899-A132-129726DC3689}" dt="2024-07-18T23:00:41.254" v="1351"/>
+          <ac:spMkLst>
+            <pc:docMk/>
+            <pc:sldMk cId="1590742534" sldId="277"/>
+            <ac:spMk id="11" creationId="{1199E1B1-A8C0-4FE8-A5A8-1CB41D69F857}"/>
+          </ac:spMkLst>
+        </pc:spChg>
+        <pc:spChg chg="add">
+          <ac:chgData name="Mike Saunders" userId="c0986ea9a2f2a984" providerId="LiveId" clId="{A88E1021-0D6E-4899-A132-129726DC3689}" dt="2024-07-18T23:01:34.491" v="1364" actId="26606"/>
+          <ac:spMkLst>
+            <pc:docMk/>
+            <pc:sldMk cId="1590742534" sldId="277"/>
+            <ac:spMk id="12" creationId="{A8384FB5-9ADC-4DDC-881B-597D56F5B15D}"/>
+          </ac:spMkLst>
+        </pc:spChg>
+        <pc:spChg chg="del">
+          <ac:chgData name="Mike Saunders" userId="c0986ea9a2f2a984" providerId="LiveId" clId="{A88E1021-0D6E-4899-A132-129726DC3689}" dt="2024-07-18T23:00:41.254" v="1351"/>
+          <ac:spMkLst>
+            <pc:docMk/>
+            <pc:sldMk cId="1590742534" sldId="277"/>
+            <ac:spMk id="13" creationId="{84A8DE83-DE75-4B41-9DB4-A7EC0B0DEC0B}"/>
+          </ac:spMkLst>
+        </pc:spChg>
+        <pc:spChg chg="add">
+          <ac:chgData name="Mike Saunders" userId="c0986ea9a2f2a984" providerId="LiveId" clId="{A88E1021-0D6E-4899-A132-129726DC3689}" dt="2024-07-18T23:01:34.491" v="1364" actId="26606"/>
+          <ac:spMkLst>
+            <pc:docMk/>
+            <pc:sldMk cId="1590742534" sldId="277"/>
+            <ac:spMk id="14" creationId="{1199E1B1-A8C0-4FE8-A5A8-1CB41D69F857}"/>
+          </ac:spMkLst>
+        </pc:spChg>
+        <pc:spChg chg="del">
+          <ac:chgData name="Mike Saunders" userId="c0986ea9a2f2a984" providerId="LiveId" clId="{A88E1021-0D6E-4899-A132-129726DC3689}" dt="2024-07-18T23:00:41.254" v="1351"/>
+          <ac:spMkLst>
+            <pc:docMk/>
+            <pc:sldMk cId="1590742534" sldId="277"/>
+            <ac:spMk id="15" creationId="{A7009A0A-BEF5-4EAC-AF15-E4F9F002E239}"/>
+          </ac:spMkLst>
+        </pc:spChg>
+        <pc:spChg chg="add">
+          <ac:chgData name="Mike Saunders" userId="c0986ea9a2f2a984" providerId="LiveId" clId="{A88E1021-0D6E-4899-A132-129726DC3689}" dt="2024-07-18T23:01:34.491" v="1364" actId="26606"/>
+          <ac:spMkLst>
+            <pc:docMk/>
+            <pc:sldMk cId="1590742534" sldId="277"/>
+            <ac:spMk id="16" creationId="{84A8DE83-DE75-4B41-9DB4-A7EC0B0DEC0B}"/>
+          </ac:spMkLst>
+        </pc:spChg>
+        <pc:spChg chg="add">
+          <ac:chgData name="Mike Saunders" userId="c0986ea9a2f2a984" providerId="LiveId" clId="{A88E1021-0D6E-4899-A132-129726DC3689}" dt="2024-07-18T23:01:34.491" v="1364" actId="26606"/>
+          <ac:spMkLst>
+            <pc:docMk/>
+            <pc:sldMk cId="1590742534" sldId="277"/>
+            <ac:spMk id="18" creationId="{A7009A0A-BEF5-4EAC-AF15-E4F9F002E239}"/>
+          </ac:spMkLst>
+        </pc:spChg>
+        <pc:picChg chg="del">
+          <ac:chgData name="Mike Saunders" userId="c0986ea9a2f2a984" providerId="LiveId" clId="{A88E1021-0D6E-4899-A132-129726DC3689}" dt="2024-07-18T23:00:42.925" v="1352" actId="478"/>
+          <ac:picMkLst>
+            <pc:docMk/>
+            <pc:sldMk cId="1590742534" sldId="277"/>
+            <ac:picMk id="4" creationId="{7E1E60B8-0865-9EFB-5382-91AAB97DD036}"/>
+          </ac:picMkLst>
+        </pc:picChg>
+        <pc:picChg chg="add del mod">
+          <ac:chgData name="Mike Saunders" userId="c0986ea9a2f2a984" providerId="LiveId" clId="{A88E1021-0D6E-4899-A132-129726DC3689}" dt="2024-07-18T23:03:04.953" v="1381" actId="478"/>
+          <ac:picMkLst>
+            <pc:docMk/>
+            <pc:sldMk cId="1590742534" sldId="277"/>
+            <ac:picMk id="5" creationId="{C6F43B31-2361-D277-D40D-F0C578809BDD}"/>
+          </ac:picMkLst>
+        </pc:picChg>
+        <pc:picChg chg="mod">
+          <ac:chgData name="Mike Saunders" userId="c0986ea9a2f2a984" providerId="LiveId" clId="{A88E1021-0D6E-4899-A132-129726DC3689}" dt="2024-07-19T00:01:38.059" v="1539" actId="1076"/>
+          <ac:picMkLst>
+            <pc:docMk/>
+            <pc:sldMk cId="1590742534" sldId="277"/>
+            <ac:picMk id="7" creationId="{0EF41B18-8C96-F8A8-71A9-C47AB7899AF2}"/>
+          </ac:picMkLst>
+        </pc:picChg>
+        <pc:picChg chg="add mod">
+          <ac:chgData name="Mike Saunders" userId="c0986ea9a2f2a984" providerId="LiveId" clId="{A88E1021-0D6E-4899-A132-129726DC3689}" dt="2024-07-18T23:04:30.854" v="1468" actId="1076"/>
+          <ac:picMkLst>
+            <pc:docMk/>
+            <pc:sldMk cId="1590742534" sldId="277"/>
+            <ac:picMk id="8" creationId="{7701BF50-4FBE-02BA-8031-2607A00A08F6}"/>
+          </ac:picMkLst>
+        </pc:picChg>
+      </pc:sldChg>
+      <pc:sldChg chg="addSp modSp new del mod setBg">
+        <pc:chgData name="Mike Saunders" userId="c0986ea9a2f2a984" providerId="LiveId" clId="{A88E1021-0D6E-4899-A132-129726DC3689}" dt="2024-07-18T23:00:32.998" v="1349" actId="47"/>
+        <pc:sldMkLst>
+          <pc:docMk/>
+          <pc:sldMk cId="3139819979" sldId="277"/>
+        </pc:sldMkLst>
+        <pc:spChg chg="mod">
+          <ac:chgData name="Mike Saunders" userId="c0986ea9a2f2a984" providerId="LiveId" clId="{A88E1021-0D6E-4899-A132-129726DC3689}" dt="2024-07-18T23:00:23.062" v="1348" actId="26606"/>
+          <ac:spMkLst>
+            <pc:docMk/>
+            <pc:sldMk cId="3139819979" sldId="277"/>
+            <ac:spMk id="2" creationId="{F3A2013F-40C7-CA0C-3772-6AA4A7F235B2}"/>
+          </ac:spMkLst>
+        </pc:spChg>
+        <pc:spChg chg="add">
+          <ac:chgData name="Mike Saunders" userId="c0986ea9a2f2a984" providerId="LiveId" clId="{A88E1021-0D6E-4899-A132-129726DC3689}" dt="2024-07-18T23:00:23.062" v="1348" actId="26606"/>
+          <ac:spMkLst>
+            <pc:docMk/>
+            <pc:sldMk cId="3139819979" sldId="277"/>
+            <ac:spMk id="9" creationId="{A4AC5506-6312-4701-8D3C-40187889A947}"/>
+          </ac:spMkLst>
+        </pc:spChg>
+        <pc:picChg chg="add mod">
+          <ac:chgData name="Mike Saunders" userId="c0986ea9a2f2a984" providerId="LiveId" clId="{A88E1021-0D6E-4899-A132-129726DC3689}" dt="2024-07-18T23:00:23.062" v="1348" actId="26606"/>
+          <ac:picMkLst>
+            <pc:docMk/>
+            <pc:sldMk cId="3139819979" sldId="277"/>
+            <ac:picMk id="4" creationId="{220DC481-1AA2-BFCA-15D8-3875467A67CF}"/>
+          </ac:picMkLst>
+        </pc:picChg>
+      </pc:sldChg>
+      <pc:sldChg chg="addSp delSp modSp add del mod setBg delDesignElem chgLayout">
+        <pc:chgData name="Mike Saunders" userId="c0986ea9a2f2a984" providerId="LiveId" clId="{A88E1021-0D6E-4899-A132-129726DC3689}" dt="2024-07-18T23:01:20.730" v="1362"/>
+        <pc:sldMkLst>
+          <pc:docMk/>
+          <pc:sldMk cId="680769365" sldId="278"/>
+        </pc:sldMkLst>
+        <pc:spChg chg="mod ord">
+          <ac:chgData name="Mike Saunders" userId="c0986ea9a2f2a984" providerId="LiveId" clId="{A88E1021-0D6E-4899-A132-129726DC3689}" dt="2024-07-18T23:01:20.064" v="1361" actId="700"/>
+          <ac:spMkLst>
+            <pc:docMk/>
+            <pc:sldMk cId="680769365" sldId="278"/>
+            <ac:spMk id="2" creationId="{56E94A04-04A0-FD3D-83EC-CBA731417051}"/>
+          </ac:spMkLst>
+        </pc:spChg>
+        <pc:spChg chg="mod">
+          <ac:chgData name="Mike Saunders" userId="c0986ea9a2f2a984" providerId="LiveId" clId="{A88E1021-0D6E-4899-A132-129726DC3689}" dt="2024-07-18T23:01:17.365" v="1360" actId="26606"/>
+          <ac:spMkLst>
+            <pc:docMk/>
+            <pc:sldMk cId="680769365" sldId="278"/>
+            <ac:spMk id="7" creationId="{7D1C0FCC-A79B-8D82-05D1-E4F87A5A0A11}"/>
+          </ac:spMkLst>
+        </pc:spChg>
+        <pc:spChg chg="add del">
+          <ac:chgData name="Mike Saunders" userId="c0986ea9a2f2a984" providerId="LiveId" clId="{A88E1021-0D6E-4899-A132-129726DC3689}" dt="2024-07-18T23:01:20.730" v="1362"/>
+          <ac:spMkLst>
+            <pc:docMk/>
+            <pc:sldMk cId="680769365" sldId="278"/>
+            <ac:spMk id="9" creationId="{A8384FB5-9ADC-4DDC-881B-597D56F5B15D}"/>
+          </ac:spMkLst>
+        </pc:spChg>
+        <pc:spChg chg="add del">
+          <ac:chgData name="Mike Saunders" userId="c0986ea9a2f2a984" providerId="LiveId" clId="{A88E1021-0D6E-4899-A132-129726DC3689}" dt="2024-07-18T23:01:20.730" v="1362"/>
+          <ac:spMkLst>
+            <pc:docMk/>
+            <pc:sldMk cId="680769365" sldId="278"/>
+            <ac:spMk id="11" creationId="{1199E1B1-A8C0-4FE8-A5A8-1CB41D69F857}"/>
+          </ac:spMkLst>
+        </pc:spChg>
+        <pc:spChg chg="add del">
+          <ac:chgData name="Mike Saunders" userId="c0986ea9a2f2a984" providerId="LiveId" clId="{A88E1021-0D6E-4899-A132-129726DC3689}" dt="2024-07-18T23:01:17.365" v="1360" actId="26606"/>
+          <ac:spMkLst>
+            <pc:docMk/>
+            <pc:sldMk cId="680769365" sldId="278"/>
+            <ac:spMk id="12" creationId="{A8384FB5-9ADC-4DDC-881B-597D56F5B15D}"/>
+          </ac:spMkLst>
+        </pc:spChg>
+        <pc:spChg chg="add del">
+          <ac:chgData name="Mike Saunders" userId="c0986ea9a2f2a984" providerId="LiveId" clId="{A88E1021-0D6E-4899-A132-129726DC3689}" dt="2024-07-18T23:01:20.730" v="1362"/>
+          <ac:spMkLst>
+            <pc:docMk/>
+            <pc:sldMk cId="680769365" sldId="278"/>
+            <ac:spMk id="13" creationId="{84A8DE83-DE75-4B41-9DB4-A7EC0B0DEC0B}"/>
+          </ac:spMkLst>
+        </pc:spChg>
+        <pc:spChg chg="add del">
+          <ac:chgData name="Mike Saunders" userId="c0986ea9a2f2a984" providerId="LiveId" clId="{A88E1021-0D6E-4899-A132-129726DC3689}" dt="2024-07-18T23:01:17.365" v="1360" actId="26606"/>
+          <ac:spMkLst>
+            <pc:docMk/>
+            <pc:sldMk cId="680769365" sldId="278"/>
+            <ac:spMk id="14" creationId="{1199E1B1-A8C0-4FE8-A5A8-1CB41D69F857}"/>
+          </ac:spMkLst>
+        </pc:spChg>
+        <pc:spChg chg="add del">
+          <ac:chgData name="Mike Saunders" userId="c0986ea9a2f2a984" providerId="LiveId" clId="{A88E1021-0D6E-4899-A132-129726DC3689}" dt="2024-07-18T23:01:20.730" v="1362"/>
+          <ac:spMkLst>
+            <pc:docMk/>
+            <pc:sldMk cId="680769365" sldId="278"/>
+            <ac:spMk id="15" creationId="{A7009A0A-BEF5-4EAC-AF15-E4F9F002E239}"/>
+          </ac:spMkLst>
+        </pc:spChg>
+        <pc:spChg chg="add del">
+          <ac:chgData name="Mike Saunders" userId="c0986ea9a2f2a984" providerId="LiveId" clId="{A88E1021-0D6E-4899-A132-129726DC3689}" dt="2024-07-18T23:01:17.365" v="1360" actId="26606"/>
+          <ac:spMkLst>
+            <pc:docMk/>
+            <pc:sldMk cId="680769365" sldId="278"/>
+            <ac:spMk id="16" creationId="{84A8DE83-DE75-4B41-9DB4-A7EC0B0DEC0B}"/>
+          </ac:spMkLst>
+        </pc:spChg>
+        <pc:spChg chg="add del">
+          <ac:chgData name="Mike Saunders" userId="c0986ea9a2f2a984" providerId="LiveId" clId="{A88E1021-0D6E-4899-A132-129726DC3689}" dt="2024-07-18T23:01:17.365" v="1360" actId="26606"/>
+          <ac:spMkLst>
+            <pc:docMk/>
+            <pc:sldMk cId="680769365" sldId="278"/>
+            <ac:spMk id="18" creationId="{A7009A0A-BEF5-4EAC-AF15-E4F9F002E239}"/>
+          </ac:spMkLst>
+        </pc:spChg>
+        <pc:picChg chg="mod">
+          <ac:chgData name="Mike Saunders" userId="c0986ea9a2f2a984" providerId="LiveId" clId="{A88E1021-0D6E-4899-A132-129726DC3689}" dt="2024-07-18T23:01:17.365" v="1360" actId="26606"/>
+          <ac:picMkLst>
+            <pc:docMk/>
+            <pc:sldMk cId="680769365" sldId="278"/>
+            <ac:picMk id="4" creationId="{7E1E60B8-0865-9EFB-5382-91AAB97DD036}"/>
+          </ac:picMkLst>
+        </pc:picChg>
+      </pc:sldChg>
+      <pc:sldChg chg="addSp delSp modSp mod">
+        <pc:chgData name="Mike Saunders" userId="c0986ea9a2f2a984" providerId="LiveId" clId="{A88E1021-0D6E-4899-A132-129726DC3689}" dt="2024-07-19T00:01:31.223" v="1538" actId="1076"/>
+        <pc:sldMkLst>
+          <pc:docMk/>
+          <pc:sldMk cId="1021540584" sldId="281"/>
+        </pc:sldMkLst>
+        <pc:picChg chg="del mod">
+          <ac:chgData name="Mike Saunders" userId="c0986ea9a2f2a984" providerId="LiveId" clId="{A88E1021-0D6E-4899-A132-129726DC3689}" dt="2024-07-19T00:00:19.642" v="1522" actId="478"/>
+          <ac:picMkLst>
+            <pc:docMk/>
+            <pc:sldMk cId="1021540584" sldId="281"/>
+            <ac:picMk id="3" creationId="{A4B1ECD7-C653-8649-C606-21A576E11574}"/>
+          </ac:picMkLst>
+        </pc:picChg>
+        <pc:picChg chg="del mod">
+          <ac:chgData name="Mike Saunders" userId="c0986ea9a2f2a984" providerId="LiveId" clId="{A88E1021-0D6E-4899-A132-129726DC3689}" dt="2024-07-19T00:00:42.919" v="1526" actId="478"/>
+          <ac:picMkLst>
+            <pc:docMk/>
+            <pc:sldMk cId="1021540584" sldId="281"/>
+            <ac:picMk id="4" creationId="{E490A7A4-396C-849D-3618-62ED6B67BB69}"/>
+          </ac:picMkLst>
+        </pc:picChg>
+        <pc:picChg chg="del mod">
+          <ac:chgData name="Mike Saunders" userId="c0986ea9a2f2a984" providerId="LiveId" clId="{A88E1021-0D6E-4899-A132-129726DC3689}" dt="2024-07-19T00:01:06.658" v="1531" actId="478"/>
+          <ac:picMkLst>
+            <pc:docMk/>
+            <pc:sldMk cId="1021540584" sldId="281"/>
+            <ac:picMk id="5" creationId="{85B51D1C-4896-C8DD-2844-90B92591F13A}"/>
+          </ac:picMkLst>
+        </pc:picChg>
+        <pc:picChg chg="del mod">
+          <ac:chgData name="Mike Saunders" userId="c0986ea9a2f2a984" providerId="LiveId" clId="{A88E1021-0D6E-4899-A132-129726DC3689}" dt="2024-07-19T00:01:24.164" v="1535" actId="478"/>
+          <ac:picMkLst>
+            <pc:docMk/>
+            <pc:sldMk cId="1021540584" sldId="281"/>
+            <ac:picMk id="6" creationId="{A81EFED3-529B-05BA-D21B-787BB8A55721}"/>
+          </ac:picMkLst>
+        </pc:picChg>
+        <pc:picChg chg="add mod">
+          <ac:chgData name="Mike Saunders" userId="c0986ea9a2f2a984" providerId="LiveId" clId="{A88E1021-0D6E-4899-A132-129726DC3689}" dt="2024-07-19T00:00:33.838" v="1525" actId="14100"/>
+          <ac:picMkLst>
+            <pc:docMk/>
+            <pc:sldMk cId="1021540584" sldId="281"/>
+            <ac:picMk id="8" creationId="{6CFE47D0-FEF5-5995-0408-E943CF0F859C}"/>
+          </ac:picMkLst>
+        </pc:picChg>
+        <pc:picChg chg="add mod">
+          <ac:chgData name="Mike Saunders" userId="c0986ea9a2f2a984" providerId="LiveId" clId="{A88E1021-0D6E-4899-A132-129726DC3689}" dt="2024-07-19T00:00:57.660" v="1530" actId="1076"/>
+          <ac:picMkLst>
+            <pc:docMk/>
+            <pc:sldMk cId="1021540584" sldId="281"/>
+            <ac:picMk id="11" creationId="{F3138102-81F3-6E66-29AA-E3175BC39015}"/>
+          </ac:picMkLst>
+        </pc:picChg>
+        <pc:picChg chg="add mod">
+          <ac:chgData name="Mike Saunders" userId="c0986ea9a2f2a984" providerId="LiveId" clId="{A88E1021-0D6E-4899-A132-129726DC3689}" dt="2024-07-19T00:01:13.321" v="1534" actId="1076"/>
+          <ac:picMkLst>
+            <pc:docMk/>
+            <pc:sldMk cId="1021540584" sldId="281"/>
+            <ac:picMk id="15" creationId="{5EA080E8-42F6-4C6E-6773-76D63A52D366}"/>
+          </ac:picMkLst>
+        </pc:picChg>
+        <pc:picChg chg="add mod">
+          <ac:chgData name="Mike Saunders" userId="c0986ea9a2f2a984" providerId="LiveId" clId="{A88E1021-0D6E-4899-A132-129726DC3689}" dt="2024-07-19T00:01:31.223" v="1538" actId="1076"/>
+          <ac:picMkLst>
+            <pc:docMk/>
+            <pc:sldMk cId="1021540584" sldId="281"/>
+            <ac:picMk id="19" creationId="{1734FEFF-1B9B-D6A1-1C1B-F785FFAB62C6}"/>
           </ac:picMkLst>
         </pc:picChg>
       </pc:sldChg>
@@ -2864,6 +2982,90 @@
     <p:extLst>
       <p:ext uri="{BB962C8B-B14F-4D97-AF65-F5344CB8AC3E}">
         <p14:creationId xmlns:p14="http://schemas.microsoft.com/office/powerpoint/2010/main" val="1122053079"/>
+      </p:ext>
+    </p:extLst>
+  </p:cSld>
+  <p:clrMapOvr>
+    <a:masterClrMapping/>
+  </p:clrMapOvr>
+</p:notes>
+</file>
+
+<file path=ppt/notesSlides/notesSlide7.xml><?xml version="1.0" encoding="utf-8"?>
+<p:notes xmlns:a="http://schemas.openxmlformats.org/drawingml/2006/main" xmlns:r="http://schemas.openxmlformats.org/officeDocument/2006/relationships" xmlns:p="http://schemas.openxmlformats.org/presentationml/2006/main">
+  <p:cSld>
+    <p:spTree>
+      <p:nvGrpSpPr>
+        <p:cNvPr id="1" name=""/>
+        <p:cNvGrpSpPr/>
+        <p:nvPr/>
+      </p:nvGrpSpPr>
+      <p:grpSpPr>
+        <a:xfrm>
+          <a:off x="0" y="0"/>
+          <a:ext cx="0" cy="0"/>
+          <a:chOff x="0" y="0"/>
+          <a:chExt cx="0" cy="0"/>
+        </a:xfrm>
+      </p:grpSpPr>
+      <p:sp>
+        <p:nvSpPr>
+          <p:cNvPr id="2" name="Slide Image Placeholder 1"/>
+          <p:cNvSpPr>
+            <a:spLocks noGrp="1" noRot="1" noChangeAspect="1"/>
+          </p:cNvSpPr>
+          <p:nvPr>
+            <p:ph type="sldImg"/>
+          </p:nvPr>
+        </p:nvSpPr>
+        <p:spPr/>
+      </p:sp>
+      <p:sp>
+        <p:nvSpPr>
+          <p:cNvPr id="3" name="Notes Placeholder 2"/>
+          <p:cNvSpPr>
+            <a:spLocks noGrp="1"/>
+          </p:cNvSpPr>
+          <p:nvPr>
+            <p:ph type="body" idx="1"/>
+          </p:nvPr>
+        </p:nvSpPr>
+        <p:spPr/>
+        <p:txBody>
+          <a:bodyPr/>
+          <a:lstStyle/>
+          <a:p>
+            <a:endParaRPr lang="en-US" dirty="0"/>
+          </a:p>
+        </p:txBody>
+      </p:sp>
+      <p:sp>
+        <p:nvSpPr>
+          <p:cNvPr id="4" name="Slide Number Placeholder 3"/>
+          <p:cNvSpPr>
+            <a:spLocks noGrp="1"/>
+          </p:cNvSpPr>
+          <p:nvPr>
+            <p:ph type="sldNum" sz="quarter" idx="5"/>
+          </p:nvPr>
+        </p:nvSpPr>
+        <p:spPr/>
+        <p:txBody>
+          <a:bodyPr/>
+          <a:lstStyle/>
+          <a:p>
+            <a:fld id="{5DBAAC1D-FCF9-47BC-9EB5-8EC3A97479DA}" type="slidenum">
+              <a:rPr lang="en-US" smtClean="0"/>
+              <a:t>21</a:t>
+            </a:fld>
+            <a:endParaRPr lang="en-US"/>
+          </a:p>
+        </p:txBody>
+      </p:sp>
+    </p:spTree>
+    <p:extLst>
+      <p:ext uri="{BB962C8B-B14F-4D97-AF65-F5344CB8AC3E}">
+        <p14:creationId xmlns:p14="http://schemas.microsoft.com/office/powerpoint/2010/main" val="4006866660"/>
       </p:ext>
     </p:extLst>
   </p:cSld>
@@ -7698,7 +7900,7 @@
         </p:blipFill>
         <p:spPr>
           <a:xfrm>
-            <a:off x="0" y="2081436"/>
+            <a:off x="0" y="2501850"/>
             <a:ext cx="12192000" cy="2695128"/>
           </a:xfrm>
           <a:prstGeom prst="rect">
@@ -8135,10 +8337,10 @@
       </p:sp>
       <p:pic>
         <p:nvPicPr>
-          <p:cNvPr id="3" name="Picture 2">
-            <a:extLst>
-              <a:ext uri="{FF2B5EF4-FFF2-40B4-BE49-F238E27FC236}">
-                <a16:creationId xmlns:a16="http://schemas.microsoft.com/office/drawing/2014/main" id="{A4B1ECD7-C653-8649-C606-21A576E11574}"/>
+          <p:cNvPr id="8" name="Picture 7">
+            <a:extLst>
+              <a:ext uri="{FF2B5EF4-FFF2-40B4-BE49-F238E27FC236}">
+                <a16:creationId xmlns:a16="http://schemas.microsoft.com/office/drawing/2014/main" id="{6CFE47D0-FEF5-5995-0408-E943CF0F859C}"/>
               </a:ext>
             </a:extLst>
           </p:cNvPr>
@@ -8155,8 +8357,8 @@
         </p:blipFill>
         <p:spPr>
           <a:xfrm>
-            <a:off x="699713" y="1735995"/>
-            <a:ext cx="3175814" cy="2354311"/>
+            <a:off x="427983" y="1655276"/>
+            <a:ext cx="3481865" cy="2578036"/>
           </a:xfrm>
           <a:prstGeom prst="rect">
             <a:avLst/>
@@ -8165,10 +8367,10 @@
       </p:pic>
       <p:pic>
         <p:nvPicPr>
-          <p:cNvPr id="4" name="Picture 3">
-            <a:extLst>
-              <a:ext uri="{FF2B5EF4-FFF2-40B4-BE49-F238E27FC236}">
-                <a16:creationId xmlns:a16="http://schemas.microsoft.com/office/drawing/2014/main" id="{E490A7A4-396C-849D-3618-62ED6B67BB69}"/>
+          <p:cNvPr id="11" name="Picture 10">
+            <a:extLst>
+              <a:ext uri="{FF2B5EF4-FFF2-40B4-BE49-F238E27FC236}">
+                <a16:creationId xmlns:a16="http://schemas.microsoft.com/office/drawing/2014/main" id="{F3138102-81F3-6E66-29AA-E3175BC39015}"/>
               </a:ext>
             </a:extLst>
           </p:cNvPr>
@@ -8178,35 +8380,27 @@
           <p:nvPr/>
         </p:nvPicPr>
         <p:blipFill>
-          <a:blip r:embed="rId4" cstate="print">
-            <a:extLst>
-              <a:ext uri="{28A0092B-C50C-407E-A947-70E740481C1C}">
-                <a14:useLocalDpi xmlns:a14="http://schemas.microsoft.com/office/drawing/2010/main" val="0"/>
-              </a:ext>
-            </a:extLst>
-          </a:blip>
-          <a:srcRect/>
+          <a:blip r:embed="rId4"/>
           <a:stretch>
             <a:fillRect/>
           </a:stretch>
         </p:blipFill>
-        <p:spPr bwMode="auto">
+        <p:spPr>
           <a:xfrm>
-            <a:off x="6004090" y="1947346"/>
-            <a:ext cx="3092775" cy="2050217"/>
+            <a:off x="6022115" y="1655276"/>
+            <a:ext cx="3482638" cy="2578608"/>
           </a:xfrm>
           <a:prstGeom prst="rect">
             <a:avLst/>
           </a:prstGeom>
-          <a:noFill/>
         </p:spPr>
       </p:pic>
       <p:pic>
         <p:nvPicPr>
-          <p:cNvPr id="5" name="Picture 4">
-            <a:extLst>
-              <a:ext uri="{FF2B5EF4-FFF2-40B4-BE49-F238E27FC236}">
-                <a16:creationId xmlns:a16="http://schemas.microsoft.com/office/drawing/2014/main" id="{85B51D1C-4896-C8DD-2844-90B92591F13A}"/>
+          <p:cNvPr id="15" name="Picture 14">
+            <a:extLst>
+              <a:ext uri="{FF2B5EF4-FFF2-40B4-BE49-F238E27FC236}">
+                <a16:creationId xmlns:a16="http://schemas.microsoft.com/office/drawing/2014/main" id="{5EA080E8-42F6-4C6E-6773-76D63A52D366}"/>
               </a:ext>
             </a:extLst>
           </p:cNvPr>
@@ -8223,8 +8417,8 @@
         </p:blipFill>
         <p:spPr>
           <a:xfrm>
-            <a:off x="742925" y="4329091"/>
-            <a:ext cx="3175815" cy="2072391"/>
+            <a:off x="427983" y="4090306"/>
+            <a:ext cx="3464436" cy="2578608"/>
           </a:xfrm>
           <a:prstGeom prst="rect">
             <a:avLst/>
@@ -8233,10 +8427,10 @@
       </p:pic>
       <p:pic>
         <p:nvPicPr>
-          <p:cNvPr id="6" name="Picture 5">
-            <a:extLst>
-              <a:ext uri="{FF2B5EF4-FFF2-40B4-BE49-F238E27FC236}">
-                <a16:creationId xmlns:a16="http://schemas.microsoft.com/office/drawing/2014/main" id="{A81EFED3-529B-05BA-D21B-787BB8A55721}"/>
+          <p:cNvPr id="19" name="Picture 18">
+            <a:extLst>
+              <a:ext uri="{FF2B5EF4-FFF2-40B4-BE49-F238E27FC236}">
+                <a16:creationId xmlns:a16="http://schemas.microsoft.com/office/drawing/2014/main" id="{1734FEFF-1B9B-D6A1-1C1B-F785FFAB62C6}"/>
               </a:ext>
             </a:extLst>
           </p:cNvPr>
@@ -8253,8 +8447,8 @@
         </p:blipFill>
         <p:spPr>
           <a:xfrm>
-            <a:off x="6095998" y="4090306"/>
-            <a:ext cx="3092774" cy="2549962"/>
+            <a:off x="6004686" y="4090306"/>
+            <a:ext cx="3482638" cy="2578608"/>
           </a:xfrm>
           <a:prstGeom prst="rect">
             <a:avLst/>
@@ -11004,7 +11198,7 @@
         </p:nvSpPr>
         <p:spPr>
           <a:xfrm>
-            <a:off x="10024056" y="6498460"/>
+            <a:off x="8972286" y="602488"/>
             <a:ext cx="2146476" cy="369332"/>
           </a:xfrm>
           <a:prstGeom prst="rect">
@@ -11019,7 +11213,11 @@
           <a:lstStyle/>
           <a:p>
             <a:r>
-              <a:rPr lang="en-US" dirty="0"/>
+              <a:rPr lang="en-US" dirty="0">
+                <a:solidFill>
+                  <a:schemeClr val="bg1"/>
+                </a:solidFill>
+              </a:rPr>
               <a:t>Correlation: -0.513</a:t>
             </a:r>
           </a:p>
@@ -12059,7 +12257,7 @@
         </p:nvSpPr>
         <p:spPr>
           <a:xfrm>
-            <a:off x="10024056" y="6498460"/>
+            <a:off x="9087189" y="602488"/>
             <a:ext cx="2146476" cy="369332"/>
           </a:xfrm>
           <a:prstGeom prst="rect">
@@ -12074,7 +12272,11 @@
           <a:lstStyle/>
           <a:p>
             <a:r>
-              <a:rPr lang="en-US" dirty="0"/>
+              <a:rPr lang="en-US" dirty="0">
+                <a:solidFill>
+                  <a:schemeClr val="bg1"/>
+                </a:solidFill>
+              </a:rPr>
               <a:t>Correlation: -0.534</a:t>
             </a:r>
           </a:p>
@@ -12512,7 +12714,7 @@
         </p:nvSpPr>
         <p:spPr>
           <a:xfrm>
-            <a:off x="10024056" y="6498460"/>
+            <a:off x="9087189" y="629299"/>
             <a:ext cx="2146476" cy="369332"/>
           </a:xfrm>
           <a:prstGeom prst="rect">
@@ -12527,7 +12729,11 @@
           <a:lstStyle/>
           <a:p>
             <a:r>
-              <a:rPr lang="en-US" dirty="0"/>
+              <a:rPr lang="en-US" dirty="0">
+                <a:solidFill>
+                  <a:schemeClr val="bg1"/>
+                </a:solidFill>
+              </a:rPr>
               <a:t>Correlation: -0.582</a:t>
             </a:r>
           </a:p>
@@ -12535,10 +12741,10 @@
       </p:sp>
       <p:pic>
         <p:nvPicPr>
-          <p:cNvPr id="19" name="Picture 18">
-            <a:extLst>
-              <a:ext uri="{FF2B5EF4-FFF2-40B4-BE49-F238E27FC236}">
-                <a16:creationId xmlns:a16="http://schemas.microsoft.com/office/drawing/2014/main" id="{C0AC1AB0-9313-08BA-D191-FFCEC26F8885}"/>
+          <p:cNvPr id="4" name="Picture 3">
+            <a:extLst>
+              <a:ext uri="{FF2B5EF4-FFF2-40B4-BE49-F238E27FC236}">
+                <a16:creationId xmlns:a16="http://schemas.microsoft.com/office/drawing/2014/main" id="{038C7811-DC8A-79E5-FBA3-378944F1E9C9}"/>
               </a:ext>
             </a:extLst>
           </p:cNvPr>
@@ -12548,14 +12754,14 @@
           <p:nvPr/>
         </p:nvPicPr>
         <p:blipFill>
-          <a:blip r:embed="rId2"/>
+          <a:blip r:embed="rId3"/>
           <a:stretch>
             <a:fillRect/>
           </a:stretch>
         </p:blipFill>
         <p:spPr>
           <a:xfrm>
-            <a:off x="1038225" y="1896924"/>
+            <a:off x="1191574" y="1842648"/>
             <a:ext cx="9905720" cy="4389120"/>
           </a:xfrm>
           <a:prstGeom prst="rect">
@@ -12965,7 +13171,7 @@
         </p:nvSpPr>
         <p:spPr>
           <a:xfrm>
-            <a:off x="9916886" y="6498460"/>
+            <a:off x="8811531" y="602488"/>
             <a:ext cx="2253646" cy="369332"/>
           </a:xfrm>
           <a:prstGeom prst="rect">
@@ -12980,7 +13186,11 @@
           <a:lstStyle/>
           <a:p>
             <a:r>
-              <a:rPr lang="en-US" dirty="0"/>
+              <a:rPr lang="en-US" dirty="0">
+                <a:solidFill>
+                  <a:schemeClr val="bg1"/>
+                </a:solidFill>
+              </a:rPr>
               <a:t>Correlation: -0.4140</a:t>
             </a:r>
           </a:p>
@@ -15340,10 +15550,10 @@
       </p:sp>
       <p:pic>
         <p:nvPicPr>
-          <p:cNvPr id="17" name="Picture 16">
-            <a:extLst>
-              <a:ext uri="{FF2B5EF4-FFF2-40B4-BE49-F238E27FC236}">
-                <a16:creationId xmlns:a16="http://schemas.microsoft.com/office/drawing/2014/main" id="{B71906B2-FED4-2ACF-0004-B126DC26D308}"/>
+          <p:cNvPr id="4" name="Picture 3">
+            <a:extLst>
+              <a:ext uri="{FF2B5EF4-FFF2-40B4-BE49-F238E27FC236}">
+                <a16:creationId xmlns:a16="http://schemas.microsoft.com/office/drawing/2014/main" id="{9F38D1A3-3912-C330-57FD-9F39901AE33E}"/>
               </a:ext>
             </a:extLst>
           </p:cNvPr>
@@ -15360,8 +15570,8 @@
         </p:blipFill>
         <p:spPr>
           <a:xfrm>
-            <a:off x="1510749" y="1990038"/>
-            <a:ext cx="9905721" cy="4389120"/>
+            <a:off x="868746" y="1866392"/>
+            <a:ext cx="9905720" cy="4389120"/>
           </a:xfrm>
           <a:prstGeom prst="rect">
             <a:avLst/>
@@ -15792,10 +16002,10 @@
       </p:sp>
       <p:pic>
         <p:nvPicPr>
-          <p:cNvPr id="17" name="Picture 16">
-            <a:extLst>
-              <a:ext uri="{FF2B5EF4-FFF2-40B4-BE49-F238E27FC236}">
-                <a16:creationId xmlns:a16="http://schemas.microsoft.com/office/drawing/2014/main" id="{D0883807-B68A-F374-F3E6-968D6E769FE9}"/>
+          <p:cNvPr id="4" name="Picture 3">
+            <a:extLst>
+              <a:ext uri="{FF2B5EF4-FFF2-40B4-BE49-F238E27FC236}">
+                <a16:creationId xmlns:a16="http://schemas.microsoft.com/office/drawing/2014/main" id="{B22C3A64-0993-7DA8-3F22-4CCFB09EC86B}"/>
               </a:ext>
             </a:extLst>
           </p:cNvPr>
@@ -15812,7 +16022,7 @@
         </p:blipFill>
         <p:spPr>
           <a:xfrm>
-            <a:off x="923925" y="1882015"/>
+            <a:off x="973849" y="1866392"/>
             <a:ext cx="9905720" cy="4389120"/>
           </a:xfrm>
           <a:prstGeom prst="rect">

</xml_diff>

<commit_message>
fixed title on slides 10-11
</commit_message>
<xml_diff>
--- a/Project-1-Presentation.pptx
+++ b/Project-1-Presentation.pptx
@@ -137,14 +137,6 @@
 </p:presentation>
 </file>
 
-<file path=ppt/revisionInfo.xml><?xml version="1.0" encoding="utf-8"?>
-<p1510:revInfo xmlns:a="http://schemas.openxmlformats.org/drawingml/2006/main" xmlns:r="http://schemas.openxmlformats.org/officeDocument/2006/relationships" xmlns:p1510="http://schemas.microsoft.com/office/powerpoint/2015/10/main">
-  <p1510:revLst>
-    <p1510:client id="{3961579C-DF2F-9540-8A26-84ECA1134E6E}" v="10" dt="2024-07-19T00:25:03.168"/>
-  </p1510:revLst>
-</p1510:revInfo>
-</file>
-
 <file path=ppt/changesInfos/changesInfo1.xml><?xml version="1.0" encoding="utf-8"?>
 <pc:chgInfo xmlns:a="http://schemas.openxmlformats.org/drawingml/2006/main" xmlns:r="http://schemas.openxmlformats.org/officeDocument/2006/relationships" xmlns:ac="http://schemas.microsoft.com/office/drawing/2013/main/command" xmlns:pc="http://schemas.microsoft.com/office/powerpoint/2013/main/command">
   <pc:docChgLst>
@@ -524,7 +516,7 @@
   <pc:docChgLst>
     <pc:chgData name="Mike Saunders" userId="c0986ea9a2f2a984" providerId="LiveId" clId="{A88E1021-0D6E-4899-A132-129726DC3689}"/>
     <pc:docChg chg="undo custSel addSld delSld modSld sldOrd">
-      <pc:chgData name="Mike Saunders" userId="c0986ea9a2f2a984" providerId="LiveId" clId="{A88E1021-0D6E-4899-A132-129726DC3689}" dt="2024-07-19T00:22:36.269" v="1694" actId="478"/>
+      <pc:chgData name="Mike Saunders" userId="c0986ea9a2f2a984" providerId="LiveId" clId="{A88E1021-0D6E-4899-A132-129726DC3689}" dt="2024-07-23T00:11:14.615" v="1696" actId="6549"/>
       <pc:docMkLst>
         <pc:docMk/>
       </pc:docMkLst>
@@ -1854,11 +1846,19 @@
         </pc:spChg>
       </pc:sldChg>
       <pc:sldChg chg="modSp mod">
-        <pc:chgData name="Mike Saunders" userId="c0986ea9a2f2a984" providerId="LiveId" clId="{A88E1021-0D6E-4899-A132-129726DC3689}" dt="2024-07-18T23:06:01.883" v="1484" actId="207"/>
+        <pc:chgData name="Mike Saunders" userId="c0986ea9a2f2a984" providerId="LiveId" clId="{A88E1021-0D6E-4899-A132-129726DC3689}" dt="2024-07-23T00:11:11.668" v="1695" actId="6549"/>
         <pc:sldMkLst>
           <pc:docMk/>
           <pc:sldMk cId="4166704550" sldId="274"/>
         </pc:sldMkLst>
+        <pc:spChg chg="mod">
+          <ac:chgData name="Mike Saunders" userId="c0986ea9a2f2a984" providerId="LiveId" clId="{A88E1021-0D6E-4899-A132-129726DC3689}" dt="2024-07-23T00:11:11.668" v="1695" actId="6549"/>
+          <ac:spMkLst>
+            <pc:docMk/>
+            <pc:sldMk cId="4166704550" sldId="274"/>
+            <ac:spMk id="2" creationId="{56E94A04-04A0-FD3D-83EC-CBA731417051}"/>
+          </ac:spMkLst>
+        </pc:spChg>
         <pc:spChg chg="mod">
           <ac:chgData name="Mike Saunders" userId="c0986ea9a2f2a984" providerId="LiveId" clId="{A88E1021-0D6E-4899-A132-129726DC3689}" dt="2024-07-18T23:06:01.883" v="1484" actId="207"/>
           <ac:spMkLst>
@@ -1869,11 +1869,19 @@
         </pc:spChg>
       </pc:sldChg>
       <pc:sldChg chg="modSp mod">
-        <pc:chgData name="Mike Saunders" userId="c0986ea9a2f2a984" providerId="LiveId" clId="{A88E1021-0D6E-4899-A132-129726DC3689}" dt="2024-07-18T23:06:12.532" v="1486" actId="207"/>
+        <pc:chgData name="Mike Saunders" userId="c0986ea9a2f2a984" providerId="LiveId" clId="{A88E1021-0D6E-4899-A132-129726DC3689}" dt="2024-07-23T00:11:14.615" v="1696" actId="6549"/>
         <pc:sldMkLst>
           <pc:docMk/>
           <pc:sldMk cId="3940634714" sldId="275"/>
         </pc:sldMkLst>
+        <pc:spChg chg="mod">
+          <ac:chgData name="Mike Saunders" userId="c0986ea9a2f2a984" providerId="LiveId" clId="{A88E1021-0D6E-4899-A132-129726DC3689}" dt="2024-07-23T00:11:14.615" v="1696" actId="6549"/>
+          <ac:spMkLst>
+            <pc:docMk/>
+            <pc:sldMk cId="3940634714" sldId="275"/>
+            <ac:spMk id="2" creationId="{56E94A04-04A0-FD3D-83EC-CBA731417051}"/>
+          </ac:spMkLst>
+        </pc:spChg>
         <pc:spChg chg="mod">
           <ac:chgData name="Mike Saunders" userId="c0986ea9a2f2a984" providerId="LiveId" clId="{A88E1021-0D6E-4899-A132-129726DC3689}" dt="2024-07-18T23:06:12.532" v="1486" actId="207"/>
           <ac:spMkLst>
@@ -2340,7 +2348,7 @@
           <a:p>
             <a:fld id="{EED1439E-0D64-4804-80F6-7A6E36836B42}" type="datetimeFigureOut">
               <a:rPr lang="en-US" smtClean="0"/>
-              <a:t>7/18/24</a:t>
+              <a:t>7/22/2024</a:t>
             </a:fld>
             <a:endParaRPr lang="en-US"/>
           </a:p>
@@ -3348,7 +3356,7 @@
           <a:p>
             <a:fld id="{72345051-2045-45DA-935E-2E3CA1A69ADC}" type="datetimeFigureOut">
               <a:rPr lang="en-US" smtClean="0"/>
-              <a:t>7/18/24</a:t>
+              <a:t>7/22/2024</a:t>
             </a:fld>
             <a:endParaRPr lang="en-US" dirty="0"/>
           </a:p>
@@ -3546,7 +3554,7 @@
           <a:p>
             <a:fld id="{72345051-2045-45DA-935E-2E3CA1A69ADC}" type="datetimeFigureOut">
               <a:rPr lang="en-US" smtClean="0"/>
-              <a:t>7/18/24</a:t>
+              <a:t>7/22/2024</a:t>
             </a:fld>
             <a:endParaRPr lang="en-US"/>
           </a:p>
@@ -3754,7 +3762,7 @@
           <a:p>
             <a:fld id="{72345051-2045-45DA-935E-2E3CA1A69ADC}" type="datetimeFigureOut">
               <a:rPr lang="en-US" smtClean="0"/>
-              <a:t>7/18/24</a:t>
+              <a:t>7/22/2024</a:t>
             </a:fld>
             <a:endParaRPr lang="en-US"/>
           </a:p>
@@ -3952,7 +3960,7 @@
           <a:p>
             <a:fld id="{72345051-2045-45DA-935E-2E3CA1A69ADC}" type="datetimeFigureOut">
               <a:rPr lang="en-US" smtClean="0"/>
-              <a:t>7/18/24</a:t>
+              <a:t>7/22/2024</a:t>
             </a:fld>
             <a:endParaRPr lang="en-US"/>
           </a:p>
@@ -4227,7 +4235,7 @@
           <a:p>
             <a:fld id="{72345051-2045-45DA-935E-2E3CA1A69ADC}" type="datetimeFigureOut">
               <a:rPr lang="en-US" smtClean="0"/>
-              <a:t>7/18/24</a:t>
+              <a:t>7/22/2024</a:t>
             </a:fld>
             <a:endParaRPr lang="en-US"/>
           </a:p>
@@ -4492,7 +4500,7 @@
           <a:p>
             <a:fld id="{72345051-2045-45DA-935E-2E3CA1A69ADC}" type="datetimeFigureOut">
               <a:rPr lang="en-US" smtClean="0"/>
-              <a:t>7/18/24</a:t>
+              <a:t>7/22/2024</a:t>
             </a:fld>
             <a:endParaRPr lang="en-US"/>
           </a:p>
@@ -4904,7 +4912,7 @@
           <a:p>
             <a:fld id="{72345051-2045-45DA-935E-2E3CA1A69ADC}" type="datetimeFigureOut">
               <a:rPr lang="en-US" smtClean="0"/>
-              <a:t>7/18/24</a:t>
+              <a:t>7/22/2024</a:t>
             </a:fld>
             <a:endParaRPr lang="en-US"/>
           </a:p>
@@ -5045,7 +5053,7 @@
           <a:p>
             <a:fld id="{72345051-2045-45DA-935E-2E3CA1A69ADC}" type="datetimeFigureOut">
               <a:rPr lang="en-US" smtClean="0"/>
-              <a:t>7/18/24</a:t>
+              <a:t>7/22/2024</a:t>
             </a:fld>
             <a:endParaRPr lang="en-US"/>
           </a:p>
@@ -5158,7 +5166,7 @@
           <a:p>
             <a:fld id="{72345051-2045-45DA-935E-2E3CA1A69ADC}" type="datetimeFigureOut">
               <a:rPr lang="en-US" smtClean="0"/>
-              <a:t>7/18/24</a:t>
+              <a:t>7/22/2024</a:t>
             </a:fld>
             <a:endParaRPr lang="en-US"/>
           </a:p>
@@ -5469,7 +5477,7 @@
           <a:p>
             <a:fld id="{72345051-2045-45DA-935E-2E3CA1A69ADC}" type="datetimeFigureOut">
               <a:rPr lang="en-US" smtClean="0"/>
-              <a:t>7/18/24</a:t>
+              <a:t>7/22/2024</a:t>
             </a:fld>
             <a:endParaRPr lang="en-US"/>
           </a:p>
@@ -5757,7 +5765,7 @@
           <a:p>
             <a:fld id="{72345051-2045-45DA-935E-2E3CA1A69ADC}" type="datetimeFigureOut">
               <a:rPr lang="en-US" smtClean="0"/>
-              <a:t>7/18/24</a:t>
+              <a:t>7/22/2024</a:t>
             </a:fld>
             <a:endParaRPr lang="en-US"/>
           </a:p>
@@ -5998,7 +6006,7 @@
           <a:p>
             <a:fld id="{72345051-2045-45DA-935E-2E3CA1A69ADC}" type="datetimeFigureOut">
               <a:rPr lang="en-US" smtClean="0"/>
-              <a:t>7/18/24</a:t>
+              <a:t>7/22/2024</a:t>
             </a:fld>
             <a:endParaRPr lang="en-US" dirty="0"/>
           </a:p>
@@ -7026,7 +7034,7 @@
                   <a:srgbClr val="FFFFFF"/>
                 </a:solidFill>
               </a:rPr>
-              <a:t>Weekly Temperatures &amp; Population- Columbus</a:t>
+              <a:t>Temperatures &amp; Population- Columbus</a:t>
             </a:r>
             <a:endParaRPr lang="en-US" sz="4000" kern="1200" dirty="0">
               <a:solidFill>
@@ -7489,7 +7497,7 @@
                   <a:srgbClr val="FFFFFF"/>
                 </a:solidFill>
               </a:rPr>
-              <a:t>Weekly Temperatures &amp; Population- Cincinnati</a:t>
+              <a:t>Temperatures &amp; Population- Cincinnati</a:t>
             </a:r>
             <a:endParaRPr lang="en-US" sz="4000" kern="1200" dirty="0">
               <a:solidFill>

</xml_diff>